<commit_message>
Minor updates to the presentation and resources.html
</commit_message>
<xml_diff>
--- a/resources/Introduction to github.pptx
+++ b/resources/Introduction to github.pptx
@@ -5,37 +5,39 @@
     <p:sldMasterId id="2147483669" r:id="rId4"/>
   </p:sldMasterIdLst>
   <p:notesMasterIdLst>
-    <p:notesMasterId r:id="rId30"/>
+    <p:notesMasterId r:id="rId32"/>
   </p:notesMasterIdLst>
   <p:handoutMasterIdLst>
-    <p:handoutMasterId r:id="rId31"/>
+    <p:handoutMasterId r:id="rId33"/>
   </p:handoutMasterIdLst>
   <p:sldIdLst>
     <p:sldId id="256" r:id="rId5"/>
     <p:sldId id="258" r:id="rId6"/>
-    <p:sldId id="261" r:id="rId7"/>
-    <p:sldId id="262" r:id="rId8"/>
-    <p:sldId id="264" r:id="rId9"/>
-    <p:sldId id="266" r:id="rId10"/>
-    <p:sldId id="267" r:id="rId11"/>
-    <p:sldId id="268" r:id="rId12"/>
-    <p:sldId id="271" r:id="rId13"/>
-    <p:sldId id="270" r:id="rId14"/>
-    <p:sldId id="272" r:id="rId15"/>
-    <p:sldId id="273" r:id="rId16"/>
-    <p:sldId id="274" r:id="rId17"/>
-    <p:sldId id="269" r:id="rId18"/>
-    <p:sldId id="275" r:id="rId19"/>
-    <p:sldId id="276" r:id="rId20"/>
-    <p:sldId id="277" r:id="rId21"/>
-    <p:sldId id="278" r:id="rId22"/>
-    <p:sldId id="279" r:id="rId23"/>
-    <p:sldId id="280" r:id="rId24"/>
-    <p:sldId id="281" r:id="rId25"/>
-    <p:sldId id="282" r:id="rId26"/>
-    <p:sldId id="283" r:id="rId27"/>
-    <p:sldId id="284" r:id="rId28"/>
-    <p:sldId id="265" r:id="rId29"/>
+    <p:sldId id="285" r:id="rId7"/>
+    <p:sldId id="261" r:id="rId8"/>
+    <p:sldId id="262" r:id="rId9"/>
+    <p:sldId id="264" r:id="rId10"/>
+    <p:sldId id="266" r:id="rId11"/>
+    <p:sldId id="267" r:id="rId12"/>
+    <p:sldId id="268" r:id="rId13"/>
+    <p:sldId id="271" r:id="rId14"/>
+    <p:sldId id="270" r:id="rId15"/>
+    <p:sldId id="272" r:id="rId16"/>
+    <p:sldId id="273" r:id="rId17"/>
+    <p:sldId id="274" r:id="rId18"/>
+    <p:sldId id="269" r:id="rId19"/>
+    <p:sldId id="275" r:id="rId20"/>
+    <p:sldId id="276" r:id="rId21"/>
+    <p:sldId id="277" r:id="rId22"/>
+    <p:sldId id="278" r:id="rId23"/>
+    <p:sldId id="279" r:id="rId24"/>
+    <p:sldId id="280" r:id="rId25"/>
+    <p:sldId id="281" r:id="rId26"/>
+    <p:sldId id="282" r:id="rId27"/>
+    <p:sldId id="283" r:id="rId28"/>
+    <p:sldId id="284" r:id="rId29"/>
+    <p:sldId id="286" r:id="rId30"/>
+    <p:sldId id="265" r:id="rId31"/>
   </p:sldIdLst>
   <p:sldSz cx="12192000" cy="6858000"/>
   <p:notesSz cx="6858000" cy="9144000"/>
@@ -239,7 +241,7 @@
           <a:p>
             <a:fld id="{2B85766F-5EC0-4797-B4D1-777FCB005B11}" type="datetimeFigureOut">
               <a:rPr lang="en-US" smtClean="0"/>
-              <a:t>1/8/2020</a:t>
+              <a:t>1/9/2020</a:t>
             </a:fld>
             <a:endParaRPr lang="en-US" dirty="0"/>
           </a:p>
@@ -416,7 +418,7 @@
           <a:p>
             <a:fld id="{B2B4B5EC-152C-4627-80C0-63B10D5574EF}" type="datetimeFigureOut">
               <a:rPr lang="en-US" smtClean="0"/>
-              <a:t>1/8/2020</a:t>
+              <a:t>1/9/2020</a:t>
             </a:fld>
             <a:endParaRPr lang="en-US" dirty="0"/>
           </a:p>
@@ -740,7 +742,7 @@
           <a:noFill/>
           <a:extLst>
             <a:ext uri="{909E8E84-426E-40dd-AFC4-6F175D3DCCD1}">
-              <a14:hiddenFill xmlns:a14="http://schemas.microsoft.com/office/drawing/2010/main" xmlns="">
+              <a14:hiddenFill xmlns="" xmlns:a14="http://schemas.microsoft.com/office/drawing/2010/main">
                 <a:solidFill>
                   <a:srgbClr val="FFFFFF"/>
                 </a:solidFill>
@@ -799,7 +801,7 @@
             </a:ln>
             <a:extLst>
               <a:ext uri="{91240B29-F687-4f45-9708-019B960494DF}">
-                <a14:hiddenLine xmlns:a14="http://schemas.microsoft.com/office/drawing/2010/main" xmlns="" w="9525">
+                <a14:hiddenLine xmlns="" xmlns:a14="http://schemas.microsoft.com/office/drawing/2010/main" w="9525">
                   <a:solidFill>
                     <a:srgbClr val="000000"/>
                   </a:solidFill>
@@ -889,7 +891,7 @@
             </a:ln>
             <a:extLst>
               <a:ext uri="{91240B29-F687-4f45-9708-019B960494DF}">
-                <a14:hiddenLine xmlns:a14="http://schemas.microsoft.com/office/drawing/2010/main" xmlns="" w="9525">
+                <a14:hiddenLine xmlns="" xmlns:a14="http://schemas.microsoft.com/office/drawing/2010/main" w="9525">
                   <a:solidFill>
                     <a:srgbClr val="000000"/>
                   </a:solidFill>
@@ -979,7 +981,7 @@
             </a:ln>
             <a:extLst>
               <a:ext uri="{91240B29-F687-4f45-9708-019B960494DF}">
-                <a14:hiddenLine xmlns:a14="http://schemas.microsoft.com/office/drawing/2010/main" xmlns="" w="9525">
+                <a14:hiddenLine xmlns="" xmlns:a14="http://schemas.microsoft.com/office/drawing/2010/main" w="9525">
                   <a:solidFill>
                     <a:srgbClr val="000000"/>
                   </a:solidFill>
@@ -1013,7 +1015,7 @@
             </a:ln>
             <a:extLst>
               <a:ext uri="{91240B29-F687-4f45-9708-019B960494DF}">
-                <a14:hiddenLine xmlns:a14="http://schemas.microsoft.com/office/drawing/2010/main" xmlns="" w="9525">
+                <a14:hiddenLine xmlns="" xmlns:a14="http://schemas.microsoft.com/office/drawing/2010/main" w="9525">
                   <a:solidFill>
                     <a:srgbClr val="000000"/>
                   </a:solidFill>
@@ -1103,7 +1105,7 @@
             </a:ln>
             <a:extLst>
               <a:ext uri="{91240B29-F687-4f45-9708-019B960494DF}">
-                <a14:hiddenLine xmlns:a14="http://schemas.microsoft.com/office/drawing/2010/main" xmlns="" w="9525">
+                <a14:hiddenLine xmlns="" xmlns:a14="http://schemas.microsoft.com/office/drawing/2010/main" w="9525">
                   <a:solidFill>
                     <a:srgbClr val="000000"/>
                   </a:solidFill>
@@ -1165,7 +1167,7 @@
             </a:ln>
             <a:extLst>
               <a:ext uri="{91240B29-F687-4f45-9708-019B960494DF}">
-                <a14:hiddenLine xmlns:a14="http://schemas.microsoft.com/office/drawing/2010/main" xmlns="" w="9525">
+                <a14:hiddenLine xmlns="" xmlns:a14="http://schemas.microsoft.com/office/drawing/2010/main" w="9525">
                   <a:solidFill>
                     <a:srgbClr val="000000"/>
                   </a:solidFill>
@@ -1227,7 +1229,7 @@
             </a:ln>
             <a:extLst>
               <a:ext uri="{91240B29-F687-4f45-9708-019B960494DF}">
-                <a14:hiddenLine xmlns:a14="http://schemas.microsoft.com/office/drawing/2010/main" xmlns="" w="9525">
+                <a14:hiddenLine xmlns="" xmlns:a14="http://schemas.microsoft.com/office/drawing/2010/main" w="9525">
                   <a:solidFill>
                     <a:srgbClr val="000000"/>
                   </a:solidFill>
@@ -1317,7 +1319,7 @@
             </a:ln>
             <a:extLst>
               <a:ext uri="{91240B29-F687-4f45-9708-019B960494DF}">
-                <a14:hiddenLine xmlns:a14="http://schemas.microsoft.com/office/drawing/2010/main" xmlns="" w="9525">
+                <a14:hiddenLine xmlns="" xmlns:a14="http://schemas.microsoft.com/office/drawing/2010/main" w="9525">
                   <a:solidFill>
                     <a:srgbClr val="000000"/>
                   </a:solidFill>
@@ -1379,7 +1381,7 @@
             </a:ln>
             <a:extLst>
               <a:ext uri="{91240B29-F687-4f45-9708-019B960494DF}">
-                <a14:hiddenLine xmlns:a14="http://schemas.microsoft.com/office/drawing/2010/main" xmlns="" w="9525">
+                <a14:hiddenLine xmlns="" xmlns:a14="http://schemas.microsoft.com/office/drawing/2010/main" w="9525">
                   <a:solidFill>
                     <a:srgbClr val="000000"/>
                   </a:solidFill>
@@ -1441,7 +1443,7 @@
             </a:ln>
             <a:extLst>
               <a:ext uri="{91240B29-F687-4f45-9708-019B960494DF}">
-                <a14:hiddenLine xmlns:a14="http://schemas.microsoft.com/office/drawing/2010/main" xmlns="" w="9525">
+                <a14:hiddenLine xmlns="" xmlns:a14="http://schemas.microsoft.com/office/drawing/2010/main" w="9525">
                   <a:solidFill>
                     <a:srgbClr val="000000"/>
                   </a:solidFill>
@@ -1531,7 +1533,7 @@
             </a:ln>
             <a:extLst>
               <a:ext uri="{91240B29-F687-4f45-9708-019B960494DF}">
-                <a14:hiddenLine xmlns:a14="http://schemas.microsoft.com/office/drawing/2010/main" xmlns="" w="9525">
+                <a14:hiddenLine xmlns="" xmlns:a14="http://schemas.microsoft.com/office/drawing/2010/main" w="9525">
                   <a:solidFill>
                     <a:srgbClr val="000000"/>
                   </a:solidFill>
@@ -1621,7 +1623,7 @@
             </a:ln>
             <a:extLst>
               <a:ext uri="{91240B29-F687-4f45-9708-019B960494DF}">
-                <a14:hiddenLine xmlns:a14="http://schemas.microsoft.com/office/drawing/2010/main" xmlns="" w="9525">
+                <a14:hiddenLine xmlns="" xmlns:a14="http://schemas.microsoft.com/office/drawing/2010/main" w="9525">
                   <a:solidFill>
                     <a:srgbClr val="000000"/>
                   </a:solidFill>
@@ -1683,7 +1685,7 @@
             </a:ln>
             <a:extLst>
               <a:ext uri="{91240B29-F687-4f45-9708-019B960494DF}">
-                <a14:hiddenLine xmlns:a14="http://schemas.microsoft.com/office/drawing/2010/main" xmlns="" w="9525">
+                <a14:hiddenLine xmlns="" xmlns:a14="http://schemas.microsoft.com/office/drawing/2010/main" w="9525">
                   <a:solidFill>
                     <a:srgbClr val="000000"/>
                   </a:solidFill>
@@ -1793,7 +1795,7 @@
             </a:ln>
             <a:extLst>
               <a:ext uri="{91240B29-F687-4f45-9708-019B960494DF}">
-                <a14:hiddenLine xmlns:a14="http://schemas.microsoft.com/office/drawing/2010/main" xmlns="" w="9525">
+                <a14:hiddenLine xmlns="" xmlns:a14="http://schemas.microsoft.com/office/drawing/2010/main" w="9525">
                   <a:solidFill>
                     <a:srgbClr val="000000"/>
                   </a:solidFill>
@@ -1855,7 +1857,7 @@
             </a:ln>
             <a:extLst>
               <a:ext uri="{91240B29-F687-4f45-9708-019B960494DF}">
-                <a14:hiddenLine xmlns:a14="http://schemas.microsoft.com/office/drawing/2010/main" xmlns="" w="9525">
+                <a14:hiddenLine xmlns="" xmlns:a14="http://schemas.microsoft.com/office/drawing/2010/main" w="9525">
                   <a:solidFill>
                     <a:srgbClr val="000000"/>
                   </a:solidFill>
@@ -1945,7 +1947,7 @@
             </a:ln>
             <a:extLst>
               <a:ext uri="{91240B29-F687-4f45-9708-019B960494DF}">
-                <a14:hiddenLine xmlns:a14="http://schemas.microsoft.com/office/drawing/2010/main" xmlns="" w="9525">
+                <a14:hiddenLine xmlns="" xmlns:a14="http://schemas.microsoft.com/office/drawing/2010/main" w="9525">
                   <a:solidFill>
                     <a:srgbClr val="000000"/>
                   </a:solidFill>
@@ -2035,7 +2037,7 @@
             </a:ln>
             <a:extLst>
               <a:ext uri="{91240B29-F687-4f45-9708-019B960494DF}">
-                <a14:hiddenLine xmlns:a14="http://schemas.microsoft.com/office/drawing/2010/main" xmlns="" w="9525">
+                <a14:hiddenLine xmlns="" xmlns:a14="http://schemas.microsoft.com/office/drawing/2010/main" w="9525">
                   <a:solidFill>
                     <a:srgbClr val="000000"/>
                   </a:solidFill>
@@ -2097,7 +2099,7 @@
             </a:ln>
             <a:extLst>
               <a:ext uri="{91240B29-F687-4f45-9708-019B960494DF}">
-                <a14:hiddenLine xmlns:a14="http://schemas.microsoft.com/office/drawing/2010/main" xmlns="" w="9525">
+                <a14:hiddenLine xmlns="" xmlns:a14="http://schemas.microsoft.com/office/drawing/2010/main" w="9525">
                   <a:solidFill>
                     <a:srgbClr val="000000"/>
                   </a:solidFill>
@@ -2187,7 +2189,7 @@
             </a:ln>
             <a:extLst>
               <a:ext uri="{91240B29-F687-4f45-9708-019B960494DF}">
-                <a14:hiddenLine xmlns:a14="http://schemas.microsoft.com/office/drawing/2010/main" xmlns="" w="9525">
+                <a14:hiddenLine xmlns="" xmlns:a14="http://schemas.microsoft.com/office/drawing/2010/main" w="9525">
                   <a:solidFill>
                     <a:srgbClr val="000000"/>
                   </a:solidFill>
@@ -2277,7 +2279,7 @@
             </a:ln>
             <a:extLst>
               <a:ext uri="{91240B29-F687-4f45-9708-019B960494DF}">
-                <a14:hiddenLine xmlns:a14="http://schemas.microsoft.com/office/drawing/2010/main" xmlns="" w="9525">
+                <a14:hiddenLine xmlns="" xmlns:a14="http://schemas.microsoft.com/office/drawing/2010/main" w="9525">
                   <a:solidFill>
                     <a:srgbClr val="000000"/>
                   </a:solidFill>
@@ -2333,7 +2335,7 @@
             </a:ln>
             <a:extLst>
               <a:ext uri="{91240B29-F687-4f45-9708-019B960494DF}">
-                <a14:hiddenLine xmlns:a14="http://schemas.microsoft.com/office/drawing/2010/main" xmlns="" w="9525">
+                <a14:hiddenLine xmlns="" xmlns:a14="http://schemas.microsoft.com/office/drawing/2010/main" w="9525">
                   <a:solidFill>
                     <a:srgbClr val="000000"/>
                   </a:solidFill>
@@ -2423,7 +2425,7 @@
             </a:ln>
             <a:extLst>
               <a:ext uri="{91240B29-F687-4f45-9708-019B960494DF}">
-                <a14:hiddenLine xmlns:a14="http://schemas.microsoft.com/office/drawing/2010/main" xmlns="" w="9525">
+                <a14:hiddenLine xmlns="" xmlns:a14="http://schemas.microsoft.com/office/drawing/2010/main" w="9525">
                   <a:solidFill>
                     <a:srgbClr val="000000"/>
                   </a:solidFill>
@@ -2479,7 +2481,7 @@
             </a:ln>
             <a:extLst>
               <a:ext uri="{91240B29-F687-4f45-9708-019B960494DF}">
-                <a14:hiddenLine xmlns:a14="http://schemas.microsoft.com/office/drawing/2010/main" xmlns="" w="9525">
+                <a14:hiddenLine xmlns="" xmlns:a14="http://schemas.microsoft.com/office/drawing/2010/main" w="9525">
                   <a:solidFill>
                     <a:srgbClr val="000000"/>
                   </a:solidFill>
@@ -2569,7 +2571,7 @@
             </a:ln>
             <a:extLst>
               <a:ext uri="{91240B29-F687-4f45-9708-019B960494DF}">
-                <a14:hiddenLine xmlns:a14="http://schemas.microsoft.com/office/drawing/2010/main" xmlns="" w="9525">
+                <a14:hiddenLine xmlns="" xmlns:a14="http://schemas.microsoft.com/office/drawing/2010/main" w="9525">
                   <a:solidFill>
                     <a:srgbClr val="000000"/>
                   </a:solidFill>
@@ -2637,7 +2639,7 @@
             </a:ln>
             <a:extLst>
               <a:ext uri="{91240B29-F687-4f45-9708-019B960494DF}">
-                <a14:hiddenLine xmlns:a14="http://schemas.microsoft.com/office/drawing/2010/main" xmlns="" w="9525">
+                <a14:hiddenLine xmlns="" xmlns:a14="http://schemas.microsoft.com/office/drawing/2010/main" w="9525">
                   <a:solidFill>
                     <a:srgbClr val="000000"/>
                   </a:solidFill>
@@ -2727,7 +2729,7 @@
             </a:ln>
             <a:extLst>
               <a:ext uri="{91240B29-F687-4f45-9708-019B960494DF}">
-                <a14:hiddenLine xmlns:a14="http://schemas.microsoft.com/office/drawing/2010/main" xmlns="" w="9525">
+                <a14:hiddenLine xmlns="" xmlns:a14="http://schemas.microsoft.com/office/drawing/2010/main" w="9525">
                   <a:solidFill>
                     <a:srgbClr val="000000"/>
                   </a:solidFill>
@@ -2795,7 +2797,7 @@
             </a:ln>
             <a:extLst>
               <a:ext uri="{91240B29-F687-4f45-9708-019B960494DF}">
-                <a14:hiddenLine xmlns:a14="http://schemas.microsoft.com/office/drawing/2010/main" xmlns="" w="9525">
+                <a14:hiddenLine xmlns="" xmlns:a14="http://schemas.microsoft.com/office/drawing/2010/main" w="9525">
                   <a:solidFill>
                     <a:srgbClr val="000000"/>
                   </a:solidFill>
@@ -2885,7 +2887,7 @@
             </a:ln>
             <a:extLst>
               <a:ext uri="{91240B29-F687-4f45-9708-019B960494DF}">
-                <a14:hiddenLine xmlns:a14="http://schemas.microsoft.com/office/drawing/2010/main" xmlns="" w="9525">
+                <a14:hiddenLine xmlns="" xmlns:a14="http://schemas.microsoft.com/office/drawing/2010/main" w="9525">
                   <a:solidFill>
                     <a:srgbClr val="000000"/>
                   </a:solidFill>
@@ -2919,7 +2921,7 @@
             </a:ln>
             <a:extLst>
               <a:ext uri="{91240B29-F687-4f45-9708-019B960494DF}">
-                <a14:hiddenLine xmlns:a14="http://schemas.microsoft.com/office/drawing/2010/main" xmlns="" w="9525">
+                <a14:hiddenLine xmlns="" xmlns:a14="http://schemas.microsoft.com/office/drawing/2010/main" w="9525">
                   <a:solidFill>
                     <a:srgbClr val="000000"/>
                   </a:solidFill>
@@ -3009,7 +3011,7 @@
             </a:ln>
             <a:extLst>
               <a:ext uri="{91240B29-F687-4f45-9708-019B960494DF}">
-                <a14:hiddenLine xmlns:a14="http://schemas.microsoft.com/office/drawing/2010/main" xmlns="" w="9525">
+                <a14:hiddenLine xmlns="" xmlns:a14="http://schemas.microsoft.com/office/drawing/2010/main" w="9525">
                   <a:solidFill>
                     <a:srgbClr val="000000"/>
                   </a:solidFill>
@@ -3071,7 +3073,7 @@
             </a:ln>
             <a:extLst>
               <a:ext uri="{91240B29-F687-4f45-9708-019B960494DF}">
-                <a14:hiddenLine xmlns:a14="http://schemas.microsoft.com/office/drawing/2010/main" xmlns="" w="9525">
+                <a14:hiddenLine xmlns="" xmlns:a14="http://schemas.microsoft.com/office/drawing/2010/main" w="9525">
                   <a:solidFill>
                     <a:srgbClr val="000000"/>
                   </a:solidFill>
@@ -3133,7 +3135,7 @@
             </a:ln>
             <a:extLst>
               <a:ext uri="{91240B29-F687-4f45-9708-019B960494DF}">
-                <a14:hiddenLine xmlns:a14="http://schemas.microsoft.com/office/drawing/2010/main" xmlns="" w="9525">
+                <a14:hiddenLine xmlns="" xmlns:a14="http://schemas.microsoft.com/office/drawing/2010/main" w="9525">
                   <a:solidFill>
                     <a:srgbClr val="000000"/>
                   </a:solidFill>
@@ -3223,7 +3225,7 @@
             </a:ln>
             <a:extLst>
               <a:ext uri="{91240B29-F687-4f45-9708-019B960494DF}">
-                <a14:hiddenLine xmlns:a14="http://schemas.microsoft.com/office/drawing/2010/main" xmlns="" w="9525">
+                <a14:hiddenLine xmlns="" xmlns:a14="http://schemas.microsoft.com/office/drawing/2010/main" w="9525">
                   <a:solidFill>
                     <a:srgbClr val="000000"/>
                   </a:solidFill>
@@ -3291,7 +3293,7 @@
             </a:ln>
             <a:extLst>
               <a:ext uri="{91240B29-F687-4f45-9708-019B960494DF}">
-                <a14:hiddenLine xmlns:a14="http://schemas.microsoft.com/office/drawing/2010/main" xmlns="" w="9525">
+                <a14:hiddenLine xmlns="" xmlns:a14="http://schemas.microsoft.com/office/drawing/2010/main" w="9525">
                   <a:solidFill>
                     <a:srgbClr val="000000"/>
                   </a:solidFill>
@@ -3353,7 +3355,7 @@
             </a:ln>
             <a:extLst>
               <a:ext uri="{91240B29-F687-4f45-9708-019B960494DF}">
-                <a14:hiddenLine xmlns:a14="http://schemas.microsoft.com/office/drawing/2010/main" xmlns="" w="9525">
+                <a14:hiddenLine xmlns="" xmlns:a14="http://schemas.microsoft.com/office/drawing/2010/main" w="9525">
                   <a:solidFill>
                     <a:srgbClr val="000000"/>
                   </a:solidFill>
@@ -3443,7 +3445,7 @@
             </a:ln>
             <a:extLst>
               <a:ext uri="{91240B29-F687-4f45-9708-019B960494DF}">
-                <a14:hiddenLine xmlns:a14="http://schemas.microsoft.com/office/drawing/2010/main" xmlns="" w="9525">
+                <a14:hiddenLine xmlns="" xmlns:a14="http://schemas.microsoft.com/office/drawing/2010/main" w="9525">
                   <a:solidFill>
                     <a:srgbClr val="000000"/>
                   </a:solidFill>
@@ -3505,7 +3507,7 @@
             </a:ln>
             <a:extLst>
               <a:ext uri="{91240B29-F687-4f45-9708-019B960494DF}">
-                <a14:hiddenLine xmlns:a14="http://schemas.microsoft.com/office/drawing/2010/main" xmlns="" w="9525">
+                <a14:hiddenLine xmlns="" xmlns:a14="http://schemas.microsoft.com/office/drawing/2010/main" w="9525">
                   <a:solidFill>
                     <a:srgbClr val="000000"/>
                   </a:solidFill>
@@ -3595,7 +3597,7 @@
             </a:ln>
             <a:extLst>
               <a:ext uri="{91240B29-F687-4f45-9708-019B960494DF}">
-                <a14:hiddenLine xmlns:a14="http://schemas.microsoft.com/office/drawing/2010/main" xmlns="" w="9525">
+                <a14:hiddenLine xmlns="" xmlns:a14="http://schemas.microsoft.com/office/drawing/2010/main" w="9525">
                   <a:solidFill>
                     <a:srgbClr val="000000"/>
                   </a:solidFill>
@@ -3657,7 +3659,7 @@
             </a:ln>
             <a:extLst>
               <a:ext uri="{91240B29-F687-4f45-9708-019B960494DF}">
-                <a14:hiddenLine xmlns:a14="http://schemas.microsoft.com/office/drawing/2010/main" xmlns="" w="9525">
+                <a14:hiddenLine xmlns="" xmlns:a14="http://schemas.microsoft.com/office/drawing/2010/main" w="9525">
                   <a:solidFill>
                     <a:srgbClr val="000000"/>
                   </a:solidFill>
@@ -3747,7 +3749,7 @@
             </a:ln>
             <a:extLst>
               <a:ext uri="{91240B29-F687-4f45-9708-019B960494DF}">
-                <a14:hiddenLine xmlns:a14="http://schemas.microsoft.com/office/drawing/2010/main" xmlns="" w="9525">
+                <a14:hiddenLine xmlns="" xmlns:a14="http://schemas.microsoft.com/office/drawing/2010/main" w="9525">
                   <a:solidFill>
                     <a:srgbClr val="000000"/>
                   </a:solidFill>
@@ -3781,7 +3783,7 @@
             </a:ln>
             <a:extLst>
               <a:ext uri="{91240B29-F687-4f45-9708-019B960494DF}">
-                <a14:hiddenLine xmlns:a14="http://schemas.microsoft.com/office/drawing/2010/main" xmlns="" w="9525">
+                <a14:hiddenLine xmlns="" xmlns:a14="http://schemas.microsoft.com/office/drawing/2010/main" w="9525">
                   <a:solidFill>
                     <a:srgbClr val="000000"/>
                   </a:solidFill>
@@ -3846,7 +3848,7 @@
             </a:ln>
             <a:extLst>
               <a:ext uri="{91240B29-F687-4f45-9708-019B960494DF}">
-                <a14:hiddenLine xmlns:a14="http://schemas.microsoft.com/office/drawing/2010/main" xmlns="" w="9525">
+                <a14:hiddenLine xmlns="" xmlns:a14="http://schemas.microsoft.com/office/drawing/2010/main" w="9525">
                   <a:solidFill>
                     <a:srgbClr val="000000"/>
                   </a:solidFill>
@@ -3936,7 +3938,7 @@
             </a:ln>
             <a:extLst>
               <a:ext uri="{91240B29-F687-4f45-9708-019B960494DF}">
-                <a14:hiddenLine xmlns:a14="http://schemas.microsoft.com/office/drawing/2010/main" xmlns="" w="9525">
+                <a14:hiddenLine xmlns="" xmlns:a14="http://schemas.microsoft.com/office/drawing/2010/main" w="9525">
                   <a:solidFill>
                     <a:srgbClr val="000000"/>
                   </a:solidFill>
@@ -3998,7 +4000,7 @@
             </a:ln>
             <a:extLst>
               <a:ext uri="{91240B29-F687-4f45-9708-019B960494DF}">
-                <a14:hiddenLine xmlns:a14="http://schemas.microsoft.com/office/drawing/2010/main" xmlns="" w="9525">
+                <a14:hiddenLine xmlns="" xmlns:a14="http://schemas.microsoft.com/office/drawing/2010/main" w="9525">
                   <a:solidFill>
                     <a:srgbClr val="000000"/>
                   </a:solidFill>
@@ -4088,7 +4090,7 @@
             </a:ln>
             <a:extLst>
               <a:ext uri="{91240B29-F687-4f45-9708-019B960494DF}">
-                <a14:hiddenLine xmlns:a14="http://schemas.microsoft.com/office/drawing/2010/main" xmlns="" w="9525">
+                <a14:hiddenLine xmlns="" xmlns:a14="http://schemas.microsoft.com/office/drawing/2010/main" w="9525">
                   <a:solidFill>
                     <a:srgbClr val="000000"/>
                   </a:solidFill>
@@ -4178,7 +4180,7 @@
             </a:ln>
             <a:extLst>
               <a:ext uri="{91240B29-F687-4f45-9708-019B960494DF}">
-                <a14:hiddenLine xmlns:a14="http://schemas.microsoft.com/office/drawing/2010/main" xmlns="" w="9525">
+                <a14:hiddenLine xmlns="" xmlns:a14="http://schemas.microsoft.com/office/drawing/2010/main" w="9525">
                   <a:solidFill>
                     <a:srgbClr val="000000"/>
                   </a:solidFill>
@@ -4243,7 +4245,7 @@
             </a:ln>
             <a:extLst>
               <a:ext uri="{91240B29-F687-4f45-9708-019B960494DF}">
-                <a14:hiddenLine xmlns:a14="http://schemas.microsoft.com/office/drawing/2010/main" xmlns="" w="9525">
+                <a14:hiddenLine xmlns="" xmlns:a14="http://schemas.microsoft.com/office/drawing/2010/main" w="9525">
                   <a:solidFill>
                     <a:srgbClr val="000000"/>
                   </a:solidFill>
@@ -4305,7 +4307,7 @@
             </a:ln>
             <a:extLst>
               <a:ext uri="{91240B29-F687-4f45-9708-019B960494DF}">
-                <a14:hiddenLine xmlns:a14="http://schemas.microsoft.com/office/drawing/2010/main" xmlns="" w="9525">
+                <a14:hiddenLine xmlns="" xmlns:a14="http://schemas.microsoft.com/office/drawing/2010/main" w="9525">
                   <a:solidFill>
                     <a:srgbClr val="000000"/>
                   </a:solidFill>
@@ -4395,7 +4397,7 @@
             </a:ln>
             <a:extLst>
               <a:ext uri="{91240B29-F687-4f45-9708-019B960494DF}">
-                <a14:hiddenLine xmlns:a14="http://schemas.microsoft.com/office/drawing/2010/main" xmlns="" w="9525">
+                <a14:hiddenLine xmlns="" xmlns:a14="http://schemas.microsoft.com/office/drawing/2010/main" w="9525">
                   <a:solidFill>
                     <a:srgbClr val="000000"/>
                   </a:solidFill>
@@ -4485,7 +4487,7 @@
             </a:ln>
             <a:extLst>
               <a:ext uri="{91240B29-F687-4f45-9708-019B960494DF}">
-                <a14:hiddenLine xmlns:a14="http://schemas.microsoft.com/office/drawing/2010/main" xmlns="" w="9525">
+                <a14:hiddenLine xmlns="" xmlns:a14="http://schemas.microsoft.com/office/drawing/2010/main" w="9525">
                   <a:solidFill>
                     <a:srgbClr val="000000"/>
                   </a:solidFill>
@@ -4547,7 +4549,7 @@
             </a:ln>
             <a:extLst>
               <a:ext uri="{91240B29-F687-4f45-9708-019B960494DF}">
-                <a14:hiddenLine xmlns:a14="http://schemas.microsoft.com/office/drawing/2010/main" xmlns="" w="9525">
+                <a14:hiddenLine xmlns="" xmlns:a14="http://schemas.microsoft.com/office/drawing/2010/main" w="9525">
                   <a:solidFill>
                     <a:srgbClr val="000000"/>
                   </a:solidFill>
@@ -4667,7 +4669,7 @@
             </a:ln>
             <a:extLst>
               <a:ext uri="{91240B29-F687-4f45-9708-019B960494DF}">
-                <a14:hiddenLine xmlns:a14="http://schemas.microsoft.com/office/drawing/2010/main" xmlns="" w="9525">
+                <a14:hiddenLine xmlns="" xmlns:a14="http://schemas.microsoft.com/office/drawing/2010/main" w="9525">
                   <a:solidFill>
                     <a:srgbClr val="000000"/>
                   </a:solidFill>
@@ -4735,7 +4737,7 @@
             </a:ln>
             <a:extLst>
               <a:ext uri="{91240B29-F687-4f45-9708-019B960494DF}">
-                <a14:hiddenLine xmlns:a14="http://schemas.microsoft.com/office/drawing/2010/main" xmlns="" w="9525">
+                <a14:hiddenLine xmlns="" xmlns:a14="http://schemas.microsoft.com/office/drawing/2010/main" w="9525">
                   <a:solidFill>
                     <a:srgbClr val="000000"/>
                   </a:solidFill>
@@ -4825,7 +4827,7 @@
             </a:ln>
             <a:extLst>
               <a:ext uri="{91240B29-F687-4f45-9708-019B960494DF}">
-                <a14:hiddenLine xmlns:a14="http://schemas.microsoft.com/office/drawing/2010/main" xmlns="" w="9525">
+                <a14:hiddenLine xmlns="" xmlns:a14="http://schemas.microsoft.com/office/drawing/2010/main" w="9525">
                   <a:solidFill>
                     <a:srgbClr val="000000"/>
                   </a:solidFill>
@@ -4965,7 +4967,7 @@
           <a:p>
             <a:fld id="{48A87A34-81AB-432B-8DAE-1953F412C126}" type="datetimeFigureOut">
               <a:rPr lang="en-US" smtClean="0"/>
-              <a:t>1/8/2020</a:t>
+              <a:t>1/9/2020</a:t>
             </a:fld>
             <a:endParaRPr lang="en-US" dirty="0"/>
           </a:p>
@@ -5232,7 +5234,7 @@
           <a:p>
             <a:fld id="{48A87A34-81AB-432B-8DAE-1953F412C126}" type="datetimeFigureOut">
               <a:rPr lang="en-US" smtClean="0"/>
-              <a:t>1/8/2020</a:t>
+              <a:t>1/9/2020</a:t>
             </a:fld>
             <a:endParaRPr lang="en-US" dirty="0"/>
           </a:p>
@@ -5428,7 +5430,7 @@
           <a:p>
             <a:fld id="{48A87A34-81AB-432B-8DAE-1953F412C126}" type="datetimeFigureOut">
               <a:rPr lang="en-US" smtClean="0"/>
-              <a:t>1/8/2020</a:t>
+              <a:t>1/9/2020</a:t>
             </a:fld>
             <a:endParaRPr lang="en-US" dirty="0"/>
           </a:p>
@@ -5691,7 +5693,7 @@
           <a:p>
             <a:fld id="{48A87A34-81AB-432B-8DAE-1953F412C126}" type="datetimeFigureOut">
               <a:rPr lang="en-US" smtClean="0"/>
-              <a:t>1/8/2020</a:t>
+              <a:t>1/9/2020</a:t>
             </a:fld>
             <a:endParaRPr lang="en-US" dirty="0"/>
           </a:p>
@@ -6125,7 +6127,7 @@
           <a:p>
             <a:fld id="{48A87A34-81AB-432B-8DAE-1953F412C126}" type="datetimeFigureOut">
               <a:rPr lang="en-US" smtClean="0"/>
-              <a:t>1/8/2020</a:t>
+              <a:t>1/9/2020</a:t>
             </a:fld>
             <a:endParaRPr lang="en-US" dirty="0"/>
           </a:p>
@@ -6671,7 +6673,7 @@
           <a:p>
             <a:fld id="{48A87A34-81AB-432B-8DAE-1953F412C126}" type="datetimeFigureOut">
               <a:rPr lang="en-US" smtClean="0"/>
-              <a:t>1/8/2020</a:t>
+              <a:t>1/9/2020</a:t>
             </a:fld>
             <a:endParaRPr lang="en-US" dirty="0"/>
           </a:p>
@@ -7391,7 +7393,7 @@
           <a:p>
             <a:fld id="{48A87A34-81AB-432B-8DAE-1953F412C126}" type="datetimeFigureOut">
               <a:rPr lang="en-US" smtClean="0"/>
-              <a:t>1/8/2020</a:t>
+              <a:t>1/9/2020</a:t>
             </a:fld>
             <a:endParaRPr lang="en-US" dirty="0"/>
           </a:p>
@@ -7561,7 +7563,7 @@
           <a:p>
             <a:fld id="{48A87A34-81AB-432B-8DAE-1953F412C126}" type="datetimeFigureOut">
               <a:rPr lang="en-US" smtClean="0"/>
-              <a:t>1/8/2020</a:t>
+              <a:t>1/9/2020</a:t>
             </a:fld>
             <a:endParaRPr lang="en-US" dirty="0"/>
           </a:p>
@@ -7741,7 +7743,7 @@
           <a:p>
             <a:fld id="{48A87A34-81AB-432B-8DAE-1953F412C126}" type="datetimeFigureOut">
               <a:rPr lang="en-US" smtClean="0"/>
-              <a:t>1/8/2020</a:t>
+              <a:t>1/9/2020</a:t>
             </a:fld>
             <a:endParaRPr lang="en-US" dirty="0"/>
           </a:p>
@@ -7911,7 +7913,7 @@
           <a:p>
             <a:fld id="{48A87A34-81AB-432B-8DAE-1953F412C126}" type="datetimeFigureOut">
               <a:rPr lang="en-US" smtClean="0"/>
-              <a:t>1/8/2020</a:t>
+              <a:t>1/9/2020</a:t>
             </a:fld>
             <a:endParaRPr lang="en-US" dirty="0"/>
           </a:p>
@@ -8161,7 +8163,7 @@
           <a:p>
             <a:fld id="{48A87A34-81AB-432B-8DAE-1953F412C126}" type="datetimeFigureOut">
               <a:rPr lang="en-US" smtClean="0"/>
-              <a:t>1/8/2020</a:t>
+              <a:t>1/9/2020</a:t>
             </a:fld>
             <a:endParaRPr lang="en-US" dirty="0"/>
           </a:p>
@@ -8393,7 +8395,7 @@
           <a:p>
             <a:fld id="{48A87A34-81AB-432B-8DAE-1953F412C126}" type="datetimeFigureOut">
               <a:rPr lang="en-US" smtClean="0"/>
-              <a:t>1/8/2020</a:t>
+              <a:t>1/9/2020</a:t>
             </a:fld>
             <a:endParaRPr lang="en-US" dirty="0"/>
           </a:p>
@@ -8774,7 +8776,7 @@
           <a:p>
             <a:fld id="{48A87A34-81AB-432B-8DAE-1953F412C126}" type="datetimeFigureOut">
               <a:rPr lang="en-US" smtClean="0"/>
-              <a:t>1/8/2020</a:t>
+              <a:t>1/9/2020</a:t>
             </a:fld>
             <a:endParaRPr lang="en-US" dirty="0"/>
           </a:p>
@@ -8892,7 +8894,7 @@
           <a:p>
             <a:fld id="{48A87A34-81AB-432B-8DAE-1953F412C126}" type="datetimeFigureOut">
               <a:rPr lang="en-US" smtClean="0"/>
-              <a:t>1/8/2020</a:t>
+              <a:t>1/9/2020</a:t>
             </a:fld>
             <a:endParaRPr lang="en-US" dirty="0"/>
           </a:p>
@@ -8987,7 +8989,7 @@
           <a:p>
             <a:fld id="{48A87A34-81AB-432B-8DAE-1953F412C126}" type="datetimeFigureOut">
               <a:rPr lang="en-US" smtClean="0"/>
-              <a:t>1/8/2020</a:t>
+              <a:t>1/9/2020</a:t>
             </a:fld>
             <a:endParaRPr lang="en-US" dirty="0"/>
           </a:p>
@@ -9236,7 +9238,7 @@
           <a:p>
             <a:fld id="{48A87A34-81AB-432B-8DAE-1953F412C126}" type="datetimeFigureOut">
               <a:rPr lang="en-US" smtClean="0"/>
-              <a:t>1/8/2020</a:t>
+              <a:t>1/9/2020</a:t>
             </a:fld>
             <a:endParaRPr lang="en-US" dirty="0"/>
           </a:p>
@@ -9516,7 +9518,7 @@
           <a:p>
             <a:fld id="{48A87A34-81AB-432B-8DAE-1953F412C126}" type="datetimeFigureOut">
               <a:rPr lang="en-US" smtClean="0"/>
-              <a:t>1/8/2020</a:t>
+              <a:t>1/9/2020</a:t>
             </a:fld>
             <a:endParaRPr lang="en-US" dirty="0"/>
           </a:p>
@@ -9639,7 +9641,7 @@
           <a:noFill/>
           <a:extLst>
             <a:ext uri="{909E8E84-426E-40dd-AFC4-6F175D3DCCD1}">
-              <a14:hiddenFill xmlns:a14="http://schemas.microsoft.com/office/drawing/2010/main" xmlns="">
+              <a14:hiddenFill xmlns="" xmlns:a14="http://schemas.microsoft.com/office/drawing/2010/main">
                 <a:solidFill>
                   <a:srgbClr val="FFFFFF"/>
                 </a:solidFill>
@@ -9713,7 +9715,7 @@
               </a:ln>
               <a:extLst>
                 <a:ext uri="{91240B29-F687-4f45-9708-019B960494DF}">
-                  <a14:hiddenLine xmlns:a14="http://schemas.microsoft.com/office/drawing/2010/main" xmlns="" w="9525">
+                  <a14:hiddenLine xmlns="" xmlns:a14="http://schemas.microsoft.com/office/drawing/2010/main" w="9525">
                     <a:solidFill>
                       <a:srgbClr val="000000"/>
                     </a:solidFill>
@@ -9803,7 +9805,7 @@
               </a:ln>
               <a:extLst>
                 <a:ext uri="{91240B29-F687-4f45-9708-019B960494DF}">
-                  <a14:hiddenLine xmlns:a14="http://schemas.microsoft.com/office/drawing/2010/main" xmlns="" w="9525">
+                  <a14:hiddenLine xmlns="" xmlns:a14="http://schemas.microsoft.com/office/drawing/2010/main" w="9525">
                     <a:solidFill>
                       <a:srgbClr val="000000"/>
                     </a:solidFill>
@@ -9893,7 +9895,7 @@
               </a:ln>
               <a:extLst>
                 <a:ext uri="{91240B29-F687-4f45-9708-019B960494DF}">
-                  <a14:hiddenLine xmlns:a14="http://schemas.microsoft.com/office/drawing/2010/main" xmlns="" w="9525">
+                  <a14:hiddenLine xmlns="" xmlns:a14="http://schemas.microsoft.com/office/drawing/2010/main" w="9525">
                     <a:solidFill>
                       <a:srgbClr val="000000"/>
                     </a:solidFill>
@@ -9955,7 +9957,7 @@
               </a:ln>
               <a:extLst>
                 <a:ext uri="{91240B29-F687-4f45-9708-019B960494DF}">
-                  <a14:hiddenLine xmlns:a14="http://schemas.microsoft.com/office/drawing/2010/main" xmlns="" w="9525">
+                  <a14:hiddenLine xmlns="" xmlns:a14="http://schemas.microsoft.com/office/drawing/2010/main" w="9525">
                     <a:solidFill>
                       <a:srgbClr val="000000"/>
                     </a:solidFill>
@@ -10045,7 +10047,7 @@
               </a:ln>
               <a:extLst>
                 <a:ext uri="{91240B29-F687-4f45-9708-019B960494DF}">
-                  <a14:hiddenLine xmlns:a14="http://schemas.microsoft.com/office/drawing/2010/main" xmlns="" w="9525">
+                  <a14:hiddenLine xmlns="" xmlns:a14="http://schemas.microsoft.com/office/drawing/2010/main" w="9525">
                     <a:solidFill>
                       <a:srgbClr val="000000"/>
                     </a:solidFill>
@@ -10107,7 +10109,7 @@
               </a:ln>
               <a:extLst>
                 <a:ext uri="{91240B29-F687-4f45-9708-019B960494DF}">
-                  <a14:hiddenLine xmlns:a14="http://schemas.microsoft.com/office/drawing/2010/main" xmlns="" w="9525">
+                  <a14:hiddenLine xmlns="" xmlns:a14="http://schemas.microsoft.com/office/drawing/2010/main" w="9525">
                     <a:solidFill>
                       <a:srgbClr val="000000"/>
                     </a:solidFill>
@@ -10169,7 +10171,7 @@
               </a:ln>
               <a:extLst>
                 <a:ext uri="{91240B29-F687-4f45-9708-019B960494DF}">
-                  <a14:hiddenLine xmlns:a14="http://schemas.microsoft.com/office/drawing/2010/main" xmlns="" w="9525">
+                  <a14:hiddenLine xmlns="" xmlns:a14="http://schemas.microsoft.com/office/drawing/2010/main" w="9525">
                     <a:solidFill>
                       <a:srgbClr val="000000"/>
                     </a:solidFill>
@@ -10259,7 +10261,7 @@
               </a:ln>
               <a:extLst>
                 <a:ext uri="{91240B29-F687-4f45-9708-019B960494DF}">
-                  <a14:hiddenLine xmlns:a14="http://schemas.microsoft.com/office/drawing/2010/main" xmlns="" w="9525">
+                  <a14:hiddenLine xmlns="" xmlns:a14="http://schemas.microsoft.com/office/drawing/2010/main" w="9525">
                     <a:solidFill>
                       <a:srgbClr val="000000"/>
                     </a:solidFill>
@@ -10349,7 +10351,7 @@
               </a:ln>
               <a:extLst>
                 <a:ext uri="{91240B29-F687-4f45-9708-019B960494DF}">
-                  <a14:hiddenLine xmlns:a14="http://schemas.microsoft.com/office/drawing/2010/main" xmlns="" w="9525">
+                  <a14:hiddenLine xmlns="" xmlns:a14="http://schemas.microsoft.com/office/drawing/2010/main" w="9525">
                     <a:solidFill>
                       <a:srgbClr val="000000"/>
                     </a:solidFill>
@@ -10411,7 +10413,7 @@
               </a:ln>
               <a:extLst>
                 <a:ext uri="{91240B29-F687-4f45-9708-019B960494DF}">
-                  <a14:hiddenLine xmlns:a14="http://schemas.microsoft.com/office/drawing/2010/main" xmlns="" w="9525">
+                  <a14:hiddenLine xmlns="" xmlns:a14="http://schemas.microsoft.com/office/drawing/2010/main" w="9525">
                     <a:solidFill>
                       <a:srgbClr val="000000"/>
                     </a:solidFill>
@@ -10521,7 +10523,7 @@
               </a:ln>
               <a:extLst>
                 <a:ext uri="{91240B29-F687-4f45-9708-019B960494DF}">
-                  <a14:hiddenLine xmlns:a14="http://schemas.microsoft.com/office/drawing/2010/main" xmlns="" w="9525">
+                  <a14:hiddenLine xmlns="" xmlns:a14="http://schemas.microsoft.com/office/drawing/2010/main" w="9525">
                     <a:solidFill>
                       <a:srgbClr val="000000"/>
                     </a:solidFill>
@@ -10605,7 +10607,7 @@
               </a:ln>
               <a:extLst>
                 <a:ext uri="{91240B29-F687-4f45-9708-019B960494DF}">
-                  <a14:hiddenLine xmlns:a14="http://schemas.microsoft.com/office/drawing/2010/main" xmlns="" w="9525">
+                  <a14:hiddenLine xmlns="" xmlns:a14="http://schemas.microsoft.com/office/drawing/2010/main" w="9525">
                     <a:solidFill>
                       <a:srgbClr val="000000"/>
                     </a:solidFill>
@@ -10667,7 +10669,7 @@
               </a:ln>
               <a:extLst>
                 <a:ext uri="{91240B29-F687-4f45-9708-019B960494DF}">
-                  <a14:hiddenLine xmlns:a14="http://schemas.microsoft.com/office/drawing/2010/main" xmlns="" w="9525">
+                  <a14:hiddenLine xmlns="" xmlns:a14="http://schemas.microsoft.com/office/drawing/2010/main" w="9525">
                     <a:solidFill>
                       <a:srgbClr val="000000"/>
                     </a:solidFill>
@@ -10729,7 +10731,7 @@
               </a:ln>
               <a:extLst>
                 <a:ext uri="{91240B29-F687-4f45-9708-019B960494DF}">
-                  <a14:hiddenLine xmlns:a14="http://schemas.microsoft.com/office/drawing/2010/main" xmlns="" w="9525">
+                  <a14:hiddenLine xmlns="" xmlns:a14="http://schemas.microsoft.com/office/drawing/2010/main" w="9525">
                     <a:solidFill>
                       <a:srgbClr val="000000"/>
                     </a:solidFill>
@@ -10819,7 +10821,7 @@
               </a:ln>
               <a:extLst>
                 <a:ext uri="{91240B29-F687-4f45-9708-019B960494DF}">
-                  <a14:hiddenLine xmlns:a14="http://schemas.microsoft.com/office/drawing/2010/main" xmlns="" w="9525">
+                  <a14:hiddenLine xmlns="" xmlns:a14="http://schemas.microsoft.com/office/drawing/2010/main" w="9525">
                     <a:solidFill>
                       <a:srgbClr val="000000"/>
                     </a:solidFill>
@@ -10853,7 +10855,7 @@
               </a:ln>
               <a:extLst>
                 <a:ext uri="{91240B29-F687-4f45-9708-019B960494DF}">
-                  <a14:hiddenLine xmlns:a14="http://schemas.microsoft.com/office/drawing/2010/main" xmlns="" w="9525">
+                  <a14:hiddenLine xmlns="" xmlns:a14="http://schemas.microsoft.com/office/drawing/2010/main" w="9525">
                     <a:solidFill>
                       <a:srgbClr val="000000"/>
                     </a:solidFill>
@@ -10918,7 +10920,7 @@
               </a:ln>
               <a:extLst>
                 <a:ext uri="{91240B29-F687-4f45-9708-019B960494DF}">
-                  <a14:hiddenLine xmlns:a14="http://schemas.microsoft.com/office/drawing/2010/main" xmlns="" w="9525">
+                  <a14:hiddenLine xmlns="" xmlns:a14="http://schemas.microsoft.com/office/drawing/2010/main" w="9525">
                     <a:solidFill>
                       <a:srgbClr val="000000"/>
                     </a:solidFill>
@@ -11008,7 +11010,7 @@
               </a:ln>
               <a:extLst>
                 <a:ext uri="{91240B29-F687-4f45-9708-019B960494DF}">
-                  <a14:hiddenLine xmlns:a14="http://schemas.microsoft.com/office/drawing/2010/main" xmlns="" w="9525">
+                  <a14:hiddenLine xmlns="" xmlns:a14="http://schemas.microsoft.com/office/drawing/2010/main" w="9525">
                     <a:solidFill>
                       <a:srgbClr val="000000"/>
                     </a:solidFill>
@@ -11070,7 +11072,7 @@
               </a:ln>
               <a:extLst>
                 <a:ext uri="{91240B29-F687-4f45-9708-019B960494DF}">
-                  <a14:hiddenLine xmlns:a14="http://schemas.microsoft.com/office/drawing/2010/main" xmlns="" w="9525">
+                  <a14:hiddenLine xmlns="" xmlns:a14="http://schemas.microsoft.com/office/drawing/2010/main" w="9525">
                     <a:solidFill>
                       <a:srgbClr val="000000"/>
                     </a:solidFill>
@@ -11160,7 +11162,7 @@
               </a:ln>
               <a:extLst>
                 <a:ext uri="{91240B29-F687-4f45-9708-019B960494DF}">
-                  <a14:hiddenLine xmlns:a14="http://schemas.microsoft.com/office/drawing/2010/main" xmlns="" w="9525">
+                  <a14:hiddenLine xmlns="" xmlns:a14="http://schemas.microsoft.com/office/drawing/2010/main" w="9525">
                     <a:solidFill>
                       <a:srgbClr val="000000"/>
                     </a:solidFill>
@@ -11225,7 +11227,7 @@
               </a:ln>
               <a:extLst>
                 <a:ext uri="{91240B29-F687-4f45-9708-019B960494DF}">
-                  <a14:hiddenLine xmlns:a14="http://schemas.microsoft.com/office/drawing/2010/main" xmlns="" w="9525">
+                  <a14:hiddenLine xmlns="" xmlns:a14="http://schemas.microsoft.com/office/drawing/2010/main" w="9525">
                     <a:solidFill>
                       <a:srgbClr val="000000"/>
                     </a:solidFill>
@@ -11287,7 +11289,7 @@
               </a:ln>
               <a:extLst>
                 <a:ext uri="{91240B29-F687-4f45-9708-019B960494DF}">
-                  <a14:hiddenLine xmlns:a14="http://schemas.microsoft.com/office/drawing/2010/main" xmlns="" w="9525">
+                  <a14:hiddenLine xmlns="" xmlns:a14="http://schemas.microsoft.com/office/drawing/2010/main" w="9525">
                     <a:solidFill>
                       <a:srgbClr val="000000"/>
                     </a:solidFill>
@@ -11377,7 +11379,7 @@
               </a:ln>
               <a:extLst>
                 <a:ext uri="{91240B29-F687-4f45-9708-019B960494DF}">
-                  <a14:hiddenLine xmlns:a14="http://schemas.microsoft.com/office/drawing/2010/main" xmlns="" w="9525">
+                  <a14:hiddenLine xmlns="" xmlns:a14="http://schemas.microsoft.com/office/drawing/2010/main" w="9525">
                     <a:solidFill>
                       <a:srgbClr val="000000"/>
                     </a:solidFill>
@@ -11467,7 +11469,7 @@
               </a:ln>
               <a:extLst>
                 <a:ext uri="{91240B29-F687-4f45-9708-019B960494DF}">
-                  <a14:hiddenLine xmlns:a14="http://schemas.microsoft.com/office/drawing/2010/main" xmlns="" w="9525">
+                  <a14:hiddenLine xmlns="" xmlns:a14="http://schemas.microsoft.com/office/drawing/2010/main" w="9525">
                     <a:solidFill>
                       <a:srgbClr val="000000"/>
                     </a:solidFill>
@@ -11532,7 +11534,7 @@
               </a:ln>
               <a:extLst>
                 <a:ext uri="{91240B29-F687-4f45-9708-019B960494DF}">
-                  <a14:hiddenLine xmlns:a14="http://schemas.microsoft.com/office/drawing/2010/main" xmlns="" w="9525">
+                  <a14:hiddenLine xmlns="" xmlns:a14="http://schemas.microsoft.com/office/drawing/2010/main" w="9525">
                     <a:solidFill>
                       <a:srgbClr val="000000"/>
                     </a:solidFill>
@@ -11652,7 +11654,7 @@
               </a:ln>
               <a:extLst>
                 <a:ext uri="{91240B29-F687-4f45-9708-019B960494DF}">
-                  <a14:hiddenLine xmlns:a14="http://schemas.microsoft.com/office/drawing/2010/main" xmlns="" w="9525">
+                  <a14:hiddenLine xmlns="" xmlns:a14="http://schemas.microsoft.com/office/drawing/2010/main" w="9525">
                     <a:solidFill>
                       <a:srgbClr val="000000"/>
                     </a:solidFill>
@@ -11733,7 +11735,7 @@
               </a:ln>
               <a:extLst>
                 <a:ext uri="{91240B29-F687-4f45-9708-019B960494DF}">
-                  <a14:hiddenLine xmlns:a14="http://schemas.microsoft.com/office/drawing/2010/main" xmlns="" w="9525">
+                  <a14:hiddenLine xmlns="" xmlns:a14="http://schemas.microsoft.com/office/drawing/2010/main" w="9525">
                     <a:solidFill>
                       <a:srgbClr val="000000"/>
                     </a:solidFill>
@@ -11848,7 +11850,7 @@
               </a:ln>
               <a:extLst>
                 <a:ext uri="{91240B29-F687-4f45-9708-019B960494DF}">
-                  <a14:hiddenLine xmlns:a14="http://schemas.microsoft.com/office/drawing/2010/main" xmlns="" w="9525">
+                  <a14:hiddenLine xmlns="" xmlns:a14="http://schemas.microsoft.com/office/drawing/2010/main" w="9525">
                     <a:solidFill>
                       <a:srgbClr val="000000"/>
                     </a:solidFill>
@@ -11938,7 +11940,7 @@
               </a:ln>
               <a:extLst>
                 <a:ext uri="{91240B29-F687-4f45-9708-019B960494DF}">
-                  <a14:hiddenLine xmlns:a14="http://schemas.microsoft.com/office/drawing/2010/main" xmlns="" w="9525">
+                  <a14:hiddenLine xmlns="" xmlns:a14="http://schemas.microsoft.com/office/drawing/2010/main" w="9525">
                     <a:solidFill>
                       <a:srgbClr val="000000"/>
                     </a:solidFill>
@@ -12003,7 +12005,7 @@
               </a:ln>
               <a:extLst>
                 <a:ext uri="{91240B29-F687-4f45-9708-019B960494DF}">
-                  <a14:hiddenLine xmlns:a14="http://schemas.microsoft.com/office/drawing/2010/main" xmlns="" w="9525">
+                  <a14:hiddenLine xmlns="" xmlns:a14="http://schemas.microsoft.com/office/drawing/2010/main" w="9525">
                     <a:solidFill>
                       <a:srgbClr val="000000"/>
                     </a:solidFill>
@@ -12093,7 +12095,7 @@
               </a:ln>
               <a:extLst>
                 <a:ext uri="{91240B29-F687-4f45-9708-019B960494DF}">
-                  <a14:hiddenLine xmlns:a14="http://schemas.microsoft.com/office/drawing/2010/main" xmlns="" w="9525">
+                  <a14:hiddenLine xmlns="" xmlns:a14="http://schemas.microsoft.com/office/drawing/2010/main" w="9525">
                     <a:solidFill>
                       <a:srgbClr val="000000"/>
                     </a:solidFill>
@@ -12161,7 +12163,7 @@
               </a:ln>
               <a:extLst>
                 <a:ext uri="{91240B29-F687-4f45-9708-019B960494DF}">
-                  <a14:hiddenLine xmlns:a14="http://schemas.microsoft.com/office/drawing/2010/main" xmlns="" w="9525">
+                  <a14:hiddenLine xmlns="" xmlns:a14="http://schemas.microsoft.com/office/drawing/2010/main" w="9525">
                     <a:solidFill>
                       <a:srgbClr val="000000"/>
                     </a:solidFill>
@@ -12251,7 +12253,7 @@
               </a:ln>
               <a:extLst>
                 <a:ext uri="{91240B29-F687-4f45-9708-019B960494DF}">
-                  <a14:hiddenLine xmlns:a14="http://schemas.microsoft.com/office/drawing/2010/main" xmlns="" w="9525">
+                  <a14:hiddenLine xmlns="" xmlns:a14="http://schemas.microsoft.com/office/drawing/2010/main" w="9525">
                     <a:solidFill>
                       <a:srgbClr val="000000"/>
                     </a:solidFill>
@@ -12319,7 +12321,7 @@
               </a:ln>
               <a:extLst>
                 <a:ext uri="{91240B29-F687-4f45-9708-019B960494DF}">
-                  <a14:hiddenLine xmlns:a14="http://schemas.microsoft.com/office/drawing/2010/main" xmlns="" w="9525">
+                  <a14:hiddenLine xmlns="" xmlns:a14="http://schemas.microsoft.com/office/drawing/2010/main" w="9525">
                     <a:solidFill>
                       <a:srgbClr val="000000"/>
                     </a:solidFill>
@@ -12409,7 +12411,7 @@
               </a:ln>
               <a:extLst>
                 <a:ext uri="{91240B29-F687-4f45-9708-019B960494DF}">
-                  <a14:hiddenLine xmlns:a14="http://schemas.microsoft.com/office/drawing/2010/main" xmlns="" w="9525">
+                  <a14:hiddenLine xmlns="" xmlns:a14="http://schemas.microsoft.com/office/drawing/2010/main" w="9525">
                     <a:solidFill>
                       <a:srgbClr val="000000"/>
                     </a:solidFill>
@@ -12443,7 +12445,7 @@
               </a:ln>
               <a:extLst>
                 <a:ext uri="{91240B29-F687-4f45-9708-019B960494DF}">
-                  <a14:hiddenLine xmlns:a14="http://schemas.microsoft.com/office/drawing/2010/main" xmlns="" w="9525">
+                  <a14:hiddenLine xmlns="" xmlns:a14="http://schemas.microsoft.com/office/drawing/2010/main" w="9525">
                     <a:solidFill>
                       <a:srgbClr val="000000"/>
                     </a:solidFill>
@@ -12584,7 +12586,7 @@
             <a:fld id="{48A87A34-81AB-432B-8DAE-1953F412C126}" type="datetimeFigureOut">
               <a:rPr lang="en-US" smtClean="0"/>
               <a:pPr/>
-              <a:t>1/8/2020</a:t>
+              <a:t>1/9/2020</a:t>
             </a:fld>
             <a:endParaRPr lang="en-US" dirty="0"/>
           </a:p>
@@ -13117,6 +13119,151 @@
           <p:cNvPr id="2" name="Title 1">
             <a:extLst>
               <a:ext uri="{FF2B5EF4-FFF2-40B4-BE49-F238E27FC236}">
+                <a16:creationId xmlns:a16="http://schemas.microsoft.com/office/drawing/2014/main" id="{13FC7AF7-A763-46CF-A6AA-353C92C0D8D4}"/>
+              </a:ext>
+            </a:extLst>
+          </p:cNvPr>
+          <p:cNvSpPr>
+            <a:spLocks noGrp="1"/>
+          </p:cNvSpPr>
+          <p:nvPr>
+            <p:ph type="title"/>
+          </p:nvPr>
+        </p:nvSpPr>
+        <p:spPr/>
+        <p:txBody>
+          <a:bodyPr/>
+          <a:lstStyle/>
+          <a:p>
+            <a:r>
+              <a:rPr lang="en-US" dirty="0"/>
+              <a:t>Lab 1 – part 2</a:t>
+            </a:r>
+          </a:p>
+        </p:txBody>
+      </p:sp>
+      <p:sp>
+        <p:nvSpPr>
+          <p:cNvPr id="3" name="Content Placeholder 2">
+            <a:extLst>
+              <a:ext uri="{FF2B5EF4-FFF2-40B4-BE49-F238E27FC236}">
+                <a16:creationId xmlns:a16="http://schemas.microsoft.com/office/drawing/2014/main" id="{6D08EF2B-6A6E-4390-A8F1-CDC0E1412495}"/>
+              </a:ext>
+            </a:extLst>
+          </p:cNvPr>
+          <p:cNvSpPr>
+            <a:spLocks noGrp="1"/>
+          </p:cNvSpPr>
+          <p:nvPr>
+            <p:ph idx="1"/>
+          </p:nvPr>
+        </p:nvSpPr>
+        <p:spPr/>
+        <p:txBody>
+          <a:bodyPr/>
+          <a:lstStyle/>
+          <a:p>
+            <a:r>
+              <a:rPr lang="en-US" dirty="0"/>
+              <a:t>Create a repository in </a:t>
+            </a:r>
+            <a:r>
+              <a:rPr lang="en-US" dirty="0" err="1"/>
+              <a:t>github</a:t>
+            </a:r>
+            <a:endParaRPr lang="en-US" dirty="0"/>
+          </a:p>
+          <a:p>
+            <a:pPr lvl="1"/>
+            <a:r>
+              <a:rPr lang="en-US" dirty="0"/>
+              <a:t>Repository will be initialized by </a:t>
+            </a:r>
+            <a:r>
+              <a:rPr lang="en-US" dirty="0" err="1"/>
+              <a:t>github</a:t>
+            </a:r>
+            <a:endParaRPr lang="en-US" dirty="0"/>
+          </a:p>
+          <a:p>
+            <a:pPr lvl="2"/>
+            <a:r>
+              <a:rPr lang="en-US" dirty="0"/>
+              <a:t>Clone repository</a:t>
+            </a:r>
+          </a:p>
+          <a:p>
+            <a:pPr lvl="2"/>
+            <a:r>
+              <a:rPr lang="en-US" dirty="0"/>
+              <a:t>Create branch</a:t>
+            </a:r>
+          </a:p>
+          <a:p>
+            <a:pPr lvl="2"/>
+            <a:r>
+              <a:rPr lang="en-US" dirty="0"/>
+              <a:t>Make change</a:t>
+            </a:r>
+          </a:p>
+          <a:p>
+            <a:pPr lvl="2"/>
+            <a:r>
+              <a:rPr lang="en-US" dirty="0"/>
+              <a:t>Commit change</a:t>
+            </a:r>
+          </a:p>
+          <a:p>
+            <a:pPr lvl="2"/>
+            <a:r>
+              <a:rPr lang="en-US" dirty="0"/>
+              <a:t>Push</a:t>
+            </a:r>
+          </a:p>
+          <a:p>
+            <a:pPr lvl="2"/>
+            <a:r>
+              <a:rPr lang="en-US" dirty="0"/>
+              <a:t>Merge branch</a:t>
+            </a:r>
+          </a:p>
+        </p:txBody>
+      </p:sp>
+    </p:spTree>
+    <p:extLst>
+      <p:ext uri="{BB962C8B-B14F-4D97-AF65-F5344CB8AC3E}">
+        <p14:creationId xmlns:p14="http://schemas.microsoft.com/office/powerpoint/2010/main" val="4049689424"/>
+      </p:ext>
+    </p:extLst>
+  </p:cSld>
+  <p:clrMapOvr>
+    <a:masterClrMapping/>
+  </p:clrMapOvr>
+</p:sld>
+</file>
+
+<file path=ppt/slides/slide11.xml><?xml version="1.0" encoding="utf-8"?>
+<p:sld xmlns:a="http://schemas.openxmlformats.org/drawingml/2006/main" xmlns:r="http://schemas.openxmlformats.org/officeDocument/2006/relationships" xmlns:p="http://schemas.openxmlformats.org/presentationml/2006/main">
+  <p:cSld>
+    <p:spTree>
+      <p:nvGrpSpPr>
+        <p:cNvPr id="1" name=""/>
+        <p:cNvGrpSpPr/>
+        <p:nvPr/>
+      </p:nvGrpSpPr>
+      <p:grpSpPr>
+        <a:xfrm>
+          <a:off x="0" y="0"/>
+          <a:ext cx="0" cy="0"/>
+          <a:chOff x="0" y="0"/>
+          <a:chExt cx="0" cy="0"/>
+        </a:xfrm>
+      </p:grpSpPr>
+      <p:sp>
+        <p:nvSpPr>
+          <p:cNvPr id="2" name="Title 1">
+            <a:extLst>
+              <a:ext uri="{FF2B5EF4-FFF2-40B4-BE49-F238E27FC236}">
                 <a16:creationId xmlns:a16="http://schemas.microsoft.com/office/drawing/2014/main" id="{30819BD5-DA31-4FB8-B85B-9FC5D4A46B14}"/>
               </a:ext>
             </a:extLst>
@@ -13193,7 +13340,7 @@
 </p:sld>
 </file>
 
-<file path=ppt/slides/slide11.xml><?xml version="1.0" encoding="utf-8"?>
+<file path=ppt/slides/slide12.xml><?xml version="1.0" encoding="utf-8"?>
 <p:sld xmlns:a="http://schemas.openxmlformats.org/drawingml/2006/main" xmlns:r="http://schemas.openxmlformats.org/officeDocument/2006/relationships" xmlns:p="http://schemas.openxmlformats.org/presentationml/2006/main">
   <p:cSld>
     <p:spTree>
@@ -13294,7 +13441,7 @@
 </p:sld>
 </file>
 
-<file path=ppt/slides/slide12.xml><?xml version="1.0" encoding="utf-8"?>
+<file path=ppt/slides/slide13.xml><?xml version="1.0" encoding="utf-8"?>
 <p:sld xmlns:a="http://schemas.openxmlformats.org/drawingml/2006/main" xmlns:r="http://schemas.openxmlformats.org/officeDocument/2006/relationships" xmlns:p="http://schemas.openxmlformats.org/presentationml/2006/main">
   <p:cSld>
     <p:spTree>
@@ -13395,7 +13542,7 @@
 </p:sld>
 </file>
 
-<file path=ppt/slides/slide13.xml><?xml version="1.0" encoding="utf-8"?>
+<file path=ppt/slides/slide14.xml><?xml version="1.0" encoding="utf-8"?>
 <p:sld xmlns:a="http://schemas.openxmlformats.org/drawingml/2006/main" xmlns:r="http://schemas.openxmlformats.org/officeDocument/2006/relationships" xmlns:p="http://schemas.openxmlformats.org/presentationml/2006/main">
   <p:cSld>
     <p:spTree>
@@ -13496,7 +13643,7 @@
 </p:sld>
 </file>
 
-<file path=ppt/slides/slide14.xml><?xml version="1.0" encoding="utf-8"?>
+<file path=ppt/slides/slide15.xml><?xml version="1.0" encoding="utf-8"?>
 <p:sld xmlns:a="http://schemas.openxmlformats.org/drawingml/2006/main" xmlns:r="http://schemas.openxmlformats.org/officeDocument/2006/relationships" xmlns:p="http://schemas.openxmlformats.org/presentationml/2006/main">
   <p:cSld>
     <p:spTree>
@@ -13646,7 +13793,7 @@
 </p:sld>
 </file>
 
-<file path=ppt/slides/slide15.xml><?xml version="1.0" encoding="utf-8"?>
+<file path=ppt/slides/slide16.xml><?xml version="1.0" encoding="utf-8"?>
 <p:sld xmlns:a="http://schemas.openxmlformats.org/drawingml/2006/main" xmlns:r="http://schemas.openxmlformats.org/officeDocument/2006/relationships" xmlns:p="http://schemas.openxmlformats.org/presentationml/2006/main">
   <p:cSld>
     <p:spTree>
@@ -13762,7 +13909,7 @@
 </p:sld>
 </file>
 
-<file path=ppt/slides/slide16.xml><?xml version="1.0" encoding="utf-8"?>
+<file path=ppt/slides/slide17.xml><?xml version="1.0" encoding="utf-8"?>
 <p:sld xmlns:a="http://schemas.openxmlformats.org/drawingml/2006/main" xmlns:r="http://schemas.openxmlformats.org/officeDocument/2006/relationships" xmlns:p="http://schemas.openxmlformats.org/presentationml/2006/main">
   <p:cSld>
     <p:spTree>
@@ -13932,7 +14079,7 @@
 </p:sld>
 </file>
 
-<file path=ppt/slides/slide17.xml><?xml version="1.0" encoding="utf-8"?>
+<file path=ppt/slides/slide18.xml><?xml version="1.0" encoding="utf-8"?>
 <p:sld xmlns:a="http://schemas.openxmlformats.org/drawingml/2006/main" xmlns:r="http://schemas.openxmlformats.org/officeDocument/2006/relationships" xmlns:p="http://schemas.openxmlformats.org/presentationml/2006/main">
   <p:cSld>
     <p:spTree>
@@ -14025,7 +14172,7 @@
 </p:sld>
 </file>
 
-<file path=ppt/slides/slide18.xml><?xml version="1.0" encoding="utf-8"?>
+<file path=ppt/slides/slide19.xml><?xml version="1.0" encoding="utf-8"?>
 <p:sld xmlns:a="http://schemas.openxmlformats.org/drawingml/2006/main" xmlns:r="http://schemas.openxmlformats.org/officeDocument/2006/relationships" xmlns:p="http://schemas.openxmlformats.org/presentationml/2006/main">
   <p:cSld>
     <p:spTree>
@@ -14109,99 +14256,6 @@
     <p:extLst>
       <p:ext uri="{BB962C8B-B14F-4D97-AF65-F5344CB8AC3E}">
         <p14:creationId xmlns:p14="http://schemas.microsoft.com/office/powerpoint/2010/main" val="1078994264"/>
-      </p:ext>
-    </p:extLst>
-  </p:cSld>
-  <p:clrMapOvr>
-    <a:masterClrMapping/>
-  </p:clrMapOvr>
-</p:sld>
-</file>
-
-<file path=ppt/slides/slide19.xml><?xml version="1.0" encoding="utf-8"?>
-<p:sld xmlns:a="http://schemas.openxmlformats.org/drawingml/2006/main" xmlns:r="http://schemas.openxmlformats.org/officeDocument/2006/relationships" xmlns:p="http://schemas.openxmlformats.org/presentationml/2006/main">
-  <p:cSld>
-    <p:spTree>
-      <p:nvGrpSpPr>
-        <p:cNvPr id="1" name=""/>
-        <p:cNvGrpSpPr/>
-        <p:nvPr/>
-      </p:nvGrpSpPr>
-      <p:grpSpPr>
-        <a:xfrm>
-          <a:off x="0" y="0"/>
-          <a:ext cx="0" cy="0"/>
-          <a:chOff x="0" y="0"/>
-          <a:chExt cx="0" cy="0"/>
-        </a:xfrm>
-      </p:grpSpPr>
-      <p:sp>
-        <p:nvSpPr>
-          <p:cNvPr id="2" name="Title 1">
-            <a:extLst>
-              <a:ext uri="{FF2B5EF4-FFF2-40B4-BE49-F238E27FC236}">
-                <a16:creationId xmlns:a16="http://schemas.microsoft.com/office/drawing/2014/main" id="{4D1E3FC3-B062-491B-A8A4-DA3269C9306E}"/>
-              </a:ext>
-            </a:extLst>
-          </p:cNvPr>
-          <p:cNvSpPr>
-            <a:spLocks noGrp="1"/>
-          </p:cNvSpPr>
-          <p:nvPr>
-            <p:ph type="title"/>
-          </p:nvPr>
-        </p:nvSpPr>
-        <p:spPr/>
-        <p:txBody>
-          <a:bodyPr/>
-          <a:lstStyle/>
-          <a:p>
-            <a:r>
-              <a:rPr lang="en-US" dirty="0"/>
-              <a:t>Rebase – Tread carefully (Cont.)</a:t>
-            </a:r>
-          </a:p>
-        </p:txBody>
-      </p:sp>
-      <p:pic>
-        <p:nvPicPr>
-          <p:cNvPr id="5" name="Content Placeholder 4">
-            <a:extLst>
-              <a:ext uri="{FF2B5EF4-FFF2-40B4-BE49-F238E27FC236}">
-                <a16:creationId xmlns:a16="http://schemas.microsoft.com/office/drawing/2014/main" id="{1126805B-9410-4816-80DE-B9371B2B9B8C}"/>
-              </a:ext>
-            </a:extLst>
-          </p:cNvPr>
-          <p:cNvPicPr>
-            <a:picLocks noGrp="1" noChangeAspect="1"/>
-          </p:cNvPicPr>
-          <p:nvPr>
-            <p:ph idx="1"/>
-          </p:nvPr>
-        </p:nvPicPr>
-        <p:blipFill>
-          <a:blip r:embed="rId2">
-            <a:extLst>
-              <a:ext uri="{96DAC541-7B7A-43D3-8B79-37D633B846F1}">
-                <asvg:svgBlip xmlns:asvg="http://schemas.microsoft.com/office/drawing/2016/SVG/main" r:embed="rId3"/>
-              </a:ext>
-            </a:extLst>
-          </a:blip>
-          <a:stretch>
-            <a:fillRect/>
-          </a:stretch>
-        </p:blipFill>
-        <p:spPr>
-          <a:xfrm>
-            <a:off x="3494991" y="2249488"/>
-            <a:ext cx="5198843" cy="3541712"/>
-          </a:xfrm>
-        </p:spPr>
-      </p:pic>
-    </p:spTree>
-    <p:extLst>
-      <p:ext uri="{BB962C8B-B14F-4D97-AF65-F5344CB8AC3E}">
-        <p14:creationId xmlns:p14="http://schemas.microsoft.com/office/powerpoint/2010/main" val="3275597828"/>
       </p:ext>
     </p:extLst>
   </p:cSld>
@@ -14468,6 +14522,99 @@
           <p:cNvPr id="5" name="Content Placeholder 4">
             <a:extLst>
               <a:ext uri="{FF2B5EF4-FFF2-40B4-BE49-F238E27FC236}">
+                <a16:creationId xmlns:a16="http://schemas.microsoft.com/office/drawing/2014/main" id="{1126805B-9410-4816-80DE-B9371B2B9B8C}"/>
+              </a:ext>
+            </a:extLst>
+          </p:cNvPr>
+          <p:cNvPicPr>
+            <a:picLocks noGrp="1" noChangeAspect="1"/>
+          </p:cNvPicPr>
+          <p:nvPr>
+            <p:ph idx="1"/>
+          </p:nvPr>
+        </p:nvPicPr>
+        <p:blipFill>
+          <a:blip r:embed="rId2">
+            <a:extLst>
+              <a:ext uri="{96DAC541-7B7A-43D3-8B79-37D633B846F1}">
+                <asvg:svgBlip xmlns:asvg="http://schemas.microsoft.com/office/drawing/2016/SVG/main" r:embed="rId3"/>
+              </a:ext>
+            </a:extLst>
+          </a:blip>
+          <a:stretch>
+            <a:fillRect/>
+          </a:stretch>
+        </p:blipFill>
+        <p:spPr>
+          <a:xfrm>
+            <a:off x="3494991" y="2249488"/>
+            <a:ext cx="5198843" cy="3541712"/>
+          </a:xfrm>
+        </p:spPr>
+      </p:pic>
+    </p:spTree>
+    <p:extLst>
+      <p:ext uri="{BB962C8B-B14F-4D97-AF65-F5344CB8AC3E}">
+        <p14:creationId xmlns:p14="http://schemas.microsoft.com/office/powerpoint/2010/main" val="3275597828"/>
+      </p:ext>
+    </p:extLst>
+  </p:cSld>
+  <p:clrMapOvr>
+    <a:masterClrMapping/>
+  </p:clrMapOvr>
+</p:sld>
+</file>
+
+<file path=ppt/slides/slide21.xml><?xml version="1.0" encoding="utf-8"?>
+<p:sld xmlns:a="http://schemas.openxmlformats.org/drawingml/2006/main" xmlns:r="http://schemas.openxmlformats.org/officeDocument/2006/relationships" xmlns:p="http://schemas.openxmlformats.org/presentationml/2006/main">
+  <p:cSld>
+    <p:spTree>
+      <p:nvGrpSpPr>
+        <p:cNvPr id="1" name=""/>
+        <p:cNvGrpSpPr/>
+        <p:nvPr/>
+      </p:nvGrpSpPr>
+      <p:grpSpPr>
+        <a:xfrm>
+          <a:off x="0" y="0"/>
+          <a:ext cx="0" cy="0"/>
+          <a:chOff x="0" y="0"/>
+          <a:chExt cx="0" cy="0"/>
+        </a:xfrm>
+      </p:grpSpPr>
+      <p:sp>
+        <p:nvSpPr>
+          <p:cNvPr id="2" name="Title 1">
+            <a:extLst>
+              <a:ext uri="{FF2B5EF4-FFF2-40B4-BE49-F238E27FC236}">
+                <a16:creationId xmlns:a16="http://schemas.microsoft.com/office/drawing/2014/main" id="{4D1E3FC3-B062-491B-A8A4-DA3269C9306E}"/>
+              </a:ext>
+            </a:extLst>
+          </p:cNvPr>
+          <p:cNvSpPr>
+            <a:spLocks noGrp="1"/>
+          </p:cNvSpPr>
+          <p:nvPr>
+            <p:ph type="title"/>
+          </p:nvPr>
+        </p:nvSpPr>
+        <p:spPr/>
+        <p:txBody>
+          <a:bodyPr/>
+          <a:lstStyle/>
+          <a:p>
+            <a:r>
+              <a:rPr lang="en-US" dirty="0"/>
+              <a:t>Rebase – Tread carefully (Cont.)</a:t>
+            </a:r>
+          </a:p>
+        </p:txBody>
+      </p:sp>
+      <p:pic>
+        <p:nvPicPr>
+          <p:cNvPr id="5" name="Content Placeholder 4">
+            <a:extLst>
+              <a:ext uri="{FF2B5EF4-FFF2-40B4-BE49-F238E27FC236}">
                 <a16:creationId xmlns:a16="http://schemas.microsoft.com/office/drawing/2014/main" id="{64E11DB0-6AC1-4186-A39B-69210812F4F5}"/>
               </a:ext>
             </a:extLst>
@@ -14511,7 +14658,7 @@
 </p:sld>
 </file>
 
-<file path=ppt/slides/slide21.xml><?xml version="1.0" encoding="utf-8"?>
+<file path=ppt/slides/slide22.xml><?xml version="1.0" encoding="utf-8"?>
 <p:sld xmlns:a="http://schemas.openxmlformats.org/drawingml/2006/main" xmlns:r="http://schemas.openxmlformats.org/officeDocument/2006/relationships" xmlns:p="http://schemas.openxmlformats.org/presentationml/2006/main">
   <p:cSld>
     <p:spTree>
@@ -14604,7 +14751,7 @@
 </p:sld>
 </file>
 
-<file path=ppt/slides/slide22.xml><?xml version="1.0" encoding="utf-8"?>
+<file path=ppt/slides/slide23.xml><?xml version="1.0" encoding="utf-8"?>
 <p:sld xmlns:a="http://schemas.openxmlformats.org/drawingml/2006/main" xmlns:r="http://schemas.openxmlformats.org/officeDocument/2006/relationships" xmlns:p="http://schemas.openxmlformats.org/presentationml/2006/main">
   <p:cSld>
     <p:spTree>
@@ -14697,7 +14844,7 @@
 </p:sld>
 </file>
 
-<file path=ppt/slides/slide23.xml><?xml version="1.0" encoding="utf-8"?>
+<file path=ppt/slides/slide24.xml><?xml version="1.0" encoding="utf-8"?>
 <p:sld xmlns:a="http://schemas.openxmlformats.org/drawingml/2006/main" xmlns:r="http://schemas.openxmlformats.org/officeDocument/2006/relationships" xmlns:p="http://schemas.openxmlformats.org/presentationml/2006/main">
   <p:cSld>
     <p:spTree>
@@ -14790,7 +14937,7 @@
 </p:sld>
 </file>
 
-<file path=ppt/slides/slide24.xml><?xml version="1.0" encoding="utf-8"?>
+<file path=ppt/slides/slide25.xml><?xml version="1.0" encoding="utf-8"?>
 <p:sld xmlns:a="http://schemas.openxmlformats.org/drawingml/2006/main" xmlns:r="http://schemas.openxmlformats.org/officeDocument/2006/relationships" xmlns:p="http://schemas.openxmlformats.org/presentationml/2006/main">
   <p:cSld>
     <p:spTree>
@@ -14855,7 +15002,159 @@
 </p:sld>
 </file>
 
-<file path=ppt/slides/slide25.xml><?xml version="1.0" encoding="utf-8"?>
+<file path=ppt/slides/slide26.xml><?xml version="1.0" encoding="utf-8"?>
+<p:sld xmlns:a="http://schemas.openxmlformats.org/drawingml/2006/main" xmlns:r="http://schemas.openxmlformats.org/officeDocument/2006/relationships" xmlns:p="http://schemas.openxmlformats.org/presentationml/2006/main">
+  <p:cSld>
+    <p:spTree>
+      <p:nvGrpSpPr>
+        <p:cNvPr id="1" name=""/>
+        <p:cNvGrpSpPr/>
+        <p:nvPr/>
+      </p:nvGrpSpPr>
+      <p:grpSpPr>
+        <a:xfrm>
+          <a:off x="0" y="0"/>
+          <a:ext cx="0" cy="0"/>
+          <a:chOff x="0" y="0"/>
+          <a:chExt cx="0" cy="0"/>
+        </a:xfrm>
+      </p:grpSpPr>
+      <p:sp>
+        <p:nvSpPr>
+          <p:cNvPr id="2" name="Title 1">
+            <a:extLst>
+              <a:ext uri="{FF2B5EF4-FFF2-40B4-BE49-F238E27FC236}">
+                <a16:creationId xmlns:a16="http://schemas.microsoft.com/office/drawing/2014/main" id="{A234A7D7-D1AF-41D1-B1CF-9696405119D7}"/>
+              </a:ext>
+            </a:extLst>
+          </p:cNvPr>
+          <p:cNvSpPr>
+            <a:spLocks noGrp="1"/>
+          </p:cNvSpPr>
+          <p:nvPr>
+            <p:ph type="title"/>
+          </p:nvPr>
+        </p:nvSpPr>
+        <p:spPr/>
+        <p:txBody>
+          <a:bodyPr/>
+          <a:lstStyle/>
+          <a:p>
+            <a:r>
+              <a:rPr lang="en-US" dirty="0" err="1"/>
+              <a:t>Github</a:t>
+            </a:r>
+            <a:r>
+              <a:rPr lang="en-US" dirty="0"/>
+              <a:t> features and next steps</a:t>
+            </a:r>
+          </a:p>
+        </p:txBody>
+      </p:sp>
+      <p:sp>
+        <p:nvSpPr>
+          <p:cNvPr id="3" name="Content Placeholder 2">
+            <a:extLst>
+              <a:ext uri="{FF2B5EF4-FFF2-40B4-BE49-F238E27FC236}">
+                <a16:creationId xmlns:a16="http://schemas.microsoft.com/office/drawing/2014/main" id="{1C3B3AAE-A676-4F92-A6C6-DD0ABEBE3E8B}"/>
+              </a:ext>
+            </a:extLst>
+          </p:cNvPr>
+          <p:cNvSpPr>
+            <a:spLocks noGrp="1"/>
+          </p:cNvSpPr>
+          <p:nvPr>
+            <p:ph idx="1"/>
+          </p:nvPr>
+        </p:nvSpPr>
+        <p:spPr>
+          <a:xfrm>
+            <a:off x="1141412" y="2097088"/>
+            <a:ext cx="9905999" cy="4268760"/>
+          </a:xfrm>
+        </p:spPr>
+        <p:txBody>
+          <a:bodyPr>
+            <a:normAutofit fontScale="92500" lnSpcReduction="10000"/>
+          </a:bodyPr>
+          <a:lstStyle/>
+          <a:p>
+            <a:r>
+              <a:rPr lang="en-US" dirty="0"/>
+              <a:t>Issue tracking</a:t>
+            </a:r>
+          </a:p>
+          <a:p>
+            <a:r>
+              <a:rPr lang="en-US" dirty="0"/>
+              <a:t>Documentation</a:t>
+            </a:r>
+          </a:p>
+          <a:p>
+            <a:r>
+              <a:rPr lang="en-US" dirty="0"/>
+              <a:t>Marketplace</a:t>
+            </a:r>
+          </a:p>
+          <a:p>
+            <a:r>
+              <a:rPr lang="en-US" dirty="0"/>
+              <a:t>Actions</a:t>
+            </a:r>
+          </a:p>
+          <a:p>
+            <a:r>
+              <a:rPr lang="en-US" dirty="0"/>
+              <a:t>Pages</a:t>
+            </a:r>
+          </a:p>
+          <a:p>
+            <a:r>
+              <a:rPr lang="en-US" dirty="0"/>
+              <a:t>Social</a:t>
+            </a:r>
+          </a:p>
+          <a:p>
+            <a:pPr lvl="1"/>
+            <a:r>
+              <a:rPr lang="en-US" dirty="0"/>
+              <a:t>Topics</a:t>
+            </a:r>
+          </a:p>
+          <a:p>
+            <a:pPr lvl="1"/>
+            <a:r>
+              <a:rPr lang="en-US" dirty="0"/>
+              <a:t>Trending</a:t>
+            </a:r>
+          </a:p>
+          <a:p>
+            <a:pPr lvl="1"/>
+            <a:r>
+              <a:rPr lang="en-US" dirty="0"/>
+              <a:t>Collections</a:t>
+            </a:r>
+          </a:p>
+          <a:p>
+            <a:pPr lvl="1"/>
+            <a:endParaRPr lang="en-US" dirty="0"/>
+          </a:p>
+        </p:txBody>
+      </p:sp>
+    </p:spTree>
+    <p:extLst>
+      <p:ext uri="{BB962C8B-B14F-4D97-AF65-F5344CB8AC3E}">
+        <p14:creationId xmlns:p14="http://schemas.microsoft.com/office/powerpoint/2010/main" val="635754875"/>
+      </p:ext>
+    </p:extLst>
+  </p:cSld>
+  <p:clrMapOvr>
+    <a:masterClrMapping/>
+  </p:clrMapOvr>
+</p:sld>
+</file>
+
+<file path=ppt/slides/slide27.xml><?xml version="1.0" encoding="utf-8"?>
 <p:sld xmlns:a="http://schemas.openxmlformats.org/drawingml/2006/main" xmlns:r="http://schemas.openxmlformats.org/officeDocument/2006/relationships" xmlns:p="http://schemas.openxmlformats.org/presentationml/2006/main">
   <p:cSld>
     <p:spTree>
@@ -14994,7 +15293,7 @@
           <p:cNvPr id="2" name="Title 1">
             <a:extLst>
               <a:ext uri="{FF2B5EF4-FFF2-40B4-BE49-F238E27FC236}">
-                <a16:creationId xmlns:a16="http://schemas.microsoft.com/office/drawing/2014/main" id="{34DB6CE4-2B13-4715-B5B2-615A55922CA1}"/>
+                <a16:creationId xmlns:a16="http://schemas.microsoft.com/office/drawing/2014/main" id="{9D1D1095-54EF-4488-87D3-7C294FE5DDD1}"/>
               </a:ext>
             </a:extLst>
           </p:cNvPr>
@@ -15007,22 +15306,12 @@
         </p:nvSpPr>
         <p:spPr/>
         <p:txBody>
-          <a:bodyPr>
-            <a:normAutofit/>
-          </a:bodyPr>
+          <a:bodyPr/>
           <a:lstStyle/>
           <a:p>
             <a:r>
-              <a:rPr lang="en-US" sz="4400" dirty="0" err="1">
-                <a:latin typeface="Rockwell" panose="02060603020205020403" pitchFamily="18" charset="0"/>
-              </a:rPr>
-              <a:t>GIThub</a:t>
-            </a:r>
-            <a:r>
-              <a:rPr lang="en-US" sz="4400" dirty="0">
-                <a:latin typeface="Rockwell" panose="02060603020205020403" pitchFamily="18" charset="0"/>
-              </a:rPr>
-              <a:t> uses git (surprise!)</a:t>
+              <a:rPr lang="en-US" dirty="0"/>
+              <a:t>Presentation Objectives</a:t>
             </a:r>
           </a:p>
         </p:txBody>
@@ -15032,7 +15321,7 @@
           <p:cNvPr id="3" name="Content Placeholder 2">
             <a:extLst>
               <a:ext uri="{FF2B5EF4-FFF2-40B4-BE49-F238E27FC236}">
-                <a16:creationId xmlns:a16="http://schemas.microsoft.com/office/drawing/2014/main" id="{143F5361-68C0-4BF5-80C8-F1E7BF92B2DB}"/>
+                <a16:creationId xmlns:a16="http://schemas.microsoft.com/office/drawing/2014/main" id="{96FF33B1-49D5-4AF1-A01B-E5F09E5E9620}"/>
               </a:ext>
             </a:extLst>
           </p:cNvPr>
@@ -15045,90 +15334,58 @@
         </p:nvSpPr>
         <p:spPr/>
         <p:txBody>
-          <a:bodyPr>
-            <a:normAutofit/>
-          </a:bodyPr>
+          <a:bodyPr/>
           <a:lstStyle/>
           <a:p>
+            <a:r>
+              <a:rPr lang="en-US" dirty="0"/>
+              <a:t>Agnostic view of git, separate from </a:t>
+            </a:r>
+            <a:r>
+              <a:rPr lang="en-US" dirty="0" err="1"/>
+              <a:t>github</a:t>
+            </a:r>
+            <a:endParaRPr lang="en-US" dirty="0"/>
+          </a:p>
+          <a:p>
             <a:pPr lvl="1"/>
             <a:r>
-              <a:rPr lang="en-US" sz="2400" dirty="0">
-                <a:latin typeface="Tahoma" panose="020B0604030504040204" pitchFamily="34" charset="0"/>
-                <a:ea typeface="Tahoma" panose="020B0604030504040204" pitchFamily="34" charset="0"/>
-                <a:cs typeface="Tahoma" panose="020B0604030504040204" pitchFamily="34" charset="0"/>
-              </a:rPr>
-              <a:t>What is git?</a:t>
-            </a:r>
-          </a:p>
-          <a:p>
-            <a:pPr lvl="2"/>
-            <a:r>
-              <a:rPr lang="en-US" sz="2200" dirty="0">
-                <a:latin typeface="Tahoma" panose="020B0604030504040204" pitchFamily="34" charset="0"/>
-                <a:ea typeface="Tahoma" panose="020B0604030504040204" pitchFamily="34" charset="0"/>
-                <a:cs typeface="Tahoma" panose="020B0604030504040204" pitchFamily="34" charset="0"/>
-              </a:rPr>
-              <a:t>Git is a VCS (Version Control System)</a:t>
-            </a:r>
-            <a:endParaRPr lang="en-US" sz="2400" dirty="0">
-              <a:latin typeface="Tahoma" panose="020B0604030504040204" pitchFamily="34" charset="0"/>
-              <a:ea typeface="Tahoma" panose="020B0604030504040204" pitchFamily="34" charset="0"/>
-              <a:cs typeface="Tahoma" panose="020B0604030504040204" pitchFamily="34" charset="0"/>
-            </a:endParaRPr>
+              <a:rPr lang="en-US" dirty="0"/>
+              <a:t>Then how and why of using git</a:t>
+            </a:r>
           </a:p>
           <a:p>
             <a:pPr lvl="1"/>
             <a:r>
-              <a:rPr lang="en-US" sz="2400" dirty="0">
-                <a:latin typeface="Tahoma" panose="020B0604030504040204" pitchFamily="34" charset="0"/>
-                <a:ea typeface="Tahoma" panose="020B0604030504040204" pitchFamily="34" charset="0"/>
-                <a:cs typeface="Tahoma" panose="020B0604030504040204" pitchFamily="34" charset="0"/>
-              </a:rPr>
-              <a:t>Examples of other VCS</a:t>
-            </a:r>
-          </a:p>
-          <a:p>
-            <a:pPr lvl="2"/>
-            <a:r>
-              <a:rPr lang="en-US" sz="2200" dirty="0">
-                <a:latin typeface="Tahoma" panose="020B0604030504040204" pitchFamily="34" charset="0"/>
-                <a:ea typeface="Tahoma" panose="020B0604030504040204" pitchFamily="34" charset="0"/>
-                <a:cs typeface="Tahoma" panose="020B0604030504040204" pitchFamily="34" charset="0"/>
-              </a:rPr>
-              <a:t>Subversion</a:t>
-            </a:r>
-          </a:p>
-          <a:p>
-            <a:pPr lvl="2"/>
-            <a:r>
-              <a:rPr lang="en-US" sz="2200" dirty="0">
-                <a:latin typeface="Tahoma" panose="020B0604030504040204" pitchFamily="34" charset="0"/>
-                <a:ea typeface="Tahoma" panose="020B0604030504040204" pitchFamily="34" charset="0"/>
-                <a:cs typeface="Tahoma" panose="020B0604030504040204" pitchFamily="34" charset="0"/>
-              </a:rPr>
-              <a:t>CVS</a:t>
-            </a:r>
-          </a:p>
-          <a:p>
-            <a:pPr lvl="2"/>
-            <a:r>
-              <a:rPr lang="en-US" sz="2200" dirty="0">
-                <a:latin typeface="Tahoma" panose="020B0604030504040204" pitchFamily="34" charset="0"/>
-                <a:ea typeface="Tahoma" panose="020B0604030504040204" pitchFamily="34" charset="0"/>
-                <a:cs typeface="Tahoma" panose="020B0604030504040204" pitchFamily="34" charset="0"/>
-              </a:rPr>
-              <a:t>Mercurial</a:t>
-            </a:r>
-          </a:p>
-          <a:p>
-            <a:pPr lvl="2"/>
-            <a:r>
-              <a:rPr lang="en-US" sz="2200" dirty="0">
-                <a:latin typeface="Tahoma" panose="020B0604030504040204" pitchFamily="34" charset="0"/>
-                <a:ea typeface="Tahoma" panose="020B0604030504040204" pitchFamily="34" charset="0"/>
-                <a:cs typeface="Tahoma" panose="020B0604030504040204" pitchFamily="34" charset="0"/>
-              </a:rPr>
-              <a:t>Monotone</a:t>
+              <a:rPr lang="en-US" dirty="0"/>
+              <a:t>Labs involving both command-line and GUI driven git interaction</a:t>
+            </a:r>
+          </a:p>
+          <a:p>
+            <a:pPr lvl="1"/>
+            <a:r>
+              <a:rPr lang="en-US" dirty="0"/>
+              <a:t>Branching strategies and conventions</a:t>
+            </a:r>
+          </a:p>
+          <a:p>
+            <a:r>
+              <a:rPr lang="en-US" dirty="0"/>
+              <a:t>GitHub features beyond git</a:t>
+            </a:r>
+          </a:p>
+          <a:p>
+            <a:pPr lvl="1"/>
+            <a:r>
+              <a:rPr lang="en-US" dirty="0"/>
+              <a:t>Issue tracking</a:t>
+            </a:r>
+          </a:p>
+          <a:p>
+            <a:pPr lvl="1"/>
+            <a:r>
+              <a:rPr lang="en-US" dirty="0"/>
+              <a:t>Actions</a:t>
             </a:r>
           </a:p>
         </p:txBody>
@@ -15136,7 +15393,7 @@
     </p:spTree>
     <p:extLst>
       <p:ext uri="{BB962C8B-B14F-4D97-AF65-F5344CB8AC3E}">
-        <p14:creationId xmlns:p14="http://schemas.microsoft.com/office/powerpoint/2010/main" val="1348318116"/>
+        <p14:creationId xmlns:p14="http://schemas.microsoft.com/office/powerpoint/2010/main" val="2549343309"/>
       </p:ext>
     </p:extLst>
   </p:cSld>
@@ -15187,10 +15444,16 @@
           <a:lstStyle/>
           <a:p>
             <a:r>
+              <a:rPr lang="en-US" sz="4400" dirty="0" err="1">
+                <a:latin typeface="Rockwell" panose="02060603020205020403" pitchFamily="18" charset="0"/>
+              </a:rPr>
+              <a:t>GIThub</a:t>
+            </a:r>
+            <a:r>
               <a:rPr lang="en-US" sz="4400" dirty="0">
                 <a:latin typeface="Rockwell" panose="02060603020205020403" pitchFamily="18" charset="0"/>
               </a:rPr>
-              <a:t>Version Control System</a:t>
+              <a:t> uses git (surprise!)</a:t>
             </a:r>
           </a:p>
         </p:txBody>
@@ -15218,6 +15481,174 @@
           </a:bodyPr>
           <a:lstStyle/>
           <a:p>
+            <a:pPr lvl="1"/>
+            <a:r>
+              <a:rPr lang="en-US" sz="2400" dirty="0">
+                <a:latin typeface="Tahoma" panose="020B0604030504040204" pitchFamily="34" charset="0"/>
+                <a:ea typeface="Tahoma" panose="020B0604030504040204" pitchFamily="34" charset="0"/>
+                <a:cs typeface="Tahoma" panose="020B0604030504040204" pitchFamily="34" charset="0"/>
+              </a:rPr>
+              <a:t>What is git?</a:t>
+            </a:r>
+          </a:p>
+          <a:p>
+            <a:pPr lvl="2"/>
+            <a:r>
+              <a:rPr lang="en-US" sz="2200" dirty="0">
+                <a:latin typeface="Tahoma" panose="020B0604030504040204" pitchFamily="34" charset="0"/>
+                <a:ea typeface="Tahoma" panose="020B0604030504040204" pitchFamily="34" charset="0"/>
+                <a:cs typeface="Tahoma" panose="020B0604030504040204" pitchFamily="34" charset="0"/>
+              </a:rPr>
+              <a:t>Git is a VCS (Version Control System)</a:t>
+            </a:r>
+            <a:endParaRPr lang="en-US" sz="2400" dirty="0">
+              <a:latin typeface="Tahoma" panose="020B0604030504040204" pitchFamily="34" charset="0"/>
+              <a:ea typeface="Tahoma" panose="020B0604030504040204" pitchFamily="34" charset="0"/>
+              <a:cs typeface="Tahoma" panose="020B0604030504040204" pitchFamily="34" charset="0"/>
+            </a:endParaRPr>
+          </a:p>
+          <a:p>
+            <a:pPr lvl="1"/>
+            <a:r>
+              <a:rPr lang="en-US" sz="2400" dirty="0">
+                <a:latin typeface="Tahoma" panose="020B0604030504040204" pitchFamily="34" charset="0"/>
+                <a:ea typeface="Tahoma" panose="020B0604030504040204" pitchFamily="34" charset="0"/>
+                <a:cs typeface="Tahoma" panose="020B0604030504040204" pitchFamily="34" charset="0"/>
+              </a:rPr>
+              <a:t>Examples of other VCS</a:t>
+            </a:r>
+          </a:p>
+          <a:p>
+            <a:pPr lvl="2"/>
+            <a:r>
+              <a:rPr lang="en-US" sz="2200" dirty="0">
+                <a:latin typeface="Tahoma" panose="020B0604030504040204" pitchFamily="34" charset="0"/>
+                <a:ea typeface="Tahoma" panose="020B0604030504040204" pitchFamily="34" charset="0"/>
+                <a:cs typeface="Tahoma" panose="020B0604030504040204" pitchFamily="34" charset="0"/>
+              </a:rPr>
+              <a:t>Subversion</a:t>
+            </a:r>
+          </a:p>
+          <a:p>
+            <a:pPr lvl="2"/>
+            <a:r>
+              <a:rPr lang="en-US" sz="2200" dirty="0">
+                <a:latin typeface="Tahoma" panose="020B0604030504040204" pitchFamily="34" charset="0"/>
+                <a:ea typeface="Tahoma" panose="020B0604030504040204" pitchFamily="34" charset="0"/>
+                <a:cs typeface="Tahoma" panose="020B0604030504040204" pitchFamily="34" charset="0"/>
+              </a:rPr>
+              <a:t>CVS</a:t>
+            </a:r>
+          </a:p>
+          <a:p>
+            <a:pPr lvl="2"/>
+            <a:r>
+              <a:rPr lang="en-US" sz="2200" dirty="0">
+                <a:latin typeface="Tahoma" panose="020B0604030504040204" pitchFamily="34" charset="0"/>
+                <a:ea typeface="Tahoma" panose="020B0604030504040204" pitchFamily="34" charset="0"/>
+                <a:cs typeface="Tahoma" panose="020B0604030504040204" pitchFamily="34" charset="0"/>
+              </a:rPr>
+              <a:t>Mercurial</a:t>
+            </a:r>
+          </a:p>
+          <a:p>
+            <a:pPr lvl="2"/>
+            <a:r>
+              <a:rPr lang="en-US" sz="2200" dirty="0">
+                <a:latin typeface="Tahoma" panose="020B0604030504040204" pitchFamily="34" charset="0"/>
+                <a:ea typeface="Tahoma" panose="020B0604030504040204" pitchFamily="34" charset="0"/>
+                <a:cs typeface="Tahoma" panose="020B0604030504040204" pitchFamily="34" charset="0"/>
+              </a:rPr>
+              <a:t>Monotone</a:t>
+            </a:r>
+          </a:p>
+        </p:txBody>
+      </p:sp>
+    </p:spTree>
+    <p:extLst>
+      <p:ext uri="{BB962C8B-B14F-4D97-AF65-F5344CB8AC3E}">
+        <p14:creationId xmlns:p14="http://schemas.microsoft.com/office/powerpoint/2010/main" val="1348318116"/>
+      </p:ext>
+    </p:extLst>
+  </p:cSld>
+  <p:clrMapOvr>
+    <a:masterClrMapping/>
+  </p:clrMapOvr>
+</p:sld>
+</file>
+
+<file path=ppt/slides/slide5.xml><?xml version="1.0" encoding="utf-8"?>
+<p:sld xmlns:a="http://schemas.openxmlformats.org/drawingml/2006/main" xmlns:r="http://schemas.openxmlformats.org/officeDocument/2006/relationships" xmlns:p="http://schemas.openxmlformats.org/presentationml/2006/main">
+  <p:cSld>
+    <p:spTree>
+      <p:nvGrpSpPr>
+        <p:cNvPr id="1" name=""/>
+        <p:cNvGrpSpPr/>
+        <p:nvPr/>
+      </p:nvGrpSpPr>
+      <p:grpSpPr>
+        <a:xfrm>
+          <a:off x="0" y="0"/>
+          <a:ext cx="0" cy="0"/>
+          <a:chOff x="0" y="0"/>
+          <a:chExt cx="0" cy="0"/>
+        </a:xfrm>
+      </p:grpSpPr>
+      <p:sp>
+        <p:nvSpPr>
+          <p:cNvPr id="2" name="Title 1">
+            <a:extLst>
+              <a:ext uri="{FF2B5EF4-FFF2-40B4-BE49-F238E27FC236}">
+                <a16:creationId xmlns:a16="http://schemas.microsoft.com/office/drawing/2014/main" id="{34DB6CE4-2B13-4715-B5B2-615A55922CA1}"/>
+              </a:ext>
+            </a:extLst>
+          </p:cNvPr>
+          <p:cNvSpPr>
+            <a:spLocks noGrp="1"/>
+          </p:cNvSpPr>
+          <p:nvPr>
+            <p:ph type="title"/>
+          </p:nvPr>
+        </p:nvSpPr>
+        <p:spPr/>
+        <p:txBody>
+          <a:bodyPr>
+            <a:normAutofit/>
+          </a:bodyPr>
+          <a:lstStyle/>
+          <a:p>
+            <a:r>
+              <a:rPr lang="en-US" sz="4400" dirty="0">
+                <a:latin typeface="Rockwell" panose="02060603020205020403" pitchFamily="18" charset="0"/>
+              </a:rPr>
+              <a:t>Version Control System</a:t>
+            </a:r>
+          </a:p>
+        </p:txBody>
+      </p:sp>
+      <p:sp>
+        <p:nvSpPr>
+          <p:cNvPr id="3" name="Content Placeholder 2">
+            <a:extLst>
+              <a:ext uri="{FF2B5EF4-FFF2-40B4-BE49-F238E27FC236}">
+                <a16:creationId xmlns:a16="http://schemas.microsoft.com/office/drawing/2014/main" id="{143F5361-68C0-4BF5-80C8-F1E7BF92B2DB}"/>
+              </a:ext>
+            </a:extLst>
+          </p:cNvPr>
+          <p:cNvSpPr>
+            <a:spLocks noGrp="1"/>
+          </p:cNvSpPr>
+          <p:nvPr>
+            <p:ph idx="1"/>
+          </p:nvPr>
+        </p:nvSpPr>
+        <p:spPr/>
+        <p:txBody>
+          <a:bodyPr>
+            <a:normAutofit/>
+          </a:bodyPr>
+          <a:lstStyle/>
+          <a:p>
             <a:r>
               <a:rPr lang="en-US" sz="2800" dirty="0">
                 <a:latin typeface="Tahoma" panose="020B0604030504040204" pitchFamily="34" charset="0"/>
@@ -15296,7 +15727,7 @@
 </p:sld>
 </file>
 
-<file path=ppt/slides/slide5.xml><?xml version="1.0" encoding="utf-8"?>
+<file path=ppt/slides/slide6.xml><?xml version="1.0" encoding="utf-8"?>
 <p:sld xmlns:a="http://schemas.openxmlformats.org/drawingml/2006/main" xmlns:r="http://schemas.openxmlformats.org/officeDocument/2006/relationships" xmlns:p="http://schemas.openxmlformats.org/presentationml/2006/main">
   <p:cSld>
     <p:spTree>
@@ -15406,7 +15837,7 @@
 </p:sld>
 </file>
 
-<file path=ppt/slides/slide6.xml><?xml version="1.0" encoding="utf-8"?>
+<file path=ppt/slides/slide7.xml><?xml version="1.0" encoding="utf-8"?>
 <p:sld xmlns:a="http://schemas.openxmlformats.org/drawingml/2006/main" xmlns:r="http://schemas.openxmlformats.org/officeDocument/2006/relationships" xmlns:p="http://schemas.openxmlformats.org/presentationml/2006/main">
   <p:cSld>
     <p:spTree>
@@ -15496,7 +15927,7 @@
 </p:sld>
 </file>
 
-<file path=ppt/slides/slide7.xml><?xml version="1.0" encoding="utf-8"?>
+<file path=ppt/slides/slide8.xml><?xml version="1.0" encoding="utf-8"?>
 <p:sld xmlns:a="http://schemas.openxmlformats.org/drawingml/2006/main" xmlns:r="http://schemas.openxmlformats.org/officeDocument/2006/relationships" xmlns:p="http://schemas.openxmlformats.org/presentationml/2006/main">
   <p:cSld>
     <p:spTree>
@@ -15851,105 +16282,6 @@
 </p:sld>
 </file>
 
-<file path=ppt/slides/slide8.xml><?xml version="1.0" encoding="utf-8"?>
-<p:sld xmlns:a="http://schemas.openxmlformats.org/drawingml/2006/main" xmlns:r="http://schemas.openxmlformats.org/officeDocument/2006/relationships" xmlns:p="http://schemas.openxmlformats.org/presentationml/2006/main">
-  <p:cSld>
-    <p:spTree>
-      <p:nvGrpSpPr>
-        <p:cNvPr id="1" name=""/>
-        <p:cNvGrpSpPr/>
-        <p:nvPr/>
-      </p:nvGrpSpPr>
-      <p:grpSpPr>
-        <a:xfrm>
-          <a:off x="0" y="0"/>
-          <a:ext cx="0" cy="0"/>
-          <a:chOff x="0" y="0"/>
-          <a:chExt cx="0" cy="0"/>
-        </a:xfrm>
-      </p:grpSpPr>
-      <p:sp>
-        <p:nvSpPr>
-          <p:cNvPr id="2" name="Title 1">
-            <a:extLst>
-              <a:ext uri="{FF2B5EF4-FFF2-40B4-BE49-F238E27FC236}">
-                <a16:creationId xmlns:a16="http://schemas.microsoft.com/office/drawing/2014/main" id="{13FC7AF7-A763-46CF-A6AA-353C92C0D8D4}"/>
-              </a:ext>
-            </a:extLst>
-          </p:cNvPr>
-          <p:cNvSpPr>
-            <a:spLocks noGrp="1"/>
-          </p:cNvSpPr>
-          <p:nvPr>
-            <p:ph type="title"/>
-          </p:nvPr>
-        </p:nvSpPr>
-        <p:spPr/>
-        <p:txBody>
-          <a:bodyPr/>
-          <a:lstStyle/>
-          <a:p>
-            <a:r>
-              <a:rPr lang="en-US" dirty="0"/>
-              <a:t>Lab 1 – part 1</a:t>
-            </a:r>
-          </a:p>
-        </p:txBody>
-      </p:sp>
-      <p:sp>
-        <p:nvSpPr>
-          <p:cNvPr id="3" name="Content Placeholder 2">
-            <a:extLst>
-              <a:ext uri="{FF2B5EF4-FFF2-40B4-BE49-F238E27FC236}">
-                <a16:creationId xmlns:a16="http://schemas.microsoft.com/office/drawing/2014/main" id="{6D08EF2B-6A6E-4390-A8F1-CDC0E1412495}"/>
-              </a:ext>
-            </a:extLst>
-          </p:cNvPr>
-          <p:cNvSpPr>
-            <a:spLocks noGrp="1"/>
-          </p:cNvSpPr>
-          <p:nvPr>
-            <p:ph idx="1"/>
-          </p:nvPr>
-        </p:nvSpPr>
-        <p:spPr/>
-        <p:txBody>
-          <a:bodyPr/>
-          <a:lstStyle/>
-          <a:p>
-            <a:r>
-              <a:rPr lang="en-US" dirty="0"/>
-              <a:t>Install git-bash</a:t>
-            </a:r>
-          </a:p>
-          <a:p>
-            <a:r>
-              <a:rPr lang="en-US" dirty="0"/>
-              <a:t>Let git know who you are</a:t>
-            </a:r>
-          </a:p>
-          <a:p>
-            <a:pPr lvl="1"/>
-            <a:r>
-              <a:rPr lang="en-US" dirty="0"/>
-              <a:t>git config --global </a:t>
-            </a:r>
-          </a:p>
-        </p:txBody>
-      </p:sp>
-    </p:spTree>
-    <p:extLst>
-      <p:ext uri="{BB962C8B-B14F-4D97-AF65-F5344CB8AC3E}">
-        <p14:creationId xmlns:p14="http://schemas.microsoft.com/office/powerpoint/2010/main" val="1868797460"/>
-      </p:ext>
-    </p:extLst>
-  </p:cSld>
-  <p:clrMapOvr>
-    <a:masterClrMapping/>
-  </p:clrMapOvr>
-</p:sld>
-</file>
-
 <file path=ppt/slides/slide9.xml><?xml version="1.0" encoding="utf-8"?>
 <p:sld xmlns:a="http://schemas.openxmlformats.org/drawingml/2006/main" xmlns:r="http://schemas.openxmlformats.org/officeDocument/2006/relationships" xmlns:p="http://schemas.openxmlformats.org/presentationml/2006/main">
   <p:cSld>
@@ -15990,7 +16322,7 @@
           <a:p>
             <a:r>
               <a:rPr lang="en-US" dirty="0"/>
-              <a:t>Lab 1 – part 2</a:t>
+              <a:t>Lab 1 – part 1</a:t>
             </a:r>
           </a:p>
         </p:txBody>
@@ -16018,66 +16350,20 @@
           <a:p>
             <a:r>
               <a:rPr lang="en-US" dirty="0"/>
-              <a:t>Create a repository in </a:t>
-            </a:r>
-            <a:r>
-              <a:rPr lang="en-US" dirty="0" err="1"/>
-              <a:t>github</a:t>
-            </a:r>
-            <a:endParaRPr lang="en-US" dirty="0"/>
+              <a:t>Install git-bash</a:t>
+            </a:r>
+          </a:p>
+          <a:p>
+            <a:r>
+              <a:rPr lang="en-US" dirty="0"/>
+              <a:t>Let git know who you are</a:t>
+            </a:r>
           </a:p>
           <a:p>
             <a:pPr lvl="1"/>
             <a:r>
               <a:rPr lang="en-US" dirty="0"/>
-              <a:t>Repository will be initialized by </a:t>
-            </a:r>
-            <a:r>
-              <a:rPr lang="en-US" dirty="0" err="1"/>
-              <a:t>github</a:t>
-            </a:r>
-            <a:endParaRPr lang="en-US" dirty="0"/>
-          </a:p>
-          <a:p>
-            <a:pPr lvl="2"/>
-            <a:r>
-              <a:rPr lang="en-US" dirty="0"/>
-              <a:t>Clone repository</a:t>
-            </a:r>
-          </a:p>
-          <a:p>
-            <a:pPr lvl="2"/>
-            <a:r>
-              <a:rPr lang="en-US" dirty="0"/>
-              <a:t>Create branch</a:t>
-            </a:r>
-          </a:p>
-          <a:p>
-            <a:pPr lvl="2"/>
-            <a:r>
-              <a:rPr lang="en-US" dirty="0"/>
-              <a:t>Make change</a:t>
-            </a:r>
-          </a:p>
-          <a:p>
-            <a:pPr lvl="2"/>
-            <a:r>
-              <a:rPr lang="en-US" dirty="0"/>
-              <a:t>Commit change</a:t>
-            </a:r>
-          </a:p>
-          <a:p>
-            <a:pPr lvl="2"/>
-            <a:r>
-              <a:rPr lang="en-US" dirty="0"/>
-              <a:t>Push</a:t>
-            </a:r>
-          </a:p>
-          <a:p>
-            <a:pPr lvl="2"/>
-            <a:r>
-              <a:rPr lang="en-US" dirty="0"/>
-              <a:t>Merge branch</a:t>
+              <a:t>git config --global </a:t>
             </a:r>
           </a:p>
         </p:txBody>
@@ -16085,7 +16371,7 @@
     </p:spTree>
     <p:extLst>
       <p:ext uri="{BB962C8B-B14F-4D97-AF65-F5344CB8AC3E}">
-        <p14:creationId xmlns:p14="http://schemas.microsoft.com/office/powerpoint/2010/main" val="4049689424"/>
+        <p14:creationId xmlns:p14="http://schemas.microsoft.com/office/powerpoint/2010/main" val="1868797460"/>
       </p:ext>
     </p:extLst>
   </p:cSld>
@@ -16937,6 +17223,15 @@
 </file>
 
 <file path=customXml/item1.xml><?xml version="1.0" encoding="utf-8"?>
+<?mso-contentType ?>
+<FormTemplates xmlns="http://schemas.microsoft.com/sharepoint/v3/contenttype/forms">
+  <Display>DocumentLibraryForm</Display>
+  <Edit>DocumentLibraryForm</Edit>
+  <New>DocumentLibraryForm</New>
+</FormTemplates>
+</file>
+
+<file path=customXml/item2.xml><?xml version="1.0" encoding="utf-8"?>
 <ct:contentTypeSchema xmlns:ct="http://schemas.microsoft.com/office/2006/metadata/contentType" xmlns:ma="http://schemas.microsoft.com/office/2006/metadata/properties/metaAttributes" ct:_="" ma:_="" ma:contentTypeName="Document" ma:contentTypeID="0x01010079F111ED35F8CC479449609E8A0923A6" ma:contentTypeVersion="11" ma:contentTypeDescription="Create a new document." ma:contentTypeScope="" ma:versionID="96291512c1ee715ab617f4c07df79fc1">
   <xsd:schema xmlns:xsd="http://www.w3.org/2001/XMLSchema" xmlns:xs="http://www.w3.org/2001/XMLSchema" xmlns:p="http://schemas.microsoft.com/office/2006/metadata/properties" xmlns:ns2="71af3243-3dd4-4a8d-8c0d-dd76da1f02a5" xmlns:ns3="16c05727-aa75-4e4a-9b5f-8a80a1165891" targetNamespace="http://schemas.microsoft.com/office/2006/metadata/properties" ma:root="true" ma:fieldsID="8256c27c40ca5c40ce1cf6c44f0205df" ns2:_="" ns3:_="">
     <xsd:import namespace="71af3243-3dd4-4a8d-8c0d-dd76da1f02a5"/>
@@ -17147,15 +17442,6 @@
 </ct:contentTypeSchema>
 </file>
 
-<file path=customXml/item2.xml><?xml version="1.0" encoding="utf-8"?>
-<?mso-contentType ?>
-<FormTemplates xmlns="http://schemas.microsoft.com/sharepoint/v3/contenttype/forms">
-  <Display>DocumentLibraryForm</Display>
-  <Edit>DocumentLibraryForm</Edit>
-  <New>DocumentLibraryForm</New>
-</FormTemplates>
-</file>
-
 <file path=customXml/item3.xml><?xml version="1.0" encoding="utf-8"?>
 <p:properties xmlns:p="http://schemas.microsoft.com/office/2006/metadata/properties" xmlns:xsi="http://www.w3.org/2001/XMLSchema-instance" xmlns:pc="http://schemas.microsoft.com/office/infopath/2007/PartnerControls">
   <documentManagement>
@@ -17165,6 +17451,14 @@
 </file>
 
 <file path=customXml/itemProps1.xml><?xml version="1.0" encoding="utf-8"?>
+<ds:datastoreItem xmlns:ds="http://schemas.openxmlformats.org/officeDocument/2006/customXml" ds:itemID="{B579702B-25C7-40D7-9E29-7686B11A9660}">
+  <ds:schemaRefs>
+    <ds:schemaRef ds:uri="http://schemas.microsoft.com/sharepoint/v3/contenttype/forms"/>
+  </ds:schemaRefs>
+</ds:datastoreItem>
+</file>
+
+<file path=customXml/itemProps2.xml><?xml version="1.0" encoding="utf-8"?>
 <ds:datastoreItem xmlns:ds="http://schemas.openxmlformats.org/officeDocument/2006/customXml" ds:itemID="{A7C0B241-13E5-418D-8920-D23491E2D2C0}">
   <ds:schemaRefs>
     <ds:schemaRef ds:uri="http://schemas.microsoft.com/office/2006/metadata/contentType"/>
@@ -17183,14 +17477,6 @@
 </ds:datastoreItem>
 </file>
 
-<file path=customXml/itemProps2.xml><?xml version="1.0" encoding="utf-8"?>
-<ds:datastoreItem xmlns:ds="http://schemas.openxmlformats.org/officeDocument/2006/customXml" ds:itemID="{B579702B-25C7-40D7-9E29-7686B11A9660}">
-  <ds:schemaRefs>
-    <ds:schemaRef ds:uri="http://schemas.microsoft.com/sharepoint/v3/contenttype/forms"/>
-  </ds:schemaRefs>
-</ds:datastoreItem>
-</file>
-
 <file path=customXml/itemProps3.xml><?xml version="1.0" encoding="utf-8"?>
 <ds:datastoreItem xmlns:ds="http://schemas.openxmlformats.org/officeDocument/2006/customXml" ds:itemID="{E7866CFD-F94E-4AE5-ACEA-86FEC0F48A10}">
   <ds:schemaRefs>

</xml_diff>

<commit_message>
Reversed labs 1 and 2, added fork and stash after review with Chris.
</commit_message>
<xml_diff>
--- a/resources/Introduction to github.pptx
+++ b/resources/Introduction to github.pptx
@@ -20,12 +20,12 @@
     <p:sldId id="266" r:id="rId11"/>
     <p:sldId id="267" r:id="rId12"/>
     <p:sldId id="268" r:id="rId13"/>
-    <p:sldId id="271" r:id="rId14"/>
+    <p:sldId id="287" r:id="rId14"/>
     <p:sldId id="270" r:id="rId15"/>
     <p:sldId id="272" r:id="rId16"/>
     <p:sldId id="273" r:id="rId17"/>
     <p:sldId id="274" r:id="rId18"/>
-    <p:sldId id="269" r:id="rId19"/>
+    <p:sldId id="271" r:id="rId19"/>
     <p:sldId id="275" r:id="rId20"/>
     <p:sldId id="276" r:id="rId21"/>
     <p:sldId id="277" r:id="rId22"/>
@@ -241,7 +241,7 @@
           <a:p>
             <a:fld id="{2B85766F-5EC0-4797-B4D1-777FCB005B11}" type="datetimeFigureOut">
               <a:rPr lang="en-US" smtClean="0"/>
-              <a:t>1/9/2020</a:t>
+              <a:t>1/10/2020</a:t>
             </a:fld>
             <a:endParaRPr lang="en-US" dirty="0"/>
           </a:p>
@@ -418,7 +418,7 @@
           <a:p>
             <a:fld id="{B2B4B5EC-152C-4627-80C0-63B10D5574EF}" type="datetimeFigureOut">
               <a:rPr lang="en-US" smtClean="0"/>
-              <a:t>1/9/2020</a:t>
+              <a:t>1/10/2020</a:t>
             </a:fld>
             <a:endParaRPr lang="en-US" dirty="0"/>
           </a:p>
@@ -4967,7 +4967,7 @@
           <a:p>
             <a:fld id="{48A87A34-81AB-432B-8DAE-1953F412C126}" type="datetimeFigureOut">
               <a:rPr lang="en-US" smtClean="0"/>
-              <a:t>1/9/2020</a:t>
+              <a:t>1/10/2020</a:t>
             </a:fld>
             <a:endParaRPr lang="en-US" dirty="0"/>
           </a:p>
@@ -5234,7 +5234,7 @@
           <a:p>
             <a:fld id="{48A87A34-81AB-432B-8DAE-1953F412C126}" type="datetimeFigureOut">
               <a:rPr lang="en-US" smtClean="0"/>
-              <a:t>1/9/2020</a:t>
+              <a:t>1/10/2020</a:t>
             </a:fld>
             <a:endParaRPr lang="en-US" dirty="0"/>
           </a:p>
@@ -5430,7 +5430,7 @@
           <a:p>
             <a:fld id="{48A87A34-81AB-432B-8DAE-1953F412C126}" type="datetimeFigureOut">
               <a:rPr lang="en-US" smtClean="0"/>
-              <a:t>1/9/2020</a:t>
+              <a:t>1/10/2020</a:t>
             </a:fld>
             <a:endParaRPr lang="en-US" dirty="0"/>
           </a:p>
@@ -5693,7 +5693,7 @@
           <a:p>
             <a:fld id="{48A87A34-81AB-432B-8DAE-1953F412C126}" type="datetimeFigureOut">
               <a:rPr lang="en-US" smtClean="0"/>
-              <a:t>1/9/2020</a:t>
+              <a:t>1/10/2020</a:t>
             </a:fld>
             <a:endParaRPr lang="en-US" dirty="0"/>
           </a:p>
@@ -6127,7 +6127,7 @@
           <a:p>
             <a:fld id="{48A87A34-81AB-432B-8DAE-1953F412C126}" type="datetimeFigureOut">
               <a:rPr lang="en-US" smtClean="0"/>
-              <a:t>1/9/2020</a:t>
+              <a:t>1/10/2020</a:t>
             </a:fld>
             <a:endParaRPr lang="en-US" dirty="0"/>
           </a:p>
@@ -6673,7 +6673,7 @@
           <a:p>
             <a:fld id="{48A87A34-81AB-432B-8DAE-1953F412C126}" type="datetimeFigureOut">
               <a:rPr lang="en-US" smtClean="0"/>
-              <a:t>1/9/2020</a:t>
+              <a:t>1/10/2020</a:t>
             </a:fld>
             <a:endParaRPr lang="en-US" dirty="0"/>
           </a:p>
@@ -7393,7 +7393,7 @@
           <a:p>
             <a:fld id="{48A87A34-81AB-432B-8DAE-1953F412C126}" type="datetimeFigureOut">
               <a:rPr lang="en-US" smtClean="0"/>
-              <a:t>1/9/2020</a:t>
+              <a:t>1/10/2020</a:t>
             </a:fld>
             <a:endParaRPr lang="en-US" dirty="0"/>
           </a:p>
@@ -7563,7 +7563,7 @@
           <a:p>
             <a:fld id="{48A87A34-81AB-432B-8DAE-1953F412C126}" type="datetimeFigureOut">
               <a:rPr lang="en-US" smtClean="0"/>
-              <a:t>1/9/2020</a:t>
+              <a:t>1/10/2020</a:t>
             </a:fld>
             <a:endParaRPr lang="en-US" dirty="0"/>
           </a:p>
@@ -7743,7 +7743,7 @@
           <a:p>
             <a:fld id="{48A87A34-81AB-432B-8DAE-1953F412C126}" type="datetimeFigureOut">
               <a:rPr lang="en-US" smtClean="0"/>
-              <a:t>1/9/2020</a:t>
+              <a:t>1/10/2020</a:t>
             </a:fld>
             <a:endParaRPr lang="en-US" dirty="0"/>
           </a:p>
@@ -7913,7 +7913,7 @@
           <a:p>
             <a:fld id="{48A87A34-81AB-432B-8DAE-1953F412C126}" type="datetimeFigureOut">
               <a:rPr lang="en-US" smtClean="0"/>
-              <a:t>1/9/2020</a:t>
+              <a:t>1/10/2020</a:t>
             </a:fld>
             <a:endParaRPr lang="en-US" dirty="0"/>
           </a:p>
@@ -8163,7 +8163,7 @@
           <a:p>
             <a:fld id="{48A87A34-81AB-432B-8DAE-1953F412C126}" type="datetimeFigureOut">
               <a:rPr lang="en-US" smtClean="0"/>
-              <a:t>1/9/2020</a:t>
+              <a:t>1/10/2020</a:t>
             </a:fld>
             <a:endParaRPr lang="en-US" dirty="0"/>
           </a:p>
@@ -8395,7 +8395,7 @@
           <a:p>
             <a:fld id="{48A87A34-81AB-432B-8DAE-1953F412C126}" type="datetimeFigureOut">
               <a:rPr lang="en-US" smtClean="0"/>
-              <a:t>1/9/2020</a:t>
+              <a:t>1/10/2020</a:t>
             </a:fld>
             <a:endParaRPr lang="en-US" dirty="0"/>
           </a:p>
@@ -8776,7 +8776,7 @@
           <a:p>
             <a:fld id="{48A87A34-81AB-432B-8DAE-1953F412C126}" type="datetimeFigureOut">
               <a:rPr lang="en-US" smtClean="0"/>
-              <a:t>1/9/2020</a:t>
+              <a:t>1/10/2020</a:t>
             </a:fld>
             <a:endParaRPr lang="en-US" dirty="0"/>
           </a:p>
@@ -8894,7 +8894,7 @@
           <a:p>
             <a:fld id="{48A87A34-81AB-432B-8DAE-1953F412C126}" type="datetimeFigureOut">
               <a:rPr lang="en-US" smtClean="0"/>
-              <a:t>1/9/2020</a:t>
+              <a:t>1/10/2020</a:t>
             </a:fld>
             <a:endParaRPr lang="en-US" dirty="0"/>
           </a:p>
@@ -8989,7 +8989,7 @@
           <a:p>
             <a:fld id="{48A87A34-81AB-432B-8DAE-1953F412C126}" type="datetimeFigureOut">
               <a:rPr lang="en-US" smtClean="0"/>
-              <a:t>1/9/2020</a:t>
+              <a:t>1/10/2020</a:t>
             </a:fld>
             <a:endParaRPr lang="en-US" dirty="0"/>
           </a:p>
@@ -9238,7 +9238,7 @@
           <a:p>
             <a:fld id="{48A87A34-81AB-432B-8DAE-1953F412C126}" type="datetimeFigureOut">
               <a:rPr lang="en-US" smtClean="0"/>
-              <a:t>1/9/2020</a:t>
+              <a:t>1/10/2020</a:t>
             </a:fld>
             <a:endParaRPr lang="en-US" dirty="0"/>
           </a:p>
@@ -9518,7 +9518,7 @@
           <a:p>
             <a:fld id="{48A87A34-81AB-432B-8DAE-1953F412C126}" type="datetimeFigureOut">
               <a:rPr lang="en-US" smtClean="0"/>
-              <a:t>1/9/2020</a:t>
+              <a:t>1/10/2020</a:t>
             </a:fld>
             <a:endParaRPr lang="en-US" dirty="0"/>
           </a:p>
@@ -12586,7 +12586,7 @@
             <a:fld id="{48A87A34-81AB-432B-8DAE-1953F412C126}" type="datetimeFigureOut">
               <a:rPr lang="en-US" smtClean="0"/>
               <a:pPr/>
-              <a:t>1/9/2020</a:t>
+              <a:t>1/10/2020</a:t>
             </a:fld>
             <a:endParaRPr lang="en-US" dirty="0"/>
           </a:p>
@@ -13160,12 +13160,32 @@
         </p:nvSpPr>
         <p:spPr/>
         <p:txBody>
-          <a:bodyPr/>
+          <a:bodyPr>
+            <a:normAutofit fontScale="92500" lnSpcReduction="10000"/>
+          </a:bodyPr>
           <a:lstStyle/>
           <a:p>
             <a:r>
               <a:rPr lang="en-US" dirty="0"/>
-              <a:t>Create a repository in </a:t>
+              <a:t>Init a new local repository</a:t>
+            </a:r>
+          </a:p>
+          <a:p>
+            <a:r>
+              <a:rPr lang="en-US" dirty="0"/>
+              <a:t>Add file to be staged</a:t>
+            </a:r>
+          </a:p>
+          <a:p>
+            <a:r>
+              <a:rPr lang="en-US" dirty="0"/>
+              <a:t>Commit file</a:t>
+            </a:r>
+          </a:p>
+          <a:p>
+            <a:r>
+              <a:rPr lang="en-US" dirty="0"/>
+              <a:t>Create a new, empty repository in </a:t>
             </a:r>
             <a:r>
               <a:rPr lang="en-US" dirty="0" err="1"/>
@@ -13174,10 +13194,15 @@
             <a:endParaRPr lang="en-US" dirty="0"/>
           </a:p>
           <a:p>
-            <a:pPr lvl="1"/>
             <a:r>
               <a:rPr lang="en-US" dirty="0"/>
-              <a:t>Repository will be initialized by </a:t>
+              <a:t>Add remote repository as upstream</a:t>
+            </a:r>
+          </a:p>
+          <a:p>
+            <a:r>
+              <a:rPr lang="en-US" dirty="0"/>
+              <a:t>Push repository to </a:t>
             </a:r>
             <a:r>
               <a:rPr lang="en-US" dirty="0" err="1"/>
@@ -13186,53 +13211,22 @@
             <a:endParaRPr lang="en-US" dirty="0"/>
           </a:p>
           <a:p>
-            <a:pPr lvl="2"/>
             <a:r>
               <a:rPr lang="en-US" dirty="0"/>
-              <a:t>Clone repository</a:t>
-            </a:r>
-          </a:p>
-          <a:p>
-            <a:pPr lvl="2"/>
-            <a:r>
-              <a:rPr lang="en-US" dirty="0"/>
-              <a:t>Create branch</a:t>
-            </a:r>
-          </a:p>
-          <a:p>
-            <a:pPr lvl="2"/>
-            <a:r>
-              <a:rPr lang="en-US" dirty="0"/>
-              <a:t>Make change</a:t>
-            </a:r>
-          </a:p>
-          <a:p>
-            <a:pPr lvl="2"/>
-            <a:r>
-              <a:rPr lang="en-US" dirty="0"/>
-              <a:t>Commit change</a:t>
-            </a:r>
-          </a:p>
-          <a:p>
-            <a:pPr lvl="2"/>
-            <a:r>
-              <a:rPr lang="en-US" dirty="0"/>
-              <a:t>Push</a:t>
-            </a:r>
-          </a:p>
-          <a:p>
-            <a:pPr lvl="2"/>
-            <a:r>
-              <a:rPr lang="en-US" dirty="0"/>
-              <a:t>Merge branch</a:t>
-            </a:r>
+              <a:t>Confirm your local repository exists in </a:t>
+            </a:r>
+            <a:r>
+              <a:rPr lang="en-US" dirty="0" err="1"/>
+              <a:t>github</a:t>
+            </a:r>
+            <a:endParaRPr lang="en-US" dirty="0"/>
           </a:p>
         </p:txBody>
       </p:sp>
     </p:spTree>
     <p:extLst>
       <p:ext uri="{BB962C8B-B14F-4D97-AF65-F5344CB8AC3E}">
-        <p14:creationId xmlns:p14="http://schemas.microsoft.com/office/powerpoint/2010/main" val="4049689424"/>
+        <p14:creationId xmlns:p14="http://schemas.microsoft.com/office/powerpoint/2010/main" val="509404374"/>
       </p:ext>
     </p:extLst>
   </p:cSld>
@@ -13723,42 +13717,7 @@
             <a:pPr lvl="1"/>
             <a:r>
               <a:rPr lang="en-US" dirty="0"/>
-              <a:t>Second repository will be empty</a:t>
-            </a:r>
-          </a:p>
-          <a:p>
-            <a:pPr lvl="2"/>
-            <a:r>
-              <a:rPr lang="en-US" dirty="0"/>
-              <a:t>Init a new local repository</a:t>
-            </a:r>
-          </a:p>
-          <a:p>
-            <a:pPr lvl="2"/>
-            <a:r>
-              <a:rPr lang="en-US" dirty="0"/>
-              <a:t>Add file to be staged</a:t>
-            </a:r>
-          </a:p>
-          <a:p>
-            <a:pPr lvl="2"/>
-            <a:r>
-              <a:rPr lang="en-US" dirty="0"/>
-              <a:t>Commit file</a:t>
-            </a:r>
-          </a:p>
-          <a:p>
-            <a:pPr lvl="2"/>
-            <a:r>
-              <a:rPr lang="en-US" dirty="0"/>
-              <a:t>Add remote repository as upstream</a:t>
-            </a:r>
-          </a:p>
-          <a:p>
-            <a:pPr lvl="2"/>
-            <a:r>
-              <a:rPr lang="en-US" dirty="0"/>
-              <a:t>Push repository to </a:t>
+              <a:t>Repository will be initialized by </a:t>
             </a:r>
             <a:r>
               <a:rPr lang="en-US" dirty="0" err="1"/>
@@ -13770,20 +13729,50 @@
             <a:pPr lvl="2"/>
             <a:r>
               <a:rPr lang="en-US" dirty="0"/>
-              <a:t>Confirm your local repository exists in </a:t>
-            </a:r>
-            <a:r>
-              <a:rPr lang="en-US" dirty="0" err="1"/>
-              <a:t>github</a:t>
-            </a:r>
-            <a:endParaRPr lang="en-US" dirty="0"/>
+              <a:t>Clone repository</a:t>
+            </a:r>
+          </a:p>
+          <a:p>
+            <a:pPr lvl="2"/>
+            <a:r>
+              <a:rPr lang="en-US" dirty="0"/>
+              <a:t>Create branch</a:t>
+            </a:r>
+          </a:p>
+          <a:p>
+            <a:pPr lvl="2"/>
+            <a:r>
+              <a:rPr lang="en-US" dirty="0"/>
+              <a:t>Make change</a:t>
+            </a:r>
+          </a:p>
+          <a:p>
+            <a:pPr lvl="2"/>
+            <a:r>
+              <a:rPr lang="en-US" dirty="0"/>
+              <a:t>Commit change</a:t>
+            </a:r>
+          </a:p>
+          <a:p>
+            <a:pPr lvl="2"/>
+            <a:r>
+              <a:rPr lang="en-US" dirty="0"/>
+              <a:t>Push</a:t>
+            </a:r>
+          </a:p>
+          <a:p>
+            <a:pPr lvl="2"/>
+            <a:r>
+              <a:rPr lang="en-US" dirty="0"/>
+              <a:t>Merge branch</a:t>
+            </a:r>
           </a:p>
         </p:txBody>
       </p:sp>
     </p:spTree>
     <p:extLst>
       <p:ext uri="{BB962C8B-B14F-4D97-AF65-F5344CB8AC3E}">
-        <p14:creationId xmlns:p14="http://schemas.microsoft.com/office/powerpoint/2010/main" val="255910775"/>
+        <p14:creationId xmlns:p14="http://schemas.microsoft.com/office/powerpoint/2010/main" val="4049689424"/>
       </p:ext>
     </p:extLst>
   </p:cSld>
@@ -16027,6 +16016,12 @@
             <a:r>
               <a:rPr lang="en-US" dirty="0"/>
               <a:t>Stage</a:t>
+            </a:r>
+          </a:p>
+          <a:p>
+            <a:r>
+              <a:rPr lang="en-US" dirty="0"/>
+              <a:t>Stash</a:t>
             </a:r>
           </a:p>
           <a:p>
@@ -16267,6 +16262,12 @@
               <a:t>Fetch</a:t>
             </a:r>
           </a:p>
+          <a:p>
+            <a:r>
+              <a:rPr lang="en-US" dirty="0"/>
+              <a:t>Fork</a:t>
+            </a:r>
+          </a:p>
         </p:txBody>
       </p:sp>
     </p:spTree>
@@ -16364,6 +16365,21 @@
             <a:r>
               <a:rPr lang="en-US" dirty="0"/>
               <a:t>git config --global </a:t>
+            </a:r>
+            <a:r>
+              <a:rPr lang="en-US" dirty="0" err="1"/>
+              <a:t>user.email</a:t>
+            </a:r>
+            <a:r>
+              <a:rPr lang="en-US" dirty="0"/>
+              <a:t> "MyEmail@Email.com"</a:t>
+            </a:r>
+          </a:p>
+          <a:p>
+            <a:pPr lvl="1"/>
+            <a:r>
+              <a:rPr lang="en-US" dirty="0"/>
+              <a:t>git config --global user.name "My Name"</a:t>
             </a:r>
           </a:p>
         </p:txBody>

</xml_diff>

<commit_message>
Updated the powerpoint and website to reflect important notes learned from lesson.
</commit_message>
<xml_diff>
--- a/resources/Introduction to github.pptx
+++ b/resources/Introduction to github.pptx
@@ -241,7 +241,7 @@
           <a:p>
             <a:fld id="{2B85766F-5EC0-4797-B4D1-777FCB005B11}" type="datetimeFigureOut">
               <a:rPr lang="en-US" smtClean="0"/>
-              <a:t>1/10/2020</a:t>
+              <a:t>1/11/2020</a:t>
             </a:fld>
             <a:endParaRPr lang="en-US" dirty="0"/>
           </a:p>
@@ -418,7 +418,7 @@
           <a:p>
             <a:fld id="{B2B4B5EC-152C-4627-80C0-63B10D5574EF}" type="datetimeFigureOut">
               <a:rPr lang="en-US" smtClean="0"/>
-              <a:t>1/10/2020</a:t>
+              <a:t>1/11/2020</a:t>
             </a:fld>
             <a:endParaRPr lang="en-US" dirty="0"/>
           </a:p>
@@ -742,7 +742,7 @@
           <a:noFill/>
           <a:extLst>
             <a:ext uri="{909E8E84-426E-40dd-AFC4-6F175D3DCCD1}">
-              <a14:hiddenFill xmlns="" xmlns:a14="http://schemas.microsoft.com/office/drawing/2010/main">
+              <a14:hiddenFill xmlns:a14="http://schemas.microsoft.com/office/drawing/2010/main" xmlns="">
                 <a:solidFill>
                   <a:srgbClr val="FFFFFF"/>
                 </a:solidFill>
@@ -801,7 +801,7 @@
             </a:ln>
             <a:extLst>
               <a:ext uri="{91240B29-F687-4f45-9708-019B960494DF}">
-                <a14:hiddenLine xmlns="" xmlns:a14="http://schemas.microsoft.com/office/drawing/2010/main" w="9525">
+                <a14:hiddenLine xmlns:a14="http://schemas.microsoft.com/office/drawing/2010/main" xmlns="" w="9525">
                   <a:solidFill>
                     <a:srgbClr val="000000"/>
                   </a:solidFill>
@@ -891,7 +891,7 @@
             </a:ln>
             <a:extLst>
               <a:ext uri="{91240B29-F687-4f45-9708-019B960494DF}">
-                <a14:hiddenLine xmlns="" xmlns:a14="http://schemas.microsoft.com/office/drawing/2010/main" w="9525">
+                <a14:hiddenLine xmlns:a14="http://schemas.microsoft.com/office/drawing/2010/main" xmlns="" w="9525">
                   <a:solidFill>
                     <a:srgbClr val="000000"/>
                   </a:solidFill>
@@ -981,7 +981,7 @@
             </a:ln>
             <a:extLst>
               <a:ext uri="{91240B29-F687-4f45-9708-019B960494DF}">
-                <a14:hiddenLine xmlns="" xmlns:a14="http://schemas.microsoft.com/office/drawing/2010/main" w="9525">
+                <a14:hiddenLine xmlns:a14="http://schemas.microsoft.com/office/drawing/2010/main" xmlns="" w="9525">
                   <a:solidFill>
                     <a:srgbClr val="000000"/>
                   </a:solidFill>
@@ -1015,7 +1015,7 @@
             </a:ln>
             <a:extLst>
               <a:ext uri="{91240B29-F687-4f45-9708-019B960494DF}">
-                <a14:hiddenLine xmlns="" xmlns:a14="http://schemas.microsoft.com/office/drawing/2010/main" w="9525">
+                <a14:hiddenLine xmlns:a14="http://schemas.microsoft.com/office/drawing/2010/main" xmlns="" w="9525">
                   <a:solidFill>
                     <a:srgbClr val="000000"/>
                   </a:solidFill>
@@ -1105,7 +1105,7 @@
             </a:ln>
             <a:extLst>
               <a:ext uri="{91240B29-F687-4f45-9708-019B960494DF}">
-                <a14:hiddenLine xmlns="" xmlns:a14="http://schemas.microsoft.com/office/drawing/2010/main" w="9525">
+                <a14:hiddenLine xmlns:a14="http://schemas.microsoft.com/office/drawing/2010/main" xmlns="" w="9525">
                   <a:solidFill>
                     <a:srgbClr val="000000"/>
                   </a:solidFill>
@@ -1167,7 +1167,7 @@
             </a:ln>
             <a:extLst>
               <a:ext uri="{91240B29-F687-4f45-9708-019B960494DF}">
-                <a14:hiddenLine xmlns="" xmlns:a14="http://schemas.microsoft.com/office/drawing/2010/main" w="9525">
+                <a14:hiddenLine xmlns:a14="http://schemas.microsoft.com/office/drawing/2010/main" xmlns="" w="9525">
                   <a:solidFill>
                     <a:srgbClr val="000000"/>
                   </a:solidFill>
@@ -1229,7 +1229,7 @@
             </a:ln>
             <a:extLst>
               <a:ext uri="{91240B29-F687-4f45-9708-019B960494DF}">
-                <a14:hiddenLine xmlns="" xmlns:a14="http://schemas.microsoft.com/office/drawing/2010/main" w="9525">
+                <a14:hiddenLine xmlns:a14="http://schemas.microsoft.com/office/drawing/2010/main" xmlns="" w="9525">
                   <a:solidFill>
                     <a:srgbClr val="000000"/>
                   </a:solidFill>
@@ -1319,7 +1319,7 @@
             </a:ln>
             <a:extLst>
               <a:ext uri="{91240B29-F687-4f45-9708-019B960494DF}">
-                <a14:hiddenLine xmlns="" xmlns:a14="http://schemas.microsoft.com/office/drawing/2010/main" w="9525">
+                <a14:hiddenLine xmlns:a14="http://schemas.microsoft.com/office/drawing/2010/main" xmlns="" w="9525">
                   <a:solidFill>
                     <a:srgbClr val="000000"/>
                   </a:solidFill>
@@ -1381,7 +1381,7 @@
             </a:ln>
             <a:extLst>
               <a:ext uri="{91240B29-F687-4f45-9708-019B960494DF}">
-                <a14:hiddenLine xmlns="" xmlns:a14="http://schemas.microsoft.com/office/drawing/2010/main" w="9525">
+                <a14:hiddenLine xmlns:a14="http://schemas.microsoft.com/office/drawing/2010/main" xmlns="" w="9525">
                   <a:solidFill>
                     <a:srgbClr val="000000"/>
                   </a:solidFill>
@@ -1443,7 +1443,7 @@
             </a:ln>
             <a:extLst>
               <a:ext uri="{91240B29-F687-4f45-9708-019B960494DF}">
-                <a14:hiddenLine xmlns="" xmlns:a14="http://schemas.microsoft.com/office/drawing/2010/main" w="9525">
+                <a14:hiddenLine xmlns:a14="http://schemas.microsoft.com/office/drawing/2010/main" xmlns="" w="9525">
                   <a:solidFill>
                     <a:srgbClr val="000000"/>
                   </a:solidFill>
@@ -1533,7 +1533,7 @@
             </a:ln>
             <a:extLst>
               <a:ext uri="{91240B29-F687-4f45-9708-019B960494DF}">
-                <a14:hiddenLine xmlns="" xmlns:a14="http://schemas.microsoft.com/office/drawing/2010/main" w="9525">
+                <a14:hiddenLine xmlns:a14="http://schemas.microsoft.com/office/drawing/2010/main" xmlns="" w="9525">
                   <a:solidFill>
                     <a:srgbClr val="000000"/>
                   </a:solidFill>
@@ -1623,7 +1623,7 @@
             </a:ln>
             <a:extLst>
               <a:ext uri="{91240B29-F687-4f45-9708-019B960494DF}">
-                <a14:hiddenLine xmlns="" xmlns:a14="http://schemas.microsoft.com/office/drawing/2010/main" w="9525">
+                <a14:hiddenLine xmlns:a14="http://schemas.microsoft.com/office/drawing/2010/main" xmlns="" w="9525">
                   <a:solidFill>
                     <a:srgbClr val="000000"/>
                   </a:solidFill>
@@ -1685,7 +1685,7 @@
             </a:ln>
             <a:extLst>
               <a:ext uri="{91240B29-F687-4f45-9708-019B960494DF}">
-                <a14:hiddenLine xmlns="" xmlns:a14="http://schemas.microsoft.com/office/drawing/2010/main" w="9525">
+                <a14:hiddenLine xmlns:a14="http://schemas.microsoft.com/office/drawing/2010/main" xmlns="" w="9525">
                   <a:solidFill>
                     <a:srgbClr val="000000"/>
                   </a:solidFill>
@@ -1795,7 +1795,7 @@
             </a:ln>
             <a:extLst>
               <a:ext uri="{91240B29-F687-4f45-9708-019B960494DF}">
-                <a14:hiddenLine xmlns="" xmlns:a14="http://schemas.microsoft.com/office/drawing/2010/main" w="9525">
+                <a14:hiddenLine xmlns:a14="http://schemas.microsoft.com/office/drawing/2010/main" xmlns="" w="9525">
                   <a:solidFill>
                     <a:srgbClr val="000000"/>
                   </a:solidFill>
@@ -1857,7 +1857,7 @@
             </a:ln>
             <a:extLst>
               <a:ext uri="{91240B29-F687-4f45-9708-019B960494DF}">
-                <a14:hiddenLine xmlns="" xmlns:a14="http://schemas.microsoft.com/office/drawing/2010/main" w="9525">
+                <a14:hiddenLine xmlns:a14="http://schemas.microsoft.com/office/drawing/2010/main" xmlns="" w="9525">
                   <a:solidFill>
                     <a:srgbClr val="000000"/>
                   </a:solidFill>
@@ -1947,7 +1947,7 @@
             </a:ln>
             <a:extLst>
               <a:ext uri="{91240B29-F687-4f45-9708-019B960494DF}">
-                <a14:hiddenLine xmlns="" xmlns:a14="http://schemas.microsoft.com/office/drawing/2010/main" w="9525">
+                <a14:hiddenLine xmlns:a14="http://schemas.microsoft.com/office/drawing/2010/main" xmlns="" w="9525">
                   <a:solidFill>
                     <a:srgbClr val="000000"/>
                   </a:solidFill>
@@ -2037,7 +2037,7 @@
             </a:ln>
             <a:extLst>
               <a:ext uri="{91240B29-F687-4f45-9708-019B960494DF}">
-                <a14:hiddenLine xmlns="" xmlns:a14="http://schemas.microsoft.com/office/drawing/2010/main" w="9525">
+                <a14:hiddenLine xmlns:a14="http://schemas.microsoft.com/office/drawing/2010/main" xmlns="" w="9525">
                   <a:solidFill>
                     <a:srgbClr val="000000"/>
                   </a:solidFill>
@@ -2099,7 +2099,7 @@
             </a:ln>
             <a:extLst>
               <a:ext uri="{91240B29-F687-4f45-9708-019B960494DF}">
-                <a14:hiddenLine xmlns="" xmlns:a14="http://schemas.microsoft.com/office/drawing/2010/main" w="9525">
+                <a14:hiddenLine xmlns:a14="http://schemas.microsoft.com/office/drawing/2010/main" xmlns="" w="9525">
                   <a:solidFill>
                     <a:srgbClr val="000000"/>
                   </a:solidFill>
@@ -2189,7 +2189,7 @@
             </a:ln>
             <a:extLst>
               <a:ext uri="{91240B29-F687-4f45-9708-019B960494DF}">
-                <a14:hiddenLine xmlns="" xmlns:a14="http://schemas.microsoft.com/office/drawing/2010/main" w="9525">
+                <a14:hiddenLine xmlns:a14="http://schemas.microsoft.com/office/drawing/2010/main" xmlns="" w="9525">
                   <a:solidFill>
                     <a:srgbClr val="000000"/>
                   </a:solidFill>
@@ -2279,7 +2279,7 @@
             </a:ln>
             <a:extLst>
               <a:ext uri="{91240B29-F687-4f45-9708-019B960494DF}">
-                <a14:hiddenLine xmlns="" xmlns:a14="http://schemas.microsoft.com/office/drawing/2010/main" w="9525">
+                <a14:hiddenLine xmlns:a14="http://schemas.microsoft.com/office/drawing/2010/main" xmlns="" w="9525">
                   <a:solidFill>
                     <a:srgbClr val="000000"/>
                   </a:solidFill>
@@ -2335,7 +2335,7 @@
             </a:ln>
             <a:extLst>
               <a:ext uri="{91240B29-F687-4f45-9708-019B960494DF}">
-                <a14:hiddenLine xmlns="" xmlns:a14="http://schemas.microsoft.com/office/drawing/2010/main" w="9525">
+                <a14:hiddenLine xmlns:a14="http://schemas.microsoft.com/office/drawing/2010/main" xmlns="" w="9525">
                   <a:solidFill>
                     <a:srgbClr val="000000"/>
                   </a:solidFill>
@@ -2425,7 +2425,7 @@
             </a:ln>
             <a:extLst>
               <a:ext uri="{91240B29-F687-4f45-9708-019B960494DF}">
-                <a14:hiddenLine xmlns="" xmlns:a14="http://schemas.microsoft.com/office/drawing/2010/main" w="9525">
+                <a14:hiddenLine xmlns:a14="http://schemas.microsoft.com/office/drawing/2010/main" xmlns="" w="9525">
                   <a:solidFill>
                     <a:srgbClr val="000000"/>
                   </a:solidFill>
@@ -2481,7 +2481,7 @@
             </a:ln>
             <a:extLst>
               <a:ext uri="{91240B29-F687-4f45-9708-019B960494DF}">
-                <a14:hiddenLine xmlns="" xmlns:a14="http://schemas.microsoft.com/office/drawing/2010/main" w="9525">
+                <a14:hiddenLine xmlns:a14="http://schemas.microsoft.com/office/drawing/2010/main" xmlns="" w="9525">
                   <a:solidFill>
                     <a:srgbClr val="000000"/>
                   </a:solidFill>
@@ -2571,7 +2571,7 @@
             </a:ln>
             <a:extLst>
               <a:ext uri="{91240B29-F687-4f45-9708-019B960494DF}">
-                <a14:hiddenLine xmlns="" xmlns:a14="http://schemas.microsoft.com/office/drawing/2010/main" w="9525">
+                <a14:hiddenLine xmlns:a14="http://schemas.microsoft.com/office/drawing/2010/main" xmlns="" w="9525">
                   <a:solidFill>
                     <a:srgbClr val="000000"/>
                   </a:solidFill>
@@ -2639,7 +2639,7 @@
             </a:ln>
             <a:extLst>
               <a:ext uri="{91240B29-F687-4f45-9708-019B960494DF}">
-                <a14:hiddenLine xmlns="" xmlns:a14="http://schemas.microsoft.com/office/drawing/2010/main" w="9525">
+                <a14:hiddenLine xmlns:a14="http://schemas.microsoft.com/office/drawing/2010/main" xmlns="" w="9525">
                   <a:solidFill>
                     <a:srgbClr val="000000"/>
                   </a:solidFill>
@@ -2729,7 +2729,7 @@
             </a:ln>
             <a:extLst>
               <a:ext uri="{91240B29-F687-4f45-9708-019B960494DF}">
-                <a14:hiddenLine xmlns="" xmlns:a14="http://schemas.microsoft.com/office/drawing/2010/main" w="9525">
+                <a14:hiddenLine xmlns:a14="http://schemas.microsoft.com/office/drawing/2010/main" xmlns="" w="9525">
                   <a:solidFill>
                     <a:srgbClr val="000000"/>
                   </a:solidFill>
@@ -2797,7 +2797,7 @@
             </a:ln>
             <a:extLst>
               <a:ext uri="{91240B29-F687-4f45-9708-019B960494DF}">
-                <a14:hiddenLine xmlns="" xmlns:a14="http://schemas.microsoft.com/office/drawing/2010/main" w="9525">
+                <a14:hiddenLine xmlns:a14="http://schemas.microsoft.com/office/drawing/2010/main" xmlns="" w="9525">
                   <a:solidFill>
                     <a:srgbClr val="000000"/>
                   </a:solidFill>
@@ -2887,7 +2887,7 @@
             </a:ln>
             <a:extLst>
               <a:ext uri="{91240B29-F687-4f45-9708-019B960494DF}">
-                <a14:hiddenLine xmlns="" xmlns:a14="http://schemas.microsoft.com/office/drawing/2010/main" w="9525">
+                <a14:hiddenLine xmlns:a14="http://schemas.microsoft.com/office/drawing/2010/main" xmlns="" w="9525">
                   <a:solidFill>
                     <a:srgbClr val="000000"/>
                   </a:solidFill>
@@ -2921,7 +2921,7 @@
             </a:ln>
             <a:extLst>
               <a:ext uri="{91240B29-F687-4f45-9708-019B960494DF}">
-                <a14:hiddenLine xmlns="" xmlns:a14="http://schemas.microsoft.com/office/drawing/2010/main" w="9525">
+                <a14:hiddenLine xmlns:a14="http://schemas.microsoft.com/office/drawing/2010/main" xmlns="" w="9525">
                   <a:solidFill>
                     <a:srgbClr val="000000"/>
                   </a:solidFill>
@@ -3011,7 +3011,7 @@
             </a:ln>
             <a:extLst>
               <a:ext uri="{91240B29-F687-4f45-9708-019B960494DF}">
-                <a14:hiddenLine xmlns="" xmlns:a14="http://schemas.microsoft.com/office/drawing/2010/main" w="9525">
+                <a14:hiddenLine xmlns:a14="http://schemas.microsoft.com/office/drawing/2010/main" xmlns="" w="9525">
                   <a:solidFill>
                     <a:srgbClr val="000000"/>
                   </a:solidFill>
@@ -3073,7 +3073,7 @@
             </a:ln>
             <a:extLst>
               <a:ext uri="{91240B29-F687-4f45-9708-019B960494DF}">
-                <a14:hiddenLine xmlns="" xmlns:a14="http://schemas.microsoft.com/office/drawing/2010/main" w="9525">
+                <a14:hiddenLine xmlns:a14="http://schemas.microsoft.com/office/drawing/2010/main" xmlns="" w="9525">
                   <a:solidFill>
                     <a:srgbClr val="000000"/>
                   </a:solidFill>
@@ -3135,7 +3135,7 @@
             </a:ln>
             <a:extLst>
               <a:ext uri="{91240B29-F687-4f45-9708-019B960494DF}">
-                <a14:hiddenLine xmlns="" xmlns:a14="http://schemas.microsoft.com/office/drawing/2010/main" w="9525">
+                <a14:hiddenLine xmlns:a14="http://schemas.microsoft.com/office/drawing/2010/main" xmlns="" w="9525">
                   <a:solidFill>
                     <a:srgbClr val="000000"/>
                   </a:solidFill>
@@ -3225,7 +3225,7 @@
             </a:ln>
             <a:extLst>
               <a:ext uri="{91240B29-F687-4f45-9708-019B960494DF}">
-                <a14:hiddenLine xmlns="" xmlns:a14="http://schemas.microsoft.com/office/drawing/2010/main" w="9525">
+                <a14:hiddenLine xmlns:a14="http://schemas.microsoft.com/office/drawing/2010/main" xmlns="" w="9525">
                   <a:solidFill>
                     <a:srgbClr val="000000"/>
                   </a:solidFill>
@@ -3293,7 +3293,7 @@
             </a:ln>
             <a:extLst>
               <a:ext uri="{91240B29-F687-4f45-9708-019B960494DF}">
-                <a14:hiddenLine xmlns="" xmlns:a14="http://schemas.microsoft.com/office/drawing/2010/main" w="9525">
+                <a14:hiddenLine xmlns:a14="http://schemas.microsoft.com/office/drawing/2010/main" xmlns="" w="9525">
                   <a:solidFill>
                     <a:srgbClr val="000000"/>
                   </a:solidFill>
@@ -3355,7 +3355,7 @@
             </a:ln>
             <a:extLst>
               <a:ext uri="{91240B29-F687-4f45-9708-019B960494DF}">
-                <a14:hiddenLine xmlns="" xmlns:a14="http://schemas.microsoft.com/office/drawing/2010/main" w="9525">
+                <a14:hiddenLine xmlns:a14="http://schemas.microsoft.com/office/drawing/2010/main" xmlns="" w="9525">
                   <a:solidFill>
                     <a:srgbClr val="000000"/>
                   </a:solidFill>
@@ -3445,7 +3445,7 @@
             </a:ln>
             <a:extLst>
               <a:ext uri="{91240B29-F687-4f45-9708-019B960494DF}">
-                <a14:hiddenLine xmlns="" xmlns:a14="http://schemas.microsoft.com/office/drawing/2010/main" w="9525">
+                <a14:hiddenLine xmlns:a14="http://schemas.microsoft.com/office/drawing/2010/main" xmlns="" w="9525">
                   <a:solidFill>
                     <a:srgbClr val="000000"/>
                   </a:solidFill>
@@ -3507,7 +3507,7 @@
             </a:ln>
             <a:extLst>
               <a:ext uri="{91240B29-F687-4f45-9708-019B960494DF}">
-                <a14:hiddenLine xmlns="" xmlns:a14="http://schemas.microsoft.com/office/drawing/2010/main" w="9525">
+                <a14:hiddenLine xmlns:a14="http://schemas.microsoft.com/office/drawing/2010/main" xmlns="" w="9525">
                   <a:solidFill>
                     <a:srgbClr val="000000"/>
                   </a:solidFill>
@@ -3597,7 +3597,7 @@
             </a:ln>
             <a:extLst>
               <a:ext uri="{91240B29-F687-4f45-9708-019B960494DF}">
-                <a14:hiddenLine xmlns="" xmlns:a14="http://schemas.microsoft.com/office/drawing/2010/main" w="9525">
+                <a14:hiddenLine xmlns:a14="http://schemas.microsoft.com/office/drawing/2010/main" xmlns="" w="9525">
                   <a:solidFill>
                     <a:srgbClr val="000000"/>
                   </a:solidFill>
@@ -3659,7 +3659,7 @@
             </a:ln>
             <a:extLst>
               <a:ext uri="{91240B29-F687-4f45-9708-019B960494DF}">
-                <a14:hiddenLine xmlns="" xmlns:a14="http://schemas.microsoft.com/office/drawing/2010/main" w="9525">
+                <a14:hiddenLine xmlns:a14="http://schemas.microsoft.com/office/drawing/2010/main" xmlns="" w="9525">
                   <a:solidFill>
                     <a:srgbClr val="000000"/>
                   </a:solidFill>
@@ -3749,7 +3749,7 @@
             </a:ln>
             <a:extLst>
               <a:ext uri="{91240B29-F687-4f45-9708-019B960494DF}">
-                <a14:hiddenLine xmlns="" xmlns:a14="http://schemas.microsoft.com/office/drawing/2010/main" w="9525">
+                <a14:hiddenLine xmlns:a14="http://schemas.microsoft.com/office/drawing/2010/main" xmlns="" w="9525">
                   <a:solidFill>
                     <a:srgbClr val="000000"/>
                   </a:solidFill>
@@ -3783,7 +3783,7 @@
             </a:ln>
             <a:extLst>
               <a:ext uri="{91240B29-F687-4f45-9708-019B960494DF}">
-                <a14:hiddenLine xmlns="" xmlns:a14="http://schemas.microsoft.com/office/drawing/2010/main" w="9525">
+                <a14:hiddenLine xmlns:a14="http://schemas.microsoft.com/office/drawing/2010/main" xmlns="" w="9525">
                   <a:solidFill>
                     <a:srgbClr val="000000"/>
                   </a:solidFill>
@@ -3848,7 +3848,7 @@
             </a:ln>
             <a:extLst>
               <a:ext uri="{91240B29-F687-4f45-9708-019B960494DF}">
-                <a14:hiddenLine xmlns="" xmlns:a14="http://schemas.microsoft.com/office/drawing/2010/main" w="9525">
+                <a14:hiddenLine xmlns:a14="http://schemas.microsoft.com/office/drawing/2010/main" xmlns="" w="9525">
                   <a:solidFill>
                     <a:srgbClr val="000000"/>
                   </a:solidFill>
@@ -3938,7 +3938,7 @@
             </a:ln>
             <a:extLst>
               <a:ext uri="{91240B29-F687-4f45-9708-019B960494DF}">
-                <a14:hiddenLine xmlns="" xmlns:a14="http://schemas.microsoft.com/office/drawing/2010/main" w="9525">
+                <a14:hiddenLine xmlns:a14="http://schemas.microsoft.com/office/drawing/2010/main" xmlns="" w="9525">
                   <a:solidFill>
                     <a:srgbClr val="000000"/>
                   </a:solidFill>
@@ -4000,7 +4000,7 @@
             </a:ln>
             <a:extLst>
               <a:ext uri="{91240B29-F687-4f45-9708-019B960494DF}">
-                <a14:hiddenLine xmlns="" xmlns:a14="http://schemas.microsoft.com/office/drawing/2010/main" w="9525">
+                <a14:hiddenLine xmlns:a14="http://schemas.microsoft.com/office/drawing/2010/main" xmlns="" w="9525">
                   <a:solidFill>
                     <a:srgbClr val="000000"/>
                   </a:solidFill>
@@ -4090,7 +4090,7 @@
             </a:ln>
             <a:extLst>
               <a:ext uri="{91240B29-F687-4f45-9708-019B960494DF}">
-                <a14:hiddenLine xmlns="" xmlns:a14="http://schemas.microsoft.com/office/drawing/2010/main" w="9525">
+                <a14:hiddenLine xmlns:a14="http://schemas.microsoft.com/office/drawing/2010/main" xmlns="" w="9525">
                   <a:solidFill>
                     <a:srgbClr val="000000"/>
                   </a:solidFill>
@@ -4180,7 +4180,7 @@
             </a:ln>
             <a:extLst>
               <a:ext uri="{91240B29-F687-4f45-9708-019B960494DF}">
-                <a14:hiddenLine xmlns="" xmlns:a14="http://schemas.microsoft.com/office/drawing/2010/main" w="9525">
+                <a14:hiddenLine xmlns:a14="http://schemas.microsoft.com/office/drawing/2010/main" xmlns="" w="9525">
                   <a:solidFill>
                     <a:srgbClr val="000000"/>
                   </a:solidFill>
@@ -4245,7 +4245,7 @@
             </a:ln>
             <a:extLst>
               <a:ext uri="{91240B29-F687-4f45-9708-019B960494DF}">
-                <a14:hiddenLine xmlns="" xmlns:a14="http://schemas.microsoft.com/office/drawing/2010/main" w="9525">
+                <a14:hiddenLine xmlns:a14="http://schemas.microsoft.com/office/drawing/2010/main" xmlns="" w="9525">
                   <a:solidFill>
                     <a:srgbClr val="000000"/>
                   </a:solidFill>
@@ -4307,7 +4307,7 @@
             </a:ln>
             <a:extLst>
               <a:ext uri="{91240B29-F687-4f45-9708-019B960494DF}">
-                <a14:hiddenLine xmlns="" xmlns:a14="http://schemas.microsoft.com/office/drawing/2010/main" w="9525">
+                <a14:hiddenLine xmlns:a14="http://schemas.microsoft.com/office/drawing/2010/main" xmlns="" w="9525">
                   <a:solidFill>
                     <a:srgbClr val="000000"/>
                   </a:solidFill>
@@ -4397,7 +4397,7 @@
             </a:ln>
             <a:extLst>
               <a:ext uri="{91240B29-F687-4f45-9708-019B960494DF}">
-                <a14:hiddenLine xmlns="" xmlns:a14="http://schemas.microsoft.com/office/drawing/2010/main" w="9525">
+                <a14:hiddenLine xmlns:a14="http://schemas.microsoft.com/office/drawing/2010/main" xmlns="" w="9525">
                   <a:solidFill>
                     <a:srgbClr val="000000"/>
                   </a:solidFill>
@@ -4487,7 +4487,7 @@
             </a:ln>
             <a:extLst>
               <a:ext uri="{91240B29-F687-4f45-9708-019B960494DF}">
-                <a14:hiddenLine xmlns="" xmlns:a14="http://schemas.microsoft.com/office/drawing/2010/main" w="9525">
+                <a14:hiddenLine xmlns:a14="http://schemas.microsoft.com/office/drawing/2010/main" xmlns="" w="9525">
                   <a:solidFill>
                     <a:srgbClr val="000000"/>
                   </a:solidFill>
@@ -4549,7 +4549,7 @@
             </a:ln>
             <a:extLst>
               <a:ext uri="{91240B29-F687-4f45-9708-019B960494DF}">
-                <a14:hiddenLine xmlns="" xmlns:a14="http://schemas.microsoft.com/office/drawing/2010/main" w="9525">
+                <a14:hiddenLine xmlns:a14="http://schemas.microsoft.com/office/drawing/2010/main" xmlns="" w="9525">
                   <a:solidFill>
                     <a:srgbClr val="000000"/>
                   </a:solidFill>
@@ -4669,7 +4669,7 @@
             </a:ln>
             <a:extLst>
               <a:ext uri="{91240B29-F687-4f45-9708-019B960494DF}">
-                <a14:hiddenLine xmlns="" xmlns:a14="http://schemas.microsoft.com/office/drawing/2010/main" w="9525">
+                <a14:hiddenLine xmlns:a14="http://schemas.microsoft.com/office/drawing/2010/main" xmlns="" w="9525">
                   <a:solidFill>
                     <a:srgbClr val="000000"/>
                   </a:solidFill>
@@ -4737,7 +4737,7 @@
             </a:ln>
             <a:extLst>
               <a:ext uri="{91240B29-F687-4f45-9708-019B960494DF}">
-                <a14:hiddenLine xmlns="" xmlns:a14="http://schemas.microsoft.com/office/drawing/2010/main" w="9525">
+                <a14:hiddenLine xmlns:a14="http://schemas.microsoft.com/office/drawing/2010/main" xmlns="" w="9525">
                   <a:solidFill>
                     <a:srgbClr val="000000"/>
                   </a:solidFill>
@@ -4827,7 +4827,7 @@
             </a:ln>
             <a:extLst>
               <a:ext uri="{91240B29-F687-4f45-9708-019B960494DF}">
-                <a14:hiddenLine xmlns="" xmlns:a14="http://schemas.microsoft.com/office/drawing/2010/main" w="9525">
+                <a14:hiddenLine xmlns:a14="http://schemas.microsoft.com/office/drawing/2010/main" xmlns="" w="9525">
                   <a:solidFill>
                     <a:srgbClr val="000000"/>
                   </a:solidFill>
@@ -4967,7 +4967,7 @@
           <a:p>
             <a:fld id="{48A87A34-81AB-432B-8DAE-1953F412C126}" type="datetimeFigureOut">
               <a:rPr lang="en-US" smtClean="0"/>
-              <a:t>1/10/2020</a:t>
+              <a:t>1/11/2020</a:t>
             </a:fld>
             <a:endParaRPr lang="en-US" dirty="0"/>
           </a:p>
@@ -5234,7 +5234,7 @@
           <a:p>
             <a:fld id="{48A87A34-81AB-432B-8DAE-1953F412C126}" type="datetimeFigureOut">
               <a:rPr lang="en-US" smtClean="0"/>
-              <a:t>1/10/2020</a:t>
+              <a:t>1/11/2020</a:t>
             </a:fld>
             <a:endParaRPr lang="en-US" dirty="0"/>
           </a:p>
@@ -5430,7 +5430,7 @@
           <a:p>
             <a:fld id="{48A87A34-81AB-432B-8DAE-1953F412C126}" type="datetimeFigureOut">
               <a:rPr lang="en-US" smtClean="0"/>
-              <a:t>1/10/2020</a:t>
+              <a:t>1/11/2020</a:t>
             </a:fld>
             <a:endParaRPr lang="en-US" dirty="0"/>
           </a:p>
@@ -5693,7 +5693,7 @@
           <a:p>
             <a:fld id="{48A87A34-81AB-432B-8DAE-1953F412C126}" type="datetimeFigureOut">
               <a:rPr lang="en-US" smtClean="0"/>
-              <a:t>1/10/2020</a:t>
+              <a:t>1/11/2020</a:t>
             </a:fld>
             <a:endParaRPr lang="en-US" dirty="0"/>
           </a:p>
@@ -6127,7 +6127,7 @@
           <a:p>
             <a:fld id="{48A87A34-81AB-432B-8DAE-1953F412C126}" type="datetimeFigureOut">
               <a:rPr lang="en-US" smtClean="0"/>
-              <a:t>1/10/2020</a:t>
+              <a:t>1/11/2020</a:t>
             </a:fld>
             <a:endParaRPr lang="en-US" dirty="0"/>
           </a:p>
@@ -6673,7 +6673,7 @@
           <a:p>
             <a:fld id="{48A87A34-81AB-432B-8DAE-1953F412C126}" type="datetimeFigureOut">
               <a:rPr lang="en-US" smtClean="0"/>
-              <a:t>1/10/2020</a:t>
+              <a:t>1/11/2020</a:t>
             </a:fld>
             <a:endParaRPr lang="en-US" dirty="0"/>
           </a:p>
@@ -7393,7 +7393,7 @@
           <a:p>
             <a:fld id="{48A87A34-81AB-432B-8DAE-1953F412C126}" type="datetimeFigureOut">
               <a:rPr lang="en-US" smtClean="0"/>
-              <a:t>1/10/2020</a:t>
+              <a:t>1/11/2020</a:t>
             </a:fld>
             <a:endParaRPr lang="en-US" dirty="0"/>
           </a:p>
@@ -7563,7 +7563,7 @@
           <a:p>
             <a:fld id="{48A87A34-81AB-432B-8DAE-1953F412C126}" type="datetimeFigureOut">
               <a:rPr lang="en-US" smtClean="0"/>
-              <a:t>1/10/2020</a:t>
+              <a:t>1/11/2020</a:t>
             </a:fld>
             <a:endParaRPr lang="en-US" dirty="0"/>
           </a:p>
@@ -7743,7 +7743,7 @@
           <a:p>
             <a:fld id="{48A87A34-81AB-432B-8DAE-1953F412C126}" type="datetimeFigureOut">
               <a:rPr lang="en-US" smtClean="0"/>
-              <a:t>1/10/2020</a:t>
+              <a:t>1/11/2020</a:t>
             </a:fld>
             <a:endParaRPr lang="en-US" dirty="0"/>
           </a:p>
@@ -7913,7 +7913,7 @@
           <a:p>
             <a:fld id="{48A87A34-81AB-432B-8DAE-1953F412C126}" type="datetimeFigureOut">
               <a:rPr lang="en-US" smtClean="0"/>
-              <a:t>1/10/2020</a:t>
+              <a:t>1/11/2020</a:t>
             </a:fld>
             <a:endParaRPr lang="en-US" dirty="0"/>
           </a:p>
@@ -8163,7 +8163,7 @@
           <a:p>
             <a:fld id="{48A87A34-81AB-432B-8DAE-1953F412C126}" type="datetimeFigureOut">
               <a:rPr lang="en-US" smtClean="0"/>
-              <a:t>1/10/2020</a:t>
+              <a:t>1/11/2020</a:t>
             </a:fld>
             <a:endParaRPr lang="en-US" dirty="0"/>
           </a:p>
@@ -8395,7 +8395,7 @@
           <a:p>
             <a:fld id="{48A87A34-81AB-432B-8DAE-1953F412C126}" type="datetimeFigureOut">
               <a:rPr lang="en-US" smtClean="0"/>
-              <a:t>1/10/2020</a:t>
+              <a:t>1/11/2020</a:t>
             </a:fld>
             <a:endParaRPr lang="en-US" dirty="0"/>
           </a:p>
@@ -8776,7 +8776,7 @@
           <a:p>
             <a:fld id="{48A87A34-81AB-432B-8DAE-1953F412C126}" type="datetimeFigureOut">
               <a:rPr lang="en-US" smtClean="0"/>
-              <a:t>1/10/2020</a:t>
+              <a:t>1/11/2020</a:t>
             </a:fld>
             <a:endParaRPr lang="en-US" dirty="0"/>
           </a:p>
@@ -8894,7 +8894,7 @@
           <a:p>
             <a:fld id="{48A87A34-81AB-432B-8DAE-1953F412C126}" type="datetimeFigureOut">
               <a:rPr lang="en-US" smtClean="0"/>
-              <a:t>1/10/2020</a:t>
+              <a:t>1/11/2020</a:t>
             </a:fld>
             <a:endParaRPr lang="en-US" dirty="0"/>
           </a:p>
@@ -8989,7 +8989,7 @@
           <a:p>
             <a:fld id="{48A87A34-81AB-432B-8DAE-1953F412C126}" type="datetimeFigureOut">
               <a:rPr lang="en-US" smtClean="0"/>
-              <a:t>1/10/2020</a:t>
+              <a:t>1/11/2020</a:t>
             </a:fld>
             <a:endParaRPr lang="en-US" dirty="0"/>
           </a:p>
@@ -9238,7 +9238,7 @@
           <a:p>
             <a:fld id="{48A87A34-81AB-432B-8DAE-1953F412C126}" type="datetimeFigureOut">
               <a:rPr lang="en-US" smtClean="0"/>
-              <a:t>1/10/2020</a:t>
+              <a:t>1/11/2020</a:t>
             </a:fld>
             <a:endParaRPr lang="en-US" dirty="0"/>
           </a:p>
@@ -9518,7 +9518,7 @@
           <a:p>
             <a:fld id="{48A87A34-81AB-432B-8DAE-1953F412C126}" type="datetimeFigureOut">
               <a:rPr lang="en-US" smtClean="0"/>
-              <a:t>1/10/2020</a:t>
+              <a:t>1/11/2020</a:t>
             </a:fld>
             <a:endParaRPr lang="en-US" dirty="0"/>
           </a:p>
@@ -9641,7 +9641,7 @@
           <a:noFill/>
           <a:extLst>
             <a:ext uri="{909E8E84-426E-40dd-AFC4-6F175D3DCCD1}">
-              <a14:hiddenFill xmlns="" xmlns:a14="http://schemas.microsoft.com/office/drawing/2010/main">
+              <a14:hiddenFill xmlns:a14="http://schemas.microsoft.com/office/drawing/2010/main" xmlns="">
                 <a:solidFill>
                   <a:srgbClr val="FFFFFF"/>
                 </a:solidFill>
@@ -9715,7 +9715,7 @@
               </a:ln>
               <a:extLst>
                 <a:ext uri="{91240B29-F687-4f45-9708-019B960494DF}">
-                  <a14:hiddenLine xmlns="" xmlns:a14="http://schemas.microsoft.com/office/drawing/2010/main" w="9525">
+                  <a14:hiddenLine xmlns:a14="http://schemas.microsoft.com/office/drawing/2010/main" xmlns="" w="9525">
                     <a:solidFill>
                       <a:srgbClr val="000000"/>
                     </a:solidFill>
@@ -9805,7 +9805,7 @@
               </a:ln>
               <a:extLst>
                 <a:ext uri="{91240B29-F687-4f45-9708-019B960494DF}">
-                  <a14:hiddenLine xmlns="" xmlns:a14="http://schemas.microsoft.com/office/drawing/2010/main" w="9525">
+                  <a14:hiddenLine xmlns:a14="http://schemas.microsoft.com/office/drawing/2010/main" xmlns="" w="9525">
                     <a:solidFill>
                       <a:srgbClr val="000000"/>
                     </a:solidFill>
@@ -9895,7 +9895,7 @@
               </a:ln>
               <a:extLst>
                 <a:ext uri="{91240B29-F687-4f45-9708-019B960494DF}">
-                  <a14:hiddenLine xmlns="" xmlns:a14="http://schemas.microsoft.com/office/drawing/2010/main" w="9525">
+                  <a14:hiddenLine xmlns:a14="http://schemas.microsoft.com/office/drawing/2010/main" xmlns="" w="9525">
                     <a:solidFill>
                       <a:srgbClr val="000000"/>
                     </a:solidFill>
@@ -9957,7 +9957,7 @@
               </a:ln>
               <a:extLst>
                 <a:ext uri="{91240B29-F687-4f45-9708-019B960494DF}">
-                  <a14:hiddenLine xmlns="" xmlns:a14="http://schemas.microsoft.com/office/drawing/2010/main" w="9525">
+                  <a14:hiddenLine xmlns:a14="http://schemas.microsoft.com/office/drawing/2010/main" xmlns="" w="9525">
                     <a:solidFill>
                       <a:srgbClr val="000000"/>
                     </a:solidFill>
@@ -10047,7 +10047,7 @@
               </a:ln>
               <a:extLst>
                 <a:ext uri="{91240B29-F687-4f45-9708-019B960494DF}">
-                  <a14:hiddenLine xmlns="" xmlns:a14="http://schemas.microsoft.com/office/drawing/2010/main" w="9525">
+                  <a14:hiddenLine xmlns:a14="http://schemas.microsoft.com/office/drawing/2010/main" xmlns="" w="9525">
                     <a:solidFill>
                       <a:srgbClr val="000000"/>
                     </a:solidFill>
@@ -10109,7 +10109,7 @@
               </a:ln>
               <a:extLst>
                 <a:ext uri="{91240B29-F687-4f45-9708-019B960494DF}">
-                  <a14:hiddenLine xmlns="" xmlns:a14="http://schemas.microsoft.com/office/drawing/2010/main" w="9525">
+                  <a14:hiddenLine xmlns:a14="http://schemas.microsoft.com/office/drawing/2010/main" xmlns="" w="9525">
                     <a:solidFill>
                       <a:srgbClr val="000000"/>
                     </a:solidFill>
@@ -10171,7 +10171,7 @@
               </a:ln>
               <a:extLst>
                 <a:ext uri="{91240B29-F687-4f45-9708-019B960494DF}">
-                  <a14:hiddenLine xmlns="" xmlns:a14="http://schemas.microsoft.com/office/drawing/2010/main" w="9525">
+                  <a14:hiddenLine xmlns:a14="http://schemas.microsoft.com/office/drawing/2010/main" xmlns="" w="9525">
                     <a:solidFill>
                       <a:srgbClr val="000000"/>
                     </a:solidFill>
@@ -10261,7 +10261,7 @@
               </a:ln>
               <a:extLst>
                 <a:ext uri="{91240B29-F687-4f45-9708-019B960494DF}">
-                  <a14:hiddenLine xmlns="" xmlns:a14="http://schemas.microsoft.com/office/drawing/2010/main" w="9525">
+                  <a14:hiddenLine xmlns:a14="http://schemas.microsoft.com/office/drawing/2010/main" xmlns="" w="9525">
                     <a:solidFill>
                       <a:srgbClr val="000000"/>
                     </a:solidFill>
@@ -10351,7 +10351,7 @@
               </a:ln>
               <a:extLst>
                 <a:ext uri="{91240B29-F687-4f45-9708-019B960494DF}">
-                  <a14:hiddenLine xmlns="" xmlns:a14="http://schemas.microsoft.com/office/drawing/2010/main" w="9525">
+                  <a14:hiddenLine xmlns:a14="http://schemas.microsoft.com/office/drawing/2010/main" xmlns="" w="9525">
                     <a:solidFill>
                       <a:srgbClr val="000000"/>
                     </a:solidFill>
@@ -10413,7 +10413,7 @@
               </a:ln>
               <a:extLst>
                 <a:ext uri="{91240B29-F687-4f45-9708-019B960494DF}">
-                  <a14:hiddenLine xmlns="" xmlns:a14="http://schemas.microsoft.com/office/drawing/2010/main" w="9525">
+                  <a14:hiddenLine xmlns:a14="http://schemas.microsoft.com/office/drawing/2010/main" xmlns="" w="9525">
                     <a:solidFill>
                       <a:srgbClr val="000000"/>
                     </a:solidFill>
@@ -10523,7 +10523,7 @@
               </a:ln>
               <a:extLst>
                 <a:ext uri="{91240B29-F687-4f45-9708-019B960494DF}">
-                  <a14:hiddenLine xmlns="" xmlns:a14="http://schemas.microsoft.com/office/drawing/2010/main" w="9525">
+                  <a14:hiddenLine xmlns:a14="http://schemas.microsoft.com/office/drawing/2010/main" xmlns="" w="9525">
                     <a:solidFill>
                       <a:srgbClr val="000000"/>
                     </a:solidFill>
@@ -10607,7 +10607,7 @@
               </a:ln>
               <a:extLst>
                 <a:ext uri="{91240B29-F687-4f45-9708-019B960494DF}">
-                  <a14:hiddenLine xmlns="" xmlns:a14="http://schemas.microsoft.com/office/drawing/2010/main" w="9525">
+                  <a14:hiddenLine xmlns:a14="http://schemas.microsoft.com/office/drawing/2010/main" xmlns="" w="9525">
                     <a:solidFill>
                       <a:srgbClr val="000000"/>
                     </a:solidFill>
@@ -10669,7 +10669,7 @@
               </a:ln>
               <a:extLst>
                 <a:ext uri="{91240B29-F687-4f45-9708-019B960494DF}">
-                  <a14:hiddenLine xmlns="" xmlns:a14="http://schemas.microsoft.com/office/drawing/2010/main" w="9525">
+                  <a14:hiddenLine xmlns:a14="http://schemas.microsoft.com/office/drawing/2010/main" xmlns="" w="9525">
                     <a:solidFill>
                       <a:srgbClr val="000000"/>
                     </a:solidFill>
@@ -10731,7 +10731,7 @@
               </a:ln>
               <a:extLst>
                 <a:ext uri="{91240B29-F687-4f45-9708-019B960494DF}">
-                  <a14:hiddenLine xmlns="" xmlns:a14="http://schemas.microsoft.com/office/drawing/2010/main" w="9525">
+                  <a14:hiddenLine xmlns:a14="http://schemas.microsoft.com/office/drawing/2010/main" xmlns="" w="9525">
                     <a:solidFill>
                       <a:srgbClr val="000000"/>
                     </a:solidFill>
@@ -10821,7 +10821,7 @@
               </a:ln>
               <a:extLst>
                 <a:ext uri="{91240B29-F687-4f45-9708-019B960494DF}">
-                  <a14:hiddenLine xmlns="" xmlns:a14="http://schemas.microsoft.com/office/drawing/2010/main" w="9525">
+                  <a14:hiddenLine xmlns:a14="http://schemas.microsoft.com/office/drawing/2010/main" xmlns="" w="9525">
                     <a:solidFill>
                       <a:srgbClr val="000000"/>
                     </a:solidFill>
@@ -10855,7 +10855,7 @@
               </a:ln>
               <a:extLst>
                 <a:ext uri="{91240B29-F687-4f45-9708-019B960494DF}">
-                  <a14:hiddenLine xmlns="" xmlns:a14="http://schemas.microsoft.com/office/drawing/2010/main" w="9525">
+                  <a14:hiddenLine xmlns:a14="http://schemas.microsoft.com/office/drawing/2010/main" xmlns="" w="9525">
                     <a:solidFill>
                       <a:srgbClr val="000000"/>
                     </a:solidFill>
@@ -10920,7 +10920,7 @@
               </a:ln>
               <a:extLst>
                 <a:ext uri="{91240B29-F687-4f45-9708-019B960494DF}">
-                  <a14:hiddenLine xmlns="" xmlns:a14="http://schemas.microsoft.com/office/drawing/2010/main" w="9525">
+                  <a14:hiddenLine xmlns:a14="http://schemas.microsoft.com/office/drawing/2010/main" xmlns="" w="9525">
                     <a:solidFill>
                       <a:srgbClr val="000000"/>
                     </a:solidFill>
@@ -11010,7 +11010,7 @@
               </a:ln>
               <a:extLst>
                 <a:ext uri="{91240B29-F687-4f45-9708-019B960494DF}">
-                  <a14:hiddenLine xmlns="" xmlns:a14="http://schemas.microsoft.com/office/drawing/2010/main" w="9525">
+                  <a14:hiddenLine xmlns:a14="http://schemas.microsoft.com/office/drawing/2010/main" xmlns="" w="9525">
                     <a:solidFill>
                       <a:srgbClr val="000000"/>
                     </a:solidFill>
@@ -11072,7 +11072,7 @@
               </a:ln>
               <a:extLst>
                 <a:ext uri="{91240B29-F687-4f45-9708-019B960494DF}">
-                  <a14:hiddenLine xmlns="" xmlns:a14="http://schemas.microsoft.com/office/drawing/2010/main" w="9525">
+                  <a14:hiddenLine xmlns:a14="http://schemas.microsoft.com/office/drawing/2010/main" xmlns="" w="9525">
                     <a:solidFill>
                       <a:srgbClr val="000000"/>
                     </a:solidFill>
@@ -11162,7 +11162,7 @@
               </a:ln>
               <a:extLst>
                 <a:ext uri="{91240B29-F687-4f45-9708-019B960494DF}">
-                  <a14:hiddenLine xmlns="" xmlns:a14="http://schemas.microsoft.com/office/drawing/2010/main" w="9525">
+                  <a14:hiddenLine xmlns:a14="http://schemas.microsoft.com/office/drawing/2010/main" xmlns="" w="9525">
                     <a:solidFill>
                       <a:srgbClr val="000000"/>
                     </a:solidFill>
@@ -11227,7 +11227,7 @@
               </a:ln>
               <a:extLst>
                 <a:ext uri="{91240B29-F687-4f45-9708-019B960494DF}">
-                  <a14:hiddenLine xmlns="" xmlns:a14="http://schemas.microsoft.com/office/drawing/2010/main" w="9525">
+                  <a14:hiddenLine xmlns:a14="http://schemas.microsoft.com/office/drawing/2010/main" xmlns="" w="9525">
                     <a:solidFill>
                       <a:srgbClr val="000000"/>
                     </a:solidFill>
@@ -11289,7 +11289,7 @@
               </a:ln>
               <a:extLst>
                 <a:ext uri="{91240B29-F687-4f45-9708-019B960494DF}">
-                  <a14:hiddenLine xmlns="" xmlns:a14="http://schemas.microsoft.com/office/drawing/2010/main" w="9525">
+                  <a14:hiddenLine xmlns:a14="http://schemas.microsoft.com/office/drawing/2010/main" xmlns="" w="9525">
                     <a:solidFill>
                       <a:srgbClr val="000000"/>
                     </a:solidFill>
@@ -11379,7 +11379,7 @@
               </a:ln>
               <a:extLst>
                 <a:ext uri="{91240B29-F687-4f45-9708-019B960494DF}">
-                  <a14:hiddenLine xmlns="" xmlns:a14="http://schemas.microsoft.com/office/drawing/2010/main" w="9525">
+                  <a14:hiddenLine xmlns:a14="http://schemas.microsoft.com/office/drawing/2010/main" xmlns="" w="9525">
                     <a:solidFill>
                       <a:srgbClr val="000000"/>
                     </a:solidFill>
@@ -11469,7 +11469,7 @@
               </a:ln>
               <a:extLst>
                 <a:ext uri="{91240B29-F687-4f45-9708-019B960494DF}">
-                  <a14:hiddenLine xmlns="" xmlns:a14="http://schemas.microsoft.com/office/drawing/2010/main" w="9525">
+                  <a14:hiddenLine xmlns:a14="http://schemas.microsoft.com/office/drawing/2010/main" xmlns="" w="9525">
                     <a:solidFill>
                       <a:srgbClr val="000000"/>
                     </a:solidFill>
@@ -11534,7 +11534,7 @@
               </a:ln>
               <a:extLst>
                 <a:ext uri="{91240B29-F687-4f45-9708-019B960494DF}">
-                  <a14:hiddenLine xmlns="" xmlns:a14="http://schemas.microsoft.com/office/drawing/2010/main" w="9525">
+                  <a14:hiddenLine xmlns:a14="http://schemas.microsoft.com/office/drawing/2010/main" xmlns="" w="9525">
                     <a:solidFill>
                       <a:srgbClr val="000000"/>
                     </a:solidFill>
@@ -11654,7 +11654,7 @@
               </a:ln>
               <a:extLst>
                 <a:ext uri="{91240B29-F687-4f45-9708-019B960494DF}">
-                  <a14:hiddenLine xmlns="" xmlns:a14="http://schemas.microsoft.com/office/drawing/2010/main" w="9525">
+                  <a14:hiddenLine xmlns:a14="http://schemas.microsoft.com/office/drawing/2010/main" xmlns="" w="9525">
                     <a:solidFill>
                       <a:srgbClr val="000000"/>
                     </a:solidFill>
@@ -11735,7 +11735,7 @@
               </a:ln>
               <a:extLst>
                 <a:ext uri="{91240B29-F687-4f45-9708-019B960494DF}">
-                  <a14:hiddenLine xmlns="" xmlns:a14="http://schemas.microsoft.com/office/drawing/2010/main" w="9525">
+                  <a14:hiddenLine xmlns:a14="http://schemas.microsoft.com/office/drawing/2010/main" xmlns="" w="9525">
                     <a:solidFill>
                       <a:srgbClr val="000000"/>
                     </a:solidFill>
@@ -11850,7 +11850,7 @@
               </a:ln>
               <a:extLst>
                 <a:ext uri="{91240B29-F687-4f45-9708-019B960494DF}">
-                  <a14:hiddenLine xmlns="" xmlns:a14="http://schemas.microsoft.com/office/drawing/2010/main" w="9525">
+                  <a14:hiddenLine xmlns:a14="http://schemas.microsoft.com/office/drawing/2010/main" xmlns="" w="9525">
                     <a:solidFill>
                       <a:srgbClr val="000000"/>
                     </a:solidFill>
@@ -11940,7 +11940,7 @@
               </a:ln>
               <a:extLst>
                 <a:ext uri="{91240B29-F687-4f45-9708-019B960494DF}">
-                  <a14:hiddenLine xmlns="" xmlns:a14="http://schemas.microsoft.com/office/drawing/2010/main" w="9525">
+                  <a14:hiddenLine xmlns:a14="http://schemas.microsoft.com/office/drawing/2010/main" xmlns="" w="9525">
                     <a:solidFill>
                       <a:srgbClr val="000000"/>
                     </a:solidFill>
@@ -12005,7 +12005,7 @@
               </a:ln>
               <a:extLst>
                 <a:ext uri="{91240B29-F687-4f45-9708-019B960494DF}">
-                  <a14:hiddenLine xmlns="" xmlns:a14="http://schemas.microsoft.com/office/drawing/2010/main" w="9525">
+                  <a14:hiddenLine xmlns:a14="http://schemas.microsoft.com/office/drawing/2010/main" xmlns="" w="9525">
                     <a:solidFill>
                       <a:srgbClr val="000000"/>
                     </a:solidFill>
@@ -12095,7 +12095,7 @@
               </a:ln>
               <a:extLst>
                 <a:ext uri="{91240B29-F687-4f45-9708-019B960494DF}">
-                  <a14:hiddenLine xmlns="" xmlns:a14="http://schemas.microsoft.com/office/drawing/2010/main" w="9525">
+                  <a14:hiddenLine xmlns:a14="http://schemas.microsoft.com/office/drawing/2010/main" xmlns="" w="9525">
                     <a:solidFill>
                       <a:srgbClr val="000000"/>
                     </a:solidFill>
@@ -12163,7 +12163,7 @@
               </a:ln>
               <a:extLst>
                 <a:ext uri="{91240B29-F687-4f45-9708-019B960494DF}">
-                  <a14:hiddenLine xmlns="" xmlns:a14="http://schemas.microsoft.com/office/drawing/2010/main" w="9525">
+                  <a14:hiddenLine xmlns:a14="http://schemas.microsoft.com/office/drawing/2010/main" xmlns="" w="9525">
                     <a:solidFill>
                       <a:srgbClr val="000000"/>
                     </a:solidFill>
@@ -12253,7 +12253,7 @@
               </a:ln>
               <a:extLst>
                 <a:ext uri="{91240B29-F687-4f45-9708-019B960494DF}">
-                  <a14:hiddenLine xmlns="" xmlns:a14="http://schemas.microsoft.com/office/drawing/2010/main" w="9525">
+                  <a14:hiddenLine xmlns:a14="http://schemas.microsoft.com/office/drawing/2010/main" xmlns="" w="9525">
                     <a:solidFill>
                       <a:srgbClr val="000000"/>
                     </a:solidFill>
@@ -12321,7 +12321,7 @@
               </a:ln>
               <a:extLst>
                 <a:ext uri="{91240B29-F687-4f45-9708-019B960494DF}">
-                  <a14:hiddenLine xmlns="" xmlns:a14="http://schemas.microsoft.com/office/drawing/2010/main" w="9525">
+                  <a14:hiddenLine xmlns:a14="http://schemas.microsoft.com/office/drawing/2010/main" xmlns="" w="9525">
                     <a:solidFill>
                       <a:srgbClr val="000000"/>
                     </a:solidFill>
@@ -12411,7 +12411,7 @@
               </a:ln>
               <a:extLst>
                 <a:ext uri="{91240B29-F687-4f45-9708-019B960494DF}">
-                  <a14:hiddenLine xmlns="" xmlns:a14="http://schemas.microsoft.com/office/drawing/2010/main" w="9525">
+                  <a14:hiddenLine xmlns:a14="http://schemas.microsoft.com/office/drawing/2010/main" xmlns="" w="9525">
                     <a:solidFill>
                       <a:srgbClr val="000000"/>
                     </a:solidFill>
@@ -12445,7 +12445,7 @@
               </a:ln>
               <a:extLst>
                 <a:ext uri="{91240B29-F687-4f45-9708-019B960494DF}">
-                  <a14:hiddenLine xmlns="" xmlns:a14="http://schemas.microsoft.com/office/drawing/2010/main" w="9525">
+                  <a14:hiddenLine xmlns:a14="http://schemas.microsoft.com/office/drawing/2010/main" xmlns="" w="9525">
                     <a:solidFill>
                       <a:srgbClr val="000000"/>
                     </a:solidFill>
@@ -12586,7 +12586,7 @@
             <a:fld id="{48A87A34-81AB-432B-8DAE-1953F412C126}" type="datetimeFigureOut">
               <a:rPr lang="en-US" smtClean="0"/>
               <a:pPr/>
-              <a:t>1/10/2020</a:t>
+              <a:t>1/11/2020</a:t>
             </a:fld>
             <a:endParaRPr lang="en-US" dirty="0"/>
           </a:p>
@@ -14327,7 +14327,7 @@
         </p:spPr>
         <p:txBody>
           <a:bodyPr>
-            <a:normAutofit lnSpcReduction="10000"/>
+            <a:normAutofit fontScale="92500" lnSpcReduction="20000"/>
           </a:bodyPr>
           <a:lstStyle/>
           <a:p>
@@ -14360,18 +14360,45 @@
                 <a:ea typeface="Tahoma" panose="020B0604030504040204" pitchFamily="34" charset="0"/>
                 <a:cs typeface="Tahoma" panose="020B0604030504040204" pitchFamily="34" charset="0"/>
               </a:rPr>
-              <a:t>Download git for your OS</a:t>
-            </a:r>
-          </a:p>
-          <a:p>
-            <a:pPr lvl="1"/>
+              <a:t>Download and install git-</a:t>
+            </a:r>
+            <a:r>
+              <a:rPr lang="en-US" dirty="0" err="1">
+                <a:latin typeface="Tahoma" panose="020B0604030504040204" pitchFamily="34" charset="0"/>
+                <a:ea typeface="Tahoma" panose="020B0604030504040204" pitchFamily="34" charset="0"/>
+                <a:cs typeface="Tahoma" panose="020B0604030504040204" pitchFamily="34" charset="0"/>
+              </a:rPr>
+              <a:t>scm</a:t>
+            </a:r>
             <a:r>
               <a:rPr lang="en-US" dirty="0">
                 <a:latin typeface="Tahoma" panose="020B0604030504040204" pitchFamily="34" charset="0"/>
                 <a:ea typeface="Tahoma" panose="020B0604030504040204" pitchFamily="34" charset="0"/>
                 <a:cs typeface="Tahoma" panose="020B0604030504040204" pitchFamily="34" charset="0"/>
               </a:rPr>
-              <a:t>Download GitHub Desktop</a:t>
+              <a:t> for your OS</a:t>
+            </a:r>
+          </a:p>
+          <a:p>
+            <a:pPr lvl="1"/>
+            <a:r>
+              <a:rPr lang="en-US" dirty="0">
+                <a:latin typeface="Tahoma" panose="020B0604030504040204" pitchFamily="34" charset="0"/>
+                <a:ea typeface="Tahoma" panose="020B0604030504040204" pitchFamily="34" charset="0"/>
+                <a:cs typeface="Tahoma" panose="020B0604030504040204" pitchFamily="34" charset="0"/>
+              </a:rPr>
+              <a:t>Download and install GitHub Desktop</a:t>
+            </a:r>
+          </a:p>
+          <a:p>
+            <a:pPr lvl="1"/>
+            <a:r>
+              <a:rPr lang="en-US" dirty="0">
+                <a:latin typeface="Tahoma" panose="020B0604030504040204" pitchFamily="34" charset="0"/>
+                <a:ea typeface="Tahoma" panose="020B0604030504040204" pitchFamily="34" charset="0"/>
+                <a:cs typeface="Tahoma" panose="020B0604030504040204" pitchFamily="34" charset="0"/>
+              </a:rPr>
+              <a:t>Download and install Visual Studio Code</a:t>
             </a:r>
           </a:p>
           <a:p>
@@ -17239,15 +17266,6 @@
 </file>
 
 <file path=customXml/item1.xml><?xml version="1.0" encoding="utf-8"?>
-<?mso-contentType ?>
-<FormTemplates xmlns="http://schemas.microsoft.com/sharepoint/v3/contenttype/forms">
-  <Display>DocumentLibraryForm</Display>
-  <Edit>DocumentLibraryForm</Edit>
-  <New>DocumentLibraryForm</New>
-</FormTemplates>
-</file>
-
-<file path=customXml/item2.xml><?xml version="1.0" encoding="utf-8"?>
 <ct:contentTypeSchema xmlns:ct="http://schemas.microsoft.com/office/2006/metadata/contentType" xmlns:ma="http://schemas.microsoft.com/office/2006/metadata/properties/metaAttributes" ct:_="" ma:_="" ma:contentTypeName="Document" ma:contentTypeID="0x01010079F111ED35F8CC479449609E8A0923A6" ma:contentTypeVersion="11" ma:contentTypeDescription="Create a new document." ma:contentTypeScope="" ma:versionID="96291512c1ee715ab617f4c07df79fc1">
   <xsd:schema xmlns:xsd="http://www.w3.org/2001/XMLSchema" xmlns:xs="http://www.w3.org/2001/XMLSchema" xmlns:p="http://schemas.microsoft.com/office/2006/metadata/properties" xmlns:ns2="71af3243-3dd4-4a8d-8c0d-dd76da1f02a5" xmlns:ns3="16c05727-aa75-4e4a-9b5f-8a80a1165891" targetNamespace="http://schemas.microsoft.com/office/2006/metadata/properties" ma:root="true" ma:fieldsID="8256c27c40ca5c40ce1cf6c44f0205df" ns2:_="" ns3:_="">
     <xsd:import namespace="71af3243-3dd4-4a8d-8c0d-dd76da1f02a5"/>
@@ -17458,6 +17476,15 @@
 </ct:contentTypeSchema>
 </file>
 
+<file path=customXml/item2.xml><?xml version="1.0" encoding="utf-8"?>
+<?mso-contentType ?>
+<FormTemplates xmlns="http://schemas.microsoft.com/sharepoint/v3/contenttype/forms">
+  <Display>DocumentLibraryForm</Display>
+  <Edit>DocumentLibraryForm</Edit>
+  <New>DocumentLibraryForm</New>
+</FormTemplates>
+</file>
+
 <file path=customXml/item3.xml><?xml version="1.0" encoding="utf-8"?>
 <p:properties xmlns:p="http://schemas.microsoft.com/office/2006/metadata/properties" xmlns:xsi="http://www.w3.org/2001/XMLSchema-instance" xmlns:pc="http://schemas.microsoft.com/office/infopath/2007/PartnerControls">
   <documentManagement>
@@ -17467,14 +17494,6 @@
 </file>
 
 <file path=customXml/itemProps1.xml><?xml version="1.0" encoding="utf-8"?>
-<ds:datastoreItem xmlns:ds="http://schemas.openxmlformats.org/officeDocument/2006/customXml" ds:itemID="{B579702B-25C7-40D7-9E29-7686B11A9660}">
-  <ds:schemaRefs>
-    <ds:schemaRef ds:uri="http://schemas.microsoft.com/sharepoint/v3/contenttype/forms"/>
-  </ds:schemaRefs>
-</ds:datastoreItem>
-</file>
-
-<file path=customXml/itemProps2.xml><?xml version="1.0" encoding="utf-8"?>
 <ds:datastoreItem xmlns:ds="http://schemas.openxmlformats.org/officeDocument/2006/customXml" ds:itemID="{A7C0B241-13E5-418D-8920-D23491E2D2C0}">
   <ds:schemaRefs>
     <ds:schemaRef ds:uri="http://schemas.microsoft.com/office/2006/metadata/contentType"/>
@@ -17493,6 +17512,14 @@
 </ds:datastoreItem>
 </file>
 
+<file path=customXml/itemProps2.xml><?xml version="1.0" encoding="utf-8"?>
+<ds:datastoreItem xmlns:ds="http://schemas.openxmlformats.org/officeDocument/2006/customXml" ds:itemID="{B579702B-25C7-40D7-9E29-7686B11A9660}">
+  <ds:schemaRefs>
+    <ds:schemaRef ds:uri="http://schemas.microsoft.com/sharepoint/v3/contenttype/forms"/>
+  </ds:schemaRefs>
+</ds:datastoreItem>
+</file>
+
 <file path=customXml/itemProps3.xml><?xml version="1.0" encoding="utf-8"?>
 <ds:datastoreItem xmlns:ds="http://schemas.openxmlformats.org/officeDocument/2006/customXml" ds:itemID="{E7866CFD-F94E-4AE5-ACEA-86FEC0F48A10}">
   <ds:schemaRefs>

</xml_diff>

<commit_message>
Removed lab 1 part 2, dropped the branching lab (previously lab 2) to be lab 1 part 2. Lab 3 is now lab 2, with presentation having only 2 labs total. Website updated to correspond to changes.
</commit_message>
<xml_diff>
--- a/resources/Introduction to github.pptx
+++ b/resources/Introduction to github.pptx
@@ -5,10 +5,10 @@
     <p:sldMasterId id="2147483669" r:id="rId4"/>
   </p:sldMasterIdLst>
   <p:notesMasterIdLst>
-    <p:notesMasterId r:id="rId32"/>
+    <p:notesMasterId r:id="rId26"/>
   </p:notesMasterIdLst>
   <p:handoutMasterIdLst>
-    <p:handoutMasterId r:id="rId33"/>
+    <p:handoutMasterId r:id="rId27"/>
   </p:handoutMasterIdLst>
   <p:sldIdLst>
     <p:sldId id="256" r:id="rId5"/>
@@ -20,24 +20,18 @@
     <p:sldId id="266" r:id="rId11"/>
     <p:sldId id="267" r:id="rId12"/>
     <p:sldId id="268" r:id="rId13"/>
-    <p:sldId id="287" r:id="rId14"/>
+    <p:sldId id="271" r:id="rId14"/>
     <p:sldId id="270" r:id="rId15"/>
     <p:sldId id="272" r:id="rId16"/>
     <p:sldId id="273" r:id="rId17"/>
     <p:sldId id="274" r:id="rId18"/>
-    <p:sldId id="271" r:id="rId19"/>
-    <p:sldId id="275" r:id="rId20"/>
-    <p:sldId id="276" r:id="rId21"/>
-    <p:sldId id="277" r:id="rId22"/>
-    <p:sldId id="278" r:id="rId23"/>
-    <p:sldId id="279" r:id="rId24"/>
-    <p:sldId id="280" r:id="rId25"/>
-    <p:sldId id="281" r:id="rId26"/>
-    <p:sldId id="282" r:id="rId27"/>
-    <p:sldId id="283" r:id="rId28"/>
-    <p:sldId id="284" r:id="rId29"/>
-    <p:sldId id="286" r:id="rId30"/>
-    <p:sldId id="265" r:id="rId31"/>
+    <p:sldId id="275" r:id="rId19"/>
+    <p:sldId id="276" r:id="rId20"/>
+    <p:sldId id="277" r:id="rId21"/>
+    <p:sldId id="278" r:id="rId22"/>
+    <p:sldId id="279" r:id="rId23"/>
+    <p:sldId id="286" r:id="rId24"/>
+    <p:sldId id="265" r:id="rId25"/>
   </p:sldIdLst>
   <p:sldSz cx="12192000" cy="6858000"/>
   <p:notesSz cx="6858000" cy="9144000"/>
@@ -742,7 +736,7 @@
           <a:noFill/>
           <a:extLst>
             <a:ext uri="{909E8E84-426E-40dd-AFC4-6F175D3DCCD1}">
-              <a14:hiddenFill xmlns:a14="http://schemas.microsoft.com/office/drawing/2010/main" xmlns="">
+              <a14:hiddenFill xmlns="" xmlns:a14="http://schemas.microsoft.com/office/drawing/2010/main">
                 <a:solidFill>
                   <a:srgbClr val="FFFFFF"/>
                 </a:solidFill>
@@ -801,7 +795,7 @@
             </a:ln>
             <a:extLst>
               <a:ext uri="{91240B29-F687-4f45-9708-019B960494DF}">
-                <a14:hiddenLine xmlns:a14="http://schemas.microsoft.com/office/drawing/2010/main" xmlns="" w="9525">
+                <a14:hiddenLine xmlns="" xmlns:a14="http://schemas.microsoft.com/office/drawing/2010/main" w="9525">
                   <a:solidFill>
                     <a:srgbClr val="000000"/>
                   </a:solidFill>
@@ -891,7 +885,7 @@
             </a:ln>
             <a:extLst>
               <a:ext uri="{91240B29-F687-4f45-9708-019B960494DF}">
-                <a14:hiddenLine xmlns:a14="http://schemas.microsoft.com/office/drawing/2010/main" xmlns="" w="9525">
+                <a14:hiddenLine xmlns="" xmlns:a14="http://schemas.microsoft.com/office/drawing/2010/main" w="9525">
                   <a:solidFill>
                     <a:srgbClr val="000000"/>
                   </a:solidFill>
@@ -981,7 +975,7 @@
             </a:ln>
             <a:extLst>
               <a:ext uri="{91240B29-F687-4f45-9708-019B960494DF}">
-                <a14:hiddenLine xmlns:a14="http://schemas.microsoft.com/office/drawing/2010/main" xmlns="" w="9525">
+                <a14:hiddenLine xmlns="" xmlns:a14="http://schemas.microsoft.com/office/drawing/2010/main" w="9525">
                   <a:solidFill>
                     <a:srgbClr val="000000"/>
                   </a:solidFill>
@@ -1015,7 +1009,7 @@
             </a:ln>
             <a:extLst>
               <a:ext uri="{91240B29-F687-4f45-9708-019B960494DF}">
-                <a14:hiddenLine xmlns:a14="http://schemas.microsoft.com/office/drawing/2010/main" xmlns="" w="9525">
+                <a14:hiddenLine xmlns="" xmlns:a14="http://schemas.microsoft.com/office/drawing/2010/main" w="9525">
                   <a:solidFill>
                     <a:srgbClr val="000000"/>
                   </a:solidFill>
@@ -1105,7 +1099,7 @@
             </a:ln>
             <a:extLst>
               <a:ext uri="{91240B29-F687-4f45-9708-019B960494DF}">
-                <a14:hiddenLine xmlns:a14="http://schemas.microsoft.com/office/drawing/2010/main" xmlns="" w="9525">
+                <a14:hiddenLine xmlns="" xmlns:a14="http://schemas.microsoft.com/office/drawing/2010/main" w="9525">
                   <a:solidFill>
                     <a:srgbClr val="000000"/>
                   </a:solidFill>
@@ -1167,7 +1161,7 @@
             </a:ln>
             <a:extLst>
               <a:ext uri="{91240B29-F687-4f45-9708-019B960494DF}">
-                <a14:hiddenLine xmlns:a14="http://schemas.microsoft.com/office/drawing/2010/main" xmlns="" w="9525">
+                <a14:hiddenLine xmlns="" xmlns:a14="http://schemas.microsoft.com/office/drawing/2010/main" w="9525">
                   <a:solidFill>
                     <a:srgbClr val="000000"/>
                   </a:solidFill>
@@ -1229,7 +1223,7 @@
             </a:ln>
             <a:extLst>
               <a:ext uri="{91240B29-F687-4f45-9708-019B960494DF}">
-                <a14:hiddenLine xmlns:a14="http://schemas.microsoft.com/office/drawing/2010/main" xmlns="" w="9525">
+                <a14:hiddenLine xmlns="" xmlns:a14="http://schemas.microsoft.com/office/drawing/2010/main" w="9525">
                   <a:solidFill>
                     <a:srgbClr val="000000"/>
                   </a:solidFill>
@@ -1319,7 +1313,7 @@
             </a:ln>
             <a:extLst>
               <a:ext uri="{91240B29-F687-4f45-9708-019B960494DF}">
-                <a14:hiddenLine xmlns:a14="http://schemas.microsoft.com/office/drawing/2010/main" xmlns="" w="9525">
+                <a14:hiddenLine xmlns="" xmlns:a14="http://schemas.microsoft.com/office/drawing/2010/main" w="9525">
                   <a:solidFill>
                     <a:srgbClr val="000000"/>
                   </a:solidFill>
@@ -1381,7 +1375,7 @@
             </a:ln>
             <a:extLst>
               <a:ext uri="{91240B29-F687-4f45-9708-019B960494DF}">
-                <a14:hiddenLine xmlns:a14="http://schemas.microsoft.com/office/drawing/2010/main" xmlns="" w="9525">
+                <a14:hiddenLine xmlns="" xmlns:a14="http://schemas.microsoft.com/office/drawing/2010/main" w="9525">
                   <a:solidFill>
                     <a:srgbClr val="000000"/>
                   </a:solidFill>
@@ -1443,7 +1437,7 @@
             </a:ln>
             <a:extLst>
               <a:ext uri="{91240B29-F687-4f45-9708-019B960494DF}">
-                <a14:hiddenLine xmlns:a14="http://schemas.microsoft.com/office/drawing/2010/main" xmlns="" w="9525">
+                <a14:hiddenLine xmlns="" xmlns:a14="http://schemas.microsoft.com/office/drawing/2010/main" w="9525">
                   <a:solidFill>
                     <a:srgbClr val="000000"/>
                   </a:solidFill>
@@ -1533,7 +1527,7 @@
             </a:ln>
             <a:extLst>
               <a:ext uri="{91240B29-F687-4f45-9708-019B960494DF}">
-                <a14:hiddenLine xmlns:a14="http://schemas.microsoft.com/office/drawing/2010/main" xmlns="" w="9525">
+                <a14:hiddenLine xmlns="" xmlns:a14="http://schemas.microsoft.com/office/drawing/2010/main" w="9525">
                   <a:solidFill>
                     <a:srgbClr val="000000"/>
                   </a:solidFill>
@@ -1623,7 +1617,7 @@
             </a:ln>
             <a:extLst>
               <a:ext uri="{91240B29-F687-4f45-9708-019B960494DF}">
-                <a14:hiddenLine xmlns:a14="http://schemas.microsoft.com/office/drawing/2010/main" xmlns="" w="9525">
+                <a14:hiddenLine xmlns="" xmlns:a14="http://schemas.microsoft.com/office/drawing/2010/main" w="9525">
                   <a:solidFill>
                     <a:srgbClr val="000000"/>
                   </a:solidFill>
@@ -1685,7 +1679,7 @@
             </a:ln>
             <a:extLst>
               <a:ext uri="{91240B29-F687-4f45-9708-019B960494DF}">
-                <a14:hiddenLine xmlns:a14="http://schemas.microsoft.com/office/drawing/2010/main" xmlns="" w="9525">
+                <a14:hiddenLine xmlns="" xmlns:a14="http://schemas.microsoft.com/office/drawing/2010/main" w="9525">
                   <a:solidFill>
                     <a:srgbClr val="000000"/>
                   </a:solidFill>
@@ -1795,7 +1789,7 @@
             </a:ln>
             <a:extLst>
               <a:ext uri="{91240B29-F687-4f45-9708-019B960494DF}">
-                <a14:hiddenLine xmlns:a14="http://schemas.microsoft.com/office/drawing/2010/main" xmlns="" w="9525">
+                <a14:hiddenLine xmlns="" xmlns:a14="http://schemas.microsoft.com/office/drawing/2010/main" w="9525">
                   <a:solidFill>
                     <a:srgbClr val="000000"/>
                   </a:solidFill>
@@ -1857,7 +1851,7 @@
             </a:ln>
             <a:extLst>
               <a:ext uri="{91240B29-F687-4f45-9708-019B960494DF}">
-                <a14:hiddenLine xmlns:a14="http://schemas.microsoft.com/office/drawing/2010/main" xmlns="" w="9525">
+                <a14:hiddenLine xmlns="" xmlns:a14="http://schemas.microsoft.com/office/drawing/2010/main" w="9525">
                   <a:solidFill>
                     <a:srgbClr val="000000"/>
                   </a:solidFill>
@@ -1947,7 +1941,7 @@
             </a:ln>
             <a:extLst>
               <a:ext uri="{91240B29-F687-4f45-9708-019B960494DF}">
-                <a14:hiddenLine xmlns:a14="http://schemas.microsoft.com/office/drawing/2010/main" xmlns="" w="9525">
+                <a14:hiddenLine xmlns="" xmlns:a14="http://schemas.microsoft.com/office/drawing/2010/main" w="9525">
                   <a:solidFill>
                     <a:srgbClr val="000000"/>
                   </a:solidFill>
@@ -2037,7 +2031,7 @@
             </a:ln>
             <a:extLst>
               <a:ext uri="{91240B29-F687-4f45-9708-019B960494DF}">
-                <a14:hiddenLine xmlns:a14="http://schemas.microsoft.com/office/drawing/2010/main" xmlns="" w="9525">
+                <a14:hiddenLine xmlns="" xmlns:a14="http://schemas.microsoft.com/office/drawing/2010/main" w="9525">
                   <a:solidFill>
                     <a:srgbClr val="000000"/>
                   </a:solidFill>
@@ -2099,7 +2093,7 @@
             </a:ln>
             <a:extLst>
               <a:ext uri="{91240B29-F687-4f45-9708-019B960494DF}">
-                <a14:hiddenLine xmlns:a14="http://schemas.microsoft.com/office/drawing/2010/main" xmlns="" w="9525">
+                <a14:hiddenLine xmlns="" xmlns:a14="http://schemas.microsoft.com/office/drawing/2010/main" w="9525">
                   <a:solidFill>
                     <a:srgbClr val="000000"/>
                   </a:solidFill>
@@ -2189,7 +2183,7 @@
             </a:ln>
             <a:extLst>
               <a:ext uri="{91240B29-F687-4f45-9708-019B960494DF}">
-                <a14:hiddenLine xmlns:a14="http://schemas.microsoft.com/office/drawing/2010/main" xmlns="" w="9525">
+                <a14:hiddenLine xmlns="" xmlns:a14="http://schemas.microsoft.com/office/drawing/2010/main" w="9525">
                   <a:solidFill>
                     <a:srgbClr val="000000"/>
                   </a:solidFill>
@@ -2279,7 +2273,7 @@
             </a:ln>
             <a:extLst>
               <a:ext uri="{91240B29-F687-4f45-9708-019B960494DF}">
-                <a14:hiddenLine xmlns:a14="http://schemas.microsoft.com/office/drawing/2010/main" xmlns="" w="9525">
+                <a14:hiddenLine xmlns="" xmlns:a14="http://schemas.microsoft.com/office/drawing/2010/main" w="9525">
                   <a:solidFill>
                     <a:srgbClr val="000000"/>
                   </a:solidFill>
@@ -2335,7 +2329,7 @@
             </a:ln>
             <a:extLst>
               <a:ext uri="{91240B29-F687-4f45-9708-019B960494DF}">
-                <a14:hiddenLine xmlns:a14="http://schemas.microsoft.com/office/drawing/2010/main" xmlns="" w="9525">
+                <a14:hiddenLine xmlns="" xmlns:a14="http://schemas.microsoft.com/office/drawing/2010/main" w="9525">
                   <a:solidFill>
                     <a:srgbClr val="000000"/>
                   </a:solidFill>
@@ -2425,7 +2419,7 @@
             </a:ln>
             <a:extLst>
               <a:ext uri="{91240B29-F687-4f45-9708-019B960494DF}">
-                <a14:hiddenLine xmlns:a14="http://schemas.microsoft.com/office/drawing/2010/main" xmlns="" w="9525">
+                <a14:hiddenLine xmlns="" xmlns:a14="http://schemas.microsoft.com/office/drawing/2010/main" w="9525">
                   <a:solidFill>
                     <a:srgbClr val="000000"/>
                   </a:solidFill>
@@ -2481,7 +2475,7 @@
             </a:ln>
             <a:extLst>
               <a:ext uri="{91240B29-F687-4f45-9708-019B960494DF}">
-                <a14:hiddenLine xmlns:a14="http://schemas.microsoft.com/office/drawing/2010/main" xmlns="" w="9525">
+                <a14:hiddenLine xmlns="" xmlns:a14="http://schemas.microsoft.com/office/drawing/2010/main" w="9525">
                   <a:solidFill>
                     <a:srgbClr val="000000"/>
                   </a:solidFill>
@@ -2571,7 +2565,7 @@
             </a:ln>
             <a:extLst>
               <a:ext uri="{91240B29-F687-4f45-9708-019B960494DF}">
-                <a14:hiddenLine xmlns:a14="http://schemas.microsoft.com/office/drawing/2010/main" xmlns="" w="9525">
+                <a14:hiddenLine xmlns="" xmlns:a14="http://schemas.microsoft.com/office/drawing/2010/main" w="9525">
                   <a:solidFill>
                     <a:srgbClr val="000000"/>
                   </a:solidFill>
@@ -2639,7 +2633,7 @@
             </a:ln>
             <a:extLst>
               <a:ext uri="{91240B29-F687-4f45-9708-019B960494DF}">
-                <a14:hiddenLine xmlns:a14="http://schemas.microsoft.com/office/drawing/2010/main" xmlns="" w="9525">
+                <a14:hiddenLine xmlns="" xmlns:a14="http://schemas.microsoft.com/office/drawing/2010/main" w="9525">
                   <a:solidFill>
                     <a:srgbClr val="000000"/>
                   </a:solidFill>
@@ -2729,7 +2723,7 @@
             </a:ln>
             <a:extLst>
               <a:ext uri="{91240B29-F687-4f45-9708-019B960494DF}">
-                <a14:hiddenLine xmlns:a14="http://schemas.microsoft.com/office/drawing/2010/main" xmlns="" w="9525">
+                <a14:hiddenLine xmlns="" xmlns:a14="http://schemas.microsoft.com/office/drawing/2010/main" w="9525">
                   <a:solidFill>
                     <a:srgbClr val="000000"/>
                   </a:solidFill>
@@ -2797,7 +2791,7 @@
             </a:ln>
             <a:extLst>
               <a:ext uri="{91240B29-F687-4f45-9708-019B960494DF}">
-                <a14:hiddenLine xmlns:a14="http://schemas.microsoft.com/office/drawing/2010/main" xmlns="" w="9525">
+                <a14:hiddenLine xmlns="" xmlns:a14="http://schemas.microsoft.com/office/drawing/2010/main" w="9525">
                   <a:solidFill>
                     <a:srgbClr val="000000"/>
                   </a:solidFill>
@@ -2887,7 +2881,7 @@
             </a:ln>
             <a:extLst>
               <a:ext uri="{91240B29-F687-4f45-9708-019B960494DF}">
-                <a14:hiddenLine xmlns:a14="http://schemas.microsoft.com/office/drawing/2010/main" xmlns="" w="9525">
+                <a14:hiddenLine xmlns="" xmlns:a14="http://schemas.microsoft.com/office/drawing/2010/main" w="9525">
                   <a:solidFill>
                     <a:srgbClr val="000000"/>
                   </a:solidFill>
@@ -2921,7 +2915,7 @@
             </a:ln>
             <a:extLst>
               <a:ext uri="{91240B29-F687-4f45-9708-019B960494DF}">
-                <a14:hiddenLine xmlns:a14="http://schemas.microsoft.com/office/drawing/2010/main" xmlns="" w="9525">
+                <a14:hiddenLine xmlns="" xmlns:a14="http://schemas.microsoft.com/office/drawing/2010/main" w="9525">
                   <a:solidFill>
                     <a:srgbClr val="000000"/>
                   </a:solidFill>
@@ -3011,7 +3005,7 @@
             </a:ln>
             <a:extLst>
               <a:ext uri="{91240B29-F687-4f45-9708-019B960494DF}">
-                <a14:hiddenLine xmlns:a14="http://schemas.microsoft.com/office/drawing/2010/main" xmlns="" w="9525">
+                <a14:hiddenLine xmlns="" xmlns:a14="http://schemas.microsoft.com/office/drawing/2010/main" w="9525">
                   <a:solidFill>
                     <a:srgbClr val="000000"/>
                   </a:solidFill>
@@ -3073,7 +3067,7 @@
             </a:ln>
             <a:extLst>
               <a:ext uri="{91240B29-F687-4f45-9708-019B960494DF}">
-                <a14:hiddenLine xmlns:a14="http://schemas.microsoft.com/office/drawing/2010/main" xmlns="" w="9525">
+                <a14:hiddenLine xmlns="" xmlns:a14="http://schemas.microsoft.com/office/drawing/2010/main" w="9525">
                   <a:solidFill>
                     <a:srgbClr val="000000"/>
                   </a:solidFill>
@@ -3135,7 +3129,7 @@
             </a:ln>
             <a:extLst>
               <a:ext uri="{91240B29-F687-4f45-9708-019B960494DF}">
-                <a14:hiddenLine xmlns:a14="http://schemas.microsoft.com/office/drawing/2010/main" xmlns="" w="9525">
+                <a14:hiddenLine xmlns="" xmlns:a14="http://schemas.microsoft.com/office/drawing/2010/main" w="9525">
                   <a:solidFill>
                     <a:srgbClr val="000000"/>
                   </a:solidFill>
@@ -3225,7 +3219,7 @@
             </a:ln>
             <a:extLst>
               <a:ext uri="{91240B29-F687-4f45-9708-019B960494DF}">
-                <a14:hiddenLine xmlns:a14="http://schemas.microsoft.com/office/drawing/2010/main" xmlns="" w="9525">
+                <a14:hiddenLine xmlns="" xmlns:a14="http://schemas.microsoft.com/office/drawing/2010/main" w="9525">
                   <a:solidFill>
                     <a:srgbClr val="000000"/>
                   </a:solidFill>
@@ -3293,7 +3287,7 @@
             </a:ln>
             <a:extLst>
               <a:ext uri="{91240B29-F687-4f45-9708-019B960494DF}">
-                <a14:hiddenLine xmlns:a14="http://schemas.microsoft.com/office/drawing/2010/main" xmlns="" w="9525">
+                <a14:hiddenLine xmlns="" xmlns:a14="http://schemas.microsoft.com/office/drawing/2010/main" w="9525">
                   <a:solidFill>
                     <a:srgbClr val="000000"/>
                   </a:solidFill>
@@ -3355,7 +3349,7 @@
             </a:ln>
             <a:extLst>
               <a:ext uri="{91240B29-F687-4f45-9708-019B960494DF}">
-                <a14:hiddenLine xmlns:a14="http://schemas.microsoft.com/office/drawing/2010/main" xmlns="" w="9525">
+                <a14:hiddenLine xmlns="" xmlns:a14="http://schemas.microsoft.com/office/drawing/2010/main" w="9525">
                   <a:solidFill>
                     <a:srgbClr val="000000"/>
                   </a:solidFill>
@@ -3445,7 +3439,7 @@
             </a:ln>
             <a:extLst>
               <a:ext uri="{91240B29-F687-4f45-9708-019B960494DF}">
-                <a14:hiddenLine xmlns:a14="http://schemas.microsoft.com/office/drawing/2010/main" xmlns="" w="9525">
+                <a14:hiddenLine xmlns="" xmlns:a14="http://schemas.microsoft.com/office/drawing/2010/main" w="9525">
                   <a:solidFill>
                     <a:srgbClr val="000000"/>
                   </a:solidFill>
@@ -3507,7 +3501,7 @@
             </a:ln>
             <a:extLst>
               <a:ext uri="{91240B29-F687-4f45-9708-019B960494DF}">
-                <a14:hiddenLine xmlns:a14="http://schemas.microsoft.com/office/drawing/2010/main" xmlns="" w="9525">
+                <a14:hiddenLine xmlns="" xmlns:a14="http://schemas.microsoft.com/office/drawing/2010/main" w="9525">
                   <a:solidFill>
                     <a:srgbClr val="000000"/>
                   </a:solidFill>
@@ -3597,7 +3591,7 @@
             </a:ln>
             <a:extLst>
               <a:ext uri="{91240B29-F687-4f45-9708-019B960494DF}">
-                <a14:hiddenLine xmlns:a14="http://schemas.microsoft.com/office/drawing/2010/main" xmlns="" w="9525">
+                <a14:hiddenLine xmlns="" xmlns:a14="http://schemas.microsoft.com/office/drawing/2010/main" w="9525">
                   <a:solidFill>
                     <a:srgbClr val="000000"/>
                   </a:solidFill>
@@ -3659,7 +3653,7 @@
             </a:ln>
             <a:extLst>
               <a:ext uri="{91240B29-F687-4f45-9708-019B960494DF}">
-                <a14:hiddenLine xmlns:a14="http://schemas.microsoft.com/office/drawing/2010/main" xmlns="" w="9525">
+                <a14:hiddenLine xmlns="" xmlns:a14="http://schemas.microsoft.com/office/drawing/2010/main" w="9525">
                   <a:solidFill>
                     <a:srgbClr val="000000"/>
                   </a:solidFill>
@@ -3749,7 +3743,7 @@
             </a:ln>
             <a:extLst>
               <a:ext uri="{91240B29-F687-4f45-9708-019B960494DF}">
-                <a14:hiddenLine xmlns:a14="http://schemas.microsoft.com/office/drawing/2010/main" xmlns="" w="9525">
+                <a14:hiddenLine xmlns="" xmlns:a14="http://schemas.microsoft.com/office/drawing/2010/main" w="9525">
                   <a:solidFill>
                     <a:srgbClr val="000000"/>
                   </a:solidFill>
@@ -3783,7 +3777,7 @@
             </a:ln>
             <a:extLst>
               <a:ext uri="{91240B29-F687-4f45-9708-019B960494DF}">
-                <a14:hiddenLine xmlns:a14="http://schemas.microsoft.com/office/drawing/2010/main" xmlns="" w="9525">
+                <a14:hiddenLine xmlns="" xmlns:a14="http://schemas.microsoft.com/office/drawing/2010/main" w="9525">
                   <a:solidFill>
                     <a:srgbClr val="000000"/>
                   </a:solidFill>
@@ -3848,7 +3842,7 @@
             </a:ln>
             <a:extLst>
               <a:ext uri="{91240B29-F687-4f45-9708-019B960494DF}">
-                <a14:hiddenLine xmlns:a14="http://schemas.microsoft.com/office/drawing/2010/main" xmlns="" w="9525">
+                <a14:hiddenLine xmlns="" xmlns:a14="http://schemas.microsoft.com/office/drawing/2010/main" w="9525">
                   <a:solidFill>
                     <a:srgbClr val="000000"/>
                   </a:solidFill>
@@ -3938,7 +3932,7 @@
             </a:ln>
             <a:extLst>
               <a:ext uri="{91240B29-F687-4f45-9708-019B960494DF}">
-                <a14:hiddenLine xmlns:a14="http://schemas.microsoft.com/office/drawing/2010/main" xmlns="" w="9525">
+                <a14:hiddenLine xmlns="" xmlns:a14="http://schemas.microsoft.com/office/drawing/2010/main" w="9525">
                   <a:solidFill>
                     <a:srgbClr val="000000"/>
                   </a:solidFill>
@@ -4000,7 +3994,7 @@
             </a:ln>
             <a:extLst>
               <a:ext uri="{91240B29-F687-4f45-9708-019B960494DF}">
-                <a14:hiddenLine xmlns:a14="http://schemas.microsoft.com/office/drawing/2010/main" xmlns="" w="9525">
+                <a14:hiddenLine xmlns="" xmlns:a14="http://schemas.microsoft.com/office/drawing/2010/main" w="9525">
                   <a:solidFill>
                     <a:srgbClr val="000000"/>
                   </a:solidFill>
@@ -4090,7 +4084,7 @@
             </a:ln>
             <a:extLst>
               <a:ext uri="{91240B29-F687-4f45-9708-019B960494DF}">
-                <a14:hiddenLine xmlns:a14="http://schemas.microsoft.com/office/drawing/2010/main" xmlns="" w="9525">
+                <a14:hiddenLine xmlns="" xmlns:a14="http://schemas.microsoft.com/office/drawing/2010/main" w="9525">
                   <a:solidFill>
                     <a:srgbClr val="000000"/>
                   </a:solidFill>
@@ -4180,7 +4174,7 @@
             </a:ln>
             <a:extLst>
               <a:ext uri="{91240B29-F687-4f45-9708-019B960494DF}">
-                <a14:hiddenLine xmlns:a14="http://schemas.microsoft.com/office/drawing/2010/main" xmlns="" w="9525">
+                <a14:hiddenLine xmlns="" xmlns:a14="http://schemas.microsoft.com/office/drawing/2010/main" w="9525">
                   <a:solidFill>
                     <a:srgbClr val="000000"/>
                   </a:solidFill>
@@ -4245,7 +4239,7 @@
             </a:ln>
             <a:extLst>
               <a:ext uri="{91240B29-F687-4f45-9708-019B960494DF}">
-                <a14:hiddenLine xmlns:a14="http://schemas.microsoft.com/office/drawing/2010/main" xmlns="" w="9525">
+                <a14:hiddenLine xmlns="" xmlns:a14="http://schemas.microsoft.com/office/drawing/2010/main" w="9525">
                   <a:solidFill>
                     <a:srgbClr val="000000"/>
                   </a:solidFill>
@@ -4307,7 +4301,7 @@
             </a:ln>
             <a:extLst>
               <a:ext uri="{91240B29-F687-4f45-9708-019B960494DF}">
-                <a14:hiddenLine xmlns:a14="http://schemas.microsoft.com/office/drawing/2010/main" xmlns="" w="9525">
+                <a14:hiddenLine xmlns="" xmlns:a14="http://schemas.microsoft.com/office/drawing/2010/main" w="9525">
                   <a:solidFill>
                     <a:srgbClr val="000000"/>
                   </a:solidFill>
@@ -4397,7 +4391,7 @@
             </a:ln>
             <a:extLst>
               <a:ext uri="{91240B29-F687-4f45-9708-019B960494DF}">
-                <a14:hiddenLine xmlns:a14="http://schemas.microsoft.com/office/drawing/2010/main" xmlns="" w="9525">
+                <a14:hiddenLine xmlns="" xmlns:a14="http://schemas.microsoft.com/office/drawing/2010/main" w="9525">
                   <a:solidFill>
                     <a:srgbClr val="000000"/>
                   </a:solidFill>
@@ -4487,7 +4481,7 @@
             </a:ln>
             <a:extLst>
               <a:ext uri="{91240B29-F687-4f45-9708-019B960494DF}">
-                <a14:hiddenLine xmlns:a14="http://schemas.microsoft.com/office/drawing/2010/main" xmlns="" w="9525">
+                <a14:hiddenLine xmlns="" xmlns:a14="http://schemas.microsoft.com/office/drawing/2010/main" w="9525">
                   <a:solidFill>
                     <a:srgbClr val="000000"/>
                   </a:solidFill>
@@ -4549,7 +4543,7 @@
             </a:ln>
             <a:extLst>
               <a:ext uri="{91240B29-F687-4f45-9708-019B960494DF}">
-                <a14:hiddenLine xmlns:a14="http://schemas.microsoft.com/office/drawing/2010/main" xmlns="" w="9525">
+                <a14:hiddenLine xmlns="" xmlns:a14="http://schemas.microsoft.com/office/drawing/2010/main" w="9525">
                   <a:solidFill>
                     <a:srgbClr val="000000"/>
                   </a:solidFill>
@@ -4669,7 +4663,7 @@
             </a:ln>
             <a:extLst>
               <a:ext uri="{91240B29-F687-4f45-9708-019B960494DF}">
-                <a14:hiddenLine xmlns:a14="http://schemas.microsoft.com/office/drawing/2010/main" xmlns="" w="9525">
+                <a14:hiddenLine xmlns="" xmlns:a14="http://schemas.microsoft.com/office/drawing/2010/main" w="9525">
                   <a:solidFill>
                     <a:srgbClr val="000000"/>
                   </a:solidFill>
@@ -4737,7 +4731,7 @@
             </a:ln>
             <a:extLst>
               <a:ext uri="{91240B29-F687-4f45-9708-019B960494DF}">
-                <a14:hiddenLine xmlns:a14="http://schemas.microsoft.com/office/drawing/2010/main" xmlns="" w="9525">
+                <a14:hiddenLine xmlns="" xmlns:a14="http://schemas.microsoft.com/office/drawing/2010/main" w="9525">
                   <a:solidFill>
                     <a:srgbClr val="000000"/>
                   </a:solidFill>
@@ -4827,7 +4821,7 @@
             </a:ln>
             <a:extLst>
               <a:ext uri="{91240B29-F687-4f45-9708-019B960494DF}">
-                <a14:hiddenLine xmlns:a14="http://schemas.microsoft.com/office/drawing/2010/main" xmlns="" w="9525">
+                <a14:hiddenLine xmlns="" xmlns:a14="http://schemas.microsoft.com/office/drawing/2010/main" w="9525">
                   <a:solidFill>
                     <a:srgbClr val="000000"/>
                   </a:solidFill>
@@ -9641,7 +9635,7 @@
           <a:noFill/>
           <a:extLst>
             <a:ext uri="{909E8E84-426E-40dd-AFC4-6F175D3DCCD1}">
-              <a14:hiddenFill xmlns:a14="http://schemas.microsoft.com/office/drawing/2010/main" xmlns="">
+              <a14:hiddenFill xmlns="" xmlns:a14="http://schemas.microsoft.com/office/drawing/2010/main">
                 <a:solidFill>
                   <a:srgbClr val="FFFFFF"/>
                 </a:solidFill>
@@ -9715,7 +9709,7 @@
               </a:ln>
               <a:extLst>
                 <a:ext uri="{91240B29-F687-4f45-9708-019B960494DF}">
-                  <a14:hiddenLine xmlns:a14="http://schemas.microsoft.com/office/drawing/2010/main" xmlns="" w="9525">
+                  <a14:hiddenLine xmlns="" xmlns:a14="http://schemas.microsoft.com/office/drawing/2010/main" w="9525">
                     <a:solidFill>
                       <a:srgbClr val="000000"/>
                     </a:solidFill>
@@ -9805,7 +9799,7 @@
               </a:ln>
               <a:extLst>
                 <a:ext uri="{91240B29-F687-4f45-9708-019B960494DF}">
-                  <a14:hiddenLine xmlns:a14="http://schemas.microsoft.com/office/drawing/2010/main" xmlns="" w="9525">
+                  <a14:hiddenLine xmlns="" xmlns:a14="http://schemas.microsoft.com/office/drawing/2010/main" w="9525">
                     <a:solidFill>
                       <a:srgbClr val="000000"/>
                     </a:solidFill>
@@ -9895,7 +9889,7 @@
               </a:ln>
               <a:extLst>
                 <a:ext uri="{91240B29-F687-4f45-9708-019B960494DF}">
-                  <a14:hiddenLine xmlns:a14="http://schemas.microsoft.com/office/drawing/2010/main" xmlns="" w="9525">
+                  <a14:hiddenLine xmlns="" xmlns:a14="http://schemas.microsoft.com/office/drawing/2010/main" w="9525">
                     <a:solidFill>
                       <a:srgbClr val="000000"/>
                     </a:solidFill>
@@ -9957,7 +9951,7 @@
               </a:ln>
               <a:extLst>
                 <a:ext uri="{91240B29-F687-4f45-9708-019B960494DF}">
-                  <a14:hiddenLine xmlns:a14="http://schemas.microsoft.com/office/drawing/2010/main" xmlns="" w="9525">
+                  <a14:hiddenLine xmlns="" xmlns:a14="http://schemas.microsoft.com/office/drawing/2010/main" w="9525">
                     <a:solidFill>
                       <a:srgbClr val="000000"/>
                     </a:solidFill>
@@ -10047,7 +10041,7 @@
               </a:ln>
               <a:extLst>
                 <a:ext uri="{91240B29-F687-4f45-9708-019B960494DF}">
-                  <a14:hiddenLine xmlns:a14="http://schemas.microsoft.com/office/drawing/2010/main" xmlns="" w="9525">
+                  <a14:hiddenLine xmlns="" xmlns:a14="http://schemas.microsoft.com/office/drawing/2010/main" w="9525">
                     <a:solidFill>
                       <a:srgbClr val="000000"/>
                     </a:solidFill>
@@ -10109,7 +10103,7 @@
               </a:ln>
               <a:extLst>
                 <a:ext uri="{91240B29-F687-4f45-9708-019B960494DF}">
-                  <a14:hiddenLine xmlns:a14="http://schemas.microsoft.com/office/drawing/2010/main" xmlns="" w="9525">
+                  <a14:hiddenLine xmlns="" xmlns:a14="http://schemas.microsoft.com/office/drawing/2010/main" w="9525">
                     <a:solidFill>
                       <a:srgbClr val="000000"/>
                     </a:solidFill>
@@ -10171,7 +10165,7 @@
               </a:ln>
               <a:extLst>
                 <a:ext uri="{91240B29-F687-4f45-9708-019B960494DF}">
-                  <a14:hiddenLine xmlns:a14="http://schemas.microsoft.com/office/drawing/2010/main" xmlns="" w="9525">
+                  <a14:hiddenLine xmlns="" xmlns:a14="http://schemas.microsoft.com/office/drawing/2010/main" w="9525">
                     <a:solidFill>
                       <a:srgbClr val="000000"/>
                     </a:solidFill>
@@ -10261,7 +10255,7 @@
               </a:ln>
               <a:extLst>
                 <a:ext uri="{91240B29-F687-4f45-9708-019B960494DF}">
-                  <a14:hiddenLine xmlns:a14="http://schemas.microsoft.com/office/drawing/2010/main" xmlns="" w="9525">
+                  <a14:hiddenLine xmlns="" xmlns:a14="http://schemas.microsoft.com/office/drawing/2010/main" w="9525">
                     <a:solidFill>
                       <a:srgbClr val="000000"/>
                     </a:solidFill>
@@ -10351,7 +10345,7 @@
               </a:ln>
               <a:extLst>
                 <a:ext uri="{91240B29-F687-4f45-9708-019B960494DF}">
-                  <a14:hiddenLine xmlns:a14="http://schemas.microsoft.com/office/drawing/2010/main" xmlns="" w="9525">
+                  <a14:hiddenLine xmlns="" xmlns:a14="http://schemas.microsoft.com/office/drawing/2010/main" w="9525">
                     <a:solidFill>
                       <a:srgbClr val="000000"/>
                     </a:solidFill>
@@ -10413,7 +10407,7 @@
               </a:ln>
               <a:extLst>
                 <a:ext uri="{91240B29-F687-4f45-9708-019B960494DF}">
-                  <a14:hiddenLine xmlns:a14="http://schemas.microsoft.com/office/drawing/2010/main" xmlns="" w="9525">
+                  <a14:hiddenLine xmlns="" xmlns:a14="http://schemas.microsoft.com/office/drawing/2010/main" w="9525">
                     <a:solidFill>
                       <a:srgbClr val="000000"/>
                     </a:solidFill>
@@ -10523,7 +10517,7 @@
               </a:ln>
               <a:extLst>
                 <a:ext uri="{91240B29-F687-4f45-9708-019B960494DF}">
-                  <a14:hiddenLine xmlns:a14="http://schemas.microsoft.com/office/drawing/2010/main" xmlns="" w="9525">
+                  <a14:hiddenLine xmlns="" xmlns:a14="http://schemas.microsoft.com/office/drawing/2010/main" w="9525">
                     <a:solidFill>
                       <a:srgbClr val="000000"/>
                     </a:solidFill>
@@ -10607,7 +10601,7 @@
               </a:ln>
               <a:extLst>
                 <a:ext uri="{91240B29-F687-4f45-9708-019B960494DF}">
-                  <a14:hiddenLine xmlns:a14="http://schemas.microsoft.com/office/drawing/2010/main" xmlns="" w="9525">
+                  <a14:hiddenLine xmlns="" xmlns:a14="http://schemas.microsoft.com/office/drawing/2010/main" w="9525">
                     <a:solidFill>
                       <a:srgbClr val="000000"/>
                     </a:solidFill>
@@ -10669,7 +10663,7 @@
               </a:ln>
               <a:extLst>
                 <a:ext uri="{91240B29-F687-4f45-9708-019B960494DF}">
-                  <a14:hiddenLine xmlns:a14="http://schemas.microsoft.com/office/drawing/2010/main" xmlns="" w="9525">
+                  <a14:hiddenLine xmlns="" xmlns:a14="http://schemas.microsoft.com/office/drawing/2010/main" w="9525">
                     <a:solidFill>
                       <a:srgbClr val="000000"/>
                     </a:solidFill>
@@ -10731,7 +10725,7 @@
               </a:ln>
               <a:extLst>
                 <a:ext uri="{91240B29-F687-4f45-9708-019B960494DF}">
-                  <a14:hiddenLine xmlns:a14="http://schemas.microsoft.com/office/drawing/2010/main" xmlns="" w="9525">
+                  <a14:hiddenLine xmlns="" xmlns:a14="http://schemas.microsoft.com/office/drawing/2010/main" w="9525">
                     <a:solidFill>
                       <a:srgbClr val="000000"/>
                     </a:solidFill>
@@ -10821,7 +10815,7 @@
               </a:ln>
               <a:extLst>
                 <a:ext uri="{91240B29-F687-4f45-9708-019B960494DF}">
-                  <a14:hiddenLine xmlns:a14="http://schemas.microsoft.com/office/drawing/2010/main" xmlns="" w="9525">
+                  <a14:hiddenLine xmlns="" xmlns:a14="http://schemas.microsoft.com/office/drawing/2010/main" w="9525">
                     <a:solidFill>
                       <a:srgbClr val="000000"/>
                     </a:solidFill>
@@ -10855,7 +10849,7 @@
               </a:ln>
               <a:extLst>
                 <a:ext uri="{91240B29-F687-4f45-9708-019B960494DF}">
-                  <a14:hiddenLine xmlns:a14="http://schemas.microsoft.com/office/drawing/2010/main" xmlns="" w="9525">
+                  <a14:hiddenLine xmlns="" xmlns:a14="http://schemas.microsoft.com/office/drawing/2010/main" w="9525">
                     <a:solidFill>
                       <a:srgbClr val="000000"/>
                     </a:solidFill>
@@ -10920,7 +10914,7 @@
               </a:ln>
               <a:extLst>
                 <a:ext uri="{91240B29-F687-4f45-9708-019B960494DF}">
-                  <a14:hiddenLine xmlns:a14="http://schemas.microsoft.com/office/drawing/2010/main" xmlns="" w="9525">
+                  <a14:hiddenLine xmlns="" xmlns:a14="http://schemas.microsoft.com/office/drawing/2010/main" w="9525">
                     <a:solidFill>
                       <a:srgbClr val="000000"/>
                     </a:solidFill>
@@ -11010,7 +11004,7 @@
               </a:ln>
               <a:extLst>
                 <a:ext uri="{91240B29-F687-4f45-9708-019B960494DF}">
-                  <a14:hiddenLine xmlns:a14="http://schemas.microsoft.com/office/drawing/2010/main" xmlns="" w="9525">
+                  <a14:hiddenLine xmlns="" xmlns:a14="http://schemas.microsoft.com/office/drawing/2010/main" w="9525">
                     <a:solidFill>
                       <a:srgbClr val="000000"/>
                     </a:solidFill>
@@ -11072,7 +11066,7 @@
               </a:ln>
               <a:extLst>
                 <a:ext uri="{91240B29-F687-4f45-9708-019B960494DF}">
-                  <a14:hiddenLine xmlns:a14="http://schemas.microsoft.com/office/drawing/2010/main" xmlns="" w="9525">
+                  <a14:hiddenLine xmlns="" xmlns:a14="http://schemas.microsoft.com/office/drawing/2010/main" w="9525">
                     <a:solidFill>
                       <a:srgbClr val="000000"/>
                     </a:solidFill>
@@ -11162,7 +11156,7 @@
               </a:ln>
               <a:extLst>
                 <a:ext uri="{91240B29-F687-4f45-9708-019B960494DF}">
-                  <a14:hiddenLine xmlns:a14="http://schemas.microsoft.com/office/drawing/2010/main" xmlns="" w="9525">
+                  <a14:hiddenLine xmlns="" xmlns:a14="http://schemas.microsoft.com/office/drawing/2010/main" w="9525">
                     <a:solidFill>
                       <a:srgbClr val="000000"/>
                     </a:solidFill>
@@ -11227,7 +11221,7 @@
               </a:ln>
               <a:extLst>
                 <a:ext uri="{91240B29-F687-4f45-9708-019B960494DF}">
-                  <a14:hiddenLine xmlns:a14="http://schemas.microsoft.com/office/drawing/2010/main" xmlns="" w="9525">
+                  <a14:hiddenLine xmlns="" xmlns:a14="http://schemas.microsoft.com/office/drawing/2010/main" w="9525">
                     <a:solidFill>
                       <a:srgbClr val="000000"/>
                     </a:solidFill>
@@ -11289,7 +11283,7 @@
               </a:ln>
               <a:extLst>
                 <a:ext uri="{91240B29-F687-4f45-9708-019B960494DF}">
-                  <a14:hiddenLine xmlns:a14="http://schemas.microsoft.com/office/drawing/2010/main" xmlns="" w="9525">
+                  <a14:hiddenLine xmlns="" xmlns:a14="http://schemas.microsoft.com/office/drawing/2010/main" w="9525">
                     <a:solidFill>
                       <a:srgbClr val="000000"/>
                     </a:solidFill>
@@ -11379,7 +11373,7 @@
               </a:ln>
               <a:extLst>
                 <a:ext uri="{91240B29-F687-4f45-9708-019B960494DF}">
-                  <a14:hiddenLine xmlns:a14="http://schemas.microsoft.com/office/drawing/2010/main" xmlns="" w="9525">
+                  <a14:hiddenLine xmlns="" xmlns:a14="http://schemas.microsoft.com/office/drawing/2010/main" w="9525">
                     <a:solidFill>
                       <a:srgbClr val="000000"/>
                     </a:solidFill>
@@ -11469,7 +11463,7 @@
               </a:ln>
               <a:extLst>
                 <a:ext uri="{91240B29-F687-4f45-9708-019B960494DF}">
-                  <a14:hiddenLine xmlns:a14="http://schemas.microsoft.com/office/drawing/2010/main" xmlns="" w="9525">
+                  <a14:hiddenLine xmlns="" xmlns:a14="http://schemas.microsoft.com/office/drawing/2010/main" w="9525">
                     <a:solidFill>
                       <a:srgbClr val="000000"/>
                     </a:solidFill>
@@ -11534,7 +11528,7 @@
               </a:ln>
               <a:extLst>
                 <a:ext uri="{91240B29-F687-4f45-9708-019B960494DF}">
-                  <a14:hiddenLine xmlns:a14="http://schemas.microsoft.com/office/drawing/2010/main" xmlns="" w="9525">
+                  <a14:hiddenLine xmlns="" xmlns:a14="http://schemas.microsoft.com/office/drawing/2010/main" w="9525">
                     <a:solidFill>
                       <a:srgbClr val="000000"/>
                     </a:solidFill>
@@ -11654,7 +11648,7 @@
               </a:ln>
               <a:extLst>
                 <a:ext uri="{91240B29-F687-4f45-9708-019B960494DF}">
-                  <a14:hiddenLine xmlns:a14="http://schemas.microsoft.com/office/drawing/2010/main" xmlns="" w="9525">
+                  <a14:hiddenLine xmlns="" xmlns:a14="http://schemas.microsoft.com/office/drawing/2010/main" w="9525">
                     <a:solidFill>
                       <a:srgbClr val="000000"/>
                     </a:solidFill>
@@ -11735,7 +11729,7 @@
               </a:ln>
               <a:extLst>
                 <a:ext uri="{91240B29-F687-4f45-9708-019B960494DF}">
-                  <a14:hiddenLine xmlns:a14="http://schemas.microsoft.com/office/drawing/2010/main" xmlns="" w="9525">
+                  <a14:hiddenLine xmlns="" xmlns:a14="http://schemas.microsoft.com/office/drawing/2010/main" w="9525">
                     <a:solidFill>
                       <a:srgbClr val="000000"/>
                     </a:solidFill>
@@ -11850,7 +11844,7 @@
               </a:ln>
               <a:extLst>
                 <a:ext uri="{91240B29-F687-4f45-9708-019B960494DF}">
-                  <a14:hiddenLine xmlns:a14="http://schemas.microsoft.com/office/drawing/2010/main" xmlns="" w="9525">
+                  <a14:hiddenLine xmlns="" xmlns:a14="http://schemas.microsoft.com/office/drawing/2010/main" w="9525">
                     <a:solidFill>
                       <a:srgbClr val="000000"/>
                     </a:solidFill>
@@ -11940,7 +11934,7 @@
               </a:ln>
               <a:extLst>
                 <a:ext uri="{91240B29-F687-4f45-9708-019B960494DF}">
-                  <a14:hiddenLine xmlns:a14="http://schemas.microsoft.com/office/drawing/2010/main" xmlns="" w="9525">
+                  <a14:hiddenLine xmlns="" xmlns:a14="http://schemas.microsoft.com/office/drawing/2010/main" w="9525">
                     <a:solidFill>
                       <a:srgbClr val="000000"/>
                     </a:solidFill>
@@ -12005,7 +11999,7 @@
               </a:ln>
               <a:extLst>
                 <a:ext uri="{91240B29-F687-4f45-9708-019B960494DF}">
-                  <a14:hiddenLine xmlns:a14="http://schemas.microsoft.com/office/drawing/2010/main" xmlns="" w="9525">
+                  <a14:hiddenLine xmlns="" xmlns:a14="http://schemas.microsoft.com/office/drawing/2010/main" w="9525">
                     <a:solidFill>
                       <a:srgbClr val="000000"/>
                     </a:solidFill>
@@ -12095,7 +12089,7 @@
               </a:ln>
               <a:extLst>
                 <a:ext uri="{91240B29-F687-4f45-9708-019B960494DF}">
-                  <a14:hiddenLine xmlns:a14="http://schemas.microsoft.com/office/drawing/2010/main" xmlns="" w="9525">
+                  <a14:hiddenLine xmlns="" xmlns:a14="http://schemas.microsoft.com/office/drawing/2010/main" w="9525">
                     <a:solidFill>
                       <a:srgbClr val="000000"/>
                     </a:solidFill>
@@ -12163,7 +12157,7 @@
               </a:ln>
               <a:extLst>
                 <a:ext uri="{91240B29-F687-4f45-9708-019B960494DF}">
-                  <a14:hiddenLine xmlns:a14="http://schemas.microsoft.com/office/drawing/2010/main" xmlns="" w="9525">
+                  <a14:hiddenLine xmlns="" xmlns:a14="http://schemas.microsoft.com/office/drawing/2010/main" w="9525">
                     <a:solidFill>
                       <a:srgbClr val="000000"/>
                     </a:solidFill>
@@ -12253,7 +12247,7 @@
               </a:ln>
               <a:extLst>
                 <a:ext uri="{91240B29-F687-4f45-9708-019B960494DF}">
-                  <a14:hiddenLine xmlns:a14="http://schemas.microsoft.com/office/drawing/2010/main" xmlns="" w="9525">
+                  <a14:hiddenLine xmlns="" xmlns:a14="http://schemas.microsoft.com/office/drawing/2010/main" w="9525">
                     <a:solidFill>
                       <a:srgbClr val="000000"/>
                     </a:solidFill>
@@ -12321,7 +12315,7 @@
               </a:ln>
               <a:extLst>
                 <a:ext uri="{91240B29-F687-4f45-9708-019B960494DF}">
-                  <a14:hiddenLine xmlns:a14="http://schemas.microsoft.com/office/drawing/2010/main" xmlns="" w="9525">
+                  <a14:hiddenLine xmlns="" xmlns:a14="http://schemas.microsoft.com/office/drawing/2010/main" w="9525">
                     <a:solidFill>
                       <a:srgbClr val="000000"/>
                     </a:solidFill>
@@ -12411,7 +12405,7 @@
               </a:ln>
               <a:extLst>
                 <a:ext uri="{91240B29-F687-4f45-9708-019B960494DF}">
-                  <a14:hiddenLine xmlns:a14="http://schemas.microsoft.com/office/drawing/2010/main" xmlns="" w="9525">
+                  <a14:hiddenLine xmlns="" xmlns:a14="http://schemas.microsoft.com/office/drawing/2010/main" w="9525">
                     <a:solidFill>
                       <a:srgbClr val="000000"/>
                     </a:solidFill>
@@ -12445,7 +12439,7 @@
               </a:ln>
               <a:extLst>
                 <a:ext uri="{91240B29-F687-4f45-9708-019B960494DF}">
-                  <a14:hiddenLine xmlns:a14="http://schemas.microsoft.com/office/drawing/2010/main" xmlns="" w="9525">
+                  <a14:hiddenLine xmlns="" xmlns:a14="http://schemas.microsoft.com/office/drawing/2010/main" w="9525">
                     <a:solidFill>
                       <a:srgbClr val="000000"/>
                     </a:solidFill>
@@ -13137,7 +13131,7 @@
           <a:p>
             <a:r>
               <a:rPr lang="en-US" dirty="0"/>
-              <a:t>Lab 1 – part 2</a:t>
+              <a:t>Lab 1 – Part 2</a:t>
             </a:r>
           </a:p>
         </p:txBody>
@@ -13160,32 +13154,12 @@
         </p:nvSpPr>
         <p:spPr/>
         <p:txBody>
-          <a:bodyPr>
-            <a:normAutofit fontScale="92500" lnSpcReduction="10000"/>
-          </a:bodyPr>
+          <a:bodyPr/>
           <a:lstStyle/>
           <a:p>
             <a:r>
               <a:rPr lang="en-US" dirty="0"/>
-              <a:t>Init a new local repository</a:t>
-            </a:r>
-          </a:p>
-          <a:p>
-            <a:r>
-              <a:rPr lang="en-US" dirty="0"/>
-              <a:t>Add file to be staged</a:t>
-            </a:r>
-          </a:p>
-          <a:p>
-            <a:r>
-              <a:rPr lang="en-US" dirty="0"/>
-              <a:t>Commit file</a:t>
-            </a:r>
-          </a:p>
-          <a:p>
-            <a:r>
-              <a:rPr lang="en-US" dirty="0"/>
-              <a:t>Create a new, empty repository in </a:t>
+              <a:t>Create another repository in </a:t>
             </a:r>
             <a:r>
               <a:rPr lang="en-US" dirty="0" err="1"/>
@@ -13194,15 +13168,10 @@
             <a:endParaRPr lang="en-US" dirty="0"/>
           </a:p>
           <a:p>
+            <a:pPr lvl="1"/>
             <a:r>
               <a:rPr lang="en-US" dirty="0"/>
-              <a:t>Add remote repository as upstream</a:t>
-            </a:r>
-          </a:p>
-          <a:p>
-            <a:r>
-              <a:rPr lang="en-US" dirty="0"/>
-              <a:t>Push repository to </a:t>
+              <a:t>Repository will be initialized by </a:t>
             </a:r>
             <a:r>
               <a:rPr lang="en-US" dirty="0" err="1"/>
@@ -13211,22 +13180,53 @@
             <a:endParaRPr lang="en-US" dirty="0"/>
           </a:p>
           <a:p>
+            <a:pPr lvl="2"/>
             <a:r>
               <a:rPr lang="en-US" dirty="0"/>
-              <a:t>Confirm your local repository exists in </a:t>
-            </a:r>
-            <a:r>
-              <a:rPr lang="en-US" dirty="0" err="1"/>
-              <a:t>github</a:t>
-            </a:r>
-            <a:endParaRPr lang="en-US" dirty="0"/>
+              <a:t>Clone repository</a:t>
+            </a:r>
+          </a:p>
+          <a:p>
+            <a:pPr lvl="2"/>
+            <a:r>
+              <a:rPr lang="en-US" dirty="0"/>
+              <a:t>Create branch</a:t>
+            </a:r>
+          </a:p>
+          <a:p>
+            <a:pPr lvl="2"/>
+            <a:r>
+              <a:rPr lang="en-US" dirty="0"/>
+              <a:t>Make change</a:t>
+            </a:r>
+          </a:p>
+          <a:p>
+            <a:pPr lvl="2"/>
+            <a:r>
+              <a:rPr lang="en-US" dirty="0"/>
+              <a:t>Commit change</a:t>
+            </a:r>
+          </a:p>
+          <a:p>
+            <a:pPr lvl="2"/>
+            <a:r>
+              <a:rPr lang="en-US" dirty="0"/>
+              <a:t>Push</a:t>
+            </a:r>
+          </a:p>
+          <a:p>
+            <a:pPr lvl="2"/>
+            <a:r>
+              <a:rPr lang="en-US" dirty="0"/>
+              <a:t>Merge branch</a:t>
+            </a:r>
           </a:p>
         </p:txBody>
       </p:sp>
     </p:spTree>
     <p:extLst>
       <p:ext uri="{BB962C8B-B14F-4D97-AF65-F5344CB8AC3E}">
-        <p14:creationId xmlns:p14="http://schemas.microsoft.com/office/powerpoint/2010/main" val="509404374"/>
+        <p14:creationId xmlns:p14="http://schemas.microsoft.com/office/powerpoint/2010/main" val="4049689424"/>
       </p:ext>
     </p:extLst>
   </p:cSld>
@@ -13659,151 +13659,6 @@
           <p:cNvPr id="2" name="Title 1">
             <a:extLst>
               <a:ext uri="{FF2B5EF4-FFF2-40B4-BE49-F238E27FC236}">
-                <a16:creationId xmlns:a16="http://schemas.microsoft.com/office/drawing/2014/main" id="{13FC7AF7-A763-46CF-A6AA-353C92C0D8D4}"/>
-              </a:ext>
-            </a:extLst>
-          </p:cNvPr>
-          <p:cNvSpPr>
-            <a:spLocks noGrp="1"/>
-          </p:cNvSpPr>
-          <p:nvPr>
-            <p:ph type="title"/>
-          </p:nvPr>
-        </p:nvSpPr>
-        <p:spPr/>
-        <p:txBody>
-          <a:bodyPr/>
-          <a:lstStyle/>
-          <a:p>
-            <a:r>
-              <a:rPr lang="en-US" dirty="0"/>
-              <a:t>Lab 2</a:t>
-            </a:r>
-          </a:p>
-        </p:txBody>
-      </p:sp>
-      <p:sp>
-        <p:nvSpPr>
-          <p:cNvPr id="3" name="Content Placeholder 2">
-            <a:extLst>
-              <a:ext uri="{FF2B5EF4-FFF2-40B4-BE49-F238E27FC236}">
-                <a16:creationId xmlns:a16="http://schemas.microsoft.com/office/drawing/2014/main" id="{6D08EF2B-6A6E-4390-A8F1-CDC0E1412495}"/>
-              </a:ext>
-            </a:extLst>
-          </p:cNvPr>
-          <p:cNvSpPr>
-            <a:spLocks noGrp="1"/>
-          </p:cNvSpPr>
-          <p:nvPr>
-            <p:ph idx="1"/>
-          </p:nvPr>
-        </p:nvSpPr>
-        <p:spPr/>
-        <p:txBody>
-          <a:bodyPr/>
-          <a:lstStyle/>
-          <a:p>
-            <a:r>
-              <a:rPr lang="en-US" dirty="0"/>
-              <a:t>Create another repository in </a:t>
-            </a:r>
-            <a:r>
-              <a:rPr lang="en-US" dirty="0" err="1"/>
-              <a:t>github</a:t>
-            </a:r>
-            <a:endParaRPr lang="en-US" dirty="0"/>
-          </a:p>
-          <a:p>
-            <a:pPr lvl="1"/>
-            <a:r>
-              <a:rPr lang="en-US" dirty="0"/>
-              <a:t>Repository will be initialized by </a:t>
-            </a:r>
-            <a:r>
-              <a:rPr lang="en-US" dirty="0" err="1"/>
-              <a:t>github</a:t>
-            </a:r>
-            <a:endParaRPr lang="en-US" dirty="0"/>
-          </a:p>
-          <a:p>
-            <a:pPr lvl="2"/>
-            <a:r>
-              <a:rPr lang="en-US" dirty="0"/>
-              <a:t>Clone repository</a:t>
-            </a:r>
-          </a:p>
-          <a:p>
-            <a:pPr lvl="2"/>
-            <a:r>
-              <a:rPr lang="en-US" dirty="0"/>
-              <a:t>Create branch</a:t>
-            </a:r>
-          </a:p>
-          <a:p>
-            <a:pPr lvl="2"/>
-            <a:r>
-              <a:rPr lang="en-US" dirty="0"/>
-              <a:t>Make change</a:t>
-            </a:r>
-          </a:p>
-          <a:p>
-            <a:pPr lvl="2"/>
-            <a:r>
-              <a:rPr lang="en-US" dirty="0"/>
-              <a:t>Commit change</a:t>
-            </a:r>
-          </a:p>
-          <a:p>
-            <a:pPr lvl="2"/>
-            <a:r>
-              <a:rPr lang="en-US" dirty="0"/>
-              <a:t>Push</a:t>
-            </a:r>
-          </a:p>
-          <a:p>
-            <a:pPr lvl="2"/>
-            <a:r>
-              <a:rPr lang="en-US" dirty="0"/>
-              <a:t>Merge branch</a:t>
-            </a:r>
-          </a:p>
-        </p:txBody>
-      </p:sp>
-    </p:spTree>
-    <p:extLst>
-      <p:ext uri="{BB962C8B-B14F-4D97-AF65-F5344CB8AC3E}">
-        <p14:creationId xmlns:p14="http://schemas.microsoft.com/office/powerpoint/2010/main" val="4049689424"/>
-      </p:ext>
-    </p:extLst>
-  </p:cSld>
-  <p:clrMapOvr>
-    <a:masterClrMapping/>
-  </p:clrMapOvr>
-</p:sld>
-</file>
-
-<file path=ppt/slides/slide16.xml><?xml version="1.0" encoding="utf-8"?>
-<p:sld xmlns:a="http://schemas.openxmlformats.org/drawingml/2006/main" xmlns:r="http://schemas.openxmlformats.org/officeDocument/2006/relationships" xmlns:p="http://schemas.openxmlformats.org/presentationml/2006/main">
-  <p:cSld>
-    <p:spTree>
-      <p:nvGrpSpPr>
-        <p:cNvPr id="1" name=""/>
-        <p:cNvGrpSpPr/>
-        <p:nvPr/>
-      </p:nvGrpSpPr>
-      <p:grpSpPr>
-        <a:xfrm>
-          <a:off x="0" y="0"/>
-          <a:ext cx="0" cy="0"/>
-          <a:chOff x="0" y="0"/>
-          <a:chExt cx="0" cy="0"/>
-        </a:xfrm>
-      </p:grpSpPr>
-      <p:sp>
-        <p:nvSpPr>
-          <p:cNvPr id="2" name="Title 1">
-            <a:extLst>
-              <a:ext uri="{FF2B5EF4-FFF2-40B4-BE49-F238E27FC236}">
                 <a16:creationId xmlns:a16="http://schemas.microsoft.com/office/drawing/2014/main" id="{6DD14019-48D1-41B6-A0B1-4EF1A8F1E48D}"/>
               </a:ext>
             </a:extLst>
@@ -13898,7 +13753,7 @@
 </p:sld>
 </file>
 
-<file path=ppt/slides/slide17.xml><?xml version="1.0" encoding="utf-8"?>
+<file path=ppt/slides/slide16.xml><?xml version="1.0" encoding="utf-8"?>
 <p:sld xmlns:a="http://schemas.openxmlformats.org/drawingml/2006/main" xmlns:r="http://schemas.openxmlformats.org/officeDocument/2006/relationships" xmlns:p="http://schemas.openxmlformats.org/presentationml/2006/main">
   <p:cSld>
     <p:spTree>
@@ -13938,7 +13793,7 @@
           <a:p>
             <a:r>
               <a:rPr lang="en-US" dirty="0"/>
-              <a:t>Lab 3</a:t>
+              <a:t>Lab 2</a:t>
             </a:r>
           </a:p>
         </p:txBody>
@@ -13980,7 +13835,7 @@
             <a:pPr lvl="1"/>
             <a:r>
               <a:rPr lang="en-US" dirty="0"/>
-              <a:t>Use the second repository we created as our starting point</a:t>
+              <a:t>Use the repository we created as our starting point</a:t>
             </a:r>
           </a:p>
           <a:p>
@@ -14068,7 +13923,7 @@
 </p:sld>
 </file>
 
-<file path=ppt/slides/slide18.xml><?xml version="1.0" encoding="utf-8"?>
+<file path=ppt/slides/slide17.xml><?xml version="1.0" encoding="utf-8"?>
 <p:sld xmlns:a="http://schemas.openxmlformats.org/drawingml/2006/main" xmlns:r="http://schemas.openxmlformats.org/officeDocument/2006/relationships" xmlns:p="http://schemas.openxmlformats.org/presentationml/2006/main">
   <p:cSld>
     <p:spTree>
@@ -14161,7 +14016,7 @@
 </p:sld>
 </file>
 
-<file path=ppt/slides/slide19.xml><?xml version="1.0" encoding="utf-8"?>
+<file path=ppt/slides/slide18.xml><?xml version="1.0" encoding="utf-8"?>
 <p:sld xmlns:a="http://schemas.openxmlformats.org/drawingml/2006/main" xmlns:r="http://schemas.openxmlformats.org/officeDocument/2006/relationships" xmlns:p="http://schemas.openxmlformats.org/presentationml/2006/main">
   <p:cSld>
     <p:spTree>
@@ -14254,241 +14109,7 @@
 </p:sld>
 </file>
 
-<file path=ppt/slides/slide2.xml><?xml version="1.0" encoding="utf-8"?>
-<p:sld xmlns:a="http://schemas.openxmlformats.org/drawingml/2006/main" xmlns:r="http://schemas.openxmlformats.org/officeDocument/2006/relationships" xmlns:p="http://schemas.openxmlformats.org/presentationml/2006/main">
-  <p:cSld>
-    <p:spTree>
-      <p:nvGrpSpPr>
-        <p:cNvPr id="1" name=""/>
-        <p:cNvGrpSpPr/>
-        <p:nvPr/>
-      </p:nvGrpSpPr>
-      <p:grpSpPr>
-        <a:xfrm>
-          <a:off x="0" y="0"/>
-          <a:ext cx="0" cy="0"/>
-          <a:chOff x="0" y="0"/>
-          <a:chExt cx="0" cy="0"/>
-        </a:xfrm>
-      </p:grpSpPr>
-      <p:sp>
-        <p:nvSpPr>
-          <p:cNvPr id="2" name="Title 1">
-            <a:extLst>
-              <a:ext uri="{FF2B5EF4-FFF2-40B4-BE49-F238E27FC236}">
-                <a16:creationId xmlns:a16="http://schemas.microsoft.com/office/drawing/2014/main" id="{34DB6CE4-2B13-4715-B5B2-615A55922CA1}"/>
-              </a:ext>
-            </a:extLst>
-          </p:cNvPr>
-          <p:cNvSpPr>
-            <a:spLocks noGrp="1"/>
-          </p:cNvSpPr>
-          <p:nvPr>
-            <p:ph type="title"/>
-          </p:nvPr>
-        </p:nvSpPr>
-        <p:spPr/>
-        <p:txBody>
-          <a:bodyPr>
-            <a:normAutofit/>
-          </a:bodyPr>
-          <a:lstStyle/>
-          <a:p>
-            <a:r>
-              <a:rPr lang="en-US" sz="4400" dirty="0">
-                <a:latin typeface="Rockwell" panose="02060603020205020403" pitchFamily="18" charset="0"/>
-              </a:rPr>
-              <a:t>Initial resources and Introductions</a:t>
-            </a:r>
-          </a:p>
-        </p:txBody>
-      </p:sp>
-      <p:sp>
-        <p:nvSpPr>
-          <p:cNvPr id="3" name="Content Placeholder 2">
-            <a:extLst>
-              <a:ext uri="{FF2B5EF4-FFF2-40B4-BE49-F238E27FC236}">
-                <a16:creationId xmlns:a16="http://schemas.microsoft.com/office/drawing/2014/main" id="{143F5361-68C0-4BF5-80C8-F1E7BF92B2DB}"/>
-              </a:ext>
-            </a:extLst>
-          </p:cNvPr>
-          <p:cNvSpPr>
-            <a:spLocks noGrp="1"/>
-          </p:cNvSpPr>
-          <p:nvPr>
-            <p:ph idx="1"/>
-          </p:nvPr>
-        </p:nvSpPr>
-        <p:spPr>
-          <a:xfrm>
-            <a:off x="1141412" y="2249487"/>
-            <a:ext cx="9905999" cy="4126146"/>
-          </a:xfrm>
-        </p:spPr>
-        <p:txBody>
-          <a:bodyPr>
-            <a:normAutofit fontScale="92500" lnSpcReduction="20000"/>
-          </a:bodyPr>
-          <a:lstStyle/>
-          <a:p>
-            <a:r>
-              <a:rPr lang="en-US" dirty="0">
-                <a:latin typeface="Tahoma" panose="020B0604030504040204" pitchFamily="34" charset="0"/>
-                <a:ea typeface="Tahoma" panose="020B0604030504040204" pitchFamily="34" charset="0"/>
-                <a:cs typeface="Tahoma" panose="020B0604030504040204" pitchFamily="34" charset="0"/>
-                <a:hlinkClick r:id="rId2">
-                  <a:extLst>
-                    <a:ext uri="{A12FA001-AC4F-418D-AE19-62706E023703}">
-                      <ahyp:hlinkClr xmlns:ahyp="http://schemas.microsoft.com/office/drawing/2018/hyperlinkcolor" val="tx"/>
-                    </a:ext>
-                  </a:extLst>
-                </a:hlinkClick>
-              </a:rPr>
-              <a:t>https://github.zach-martin.com</a:t>
-            </a:r>
-            <a:endParaRPr lang="en-US" dirty="0">
-              <a:latin typeface="Tahoma" panose="020B0604030504040204" pitchFamily="34" charset="0"/>
-              <a:ea typeface="Tahoma" panose="020B0604030504040204" pitchFamily="34" charset="0"/>
-              <a:cs typeface="Tahoma" panose="020B0604030504040204" pitchFamily="34" charset="0"/>
-            </a:endParaRPr>
-          </a:p>
-          <a:p>
-            <a:pPr lvl="1"/>
-            <a:r>
-              <a:rPr lang="en-US" dirty="0">
-                <a:latin typeface="Tahoma" panose="020B0604030504040204" pitchFamily="34" charset="0"/>
-                <a:ea typeface="Tahoma" panose="020B0604030504040204" pitchFamily="34" charset="0"/>
-                <a:cs typeface="Tahoma" panose="020B0604030504040204" pitchFamily="34" charset="0"/>
-              </a:rPr>
-              <a:t>Download and install git-</a:t>
-            </a:r>
-            <a:r>
-              <a:rPr lang="en-US" dirty="0" err="1">
-                <a:latin typeface="Tahoma" panose="020B0604030504040204" pitchFamily="34" charset="0"/>
-                <a:ea typeface="Tahoma" panose="020B0604030504040204" pitchFamily="34" charset="0"/>
-                <a:cs typeface="Tahoma" panose="020B0604030504040204" pitchFamily="34" charset="0"/>
-              </a:rPr>
-              <a:t>scm</a:t>
-            </a:r>
-            <a:r>
-              <a:rPr lang="en-US" dirty="0">
-                <a:latin typeface="Tahoma" panose="020B0604030504040204" pitchFamily="34" charset="0"/>
-                <a:ea typeface="Tahoma" panose="020B0604030504040204" pitchFamily="34" charset="0"/>
-                <a:cs typeface="Tahoma" panose="020B0604030504040204" pitchFamily="34" charset="0"/>
-              </a:rPr>
-              <a:t> for your OS</a:t>
-            </a:r>
-          </a:p>
-          <a:p>
-            <a:pPr lvl="1"/>
-            <a:r>
-              <a:rPr lang="en-US" dirty="0">
-                <a:latin typeface="Tahoma" panose="020B0604030504040204" pitchFamily="34" charset="0"/>
-                <a:ea typeface="Tahoma" panose="020B0604030504040204" pitchFamily="34" charset="0"/>
-                <a:cs typeface="Tahoma" panose="020B0604030504040204" pitchFamily="34" charset="0"/>
-              </a:rPr>
-              <a:t>Download and install GitHub Desktop</a:t>
-            </a:r>
-          </a:p>
-          <a:p>
-            <a:pPr lvl="1"/>
-            <a:r>
-              <a:rPr lang="en-US" dirty="0">
-                <a:latin typeface="Tahoma" panose="020B0604030504040204" pitchFamily="34" charset="0"/>
-                <a:ea typeface="Tahoma" panose="020B0604030504040204" pitchFamily="34" charset="0"/>
-                <a:cs typeface="Tahoma" panose="020B0604030504040204" pitchFamily="34" charset="0"/>
-              </a:rPr>
-              <a:t>Download and install Visual Studio Code</a:t>
-            </a:r>
-          </a:p>
-          <a:p>
-            <a:pPr marL="0" indent="0">
-              <a:buNone/>
-            </a:pPr>
-            <a:r>
-              <a:rPr lang="en-US" dirty="0">
-                <a:latin typeface="Tahoma" panose="020B0604030504040204" pitchFamily="34" charset="0"/>
-                <a:ea typeface="Tahoma" panose="020B0604030504040204" pitchFamily="34" charset="0"/>
-                <a:cs typeface="Tahoma" panose="020B0604030504040204" pitchFamily="34" charset="0"/>
-              </a:rPr>
-              <a:t>While that is downloading… A quick introduction and question –</a:t>
-            </a:r>
-          </a:p>
-          <a:p>
-            <a:pPr marL="0" indent="0">
-              <a:buNone/>
-            </a:pPr>
-            <a:r>
-              <a:rPr lang="en-US" dirty="0">
-                <a:latin typeface="Tahoma" panose="020B0604030504040204" pitchFamily="34" charset="0"/>
-                <a:ea typeface="Tahoma" panose="020B0604030504040204" pitchFamily="34" charset="0"/>
-                <a:cs typeface="Tahoma" panose="020B0604030504040204" pitchFamily="34" charset="0"/>
-              </a:rPr>
-              <a:t>    Zach Martin</a:t>
-            </a:r>
-          </a:p>
-          <a:p>
-            <a:pPr lvl="1"/>
-            <a:r>
-              <a:rPr lang="en-US" dirty="0">
-                <a:latin typeface="Tahoma" panose="020B0604030504040204" pitchFamily="34" charset="0"/>
-                <a:ea typeface="Tahoma" panose="020B0604030504040204" pitchFamily="34" charset="0"/>
-                <a:cs typeface="Tahoma" panose="020B0604030504040204" pitchFamily="34" charset="0"/>
-              </a:rPr>
-              <a:t>14 years IT experience</a:t>
-            </a:r>
-          </a:p>
-          <a:p>
-            <a:pPr lvl="1"/>
-            <a:r>
-              <a:rPr lang="en-US" dirty="0">
-                <a:latin typeface="Tahoma" panose="020B0604030504040204" pitchFamily="34" charset="0"/>
-                <a:ea typeface="Tahoma" panose="020B0604030504040204" pitchFamily="34" charset="0"/>
-                <a:cs typeface="Tahoma" panose="020B0604030504040204" pitchFamily="34" charset="0"/>
-              </a:rPr>
-              <a:t>4 years professional software development experience</a:t>
-            </a:r>
-          </a:p>
-          <a:p>
-            <a:pPr lvl="1"/>
-            <a:r>
-              <a:rPr lang="en-US" dirty="0">
-                <a:latin typeface="Tahoma" panose="020B0604030504040204" pitchFamily="34" charset="0"/>
-                <a:ea typeface="Tahoma" panose="020B0604030504040204" pitchFamily="34" charset="0"/>
-                <a:cs typeface="Tahoma" panose="020B0604030504040204" pitchFamily="34" charset="0"/>
-              </a:rPr>
-              <a:t>Father to a six-month-old baby girl</a:t>
-            </a:r>
-          </a:p>
-          <a:p>
-            <a:pPr marL="0" indent="0">
-              <a:buNone/>
-            </a:pPr>
-            <a:r>
-              <a:rPr lang="en-US" dirty="0">
-                <a:latin typeface="Tahoma" panose="020B0604030504040204" pitchFamily="34" charset="0"/>
-                <a:ea typeface="Tahoma" panose="020B0604030504040204" pitchFamily="34" charset="0"/>
-                <a:cs typeface="Tahoma" panose="020B0604030504040204" pitchFamily="34" charset="0"/>
-              </a:rPr>
-              <a:t>What do you hope to learn today?</a:t>
-            </a:r>
-          </a:p>
-        </p:txBody>
-      </p:sp>
-    </p:spTree>
-    <p:extLst>
-      <p:ext uri="{BB962C8B-B14F-4D97-AF65-F5344CB8AC3E}">
-        <p14:creationId xmlns:p14="http://schemas.microsoft.com/office/powerpoint/2010/main" val="2172179498"/>
-      </p:ext>
-    </p:extLst>
-  </p:cSld>
-  <p:clrMapOvr>
-    <a:masterClrMapping/>
-  </p:clrMapOvr>
-</p:sld>
-</file>
-
-<file path=ppt/slides/slide20.xml><?xml version="1.0" encoding="utf-8"?>
+<file path=ppt/slides/slide19.xml><?xml version="1.0" encoding="utf-8"?>
 <p:sld xmlns:a="http://schemas.openxmlformats.org/drawingml/2006/main" xmlns:r="http://schemas.openxmlformats.org/officeDocument/2006/relationships" xmlns:p="http://schemas.openxmlformats.org/presentationml/2006/main">
   <p:cSld>
     <p:spTree>
@@ -14581,7 +14202,7 @@
 </p:sld>
 </file>
 
-<file path=ppt/slides/slide21.xml><?xml version="1.0" encoding="utf-8"?>
+<file path=ppt/slides/slide2.xml><?xml version="1.0" encoding="utf-8"?>
 <p:sld xmlns:a="http://schemas.openxmlformats.org/drawingml/2006/main" xmlns:r="http://schemas.openxmlformats.org/officeDocument/2006/relationships" xmlns:p="http://schemas.openxmlformats.org/presentationml/2006/main">
   <p:cSld>
     <p:spTree>
@@ -14603,7 +14224,7 @@
           <p:cNvPr id="2" name="Title 1">
             <a:extLst>
               <a:ext uri="{FF2B5EF4-FFF2-40B4-BE49-F238E27FC236}">
-                <a16:creationId xmlns:a16="http://schemas.microsoft.com/office/drawing/2014/main" id="{4D1E3FC3-B062-491B-A8A4-DA3269C9306E}"/>
+                <a16:creationId xmlns:a16="http://schemas.microsoft.com/office/drawing/2014/main" id="{34DB6CE4-2B13-4715-B5B2-615A55922CA1}"/>
               </a:ext>
             </a:extLst>
           </p:cNvPr>
@@ -14616,55 +14237,183 @@
         </p:nvSpPr>
         <p:spPr/>
         <p:txBody>
-          <a:bodyPr/>
+          <a:bodyPr>
+            <a:normAutofit/>
+          </a:bodyPr>
           <a:lstStyle/>
           <a:p>
             <a:r>
-              <a:rPr lang="en-US" dirty="0"/>
-              <a:t>Rebase – Tread carefully (Cont.)</a:t>
+              <a:rPr lang="en-US" sz="4400" dirty="0">
+                <a:latin typeface="Rockwell" panose="02060603020205020403" pitchFamily="18" charset="0"/>
+              </a:rPr>
+              <a:t>Initial resources and Introductions</a:t>
             </a:r>
           </a:p>
         </p:txBody>
       </p:sp>
-      <p:pic>
-        <p:nvPicPr>
-          <p:cNvPr id="5" name="Content Placeholder 4">
+      <p:sp>
+        <p:nvSpPr>
+          <p:cNvPr id="3" name="Content Placeholder 2">
             <a:extLst>
               <a:ext uri="{FF2B5EF4-FFF2-40B4-BE49-F238E27FC236}">
-                <a16:creationId xmlns:a16="http://schemas.microsoft.com/office/drawing/2014/main" id="{64E11DB0-6AC1-4186-A39B-69210812F4F5}"/>
+                <a16:creationId xmlns:a16="http://schemas.microsoft.com/office/drawing/2014/main" id="{143F5361-68C0-4BF5-80C8-F1E7BF92B2DB}"/>
               </a:ext>
             </a:extLst>
           </p:cNvPr>
-          <p:cNvPicPr>
-            <a:picLocks noGrp="1" noChangeAspect="1"/>
-          </p:cNvPicPr>
+          <p:cNvSpPr>
+            <a:spLocks noGrp="1"/>
+          </p:cNvSpPr>
           <p:nvPr>
             <p:ph idx="1"/>
           </p:nvPr>
-        </p:nvPicPr>
-        <p:blipFill>
-          <a:blip r:embed="rId2">
-            <a:extLst>
-              <a:ext uri="{96DAC541-7B7A-43D3-8B79-37D633B846F1}">
-                <asvg:svgBlip xmlns:asvg="http://schemas.microsoft.com/office/drawing/2016/SVG/main" r:embed="rId3"/>
-              </a:ext>
-            </a:extLst>
-          </a:blip>
-          <a:stretch>
-            <a:fillRect/>
-          </a:stretch>
-        </p:blipFill>
+        </p:nvSpPr>
         <p:spPr>
           <a:xfrm>
-            <a:off x="3490213" y="2249488"/>
-            <a:ext cx="5208400" cy="3541712"/>
+            <a:off x="1141412" y="2249487"/>
+            <a:ext cx="9905999" cy="4126146"/>
           </a:xfrm>
         </p:spPr>
-      </p:pic>
+        <p:txBody>
+          <a:bodyPr>
+            <a:normAutofit lnSpcReduction="10000"/>
+          </a:bodyPr>
+          <a:lstStyle/>
+          <a:p>
+            <a:r>
+              <a:rPr lang="en-US" dirty="0">
+                <a:latin typeface="Tahoma" panose="020B0604030504040204" pitchFamily="34" charset="0"/>
+                <a:ea typeface="Tahoma" panose="020B0604030504040204" pitchFamily="34" charset="0"/>
+                <a:cs typeface="Tahoma" panose="020B0604030504040204" pitchFamily="34" charset="0"/>
+                <a:hlinkClick r:id="rId2">
+                  <a:extLst>
+                    <a:ext uri="{A12FA001-AC4F-418D-AE19-62706E023703}">
+                      <ahyp:hlinkClr xmlns:ahyp="http://schemas.microsoft.com/office/drawing/2018/hyperlinkcolor" val="tx"/>
+                    </a:ext>
+                  </a:extLst>
+                </a:hlinkClick>
+              </a:rPr>
+              <a:t>https://github.zach-martin.com</a:t>
+            </a:r>
+            <a:endParaRPr lang="en-US" dirty="0">
+              <a:latin typeface="Tahoma" panose="020B0604030504040204" pitchFamily="34" charset="0"/>
+              <a:ea typeface="Tahoma" panose="020B0604030504040204" pitchFamily="34" charset="0"/>
+              <a:cs typeface="Tahoma" panose="020B0604030504040204" pitchFamily="34" charset="0"/>
+            </a:endParaRPr>
+          </a:p>
+          <a:p>
+            <a:pPr lvl="1"/>
+            <a:r>
+              <a:rPr lang="en-US" dirty="0">
+                <a:latin typeface="Tahoma" panose="020B0604030504040204" pitchFamily="34" charset="0"/>
+                <a:ea typeface="Tahoma" panose="020B0604030504040204" pitchFamily="34" charset="0"/>
+                <a:cs typeface="Tahoma" panose="020B0604030504040204" pitchFamily="34" charset="0"/>
+              </a:rPr>
+              <a:t>Download Visual Studio Code</a:t>
+            </a:r>
+          </a:p>
+          <a:p>
+            <a:pPr lvl="1"/>
+            <a:r>
+              <a:rPr lang="en-US" dirty="0">
+                <a:latin typeface="Tahoma" panose="020B0604030504040204" pitchFamily="34" charset="0"/>
+                <a:ea typeface="Tahoma" panose="020B0604030504040204" pitchFamily="34" charset="0"/>
+                <a:cs typeface="Tahoma" panose="020B0604030504040204" pitchFamily="34" charset="0"/>
+              </a:rPr>
+              <a:t>Download git-</a:t>
+            </a:r>
+            <a:r>
+              <a:rPr lang="en-US" dirty="0" err="1">
+                <a:latin typeface="Tahoma" panose="020B0604030504040204" pitchFamily="34" charset="0"/>
+                <a:ea typeface="Tahoma" panose="020B0604030504040204" pitchFamily="34" charset="0"/>
+                <a:cs typeface="Tahoma" panose="020B0604030504040204" pitchFamily="34" charset="0"/>
+              </a:rPr>
+              <a:t>scm</a:t>
+            </a:r>
+            <a:r>
+              <a:rPr lang="en-US" dirty="0">
+                <a:latin typeface="Tahoma" panose="020B0604030504040204" pitchFamily="34" charset="0"/>
+                <a:ea typeface="Tahoma" panose="020B0604030504040204" pitchFamily="34" charset="0"/>
+                <a:cs typeface="Tahoma" panose="020B0604030504040204" pitchFamily="34" charset="0"/>
+              </a:rPr>
+              <a:t> for your OS</a:t>
+            </a:r>
+          </a:p>
+          <a:p>
+            <a:pPr lvl="1"/>
+            <a:r>
+              <a:rPr lang="en-US" dirty="0">
+                <a:latin typeface="Tahoma" panose="020B0604030504040204" pitchFamily="34" charset="0"/>
+                <a:ea typeface="Tahoma" panose="020B0604030504040204" pitchFamily="34" charset="0"/>
+                <a:cs typeface="Tahoma" panose="020B0604030504040204" pitchFamily="34" charset="0"/>
+              </a:rPr>
+              <a:t>Download GitHub Desktop</a:t>
+            </a:r>
+          </a:p>
+          <a:p>
+            <a:pPr marL="0" indent="0">
+              <a:buNone/>
+            </a:pPr>
+            <a:r>
+              <a:rPr lang="en-US" dirty="0">
+                <a:latin typeface="Tahoma" panose="020B0604030504040204" pitchFamily="34" charset="0"/>
+                <a:ea typeface="Tahoma" panose="020B0604030504040204" pitchFamily="34" charset="0"/>
+                <a:cs typeface="Tahoma" panose="020B0604030504040204" pitchFamily="34" charset="0"/>
+              </a:rPr>
+              <a:t>While that is downloading… A quick introduction –</a:t>
+            </a:r>
+          </a:p>
+          <a:p>
+            <a:pPr marL="0" indent="0">
+              <a:buNone/>
+            </a:pPr>
+            <a:r>
+              <a:rPr lang="en-US" dirty="0">
+                <a:latin typeface="Tahoma" panose="020B0604030504040204" pitchFamily="34" charset="0"/>
+                <a:ea typeface="Tahoma" panose="020B0604030504040204" pitchFamily="34" charset="0"/>
+                <a:cs typeface="Tahoma" panose="020B0604030504040204" pitchFamily="34" charset="0"/>
+              </a:rPr>
+              <a:t>    Zach Martin</a:t>
+            </a:r>
+          </a:p>
+          <a:p>
+            <a:pPr lvl="1"/>
+            <a:r>
+              <a:rPr lang="en-US" dirty="0">
+                <a:latin typeface="Tahoma" panose="020B0604030504040204" pitchFamily="34" charset="0"/>
+                <a:ea typeface="Tahoma" panose="020B0604030504040204" pitchFamily="34" charset="0"/>
+                <a:cs typeface="Tahoma" panose="020B0604030504040204" pitchFamily="34" charset="0"/>
+              </a:rPr>
+              <a:t>14 years IT experience</a:t>
+            </a:r>
+          </a:p>
+          <a:p>
+            <a:pPr lvl="1"/>
+            <a:r>
+              <a:rPr lang="en-US" dirty="0">
+                <a:latin typeface="Tahoma" panose="020B0604030504040204" pitchFamily="34" charset="0"/>
+                <a:ea typeface="Tahoma" panose="020B0604030504040204" pitchFamily="34" charset="0"/>
+                <a:cs typeface="Tahoma" panose="020B0604030504040204" pitchFamily="34" charset="0"/>
+              </a:rPr>
+              <a:t>4 years professional software development experience</a:t>
+            </a:r>
+          </a:p>
+          <a:p>
+            <a:pPr lvl="1"/>
+            <a:r>
+              <a:rPr lang="en-US" dirty="0">
+                <a:latin typeface="Tahoma" panose="020B0604030504040204" pitchFamily="34" charset="0"/>
+                <a:ea typeface="Tahoma" panose="020B0604030504040204" pitchFamily="34" charset="0"/>
+                <a:cs typeface="Tahoma" panose="020B0604030504040204" pitchFamily="34" charset="0"/>
+              </a:rPr>
+              <a:t>Father to a six-month-old baby girl</a:t>
+            </a:r>
+          </a:p>
+        </p:txBody>
+      </p:sp>
     </p:spTree>
     <p:extLst>
       <p:ext uri="{BB962C8B-B14F-4D97-AF65-F5344CB8AC3E}">
-        <p14:creationId xmlns:p14="http://schemas.microsoft.com/office/powerpoint/2010/main" val="1640133883"/>
+        <p14:creationId xmlns:p14="http://schemas.microsoft.com/office/powerpoint/2010/main" val="2172179498"/>
       </p:ext>
     </p:extLst>
   </p:cSld>
@@ -14674,351 +14423,7 @@
 </p:sld>
 </file>
 
-<file path=ppt/slides/slide22.xml><?xml version="1.0" encoding="utf-8"?>
-<p:sld xmlns:a="http://schemas.openxmlformats.org/drawingml/2006/main" xmlns:r="http://schemas.openxmlformats.org/officeDocument/2006/relationships" xmlns:p="http://schemas.openxmlformats.org/presentationml/2006/main">
-  <p:cSld>
-    <p:spTree>
-      <p:nvGrpSpPr>
-        <p:cNvPr id="1" name=""/>
-        <p:cNvGrpSpPr/>
-        <p:nvPr/>
-      </p:nvGrpSpPr>
-      <p:grpSpPr>
-        <a:xfrm>
-          <a:off x="0" y="0"/>
-          <a:ext cx="0" cy="0"/>
-          <a:chOff x="0" y="0"/>
-          <a:chExt cx="0" cy="0"/>
-        </a:xfrm>
-      </p:grpSpPr>
-      <p:sp>
-        <p:nvSpPr>
-          <p:cNvPr id="2" name="Title 1">
-            <a:extLst>
-              <a:ext uri="{FF2B5EF4-FFF2-40B4-BE49-F238E27FC236}">
-                <a16:creationId xmlns:a16="http://schemas.microsoft.com/office/drawing/2014/main" id="{4D1E3FC3-B062-491B-A8A4-DA3269C9306E}"/>
-              </a:ext>
-            </a:extLst>
-          </p:cNvPr>
-          <p:cNvSpPr>
-            <a:spLocks noGrp="1"/>
-          </p:cNvSpPr>
-          <p:nvPr>
-            <p:ph type="title"/>
-          </p:nvPr>
-        </p:nvSpPr>
-        <p:spPr/>
-        <p:txBody>
-          <a:bodyPr/>
-          <a:lstStyle/>
-          <a:p>
-            <a:r>
-              <a:rPr lang="en-US" dirty="0"/>
-              <a:t>Rebase – Tread carefully (Cont.)</a:t>
-            </a:r>
-          </a:p>
-        </p:txBody>
-      </p:sp>
-      <p:pic>
-        <p:nvPicPr>
-          <p:cNvPr id="5" name="Content Placeholder 4">
-            <a:extLst>
-              <a:ext uri="{FF2B5EF4-FFF2-40B4-BE49-F238E27FC236}">
-                <a16:creationId xmlns:a16="http://schemas.microsoft.com/office/drawing/2014/main" id="{B1EB7AC1-504D-46E2-90A0-B435C3875EB3}"/>
-              </a:ext>
-            </a:extLst>
-          </p:cNvPr>
-          <p:cNvPicPr>
-            <a:picLocks noGrp="1" noChangeAspect="1"/>
-          </p:cNvPicPr>
-          <p:nvPr>
-            <p:ph idx="1"/>
-          </p:nvPr>
-        </p:nvPicPr>
-        <p:blipFill>
-          <a:blip r:embed="rId2">
-            <a:extLst>
-              <a:ext uri="{96DAC541-7B7A-43D3-8B79-37D633B846F1}">
-                <asvg:svgBlip xmlns:asvg="http://schemas.microsoft.com/office/drawing/2016/SVG/main" r:embed="rId3"/>
-              </a:ext>
-            </a:extLst>
-          </a:blip>
-          <a:stretch>
-            <a:fillRect/>
-          </a:stretch>
-        </p:blipFill>
-        <p:spPr>
-          <a:xfrm>
-            <a:off x="3441445" y="2249488"/>
-            <a:ext cx="5305935" cy="3541712"/>
-          </a:xfrm>
-        </p:spPr>
-      </p:pic>
-    </p:spTree>
-    <p:extLst>
-      <p:ext uri="{BB962C8B-B14F-4D97-AF65-F5344CB8AC3E}">
-        <p14:creationId xmlns:p14="http://schemas.microsoft.com/office/powerpoint/2010/main" val="3306451159"/>
-      </p:ext>
-    </p:extLst>
-  </p:cSld>
-  <p:clrMapOvr>
-    <a:masterClrMapping/>
-  </p:clrMapOvr>
-</p:sld>
-</file>
-
-<file path=ppt/slides/slide23.xml><?xml version="1.0" encoding="utf-8"?>
-<p:sld xmlns:a="http://schemas.openxmlformats.org/drawingml/2006/main" xmlns:r="http://schemas.openxmlformats.org/officeDocument/2006/relationships" xmlns:p="http://schemas.openxmlformats.org/presentationml/2006/main">
-  <p:cSld>
-    <p:spTree>
-      <p:nvGrpSpPr>
-        <p:cNvPr id="1" name=""/>
-        <p:cNvGrpSpPr/>
-        <p:nvPr/>
-      </p:nvGrpSpPr>
-      <p:grpSpPr>
-        <a:xfrm>
-          <a:off x="0" y="0"/>
-          <a:ext cx="0" cy="0"/>
-          <a:chOff x="0" y="0"/>
-          <a:chExt cx="0" cy="0"/>
-        </a:xfrm>
-      </p:grpSpPr>
-      <p:sp>
-        <p:nvSpPr>
-          <p:cNvPr id="2" name="Title 1">
-            <a:extLst>
-              <a:ext uri="{FF2B5EF4-FFF2-40B4-BE49-F238E27FC236}">
-                <a16:creationId xmlns:a16="http://schemas.microsoft.com/office/drawing/2014/main" id="{4D1E3FC3-B062-491B-A8A4-DA3269C9306E}"/>
-              </a:ext>
-            </a:extLst>
-          </p:cNvPr>
-          <p:cNvSpPr>
-            <a:spLocks noGrp="1"/>
-          </p:cNvSpPr>
-          <p:nvPr>
-            <p:ph type="title"/>
-          </p:nvPr>
-        </p:nvSpPr>
-        <p:spPr/>
-        <p:txBody>
-          <a:bodyPr/>
-          <a:lstStyle/>
-          <a:p>
-            <a:r>
-              <a:rPr lang="en-US" dirty="0"/>
-              <a:t>Rebase – Tread carefully (Cont.)</a:t>
-            </a:r>
-          </a:p>
-        </p:txBody>
-      </p:sp>
-      <p:pic>
-        <p:nvPicPr>
-          <p:cNvPr id="5" name="Content Placeholder 4">
-            <a:extLst>
-              <a:ext uri="{FF2B5EF4-FFF2-40B4-BE49-F238E27FC236}">
-                <a16:creationId xmlns:a16="http://schemas.microsoft.com/office/drawing/2014/main" id="{36FF0FDA-138B-41CC-848D-5D7457EB5331}"/>
-              </a:ext>
-            </a:extLst>
-          </p:cNvPr>
-          <p:cNvPicPr>
-            <a:picLocks noGrp="1" noChangeAspect="1"/>
-          </p:cNvPicPr>
-          <p:nvPr>
-            <p:ph idx="1"/>
-          </p:nvPr>
-        </p:nvPicPr>
-        <p:blipFill>
-          <a:blip r:embed="rId2">
-            <a:extLst>
-              <a:ext uri="{96DAC541-7B7A-43D3-8B79-37D633B846F1}">
-                <asvg:svgBlip xmlns:asvg="http://schemas.microsoft.com/office/drawing/2016/SVG/main" r:embed="rId3"/>
-              </a:ext>
-            </a:extLst>
-          </a:blip>
-          <a:stretch>
-            <a:fillRect/>
-          </a:stretch>
-        </p:blipFill>
-        <p:spPr>
-          <a:xfrm>
-            <a:off x="3001215" y="2249488"/>
-            <a:ext cx="6186396" cy="3541712"/>
-          </a:xfrm>
-        </p:spPr>
-      </p:pic>
-    </p:spTree>
-    <p:extLst>
-      <p:ext uri="{BB962C8B-B14F-4D97-AF65-F5344CB8AC3E}">
-        <p14:creationId xmlns:p14="http://schemas.microsoft.com/office/powerpoint/2010/main" val="1078706075"/>
-      </p:ext>
-    </p:extLst>
-  </p:cSld>
-  <p:clrMapOvr>
-    <a:masterClrMapping/>
-  </p:clrMapOvr>
-</p:sld>
-</file>
-
-<file path=ppt/slides/slide24.xml><?xml version="1.0" encoding="utf-8"?>
-<p:sld xmlns:a="http://schemas.openxmlformats.org/drawingml/2006/main" xmlns:r="http://schemas.openxmlformats.org/officeDocument/2006/relationships" xmlns:p="http://schemas.openxmlformats.org/presentationml/2006/main">
-  <p:cSld>
-    <p:spTree>
-      <p:nvGrpSpPr>
-        <p:cNvPr id="1" name=""/>
-        <p:cNvGrpSpPr/>
-        <p:nvPr/>
-      </p:nvGrpSpPr>
-      <p:grpSpPr>
-        <a:xfrm>
-          <a:off x="0" y="0"/>
-          <a:ext cx="0" cy="0"/>
-          <a:chOff x="0" y="0"/>
-          <a:chExt cx="0" cy="0"/>
-        </a:xfrm>
-      </p:grpSpPr>
-      <p:sp>
-        <p:nvSpPr>
-          <p:cNvPr id="2" name="Title 1">
-            <a:extLst>
-              <a:ext uri="{FF2B5EF4-FFF2-40B4-BE49-F238E27FC236}">
-                <a16:creationId xmlns:a16="http://schemas.microsoft.com/office/drawing/2014/main" id="{4D1E3FC3-B062-491B-A8A4-DA3269C9306E}"/>
-              </a:ext>
-            </a:extLst>
-          </p:cNvPr>
-          <p:cNvSpPr>
-            <a:spLocks noGrp="1"/>
-          </p:cNvSpPr>
-          <p:nvPr>
-            <p:ph type="title"/>
-          </p:nvPr>
-        </p:nvSpPr>
-        <p:spPr/>
-        <p:txBody>
-          <a:bodyPr/>
-          <a:lstStyle/>
-          <a:p>
-            <a:r>
-              <a:rPr lang="en-US" dirty="0"/>
-              <a:t>Rebase – Tread carefully (Cont.)</a:t>
-            </a:r>
-          </a:p>
-        </p:txBody>
-      </p:sp>
-      <p:pic>
-        <p:nvPicPr>
-          <p:cNvPr id="7" name="Content Placeholder 6">
-            <a:extLst>
-              <a:ext uri="{FF2B5EF4-FFF2-40B4-BE49-F238E27FC236}">
-                <a16:creationId xmlns:a16="http://schemas.microsoft.com/office/drawing/2014/main" id="{11B13900-BED7-4D89-80C8-474625B62595}"/>
-              </a:ext>
-            </a:extLst>
-          </p:cNvPr>
-          <p:cNvPicPr>
-            <a:picLocks noGrp="1" noChangeAspect="1"/>
-          </p:cNvPicPr>
-          <p:nvPr>
-            <p:ph idx="1"/>
-          </p:nvPr>
-        </p:nvPicPr>
-        <p:blipFill>
-          <a:blip r:embed="rId2">
-            <a:extLst>
-              <a:ext uri="{96DAC541-7B7A-43D3-8B79-37D633B846F1}">
-                <asvg:svgBlip xmlns:asvg="http://schemas.microsoft.com/office/drawing/2016/SVG/main" r:embed="rId3"/>
-              </a:ext>
-            </a:extLst>
-          </a:blip>
-          <a:stretch>
-            <a:fillRect/>
-          </a:stretch>
-        </p:blipFill>
-        <p:spPr>
-          <a:xfrm>
-            <a:off x="3768165" y="2249488"/>
-            <a:ext cx="4652495" cy="3541712"/>
-          </a:xfrm>
-        </p:spPr>
-      </p:pic>
-    </p:spTree>
-    <p:extLst>
-      <p:ext uri="{BB962C8B-B14F-4D97-AF65-F5344CB8AC3E}">
-        <p14:creationId xmlns:p14="http://schemas.microsoft.com/office/powerpoint/2010/main" val="3899721011"/>
-      </p:ext>
-    </p:extLst>
-  </p:cSld>
-  <p:clrMapOvr>
-    <a:masterClrMapping/>
-  </p:clrMapOvr>
-</p:sld>
-</file>
-
-<file path=ppt/slides/slide25.xml><?xml version="1.0" encoding="utf-8"?>
-<p:sld xmlns:a="http://schemas.openxmlformats.org/drawingml/2006/main" xmlns:r="http://schemas.openxmlformats.org/officeDocument/2006/relationships" xmlns:p="http://schemas.openxmlformats.org/presentationml/2006/main">
-  <p:cSld>
-    <p:spTree>
-      <p:nvGrpSpPr>
-        <p:cNvPr id="1" name=""/>
-        <p:cNvGrpSpPr/>
-        <p:nvPr/>
-      </p:nvGrpSpPr>
-      <p:grpSpPr>
-        <a:xfrm>
-          <a:off x="0" y="0"/>
-          <a:ext cx="0" cy="0"/>
-          <a:chOff x="0" y="0"/>
-          <a:chExt cx="0" cy="0"/>
-        </a:xfrm>
-      </p:grpSpPr>
-      <p:pic>
-        <p:nvPicPr>
-          <p:cNvPr id="6" name="Content Placeholder 5">
-            <a:extLst>
-              <a:ext uri="{FF2B5EF4-FFF2-40B4-BE49-F238E27FC236}">
-                <a16:creationId xmlns:a16="http://schemas.microsoft.com/office/drawing/2014/main" id="{E3AF817E-6271-450B-B3B1-387D75914F12}"/>
-              </a:ext>
-            </a:extLst>
-          </p:cNvPr>
-          <p:cNvPicPr>
-            <a:picLocks noGrp="1" noChangeAspect="1"/>
-          </p:cNvPicPr>
-          <p:nvPr>
-            <p:ph idx="1"/>
-          </p:nvPr>
-        </p:nvPicPr>
-        <p:blipFill>
-          <a:blip r:embed="rId2">
-            <a:extLst>
-              <a:ext uri="{96DAC541-7B7A-43D3-8B79-37D633B846F1}">
-                <asvg:svgBlip xmlns:asvg="http://schemas.microsoft.com/office/drawing/2016/SVG/main" r:embed="rId3"/>
-              </a:ext>
-            </a:extLst>
-          </a:blip>
-          <a:stretch>
-            <a:fillRect/>
-          </a:stretch>
-        </p:blipFill>
-        <p:spPr>
-          <a:xfrm>
-            <a:off x="4128431" y="243997"/>
-            <a:ext cx="3935138" cy="6370005"/>
-          </a:xfrm>
-        </p:spPr>
-      </p:pic>
-    </p:spTree>
-    <p:extLst>
-      <p:ext uri="{BB962C8B-B14F-4D97-AF65-F5344CB8AC3E}">
-        <p14:creationId xmlns:p14="http://schemas.microsoft.com/office/powerpoint/2010/main" val="3978637495"/>
-      </p:ext>
-    </p:extLst>
-  </p:cSld>
-  <p:clrMapOvr>
-    <a:masterClrMapping/>
-  </p:clrMapOvr>
-</p:sld>
-</file>
-
-<file path=ppt/slides/slide26.xml><?xml version="1.0" encoding="utf-8"?>
+<file path=ppt/slides/slide20.xml><?xml version="1.0" encoding="utf-8"?>
 <p:sld xmlns:a="http://schemas.openxmlformats.org/drawingml/2006/main" xmlns:r="http://schemas.openxmlformats.org/officeDocument/2006/relationships" xmlns:p="http://schemas.openxmlformats.org/presentationml/2006/main">
   <p:cSld>
     <p:spTree>
@@ -15170,7 +14575,7 @@
 </p:sld>
 </file>
 
-<file path=ppt/slides/slide27.xml><?xml version="1.0" encoding="utf-8"?>
+<file path=ppt/slides/slide21.xml><?xml version="1.0" encoding="utf-8"?>
 <p:sld xmlns:a="http://schemas.openxmlformats.org/drawingml/2006/main" xmlns:r="http://schemas.openxmlformats.org/officeDocument/2006/relationships" xmlns:p="http://schemas.openxmlformats.org/presentationml/2006/main">
   <p:cSld>
     <p:spTree>
@@ -16042,13 +15447,13 @@
           <a:p>
             <a:r>
               <a:rPr lang="en-US" dirty="0"/>
-              <a:t>Stage</a:t>
+              <a:t>Add/Stage</a:t>
             </a:r>
           </a:p>
           <a:p>
             <a:r>
               <a:rPr lang="en-US" dirty="0"/>
-              <a:t>Stash</a:t>
+              <a:t>Commit</a:t>
             </a:r>
           </a:p>
           <a:p>
@@ -16262,12 +15667,6 @@
           <a:p>
             <a:r>
               <a:rPr lang="en-US" dirty="0"/>
-              <a:t>Commit</a:t>
-            </a:r>
-          </a:p>
-          <a:p>
-            <a:r>
-              <a:rPr lang="en-US" dirty="0"/>
               <a:t>Merge</a:t>
             </a:r>
           </a:p>
@@ -16373,12 +15772,31 @@
         </p:nvSpPr>
         <p:spPr/>
         <p:txBody>
-          <a:bodyPr/>
+          <a:bodyPr>
+            <a:normAutofit fontScale="85000" lnSpcReduction="20000"/>
+          </a:bodyPr>
           <a:lstStyle/>
           <a:p>
             <a:r>
               <a:rPr lang="en-US" dirty="0"/>
-              <a:t>Install git-bash</a:t>
+              <a:t>Install Visual Studio Code</a:t>
+            </a:r>
+          </a:p>
+          <a:p>
+            <a:r>
+              <a:rPr lang="en-US" dirty="0"/>
+              <a:t>Install git-</a:t>
+            </a:r>
+            <a:r>
+              <a:rPr lang="en-US" dirty="0" err="1"/>
+              <a:t>scm</a:t>
+            </a:r>
+            <a:endParaRPr lang="en-US" dirty="0"/>
+          </a:p>
+          <a:p>
+            <a:r>
+              <a:rPr lang="en-US" dirty="0"/>
+              <a:t>Open git-bash (MacOS users should use terminal instead)</a:t>
             </a:r>
           </a:p>
           <a:p>
@@ -16406,8 +15824,41 @@
             <a:pPr lvl="1"/>
             <a:r>
               <a:rPr lang="en-US" dirty="0"/>
-              <a:t>git config --global user.name "My Name"</a:t>
-            </a:r>
+              <a:t>git config --global user.name "My Name“</a:t>
+            </a:r>
+          </a:p>
+          <a:p>
+            <a:pPr lvl="1"/>
+            <a:r>
+              <a:rPr lang="en-US" dirty="0"/>
+              <a:t>git config --l</a:t>
+            </a:r>
+          </a:p>
+          <a:p>
+            <a:pPr lvl="2"/>
+            <a:r>
+              <a:rPr lang="en-US" dirty="0"/>
+              <a:t>Alternatively, you can use the following commands to explicitly pull this information</a:t>
+            </a:r>
+          </a:p>
+          <a:p>
+            <a:pPr lvl="2"/>
+            <a:r>
+              <a:rPr lang="en-US" dirty="0"/>
+              <a:t>git config --get user.name</a:t>
+            </a:r>
+          </a:p>
+          <a:p>
+            <a:pPr lvl="2"/>
+            <a:r>
+              <a:rPr lang="en-US" dirty="0"/>
+              <a:t>git config --get </a:t>
+            </a:r>
+            <a:r>
+              <a:rPr lang="en-US" dirty="0" err="1"/>
+              <a:t>user.email</a:t>
+            </a:r>
+            <a:endParaRPr lang="en-US" dirty="0"/>
           </a:p>
         </p:txBody>
       </p:sp>
@@ -17266,6 +16717,15 @@
 </file>
 
 <file path=customXml/item1.xml><?xml version="1.0" encoding="utf-8"?>
+<?mso-contentType ?>
+<FormTemplates xmlns="http://schemas.microsoft.com/sharepoint/v3/contenttype/forms">
+  <Display>DocumentLibraryForm</Display>
+  <Edit>DocumentLibraryForm</Edit>
+  <New>DocumentLibraryForm</New>
+</FormTemplates>
+</file>
+
+<file path=customXml/item2.xml><?xml version="1.0" encoding="utf-8"?>
 <ct:contentTypeSchema xmlns:ct="http://schemas.microsoft.com/office/2006/metadata/contentType" xmlns:ma="http://schemas.microsoft.com/office/2006/metadata/properties/metaAttributes" ct:_="" ma:_="" ma:contentTypeName="Document" ma:contentTypeID="0x01010079F111ED35F8CC479449609E8A0923A6" ma:contentTypeVersion="11" ma:contentTypeDescription="Create a new document." ma:contentTypeScope="" ma:versionID="96291512c1ee715ab617f4c07df79fc1">
   <xsd:schema xmlns:xsd="http://www.w3.org/2001/XMLSchema" xmlns:xs="http://www.w3.org/2001/XMLSchema" xmlns:p="http://schemas.microsoft.com/office/2006/metadata/properties" xmlns:ns2="71af3243-3dd4-4a8d-8c0d-dd76da1f02a5" xmlns:ns3="16c05727-aa75-4e4a-9b5f-8a80a1165891" targetNamespace="http://schemas.microsoft.com/office/2006/metadata/properties" ma:root="true" ma:fieldsID="8256c27c40ca5c40ce1cf6c44f0205df" ns2:_="" ns3:_="">
     <xsd:import namespace="71af3243-3dd4-4a8d-8c0d-dd76da1f02a5"/>
@@ -17476,15 +16936,6 @@
 </ct:contentTypeSchema>
 </file>
 
-<file path=customXml/item2.xml><?xml version="1.0" encoding="utf-8"?>
-<?mso-contentType ?>
-<FormTemplates xmlns="http://schemas.microsoft.com/sharepoint/v3/contenttype/forms">
-  <Display>DocumentLibraryForm</Display>
-  <Edit>DocumentLibraryForm</Edit>
-  <New>DocumentLibraryForm</New>
-</FormTemplates>
-</file>
-
 <file path=customXml/item3.xml><?xml version="1.0" encoding="utf-8"?>
 <p:properties xmlns:p="http://schemas.microsoft.com/office/2006/metadata/properties" xmlns:xsi="http://www.w3.org/2001/XMLSchema-instance" xmlns:pc="http://schemas.microsoft.com/office/infopath/2007/PartnerControls">
   <documentManagement>
@@ -17494,6 +16945,14 @@
 </file>
 
 <file path=customXml/itemProps1.xml><?xml version="1.0" encoding="utf-8"?>
+<ds:datastoreItem xmlns:ds="http://schemas.openxmlformats.org/officeDocument/2006/customXml" ds:itemID="{B579702B-25C7-40D7-9E29-7686B11A9660}">
+  <ds:schemaRefs>
+    <ds:schemaRef ds:uri="http://schemas.microsoft.com/sharepoint/v3/contenttype/forms"/>
+  </ds:schemaRefs>
+</ds:datastoreItem>
+</file>
+
+<file path=customXml/itemProps2.xml><?xml version="1.0" encoding="utf-8"?>
 <ds:datastoreItem xmlns:ds="http://schemas.openxmlformats.org/officeDocument/2006/customXml" ds:itemID="{A7C0B241-13E5-418D-8920-D23491E2D2C0}">
   <ds:schemaRefs>
     <ds:schemaRef ds:uri="http://schemas.microsoft.com/office/2006/metadata/contentType"/>
@@ -17512,14 +16971,6 @@
 </ds:datastoreItem>
 </file>
 
-<file path=customXml/itemProps2.xml><?xml version="1.0" encoding="utf-8"?>
-<ds:datastoreItem xmlns:ds="http://schemas.openxmlformats.org/officeDocument/2006/customXml" ds:itemID="{B579702B-25C7-40D7-9E29-7686B11A9660}">
-  <ds:schemaRefs>
-    <ds:schemaRef ds:uri="http://schemas.microsoft.com/sharepoint/v3/contenttype/forms"/>
-  </ds:schemaRefs>
-</ds:datastoreItem>
-</file>
-
 <file path=customXml/itemProps3.xml><?xml version="1.0" encoding="utf-8"?>
 <ds:datastoreItem xmlns:ds="http://schemas.openxmlformats.org/officeDocument/2006/customXml" ds:itemID="{E7866CFD-F94E-4AE5-ACEA-86FEC0F48A10}">
   <ds:schemaRefs>

</xml_diff>

<commit_message>
Adding advanced section to website, and incorporating actions and pipeline.
</commit_message>
<xml_diff>
--- a/resources/Introduction to github.pptx
+++ b/resources/Introduction to github.pptx
@@ -235,7 +235,7 @@
           <a:p>
             <a:fld id="{2B85766F-5EC0-4797-B4D1-777FCB005B11}" type="datetimeFigureOut">
               <a:rPr lang="en-US" smtClean="0"/>
-              <a:t>1/11/2020</a:t>
+              <a:t>2/21/2020</a:t>
             </a:fld>
             <a:endParaRPr lang="en-US" dirty="0"/>
           </a:p>
@@ -412,7 +412,7 @@
           <a:p>
             <a:fld id="{B2B4B5EC-152C-4627-80C0-63B10D5574EF}" type="datetimeFigureOut">
               <a:rPr lang="en-US" smtClean="0"/>
-              <a:t>1/11/2020</a:t>
+              <a:t>2/21/2020</a:t>
             </a:fld>
             <a:endParaRPr lang="en-US" dirty="0"/>
           </a:p>
@@ -736,7 +736,7 @@
           <a:noFill/>
           <a:extLst>
             <a:ext uri="{909E8E84-426E-40dd-AFC4-6F175D3DCCD1}">
-              <a14:hiddenFill xmlns="" xmlns:a14="http://schemas.microsoft.com/office/drawing/2010/main">
+              <a14:hiddenFill xmlns:a14="http://schemas.microsoft.com/office/drawing/2010/main" xmlns="">
                 <a:solidFill>
                   <a:srgbClr val="FFFFFF"/>
                 </a:solidFill>
@@ -795,7 +795,7 @@
             </a:ln>
             <a:extLst>
               <a:ext uri="{91240B29-F687-4f45-9708-019B960494DF}">
-                <a14:hiddenLine xmlns="" xmlns:a14="http://schemas.microsoft.com/office/drawing/2010/main" w="9525">
+                <a14:hiddenLine xmlns:a14="http://schemas.microsoft.com/office/drawing/2010/main" xmlns="" w="9525">
                   <a:solidFill>
                     <a:srgbClr val="000000"/>
                   </a:solidFill>
@@ -885,7 +885,7 @@
             </a:ln>
             <a:extLst>
               <a:ext uri="{91240B29-F687-4f45-9708-019B960494DF}">
-                <a14:hiddenLine xmlns="" xmlns:a14="http://schemas.microsoft.com/office/drawing/2010/main" w="9525">
+                <a14:hiddenLine xmlns:a14="http://schemas.microsoft.com/office/drawing/2010/main" xmlns="" w="9525">
                   <a:solidFill>
                     <a:srgbClr val="000000"/>
                   </a:solidFill>
@@ -975,7 +975,7 @@
             </a:ln>
             <a:extLst>
               <a:ext uri="{91240B29-F687-4f45-9708-019B960494DF}">
-                <a14:hiddenLine xmlns="" xmlns:a14="http://schemas.microsoft.com/office/drawing/2010/main" w="9525">
+                <a14:hiddenLine xmlns:a14="http://schemas.microsoft.com/office/drawing/2010/main" xmlns="" w="9525">
                   <a:solidFill>
                     <a:srgbClr val="000000"/>
                   </a:solidFill>
@@ -1009,7 +1009,7 @@
             </a:ln>
             <a:extLst>
               <a:ext uri="{91240B29-F687-4f45-9708-019B960494DF}">
-                <a14:hiddenLine xmlns="" xmlns:a14="http://schemas.microsoft.com/office/drawing/2010/main" w="9525">
+                <a14:hiddenLine xmlns:a14="http://schemas.microsoft.com/office/drawing/2010/main" xmlns="" w="9525">
                   <a:solidFill>
                     <a:srgbClr val="000000"/>
                   </a:solidFill>
@@ -1099,7 +1099,7 @@
             </a:ln>
             <a:extLst>
               <a:ext uri="{91240B29-F687-4f45-9708-019B960494DF}">
-                <a14:hiddenLine xmlns="" xmlns:a14="http://schemas.microsoft.com/office/drawing/2010/main" w="9525">
+                <a14:hiddenLine xmlns:a14="http://schemas.microsoft.com/office/drawing/2010/main" xmlns="" w="9525">
                   <a:solidFill>
                     <a:srgbClr val="000000"/>
                   </a:solidFill>
@@ -1161,7 +1161,7 @@
             </a:ln>
             <a:extLst>
               <a:ext uri="{91240B29-F687-4f45-9708-019B960494DF}">
-                <a14:hiddenLine xmlns="" xmlns:a14="http://schemas.microsoft.com/office/drawing/2010/main" w="9525">
+                <a14:hiddenLine xmlns:a14="http://schemas.microsoft.com/office/drawing/2010/main" xmlns="" w="9525">
                   <a:solidFill>
                     <a:srgbClr val="000000"/>
                   </a:solidFill>
@@ -1223,7 +1223,7 @@
             </a:ln>
             <a:extLst>
               <a:ext uri="{91240B29-F687-4f45-9708-019B960494DF}">
-                <a14:hiddenLine xmlns="" xmlns:a14="http://schemas.microsoft.com/office/drawing/2010/main" w="9525">
+                <a14:hiddenLine xmlns:a14="http://schemas.microsoft.com/office/drawing/2010/main" xmlns="" w="9525">
                   <a:solidFill>
                     <a:srgbClr val="000000"/>
                   </a:solidFill>
@@ -1313,7 +1313,7 @@
             </a:ln>
             <a:extLst>
               <a:ext uri="{91240B29-F687-4f45-9708-019B960494DF}">
-                <a14:hiddenLine xmlns="" xmlns:a14="http://schemas.microsoft.com/office/drawing/2010/main" w="9525">
+                <a14:hiddenLine xmlns:a14="http://schemas.microsoft.com/office/drawing/2010/main" xmlns="" w="9525">
                   <a:solidFill>
                     <a:srgbClr val="000000"/>
                   </a:solidFill>
@@ -1375,7 +1375,7 @@
             </a:ln>
             <a:extLst>
               <a:ext uri="{91240B29-F687-4f45-9708-019B960494DF}">
-                <a14:hiddenLine xmlns="" xmlns:a14="http://schemas.microsoft.com/office/drawing/2010/main" w="9525">
+                <a14:hiddenLine xmlns:a14="http://schemas.microsoft.com/office/drawing/2010/main" xmlns="" w="9525">
                   <a:solidFill>
                     <a:srgbClr val="000000"/>
                   </a:solidFill>
@@ -1437,7 +1437,7 @@
             </a:ln>
             <a:extLst>
               <a:ext uri="{91240B29-F687-4f45-9708-019B960494DF}">
-                <a14:hiddenLine xmlns="" xmlns:a14="http://schemas.microsoft.com/office/drawing/2010/main" w="9525">
+                <a14:hiddenLine xmlns:a14="http://schemas.microsoft.com/office/drawing/2010/main" xmlns="" w="9525">
                   <a:solidFill>
                     <a:srgbClr val="000000"/>
                   </a:solidFill>
@@ -1527,7 +1527,7 @@
             </a:ln>
             <a:extLst>
               <a:ext uri="{91240B29-F687-4f45-9708-019B960494DF}">
-                <a14:hiddenLine xmlns="" xmlns:a14="http://schemas.microsoft.com/office/drawing/2010/main" w="9525">
+                <a14:hiddenLine xmlns:a14="http://schemas.microsoft.com/office/drawing/2010/main" xmlns="" w="9525">
                   <a:solidFill>
                     <a:srgbClr val="000000"/>
                   </a:solidFill>
@@ -1617,7 +1617,7 @@
             </a:ln>
             <a:extLst>
               <a:ext uri="{91240B29-F687-4f45-9708-019B960494DF}">
-                <a14:hiddenLine xmlns="" xmlns:a14="http://schemas.microsoft.com/office/drawing/2010/main" w="9525">
+                <a14:hiddenLine xmlns:a14="http://schemas.microsoft.com/office/drawing/2010/main" xmlns="" w="9525">
                   <a:solidFill>
                     <a:srgbClr val="000000"/>
                   </a:solidFill>
@@ -1679,7 +1679,7 @@
             </a:ln>
             <a:extLst>
               <a:ext uri="{91240B29-F687-4f45-9708-019B960494DF}">
-                <a14:hiddenLine xmlns="" xmlns:a14="http://schemas.microsoft.com/office/drawing/2010/main" w="9525">
+                <a14:hiddenLine xmlns:a14="http://schemas.microsoft.com/office/drawing/2010/main" xmlns="" w="9525">
                   <a:solidFill>
                     <a:srgbClr val="000000"/>
                   </a:solidFill>
@@ -1789,7 +1789,7 @@
             </a:ln>
             <a:extLst>
               <a:ext uri="{91240B29-F687-4f45-9708-019B960494DF}">
-                <a14:hiddenLine xmlns="" xmlns:a14="http://schemas.microsoft.com/office/drawing/2010/main" w="9525">
+                <a14:hiddenLine xmlns:a14="http://schemas.microsoft.com/office/drawing/2010/main" xmlns="" w="9525">
                   <a:solidFill>
                     <a:srgbClr val="000000"/>
                   </a:solidFill>
@@ -1851,7 +1851,7 @@
             </a:ln>
             <a:extLst>
               <a:ext uri="{91240B29-F687-4f45-9708-019B960494DF}">
-                <a14:hiddenLine xmlns="" xmlns:a14="http://schemas.microsoft.com/office/drawing/2010/main" w="9525">
+                <a14:hiddenLine xmlns:a14="http://schemas.microsoft.com/office/drawing/2010/main" xmlns="" w="9525">
                   <a:solidFill>
                     <a:srgbClr val="000000"/>
                   </a:solidFill>
@@ -1941,7 +1941,7 @@
             </a:ln>
             <a:extLst>
               <a:ext uri="{91240B29-F687-4f45-9708-019B960494DF}">
-                <a14:hiddenLine xmlns="" xmlns:a14="http://schemas.microsoft.com/office/drawing/2010/main" w="9525">
+                <a14:hiddenLine xmlns:a14="http://schemas.microsoft.com/office/drawing/2010/main" xmlns="" w="9525">
                   <a:solidFill>
                     <a:srgbClr val="000000"/>
                   </a:solidFill>
@@ -2031,7 +2031,7 @@
             </a:ln>
             <a:extLst>
               <a:ext uri="{91240B29-F687-4f45-9708-019B960494DF}">
-                <a14:hiddenLine xmlns="" xmlns:a14="http://schemas.microsoft.com/office/drawing/2010/main" w="9525">
+                <a14:hiddenLine xmlns:a14="http://schemas.microsoft.com/office/drawing/2010/main" xmlns="" w="9525">
                   <a:solidFill>
                     <a:srgbClr val="000000"/>
                   </a:solidFill>
@@ -2093,7 +2093,7 @@
             </a:ln>
             <a:extLst>
               <a:ext uri="{91240B29-F687-4f45-9708-019B960494DF}">
-                <a14:hiddenLine xmlns="" xmlns:a14="http://schemas.microsoft.com/office/drawing/2010/main" w="9525">
+                <a14:hiddenLine xmlns:a14="http://schemas.microsoft.com/office/drawing/2010/main" xmlns="" w="9525">
                   <a:solidFill>
                     <a:srgbClr val="000000"/>
                   </a:solidFill>
@@ -2183,7 +2183,7 @@
             </a:ln>
             <a:extLst>
               <a:ext uri="{91240B29-F687-4f45-9708-019B960494DF}">
-                <a14:hiddenLine xmlns="" xmlns:a14="http://schemas.microsoft.com/office/drawing/2010/main" w="9525">
+                <a14:hiddenLine xmlns:a14="http://schemas.microsoft.com/office/drawing/2010/main" xmlns="" w="9525">
                   <a:solidFill>
                     <a:srgbClr val="000000"/>
                   </a:solidFill>
@@ -2273,7 +2273,7 @@
             </a:ln>
             <a:extLst>
               <a:ext uri="{91240B29-F687-4f45-9708-019B960494DF}">
-                <a14:hiddenLine xmlns="" xmlns:a14="http://schemas.microsoft.com/office/drawing/2010/main" w="9525">
+                <a14:hiddenLine xmlns:a14="http://schemas.microsoft.com/office/drawing/2010/main" xmlns="" w="9525">
                   <a:solidFill>
                     <a:srgbClr val="000000"/>
                   </a:solidFill>
@@ -2329,7 +2329,7 @@
             </a:ln>
             <a:extLst>
               <a:ext uri="{91240B29-F687-4f45-9708-019B960494DF}">
-                <a14:hiddenLine xmlns="" xmlns:a14="http://schemas.microsoft.com/office/drawing/2010/main" w="9525">
+                <a14:hiddenLine xmlns:a14="http://schemas.microsoft.com/office/drawing/2010/main" xmlns="" w="9525">
                   <a:solidFill>
                     <a:srgbClr val="000000"/>
                   </a:solidFill>
@@ -2419,7 +2419,7 @@
             </a:ln>
             <a:extLst>
               <a:ext uri="{91240B29-F687-4f45-9708-019B960494DF}">
-                <a14:hiddenLine xmlns="" xmlns:a14="http://schemas.microsoft.com/office/drawing/2010/main" w="9525">
+                <a14:hiddenLine xmlns:a14="http://schemas.microsoft.com/office/drawing/2010/main" xmlns="" w="9525">
                   <a:solidFill>
                     <a:srgbClr val="000000"/>
                   </a:solidFill>
@@ -2475,7 +2475,7 @@
             </a:ln>
             <a:extLst>
               <a:ext uri="{91240B29-F687-4f45-9708-019B960494DF}">
-                <a14:hiddenLine xmlns="" xmlns:a14="http://schemas.microsoft.com/office/drawing/2010/main" w="9525">
+                <a14:hiddenLine xmlns:a14="http://schemas.microsoft.com/office/drawing/2010/main" xmlns="" w="9525">
                   <a:solidFill>
                     <a:srgbClr val="000000"/>
                   </a:solidFill>
@@ -2565,7 +2565,7 @@
             </a:ln>
             <a:extLst>
               <a:ext uri="{91240B29-F687-4f45-9708-019B960494DF}">
-                <a14:hiddenLine xmlns="" xmlns:a14="http://schemas.microsoft.com/office/drawing/2010/main" w="9525">
+                <a14:hiddenLine xmlns:a14="http://schemas.microsoft.com/office/drawing/2010/main" xmlns="" w="9525">
                   <a:solidFill>
                     <a:srgbClr val="000000"/>
                   </a:solidFill>
@@ -2633,7 +2633,7 @@
             </a:ln>
             <a:extLst>
               <a:ext uri="{91240B29-F687-4f45-9708-019B960494DF}">
-                <a14:hiddenLine xmlns="" xmlns:a14="http://schemas.microsoft.com/office/drawing/2010/main" w="9525">
+                <a14:hiddenLine xmlns:a14="http://schemas.microsoft.com/office/drawing/2010/main" xmlns="" w="9525">
                   <a:solidFill>
                     <a:srgbClr val="000000"/>
                   </a:solidFill>
@@ -2723,7 +2723,7 @@
             </a:ln>
             <a:extLst>
               <a:ext uri="{91240B29-F687-4f45-9708-019B960494DF}">
-                <a14:hiddenLine xmlns="" xmlns:a14="http://schemas.microsoft.com/office/drawing/2010/main" w="9525">
+                <a14:hiddenLine xmlns:a14="http://schemas.microsoft.com/office/drawing/2010/main" xmlns="" w="9525">
                   <a:solidFill>
                     <a:srgbClr val="000000"/>
                   </a:solidFill>
@@ -2791,7 +2791,7 @@
             </a:ln>
             <a:extLst>
               <a:ext uri="{91240B29-F687-4f45-9708-019B960494DF}">
-                <a14:hiddenLine xmlns="" xmlns:a14="http://schemas.microsoft.com/office/drawing/2010/main" w="9525">
+                <a14:hiddenLine xmlns:a14="http://schemas.microsoft.com/office/drawing/2010/main" xmlns="" w="9525">
                   <a:solidFill>
                     <a:srgbClr val="000000"/>
                   </a:solidFill>
@@ -2881,7 +2881,7 @@
             </a:ln>
             <a:extLst>
               <a:ext uri="{91240B29-F687-4f45-9708-019B960494DF}">
-                <a14:hiddenLine xmlns="" xmlns:a14="http://schemas.microsoft.com/office/drawing/2010/main" w="9525">
+                <a14:hiddenLine xmlns:a14="http://schemas.microsoft.com/office/drawing/2010/main" xmlns="" w="9525">
                   <a:solidFill>
                     <a:srgbClr val="000000"/>
                   </a:solidFill>
@@ -2915,7 +2915,7 @@
             </a:ln>
             <a:extLst>
               <a:ext uri="{91240B29-F687-4f45-9708-019B960494DF}">
-                <a14:hiddenLine xmlns="" xmlns:a14="http://schemas.microsoft.com/office/drawing/2010/main" w="9525">
+                <a14:hiddenLine xmlns:a14="http://schemas.microsoft.com/office/drawing/2010/main" xmlns="" w="9525">
                   <a:solidFill>
                     <a:srgbClr val="000000"/>
                   </a:solidFill>
@@ -3005,7 +3005,7 @@
             </a:ln>
             <a:extLst>
               <a:ext uri="{91240B29-F687-4f45-9708-019B960494DF}">
-                <a14:hiddenLine xmlns="" xmlns:a14="http://schemas.microsoft.com/office/drawing/2010/main" w="9525">
+                <a14:hiddenLine xmlns:a14="http://schemas.microsoft.com/office/drawing/2010/main" xmlns="" w="9525">
                   <a:solidFill>
                     <a:srgbClr val="000000"/>
                   </a:solidFill>
@@ -3067,7 +3067,7 @@
             </a:ln>
             <a:extLst>
               <a:ext uri="{91240B29-F687-4f45-9708-019B960494DF}">
-                <a14:hiddenLine xmlns="" xmlns:a14="http://schemas.microsoft.com/office/drawing/2010/main" w="9525">
+                <a14:hiddenLine xmlns:a14="http://schemas.microsoft.com/office/drawing/2010/main" xmlns="" w="9525">
                   <a:solidFill>
                     <a:srgbClr val="000000"/>
                   </a:solidFill>
@@ -3129,7 +3129,7 @@
             </a:ln>
             <a:extLst>
               <a:ext uri="{91240B29-F687-4f45-9708-019B960494DF}">
-                <a14:hiddenLine xmlns="" xmlns:a14="http://schemas.microsoft.com/office/drawing/2010/main" w="9525">
+                <a14:hiddenLine xmlns:a14="http://schemas.microsoft.com/office/drawing/2010/main" xmlns="" w="9525">
                   <a:solidFill>
                     <a:srgbClr val="000000"/>
                   </a:solidFill>
@@ -3219,7 +3219,7 @@
             </a:ln>
             <a:extLst>
               <a:ext uri="{91240B29-F687-4f45-9708-019B960494DF}">
-                <a14:hiddenLine xmlns="" xmlns:a14="http://schemas.microsoft.com/office/drawing/2010/main" w="9525">
+                <a14:hiddenLine xmlns:a14="http://schemas.microsoft.com/office/drawing/2010/main" xmlns="" w="9525">
                   <a:solidFill>
                     <a:srgbClr val="000000"/>
                   </a:solidFill>
@@ -3287,7 +3287,7 @@
             </a:ln>
             <a:extLst>
               <a:ext uri="{91240B29-F687-4f45-9708-019B960494DF}">
-                <a14:hiddenLine xmlns="" xmlns:a14="http://schemas.microsoft.com/office/drawing/2010/main" w="9525">
+                <a14:hiddenLine xmlns:a14="http://schemas.microsoft.com/office/drawing/2010/main" xmlns="" w="9525">
                   <a:solidFill>
                     <a:srgbClr val="000000"/>
                   </a:solidFill>
@@ -3349,7 +3349,7 @@
             </a:ln>
             <a:extLst>
               <a:ext uri="{91240B29-F687-4f45-9708-019B960494DF}">
-                <a14:hiddenLine xmlns="" xmlns:a14="http://schemas.microsoft.com/office/drawing/2010/main" w="9525">
+                <a14:hiddenLine xmlns:a14="http://schemas.microsoft.com/office/drawing/2010/main" xmlns="" w="9525">
                   <a:solidFill>
                     <a:srgbClr val="000000"/>
                   </a:solidFill>
@@ -3439,7 +3439,7 @@
             </a:ln>
             <a:extLst>
               <a:ext uri="{91240B29-F687-4f45-9708-019B960494DF}">
-                <a14:hiddenLine xmlns="" xmlns:a14="http://schemas.microsoft.com/office/drawing/2010/main" w="9525">
+                <a14:hiddenLine xmlns:a14="http://schemas.microsoft.com/office/drawing/2010/main" xmlns="" w="9525">
                   <a:solidFill>
                     <a:srgbClr val="000000"/>
                   </a:solidFill>
@@ -3501,7 +3501,7 @@
             </a:ln>
             <a:extLst>
               <a:ext uri="{91240B29-F687-4f45-9708-019B960494DF}">
-                <a14:hiddenLine xmlns="" xmlns:a14="http://schemas.microsoft.com/office/drawing/2010/main" w="9525">
+                <a14:hiddenLine xmlns:a14="http://schemas.microsoft.com/office/drawing/2010/main" xmlns="" w="9525">
                   <a:solidFill>
                     <a:srgbClr val="000000"/>
                   </a:solidFill>
@@ -3591,7 +3591,7 @@
             </a:ln>
             <a:extLst>
               <a:ext uri="{91240B29-F687-4f45-9708-019B960494DF}">
-                <a14:hiddenLine xmlns="" xmlns:a14="http://schemas.microsoft.com/office/drawing/2010/main" w="9525">
+                <a14:hiddenLine xmlns:a14="http://schemas.microsoft.com/office/drawing/2010/main" xmlns="" w="9525">
                   <a:solidFill>
                     <a:srgbClr val="000000"/>
                   </a:solidFill>
@@ -3653,7 +3653,7 @@
             </a:ln>
             <a:extLst>
               <a:ext uri="{91240B29-F687-4f45-9708-019B960494DF}">
-                <a14:hiddenLine xmlns="" xmlns:a14="http://schemas.microsoft.com/office/drawing/2010/main" w="9525">
+                <a14:hiddenLine xmlns:a14="http://schemas.microsoft.com/office/drawing/2010/main" xmlns="" w="9525">
                   <a:solidFill>
                     <a:srgbClr val="000000"/>
                   </a:solidFill>
@@ -3743,7 +3743,7 @@
             </a:ln>
             <a:extLst>
               <a:ext uri="{91240B29-F687-4f45-9708-019B960494DF}">
-                <a14:hiddenLine xmlns="" xmlns:a14="http://schemas.microsoft.com/office/drawing/2010/main" w="9525">
+                <a14:hiddenLine xmlns:a14="http://schemas.microsoft.com/office/drawing/2010/main" xmlns="" w="9525">
                   <a:solidFill>
                     <a:srgbClr val="000000"/>
                   </a:solidFill>
@@ -3777,7 +3777,7 @@
             </a:ln>
             <a:extLst>
               <a:ext uri="{91240B29-F687-4f45-9708-019B960494DF}">
-                <a14:hiddenLine xmlns="" xmlns:a14="http://schemas.microsoft.com/office/drawing/2010/main" w="9525">
+                <a14:hiddenLine xmlns:a14="http://schemas.microsoft.com/office/drawing/2010/main" xmlns="" w="9525">
                   <a:solidFill>
                     <a:srgbClr val="000000"/>
                   </a:solidFill>
@@ -3842,7 +3842,7 @@
             </a:ln>
             <a:extLst>
               <a:ext uri="{91240B29-F687-4f45-9708-019B960494DF}">
-                <a14:hiddenLine xmlns="" xmlns:a14="http://schemas.microsoft.com/office/drawing/2010/main" w="9525">
+                <a14:hiddenLine xmlns:a14="http://schemas.microsoft.com/office/drawing/2010/main" xmlns="" w="9525">
                   <a:solidFill>
                     <a:srgbClr val="000000"/>
                   </a:solidFill>
@@ -3932,7 +3932,7 @@
             </a:ln>
             <a:extLst>
               <a:ext uri="{91240B29-F687-4f45-9708-019B960494DF}">
-                <a14:hiddenLine xmlns="" xmlns:a14="http://schemas.microsoft.com/office/drawing/2010/main" w="9525">
+                <a14:hiddenLine xmlns:a14="http://schemas.microsoft.com/office/drawing/2010/main" xmlns="" w="9525">
                   <a:solidFill>
                     <a:srgbClr val="000000"/>
                   </a:solidFill>
@@ -3994,7 +3994,7 @@
             </a:ln>
             <a:extLst>
               <a:ext uri="{91240B29-F687-4f45-9708-019B960494DF}">
-                <a14:hiddenLine xmlns="" xmlns:a14="http://schemas.microsoft.com/office/drawing/2010/main" w="9525">
+                <a14:hiddenLine xmlns:a14="http://schemas.microsoft.com/office/drawing/2010/main" xmlns="" w="9525">
                   <a:solidFill>
                     <a:srgbClr val="000000"/>
                   </a:solidFill>
@@ -4084,7 +4084,7 @@
             </a:ln>
             <a:extLst>
               <a:ext uri="{91240B29-F687-4f45-9708-019B960494DF}">
-                <a14:hiddenLine xmlns="" xmlns:a14="http://schemas.microsoft.com/office/drawing/2010/main" w="9525">
+                <a14:hiddenLine xmlns:a14="http://schemas.microsoft.com/office/drawing/2010/main" xmlns="" w="9525">
                   <a:solidFill>
                     <a:srgbClr val="000000"/>
                   </a:solidFill>
@@ -4174,7 +4174,7 @@
             </a:ln>
             <a:extLst>
               <a:ext uri="{91240B29-F687-4f45-9708-019B960494DF}">
-                <a14:hiddenLine xmlns="" xmlns:a14="http://schemas.microsoft.com/office/drawing/2010/main" w="9525">
+                <a14:hiddenLine xmlns:a14="http://schemas.microsoft.com/office/drawing/2010/main" xmlns="" w="9525">
                   <a:solidFill>
                     <a:srgbClr val="000000"/>
                   </a:solidFill>
@@ -4239,7 +4239,7 @@
             </a:ln>
             <a:extLst>
               <a:ext uri="{91240B29-F687-4f45-9708-019B960494DF}">
-                <a14:hiddenLine xmlns="" xmlns:a14="http://schemas.microsoft.com/office/drawing/2010/main" w="9525">
+                <a14:hiddenLine xmlns:a14="http://schemas.microsoft.com/office/drawing/2010/main" xmlns="" w="9525">
                   <a:solidFill>
                     <a:srgbClr val="000000"/>
                   </a:solidFill>
@@ -4301,7 +4301,7 @@
             </a:ln>
             <a:extLst>
               <a:ext uri="{91240B29-F687-4f45-9708-019B960494DF}">
-                <a14:hiddenLine xmlns="" xmlns:a14="http://schemas.microsoft.com/office/drawing/2010/main" w="9525">
+                <a14:hiddenLine xmlns:a14="http://schemas.microsoft.com/office/drawing/2010/main" xmlns="" w="9525">
                   <a:solidFill>
                     <a:srgbClr val="000000"/>
                   </a:solidFill>
@@ -4391,7 +4391,7 @@
             </a:ln>
             <a:extLst>
               <a:ext uri="{91240B29-F687-4f45-9708-019B960494DF}">
-                <a14:hiddenLine xmlns="" xmlns:a14="http://schemas.microsoft.com/office/drawing/2010/main" w="9525">
+                <a14:hiddenLine xmlns:a14="http://schemas.microsoft.com/office/drawing/2010/main" xmlns="" w="9525">
                   <a:solidFill>
                     <a:srgbClr val="000000"/>
                   </a:solidFill>
@@ -4481,7 +4481,7 @@
             </a:ln>
             <a:extLst>
               <a:ext uri="{91240B29-F687-4f45-9708-019B960494DF}">
-                <a14:hiddenLine xmlns="" xmlns:a14="http://schemas.microsoft.com/office/drawing/2010/main" w="9525">
+                <a14:hiddenLine xmlns:a14="http://schemas.microsoft.com/office/drawing/2010/main" xmlns="" w="9525">
                   <a:solidFill>
                     <a:srgbClr val="000000"/>
                   </a:solidFill>
@@ -4543,7 +4543,7 @@
             </a:ln>
             <a:extLst>
               <a:ext uri="{91240B29-F687-4f45-9708-019B960494DF}">
-                <a14:hiddenLine xmlns="" xmlns:a14="http://schemas.microsoft.com/office/drawing/2010/main" w="9525">
+                <a14:hiddenLine xmlns:a14="http://schemas.microsoft.com/office/drawing/2010/main" xmlns="" w="9525">
                   <a:solidFill>
                     <a:srgbClr val="000000"/>
                   </a:solidFill>
@@ -4663,7 +4663,7 @@
             </a:ln>
             <a:extLst>
               <a:ext uri="{91240B29-F687-4f45-9708-019B960494DF}">
-                <a14:hiddenLine xmlns="" xmlns:a14="http://schemas.microsoft.com/office/drawing/2010/main" w="9525">
+                <a14:hiddenLine xmlns:a14="http://schemas.microsoft.com/office/drawing/2010/main" xmlns="" w="9525">
                   <a:solidFill>
                     <a:srgbClr val="000000"/>
                   </a:solidFill>
@@ -4731,7 +4731,7 @@
             </a:ln>
             <a:extLst>
               <a:ext uri="{91240B29-F687-4f45-9708-019B960494DF}">
-                <a14:hiddenLine xmlns="" xmlns:a14="http://schemas.microsoft.com/office/drawing/2010/main" w="9525">
+                <a14:hiddenLine xmlns:a14="http://schemas.microsoft.com/office/drawing/2010/main" xmlns="" w="9525">
                   <a:solidFill>
                     <a:srgbClr val="000000"/>
                   </a:solidFill>
@@ -4821,7 +4821,7 @@
             </a:ln>
             <a:extLst>
               <a:ext uri="{91240B29-F687-4f45-9708-019B960494DF}">
-                <a14:hiddenLine xmlns="" xmlns:a14="http://schemas.microsoft.com/office/drawing/2010/main" w="9525">
+                <a14:hiddenLine xmlns:a14="http://schemas.microsoft.com/office/drawing/2010/main" xmlns="" w="9525">
                   <a:solidFill>
                     <a:srgbClr val="000000"/>
                   </a:solidFill>
@@ -4961,7 +4961,7 @@
           <a:p>
             <a:fld id="{48A87A34-81AB-432B-8DAE-1953F412C126}" type="datetimeFigureOut">
               <a:rPr lang="en-US" smtClean="0"/>
-              <a:t>1/11/2020</a:t>
+              <a:t>2/21/2020</a:t>
             </a:fld>
             <a:endParaRPr lang="en-US" dirty="0"/>
           </a:p>
@@ -5228,7 +5228,7 @@
           <a:p>
             <a:fld id="{48A87A34-81AB-432B-8DAE-1953F412C126}" type="datetimeFigureOut">
               <a:rPr lang="en-US" smtClean="0"/>
-              <a:t>1/11/2020</a:t>
+              <a:t>2/21/2020</a:t>
             </a:fld>
             <a:endParaRPr lang="en-US" dirty="0"/>
           </a:p>
@@ -5424,7 +5424,7 @@
           <a:p>
             <a:fld id="{48A87A34-81AB-432B-8DAE-1953F412C126}" type="datetimeFigureOut">
               <a:rPr lang="en-US" smtClean="0"/>
-              <a:t>1/11/2020</a:t>
+              <a:t>2/21/2020</a:t>
             </a:fld>
             <a:endParaRPr lang="en-US" dirty="0"/>
           </a:p>
@@ -5687,7 +5687,7 @@
           <a:p>
             <a:fld id="{48A87A34-81AB-432B-8DAE-1953F412C126}" type="datetimeFigureOut">
               <a:rPr lang="en-US" smtClean="0"/>
-              <a:t>1/11/2020</a:t>
+              <a:t>2/21/2020</a:t>
             </a:fld>
             <a:endParaRPr lang="en-US" dirty="0"/>
           </a:p>
@@ -6121,7 +6121,7 @@
           <a:p>
             <a:fld id="{48A87A34-81AB-432B-8DAE-1953F412C126}" type="datetimeFigureOut">
               <a:rPr lang="en-US" smtClean="0"/>
-              <a:t>1/11/2020</a:t>
+              <a:t>2/21/2020</a:t>
             </a:fld>
             <a:endParaRPr lang="en-US" dirty="0"/>
           </a:p>
@@ -6667,7 +6667,7 @@
           <a:p>
             <a:fld id="{48A87A34-81AB-432B-8DAE-1953F412C126}" type="datetimeFigureOut">
               <a:rPr lang="en-US" smtClean="0"/>
-              <a:t>1/11/2020</a:t>
+              <a:t>2/21/2020</a:t>
             </a:fld>
             <a:endParaRPr lang="en-US" dirty="0"/>
           </a:p>
@@ -7387,7 +7387,7 @@
           <a:p>
             <a:fld id="{48A87A34-81AB-432B-8DAE-1953F412C126}" type="datetimeFigureOut">
               <a:rPr lang="en-US" smtClean="0"/>
-              <a:t>1/11/2020</a:t>
+              <a:t>2/21/2020</a:t>
             </a:fld>
             <a:endParaRPr lang="en-US" dirty="0"/>
           </a:p>
@@ -7557,7 +7557,7 @@
           <a:p>
             <a:fld id="{48A87A34-81AB-432B-8DAE-1953F412C126}" type="datetimeFigureOut">
               <a:rPr lang="en-US" smtClean="0"/>
-              <a:t>1/11/2020</a:t>
+              <a:t>2/21/2020</a:t>
             </a:fld>
             <a:endParaRPr lang="en-US" dirty="0"/>
           </a:p>
@@ -7737,7 +7737,7 @@
           <a:p>
             <a:fld id="{48A87A34-81AB-432B-8DAE-1953F412C126}" type="datetimeFigureOut">
               <a:rPr lang="en-US" smtClean="0"/>
-              <a:t>1/11/2020</a:t>
+              <a:t>2/21/2020</a:t>
             </a:fld>
             <a:endParaRPr lang="en-US" dirty="0"/>
           </a:p>
@@ -7907,7 +7907,7 @@
           <a:p>
             <a:fld id="{48A87A34-81AB-432B-8DAE-1953F412C126}" type="datetimeFigureOut">
               <a:rPr lang="en-US" smtClean="0"/>
-              <a:t>1/11/2020</a:t>
+              <a:t>2/21/2020</a:t>
             </a:fld>
             <a:endParaRPr lang="en-US" dirty="0"/>
           </a:p>
@@ -8157,7 +8157,7 @@
           <a:p>
             <a:fld id="{48A87A34-81AB-432B-8DAE-1953F412C126}" type="datetimeFigureOut">
               <a:rPr lang="en-US" smtClean="0"/>
-              <a:t>1/11/2020</a:t>
+              <a:t>2/21/2020</a:t>
             </a:fld>
             <a:endParaRPr lang="en-US" dirty="0"/>
           </a:p>
@@ -8389,7 +8389,7 @@
           <a:p>
             <a:fld id="{48A87A34-81AB-432B-8DAE-1953F412C126}" type="datetimeFigureOut">
               <a:rPr lang="en-US" smtClean="0"/>
-              <a:t>1/11/2020</a:t>
+              <a:t>2/21/2020</a:t>
             </a:fld>
             <a:endParaRPr lang="en-US" dirty="0"/>
           </a:p>
@@ -8770,7 +8770,7 @@
           <a:p>
             <a:fld id="{48A87A34-81AB-432B-8DAE-1953F412C126}" type="datetimeFigureOut">
               <a:rPr lang="en-US" smtClean="0"/>
-              <a:t>1/11/2020</a:t>
+              <a:t>2/21/2020</a:t>
             </a:fld>
             <a:endParaRPr lang="en-US" dirty="0"/>
           </a:p>
@@ -8888,7 +8888,7 @@
           <a:p>
             <a:fld id="{48A87A34-81AB-432B-8DAE-1953F412C126}" type="datetimeFigureOut">
               <a:rPr lang="en-US" smtClean="0"/>
-              <a:t>1/11/2020</a:t>
+              <a:t>2/21/2020</a:t>
             </a:fld>
             <a:endParaRPr lang="en-US" dirty="0"/>
           </a:p>
@@ -8983,7 +8983,7 @@
           <a:p>
             <a:fld id="{48A87A34-81AB-432B-8DAE-1953F412C126}" type="datetimeFigureOut">
               <a:rPr lang="en-US" smtClean="0"/>
-              <a:t>1/11/2020</a:t>
+              <a:t>2/21/2020</a:t>
             </a:fld>
             <a:endParaRPr lang="en-US" dirty="0"/>
           </a:p>
@@ -9232,7 +9232,7 @@
           <a:p>
             <a:fld id="{48A87A34-81AB-432B-8DAE-1953F412C126}" type="datetimeFigureOut">
               <a:rPr lang="en-US" smtClean="0"/>
-              <a:t>1/11/2020</a:t>
+              <a:t>2/21/2020</a:t>
             </a:fld>
             <a:endParaRPr lang="en-US" dirty="0"/>
           </a:p>
@@ -9512,7 +9512,7 @@
           <a:p>
             <a:fld id="{48A87A34-81AB-432B-8DAE-1953F412C126}" type="datetimeFigureOut">
               <a:rPr lang="en-US" smtClean="0"/>
-              <a:t>1/11/2020</a:t>
+              <a:t>2/21/2020</a:t>
             </a:fld>
             <a:endParaRPr lang="en-US" dirty="0"/>
           </a:p>
@@ -9635,7 +9635,7 @@
           <a:noFill/>
           <a:extLst>
             <a:ext uri="{909E8E84-426E-40dd-AFC4-6F175D3DCCD1}">
-              <a14:hiddenFill xmlns="" xmlns:a14="http://schemas.microsoft.com/office/drawing/2010/main">
+              <a14:hiddenFill xmlns:a14="http://schemas.microsoft.com/office/drawing/2010/main" xmlns="">
                 <a:solidFill>
                   <a:srgbClr val="FFFFFF"/>
                 </a:solidFill>
@@ -9709,7 +9709,7 @@
               </a:ln>
               <a:extLst>
                 <a:ext uri="{91240B29-F687-4f45-9708-019B960494DF}">
-                  <a14:hiddenLine xmlns="" xmlns:a14="http://schemas.microsoft.com/office/drawing/2010/main" w="9525">
+                  <a14:hiddenLine xmlns:a14="http://schemas.microsoft.com/office/drawing/2010/main" xmlns="" w="9525">
                     <a:solidFill>
                       <a:srgbClr val="000000"/>
                     </a:solidFill>
@@ -9799,7 +9799,7 @@
               </a:ln>
               <a:extLst>
                 <a:ext uri="{91240B29-F687-4f45-9708-019B960494DF}">
-                  <a14:hiddenLine xmlns="" xmlns:a14="http://schemas.microsoft.com/office/drawing/2010/main" w="9525">
+                  <a14:hiddenLine xmlns:a14="http://schemas.microsoft.com/office/drawing/2010/main" xmlns="" w="9525">
                     <a:solidFill>
                       <a:srgbClr val="000000"/>
                     </a:solidFill>
@@ -9889,7 +9889,7 @@
               </a:ln>
               <a:extLst>
                 <a:ext uri="{91240B29-F687-4f45-9708-019B960494DF}">
-                  <a14:hiddenLine xmlns="" xmlns:a14="http://schemas.microsoft.com/office/drawing/2010/main" w="9525">
+                  <a14:hiddenLine xmlns:a14="http://schemas.microsoft.com/office/drawing/2010/main" xmlns="" w="9525">
                     <a:solidFill>
                       <a:srgbClr val="000000"/>
                     </a:solidFill>
@@ -9951,7 +9951,7 @@
               </a:ln>
               <a:extLst>
                 <a:ext uri="{91240B29-F687-4f45-9708-019B960494DF}">
-                  <a14:hiddenLine xmlns="" xmlns:a14="http://schemas.microsoft.com/office/drawing/2010/main" w="9525">
+                  <a14:hiddenLine xmlns:a14="http://schemas.microsoft.com/office/drawing/2010/main" xmlns="" w="9525">
                     <a:solidFill>
                       <a:srgbClr val="000000"/>
                     </a:solidFill>
@@ -10041,7 +10041,7 @@
               </a:ln>
               <a:extLst>
                 <a:ext uri="{91240B29-F687-4f45-9708-019B960494DF}">
-                  <a14:hiddenLine xmlns="" xmlns:a14="http://schemas.microsoft.com/office/drawing/2010/main" w="9525">
+                  <a14:hiddenLine xmlns:a14="http://schemas.microsoft.com/office/drawing/2010/main" xmlns="" w="9525">
                     <a:solidFill>
                       <a:srgbClr val="000000"/>
                     </a:solidFill>
@@ -10103,7 +10103,7 @@
               </a:ln>
               <a:extLst>
                 <a:ext uri="{91240B29-F687-4f45-9708-019B960494DF}">
-                  <a14:hiddenLine xmlns="" xmlns:a14="http://schemas.microsoft.com/office/drawing/2010/main" w="9525">
+                  <a14:hiddenLine xmlns:a14="http://schemas.microsoft.com/office/drawing/2010/main" xmlns="" w="9525">
                     <a:solidFill>
                       <a:srgbClr val="000000"/>
                     </a:solidFill>
@@ -10165,7 +10165,7 @@
               </a:ln>
               <a:extLst>
                 <a:ext uri="{91240B29-F687-4f45-9708-019B960494DF}">
-                  <a14:hiddenLine xmlns="" xmlns:a14="http://schemas.microsoft.com/office/drawing/2010/main" w="9525">
+                  <a14:hiddenLine xmlns:a14="http://schemas.microsoft.com/office/drawing/2010/main" xmlns="" w="9525">
                     <a:solidFill>
                       <a:srgbClr val="000000"/>
                     </a:solidFill>
@@ -10255,7 +10255,7 @@
               </a:ln>
               <a:extLst>
                 <a:ext uri="{91240B29-F687-4f45-9708-019B960494DF}">
-                  <a14:hiddenLine xmlns="" xmlns:a14="http://schemas.microsoft.com/office/drawing/2010/main" w="9525">
+                  <a14:hiddenLine xmlns:a14="http://schemas.microsoft.com/office/drawing/2010/main" xmlns="" w="9525">
                     <a:solidFill>
                       <a:srgbClr val="000000"/>
                     </a:solidFill>
@@ -10345,7 +10345,7 @@
               </a:ln>
               <a:extLst>
                 <a:ext uri="{91240B29-F687-4f45-9708-019B960494DF}">
-                  <a14:hiddenLine xmlns="" xmlns:a14="http://schemas.microsoft.com/office/drawing/2010/main" w="9525">
+                  <a14:hiddenLine xmlns:a14="http://schemas.microsoft.com/office/drawing/2010/main" xmlns="" w="9525">
                     <a:solidFill>
                       <a:srgbClr val="000000"/>
                     </a:solidFill>
@@ -10407,7 +10407,7 @@
               </a:ln>
               <a:extLst>
                 <a:ext uri="{91240B29-F687-4f45-9708-019B960494DF}">
-                  <a14:hiddenLine xmlns="" xmlns:a14="http://schemas.microsoft.com/office/drawing/2010/main" w="9525">
+                  <a14:hiddenLine xmlns:a14="http://schemas.microsoft.com/office/drawing/2010/main" xmlns="" w="9525">
                     <a:solidFill>
                       <a:srgbClr val="000000"/>
                     </a:solidFill>
@@ -10517,7 +10517,7 @@
               </a:ln>
               <a:extLst>
                 <a:ext uri="{91240B29-F687-4f45-9708-019B960494DF}">
-                  <a14:hiddenLine xmlns="" xmlns:a14="http://schemas.microsoft.com/office/drawing/2010/main" w="9525">
+                  <a14:hiddenLine xmlns:a14="http://schemas.microsoft.com/office/drawing/2010/main" xmlns="" w="9525">
                     <a:solidFill>
                       <a:srgbClr val="000000"/>
                     </a:solidFill>
@@ -10601,7 +10601,7 @@
               </a:ln>
               <a:extLst>
                 <a:ext uri="{91240B29-F687-4f45-9708-019B960494DF}">
-                  <a14:hiddenLine xmlns="" xmlns:a14="http://schemas.microsoft.com/office/drawing/2010/main" w="9525">
+                  <a14:hiddenLine xmlns:a14="http://schemas.microsoft.com/office/drawing/2010/main" xmlns="" w="9525">
                     <a:solidFill>
                       <a:srgbClr val="000000"/>
                     </a:solidFill>
@@ -10663,7 +10663,7 @@
               </a:ln>
               <a:extLst>
                 <a:ext uri="{91240B29-F687-4f45-9708-019B960494DF}">
-                  <a14:hiddenLine xmlns="" xmlns:a14="http://schemas.microsoft.com/office/drawing/2010/main" w="9525">
+                  <a14:hiddenLine xmlns:a14="http://schemas.microsoft.com/office/drawing/2010/main" xmlns="" w="9525">
                     <a:solidFill>
                       <a:srgbClr val="000000"/>
                     </a:solidFill>
@@ -10725,7 +10725,7 @@
               </a:ln>
               <a:extLst>
                 <a:ext uri="{91240B29-F687-4f45-9708-019B960494DF}">
-                  <a14:hiddenLine xmlns="" xmlns:a14="http://schemas.microsoft.com/office/drawing/2010/main" w="9525">
+                  <a14:hiddenLine xmlns:a14="http://schemas.microsoft.com/office/drawing/2010/main" xmlns="" w="9525">
                     <a:solidFill>
                       <a:srgbClr val="000000"/>
                     </a:solidFill>
@@ -10815,7 +10815,7 @@
               </a:ln>
               <a:extLst>
                 <a:ext uri="{91240B29-F687-4f45-9708-019B960494DF}">
-                  <a14:hiddenLine xmlns="" xmlns:a14="http://schemas.microsoft.com/office/drawing/2010/main" w="9525">
+                  <a14:hiddenLine xmlns:a14="http://schemas.microsoft.com/office/drawing/2010/main" xmlns="" w="9525">
                     <a:solidFill>
                       <a:srgbClr val="000000"/>
                     </a:solidFill>
@@ -10849,7 +10849,7 @@
               </a:ln>
               <a:extLst>
                 <a:ext uri="{91240B29-F687-4f45-9708-019B960494DF}">
-                  <a14:hiddenLine xmlns="" xmlns:a14="http://schemas.microsoft.com/office/drawing/2010/main" w="9525">
+                  <a14:hiddenLine xmlns:a14="http://schemas.microsoft.com/office/drawing/2010/main" xmlns="" w="9525">
                     <a:solidFill>
                       <a:srgbClr val="000000"/>
                     </a:solidFill>
@@ -10914,7 +10914,7 @@
               </a:ln>
               <a:extLst>
                 <a:ext uri="{91240B29-F687-4f45-9708-019B960494DF}">
-                  <a14:hiddenLine xmlns="" xmlns:a14="http://schemas.microsoft.com/office/drawing/2010/main" w="9525">
+                  <a14:hiddenLine xmlns:a14="http://schemas.microsoft.com/office/drawing/2010/main" xmlns="" w="9525">
                     <a:solidFill>
                       <a:srgbClr val="000000"/>
                     </a:solidFill>
@@ -11004,7 +11004,7 @@
               </a:ln>
               <a:extLst>
                 <a:ext uri="{91240B29-F687-4f45-9708-019B960494DF}">
-                  <a14:hiddenLine xmlns="" xmlns:a14="http://schemas.microsoft.com/office/drawing/2010/main" w="9525">
+                  <a14:hiddenLine xmlns:a14="http://schemas.microsoft.com/office/drawing/2010/main" xmlns="" w="9525">
                     <a:solidFill>
                       <a:srgbClr val="000000"/>
                     </a:solidFill>
@@ -11066,7 +11066,7 @@
               </a:ln>
               <a:extLst>
                 <a:ext uri="{91240B29-F687-4f45-9708-019B960494DF}">
-                  <a14:hiddenLine xmlns="" xmlns:a14="http://schemas.microsoft.com/office/drawing/2010/main" w="9525">
+                  <a14:hiddenLine xmlns:a14="http://schemas.microsoft.com/office/drawing/2010/main" xmlns="" w="9525">
                     <a:solidFill>
                       <a:srgbClr val="000000"/>
                     </a:solidFill>
@@ -11156,7 +11156,7 @@
               </a:ln>
               <a:extLst>
                 <a:ext uri="{91240B29-F687-4f45-9708-019B960494DF}">
-                  <a14:hiddenLine xmlns="" xmlns:a14="http://schemas.microsoft.com/office/drawing/2010/main" w="9525">
+                  <a14:hiddenLine xmlns:a14="http://schemas.microsoft.com/office/drawing/2010/main" xmlns="" w="9525">
                     <a:solidFill>
                       <a:srgbClr val="000000"/>
                     </a:solidFill>
@@ -11221,7 +11221,7 @@
               </a:ln>
               <a:extLst>
                 <a:ext uri="{91240B29-F687-4f45-9708-019B960494DF}">
-                  <a14:hiddenLine xmlns="" xmlns:a14="http://schemas.microsoft.com/office/drawing/2010/main" w="9525">
+                  <a14:hiddenLine xmlns:a14="http://schemas.microsoft.com/office/drawing/2010/main" xmlns="" w="9525">
                     <a:solidFill>
                       <a:srgbClr val="000000"/>
                     </a:solidFill>
@@ -11283,7 +11283,7 @@
               </a:ln>
               <a:extLst>
                 <a:ext uri="{91240B29-F687-4f45-9708-019B960494DF}">
-                  <a14:hiddenLine xmlns="" xmlns:a14="http://schemas.microsoft.com/office/drawing/2010/main" w="9525">
+                  <a14:hiddenLine xmlns:a14="http://schemas.microsoft.com/office/drawing/2010/main" xmlns="" w="9525">
                     <a:solidFill>
                       <a:srgbClr val="000000"/>
                     </a:solidFill>
@@ -11373,7 +11373,7 @@
               </a:ln>
               <a:extLst>
                 <a:ext uri="{91240B29-F687-4f45-9708-019B960494DF}">
-                  <a14:hiddenLine xmlns="" xmlns:a14="http://schemas.microsoft.com/office/drawing/2010/main" w="9525">
+                  <a14:hiddenLine xmlns:a14="http://schemas.microsoft.com/office/drawing/2010/main" xmlns="" w="9525">
                     <a:solidFill>
                       <a:srgbClr val="000000"/>
                     </a:solidFill>
@@ -11463,7 +11463,7 @@
               </a:ln>
               <a:extLst>
                 <a:ext uri="{91240B29-F687-4f45-9708-019B960494DF}">
-                  <a14:hiddenLine xmlns="" xmlns:a14="http://schemas.microsoft.com/office/drawing/2010/main" w="9525">
+                  <a14:hiddenLine xmlns:a14="http://schemas.microsoft.com/office/drawing/2010/main" xmlns="" w="9525">
                     <a:solidFill>
                       <a:srgbClr val="000000"/>
                     </a:solidFill>
@@ -11528,7 +11528,7 @@
               </a:ln>
               <a:extLst>
                 <a:ext uri="{91240B29-F687-4f45-9708-019B960494DF}">
-                  <a14:hiddenLine xmlns="" xmlns:a14="http://schemas.microsoft.com/office/drawing/2010/main" w="9525">
+                  <a14:hiddenLine xmlns:a14="http://schemas.microsoft.com/office/drawing/2010/main" xmlns="" w="9525">
                     <a:solidFill>
                       <a:srgbClr val="000000"/>
                     </a:solidFill>
@@ -11648,7 +11648,7 @@
               </a:ln>
               <a:extLst>
                 <a:ext uri="{91240B29-F687-4f45-9708-019B960494DF}">
-                  <a14:hiddenLine xmlns="" xmlns:a14="http://schemas.microsoft.com/office/drawing/2010/main" w="9525">
+                  <a14:hiddenLine xmlns:a14="http://schemas.microsoft.com/office/drawing/2010/main" xmlns="" w="9525">
                     <a:solidFill>
                       <a:srgbClr val="000000"/>
                     </a:solidFill>
@@ -11729,7 +11729,7 @@
               </a:ln>
               <a:extLst>
                 <a:ext uri="{91240B29-F687-4f45-9708-019B960494DF}">
-                  <a14:hiddenLine xmlns="" xmlns:a14="http://schemas.microsoft.com/office/drawing/2010/main" w="9525">
+                  <a14:hiddenLine xmlns:a14="http://schemas.microsoft.com/office/drawing/2010/main" xmlns="" w="9525">
                     <a:solidFill>
                       <a:srgbClr val="000000"/>
                     </a:solidFill>
@@ -11844,7 +11844,7 @@
               </a:ln>
               <a:extLst>
                 <a:ext uri="{91240B29-F687-4f45-9708-019B960494DF}">
-                  <a14:hiddenLine xmlns="" xmlns:a14="http://schemas.microsoft.com/office/drawing/2010/main" w="9525">
+                  <a14:hiddenLine xmlns:a14="http://schemas.microsoft.com/office/drawing/2010/main" xmlns="" w="9525">
                     <a:solidFill>
                       <a:srgbClr val="000000"/>
                     </a:solidFill>
@@ -11934,7 +11934,7 @@
               </a:ln>
               <a:extLst>
                 <a:ext uri="{91240B29-F687-4f45-9708-019B960494DF}">
-                  <a14:hiddenLine xmlns="" xmlns:a14="http://schemas.microsoft.com/office/drawing/2010/main" w="9525">
+                  <a14:hiddenLine xmlns:a14="http://schemas.microsoft.com/office/drawing/2010/main" xmlns="" w="9525">
                     <a:solidFill>
                       <a:srgbClr val="000000"/>
                     </a:solidFill>
@@ -11999,7 +11999,7 @@
               </a:ln>
               <a:extLst>
                 <a:ext uri="{91240B29-F687-4f45-9708-019B960494DF}">
-                  <a14:hiddenLine xmlns="" xmlns:a14="http://schemas.microsoft.com/office/drawing/2010/main" w="9525">
+                  <a14:hiddenLine xmlns:a14="http://schemas.microsoft.com/office/drawing/2010/main" xmlns="" w="9525">
                     <a:solidFill>
                       <a:srgbClr val="000000"/>
                     </a:solidFill>
@@ -12089,7 +12089,7 @@
               </a:ln>
               <a:extLst>
                 <a:ext uri="{91240B29-F687-4f45-9708-019B960494DF}">
-                  <a14:hiddenLine xmlns="" xmlns:a14="http://schemas.microsoft.com/office/drawing/2010/main" w="9525">
+                  <a14:hiddenLine xmlns:a14="http://schemas.microsoft.com/office/drawing/2010/main" xmlns="" w="9525">
                     <a:solidFill>
                       <a:srgbClr val="000000"/>
                     </a:solidFill>
@@ -12157,7 +12157,7 @@
               </a:ln>
               <a:extLst>
                 <a:ext uri="{91240B29-F687-4f45-9708-019B960494DF}">
-                  <a14:hiddenLine xmlns="" xmlns:a14="http://schemas.microsoft.com/office/drawing/2010/main" w="9525">
+                  <a14:hiddenLine xmlns:a14="http://schemas.microsoft.com/office/drawing/2010/main" xmlns="" w="9525">
                     <a:solidFill>
                       <a:srgbClr val="000000"/>
                     </a:solidFill>
@@ -12247,7 +12247,7 @@
               </a:ln>
               <a:extLst>
                 <a:ext uri="{91240B29-F687-4f45-9708-019B960494DF}">
-                  <a14:hiddenLine xmlns="" xmlns:a14="http://schemas.microsoft.com/office/drawing/2010/main" w="9525">
+                  <a14:hiddenLine xmlns:a14="http://schemas.microsoft.com/office/drawing/2010/main" xmlns="" w="9525">
                     <a:solidFill>
                       <a:srgbClr val="000000"/>
                     </a:solidFill>
@@ -12315,7 +12315,7 @@
               </a:ln>
               <a:extLst>
                 <a:ext uri="{91240B29-F687-4f45-9708-019B960494DF}">
-                  <a14:hiddenLine xmlns="" xmlns:a14="http://schemas.microsoft.com/office/drawing/2010/main" w="9525">
+                  <a14:hiddenLine xmlns:a14="http://schemas.microsoft.com/office/drawing/2010/main" xmlns="" w="9525">
                     <a:solidFill>
                       <a:srgbClr val="000000"/>
                     </a:solidFill>
@@ -12405,7 +12405,7 @@
               </a:ln>
               <a:extLst>
                 <a:ext uri="{91240B29-F687-4f45-9708-019B960494DF}">
-                  <a14:hiddenLine xmlns="" xmlns:a14="http://schemas.microsoft.com/office/drawing/2010/main" w="9525">
+                  <a14:hiddenLine xmlns:a14="http://schemas.microsoft.com/office/drawing/2010/main" xmlns="" w="9525">
                     <a:solidFill>
                       <a:srgbClr val="000000"/>
                     </a:solidFill>
@@ -12439,7 +12439,7 @@
               </a:ln>
               <a:extLst>
                 <a:ext uri="{91240B29-F687-4f45-9708-019B960494DF}">
-                  <a14:hiddenLine xmlns="" xmlns:a14="http://schemas.microsoft.com/office/drawing/2010/main" w="9525">
+                  <a14:hiddenLine xmlns:a14="http://schemas.microsoft.com/office/drawing/2010/main" xmlns="" w="9525">
                     <a:solidFill>
                       <a:srgbClr val="000000"/>
                     </a:solidFill>
@@ -12580,7 +12580,7 @@
             <a:fld id="{48A87A34-81AB-432B-8DAE-1953F412C126}" type="datetimeFigureOut">
               <a:rPr lang="en-US" smtClean="0"/>
               <a:pPr/>
-              <a:t>1/11/2020</a:t>
+              <a:t>2/21/2020</a:t>
             </a:fld>
             <a:endParaRPr lang="en-US" dirty="0"/>
           </a:p>
@@ -13068,12 +13068,31 @@
           <a:p>
             <a:pPr algn="ctr"/>
             <a:r>
+              <a:rPr lang="en-US" sz="2400" dirty="0" err="1">
+                <a:latin typeface="Tahoma" panose="020B0604030504040204" pitchFamily="34" charset="0"/>
+                <a:ea typeface="Tahoma" panose="020B0604030504040204" pitchFamily="34" charset="0"/>
+                <a:cs typeface="Tahoma" panose="020B0604030504040204" pitchFamily="34" charset="0"/>
+              </a:rPr>
+              <a:t>InstructorS</a:t>
+            </a:r>
+            <a:r>
               <a:rPr lang="en-US" sz="2400" dirty="0">
                 <a:latin typeface="Tahoma" panose="020B0604030504040204" pitchFamily="34" charset="0"/>
                 <a:ea typeface="Tahoma" panose="020B0604030504040204" pitchFamily="34" charset="0"/>
                 <a:cs typeface="Tahoma" panose="020B0604030504040204" pitchFamily="34" charset="0"/>
               </a:rPr>
-              <a:t>Instructor – Zach martin</a:t>
+              <a:t> – </a:t>
+            </a:r>
+          </a:p>
+          <a:p>
+            <a:pPr algn="ctr"/>
+            <a:r>
+              <a:rPr lang="en-US" sz="2400" dirty="0">
+                <a:latin typeface="Tahoma" panose="020B0604030504040204" pitchFamily="34" charset="0"/>
+                <a:ea typeface="Tahoma" panose="020B0604030504040204" pitchFamily="34" charset="0"/>
+                <a:cs typeface="Tahoma" panose="020B0604030504040204" pitchFamily="34" charset="0"/>
+              </a:rPr>
+              <a:t>Zach martin &amp; Chris Daniels</a:t>
             </a:r>
           </a:p>
         </p:txBody>
@@ -13159,7 +13178,7 @@
           <a:p>
             <a:r>
               <a:rPr lang="en-US" dirty="0"/>
-              <a:t>Create another repository in </a:t>
+              <a:t>Create a repository in </a:t>
             </a:r>
             <a:r>
               <a:rPr lang="en-US" dirty="0" err="1"/>
@@ -14275,7 +14294,7 @@
         </p:spPr>
         <p:txBody>
           <a:bodyPr>
-            <a:normAutofit lnSpcReduction="10000"/>
+            <a:normAutofit fontScale="92500" lnSpcReduction="10000"/>
           </a:bodyPr>
           <a:lstStyle/>
           <a:p>
@@ -14301,65 +14320,16 @@
             </a:endParaRPr>
           </a:p>
           <a:p>
-            <a:pPr lvl="1"/>
+            <a:pPr marL="0" indent="0">
+              <a:buNone/>
+            </a:pPr>
             <a:r>
               <a:rPr lang="en-US" dirty="0">
                 <a:latin typeface="Tahoma" panose="020B0604030504040204" pitchFamily="34" charset="0"/>
                 <a:ea typeface="Tahoma" panose="020B0604030504040204" pitchFamily="34" charset="0"/>
                 <a:cs typeface="Tahoma" panose="020B0604030504040204" pitchFamily="34" charset="0"/>
               </a:rPr>
-              <a:t>Download Visual Studio Code</a:t>
-            </a:r>
-          </a:p>
-          <a:p>
-            <a:pPr lvl="1"/>
-            <a:r>
-              <a:rPr lang="en-US" dirty="0">
-                <a:latin typeface="Tahoma" panose="020B0604030504040204" pitchFamily="34" charset="0"/>
-                <a:ea typeface="Tahoma" panose="020B0604030504040204" pitchFamily="34" charset="0"/>
-                <a:cs typeface="Tahoma" panose="020B0604030504040204" pitchFamily="34" charset="0"/>
-              </a:rPr>
-              <a:t>Download git-</a:t>
-            </a:r>
-            <a:r>
-              <a:rPr lang="en-US" dirty="0" err="1">
-                <a:latin typeface="Tahoma" panose="020B0604030504040204" pitchFamily="34" charset="0"/>
-                <a:ea typeface="Tahoma" panose="020B0604030504040204" pitchFamily="34" charset="0"/>
-                <a:cs typeface="Tahoma" panose="020B0604030504040204" pitchFamily="34" charset="0"/>
-              </a:rPr>
-              <a:t>scm</a:t>
-            </a:r>
-            <a:r>
-              <a:rPr lang="en-US" dirty="0">
-                <a:latin typeface="Tahoma" panose="020B0604030504040204" pitchFamily="34" charset="0"/>
-                <a:ea typeface="Tahoma" panose="020B0604030504040204" pitchFamily="34" charset="0"/>
-                <a:cs typeface="Tahoma" panose="020B0604030504040204" pitchFamily="34" charset="0"/>
-              </a:rPr>
-              <a:t> for your OS</a:t>
-            </a:r>
-          </a:p>
-          <a:p>
-            <a:pPr lvl="1"/>
-            <a:r>
-              <a:rPr lang="en-US" dirty="0">
-                <a:latin typeface="Tahoma" panose="020B0604030504040204" pitchFamily="34" charset="0"/>
-                <a:ea typeface="Tahoma" panose="020B0604030504040204" pitchFamily="34" charset="0"/>
-                <a:cs typeface="Tahoma" panose="020B0604030504040204" pitchFamily="34" charset="0"/>
-              </a:rPr>
-              <a:t>Download GitHub Desktop</a:t>
-            </a:r>
-          </a:p>
-          <a:p>
-            <a:pPr marL="0" indent="0">
-              <a:buNone/>
-            </a:pPr>
-            <a:r>
-              <a:rPr lang="en-US" dirty="0">
-                <a:latin typeface="Tahoma" panose="020B0604030504040204" pitchFamily="34" charset="0"/>
-                <a:ea typeface="Tahoma" panose="020B0604030504040204" pitchFamily="34" charset="0"/>
-                <a:cs typeface="Tahoma" panose="020B0604030504040204" pitchFamily="34" charset="0"/>
-              </a:rPr>
-              <a:t>While that is downloading… A quick introduction –</a:t>
+              <a:t>A quick introduction –</a:t>
             </a:r>
           </a:p>
           <a:p>
@@ -14405,7 +14375,53 @@
                 <a:ea typeface="Tahoma" panose="020B0604030504040204" pitchFamily="34" charset="0"/>
                 <a:cs typeface="Tahoma" panose="020B0604030504040204" pitchFamily="34" charset="0"/>
               </a:rPr>
-              <a:t>Father to a six-month-old baby girl</a:t>
+              <a:t>Father to a seven-month-old baby girl</a:t>
+            </a:r>
+          </a:p>
+          <a:p>
+            <a:pPr marL="457200" lvl="1" indent="0">
+              <a:buNone/>
+            </a:pPr>
+            <a:r>
+              <a:rPr lang="en-US" dirty="0">
+                <a:latin typeface="Tahoma" panose="020B0604030504040204" pitchFamily="34" charset="0"/>
+                <a:ea typeface="Tahoma" panose="020B0604030504040204" pitchFamily="34" charset="0"/>
+                <a:cs typeface="Tahoma" panose="020B0604030504040204" pitchFamily="34" charset="0"/>
+              </a:rPr>
+              <a:t>Chris Daniels</a:t>
+            </a:r>
+          </a:p>
+          <a:p>
+            <a:pPr lvl="1"/>
+            <a:r>
+              <a:rPr lang="en-US" dirty="0">
+                <a:latin typeface="Tahoma" panose="020B0604030504040204" pitchFamily="34" charset="0"/>
+                <a:ea typeface="Tahoma" panose="020B0604030504040204" pitchFamily="34" charset="0"/>
+                <a:cs typeface="Tahoma" panose="020B0604030504040204" pitchFamily="34" charset="0"/>
+              </a:rPr>
+              <a:t>Heads up the 1819 Initiative at UC</a:t>
+            </a:r>
+          </a:p>
+          <a:p>
+            <a:pPr lvl="1"/>
+            <a:r>
+              <a:rPr lang="en-US" dirty="0">
+                <a:latin typeface="Tahoma" panose="020B0604030504040204" pitchFamily="34" charset="0"/>
+                <a:ea typeface="Tahoma" panose="020B0604030504040204" pitchFamily="34" charset="0"/>
+                <a:cs typeface="Tahoma" panose="020B0604030504040204" pitchFamily="34" charset="0"/>
+              </a:rPr>
+              <a:t>7 years professional software development experience</a:t>
+            </a:r>
+          </a:p>
+          <a:p>
+            <a:pPr lvl="1"/>
+            <a:r>
+              <a:rPr lang="en-US" dirty="0">
+                <a:latin typeface="Tahoma" panose="020B0604030504040204" pitchFamily="34" charset="0"/>
+                <a:ea typeface="Tahoma" panose="020B0604030504040204" pitchFamily="34" charset="0"/>
+                <a:cs typeface="Tahoma" panose="020B0604030504040204" pitchFamily="34" charset="0"/>
+              </a:rPr>
+              <a:t>Father to a five-month-old baby boy</a:t>
             </a:r>
           </a:p>
         </p:txBody>
@@ -14496,68 +14512,72 @@
         </p:spPr>
         <p:txBody>
           <a:bodyPr>
-            <a:normAutofit fontScale="92500" lnSpcReduction="10000"/>
+            <a:normAutofit/>
           </a:bodyPr>
           <a:lstStyle/>
           <a:p>
             <a:r>
               <a:rPr lang="en-US" dirty="0"/>
-              <a:t>Issue tracking</a:t>
+              <a:t>Commit History</a:t>
             </a:r>
           </a:p>
           <a:p>
             <a:r>
               <a:rPr lang="en-US" dirty="0"/>
-              <a:t>Documentation</a:t>
+              <a:t>Pull Requests</a:t>
             </a:r>
           </a:p>
           <a:p>
             <a:r>
               <a:rPr lang="en-US" dirty="0"/>
-              <a:t>Marketplace</a:t>
-            </a:r>
-          </a:p>
-          <a:p>
+              <a:t>Settings</a:t>
+            </a:r>
+          </a:p>
+          <a:p>
+            <a:pPr lvl="1"/>
             <a:r>
               <a:rPr lang="en-US" dirty="0"/>
-              <a:t>Actions</a:t>
-            </a:r>
-          </a:p>
-          <a:p>
+              <a:t>Features</a:t>
+            </a:r>
+          </a:p>
+          <a:p>
+            <a:pPr lvl="1"/>
             <a:r>
               <a:rPr lang="en-US" dirty="0"/>
-              <a:t>Pages</a:t>
-            </a:r>
-          </a:p>
-          <a:p>
+              <a:t>Access</a:t>
+            </a:r>
+          </a:p>
+          <a:p>
+            <a:pPr lvl="1"/>
             <a:r>
               <a:rPr lang="en-US" dirty="0"/>
-              <a:t>Social</a:t>
+              <a:t>Branch Protection</a:t>
             </a:r>
           </a:p>
           <a:p>
             <a:pPr lvl="1"/>
             <a:r>
               <a:rPr lang="en-US" dirty="0"/>
-              <a:t>Topics</a:t>
-            </a:r>
-          </a:p>
-          <a:p>
-            <a:pPr lvl="1"/>
+              <a:t>Notifications</a:t>
+            </a:r>
+          </a:p>
+          <a:p>
             <a:r>
               <a:rPr lang="en-US" dirty="0"/>
-              <a:t>Trending</a:t>
-            </a:r>
-          </a:p>
-          <a:p>
-            <a:pPr lvl="1"/>
-            <a:r>
-              <a:rPr lang="en-US" dirty="0"/>
-              <a:t>Collections</a:t>
-            </a:r>
-          </a:p>
-          <a:p>
-            <a:pPr lvl="1"/>
+              <a:t>Additional Resources Found at - </a:t>
+            </a:r>
+            <a:r>
+              <a:rPr lang="en-US" dirty="0">
+                <a:hlinkClick r:id="rId2">
+                  <a:extLst>
+                    <a:ext uri="{A12FA001-AC4F-418D-AE19-62706E023703}">
+                      <ahyp:hlinkClr xmlns:ahyp="http://schemas.microsoft.com/office/drawing/2018/hyperlinkcolor" val="tx"/>
+                    </a:ext>
+                  </a:extLst>
+                </a:hlinkClick>
+              </a:rPr>
+              <a:t>http://github.zach-martin.com/resources.html</a:t>
+            </a:r>
             <a:endParaRPr lang="en-US" dirty="0"/>
           </a:p>
         </p:txBody>
@@ -14677,6 +14697,18 @@
               </a:solidFill>
             </a:endParaRPr>
           </a:p>
+          <a:p>
+            <a:r>
+              <a:rPr lang="en-US" dirty="0">
+                <a:solidFill>
+                  <a:schemeClr val="tx1">
+                    <a:lumMod val="95000"/>
+                  </a:schemeClr>
+                </a:solidFill>
+              </a:rPr>
+              <a:t>Hope to see most of you in the GitHub Advanced Class!</a:t>
+            </a:r>
+          </a:p>
         </p:txBody>
       </p:sp>
     </p:spTree>
@@ -14792,21 +14824,21 @@
           <a:p>
             <a:r>
               <a:rPr lang="en-US" dirty="0"/>
-              <a:t>GitHub features beyond git</a:t>
+              <a:t>Basic GitHub Features</a:t>
             </a:r>
           </a:p>
           <a:p>
             <a:pPr lvl="1"/>
             <a:r>
               <a:rPr lang="en-US" dirty="0"/>
-              <a:t>Issue tracking</a:t>
+              <a:t>Quickly create your own repo</a:t>
             </a:r>
           </a:p>
           <a:p>
             <a:pPr lvl="1"/>
             <a:r>
               <a:rPr lang="en-US" dirty="0"/>
-              <a:t>Actions</a:t>
+              <a:t>Understand basic features and details about your repo</a:t>
             </a:r>
           </a:p>
         </p:txBody>
@@ -15686,6 +15718,12 @@
             <a:r>
               <a:rPr lang="en-US" dirty="0"/>
               <a:t>Fetch</a:t>
+            </a:r>
+          </a:p>
+          <a:p>
+            <a:r>
+              <a:rPr lang="en-US" dirty="0"/>
+              <a:t>Rebase</a:t>
             </a:r>
           </a:p>
           <a:p>
@@ -16726,6 +16764,14 @@
 </file>
 
 <file path=customXml/item2.xml><?xml version="1.0" encoding="utf-8"?>
+<p:properties xmlns:p="http://schemas.microsoft.com/office/2006/metadata/properties" xmlns:xsi="http://www.w3.org/2001/XMLSchema-instance" xmlns:pc="http://schemas.microsoft.com/office/infopath/2007/PartnerControls">
+  <documentManagement>
+    <MediaServiceKeyPoints xmlns="71af3243-3dd4-4a8d-8c0d-dd76da1f02a5" xsi:nil="true"/>
+  </documentManagement>
+</p:properties>
+</file>
+
+<file path=customXml/item3.xml><?xml version="1.0" encoding="utf-8"?>
 <ct:contentTypeSchema xmlns:ct="http://schemas.microsoft.com/office/2006/metadata/contentType" xmlns:ma="http://schemas.microsoft.com/office/2006/metadata/properties/metaAttributes" ct:_="" ma:_="" ma:contentTypeName="Document" ma:contentTypeID="0x01010079F111ED35F8CC479449609E8A0923A6" ma:contentTypeVersion="11" ma:contentTypeDescription="Create a new document." ma:contentTypeScope="" ma:versionID="96291512c1ee715ab617f4c07df79fc1">
   <xsd:schema xmlns:xsd="http://www.w3.org/2001/XMLSchema" xmlns:xs="http://www.w3.org/2001/XMLSchema" xmlns:p="http://schemas.microsoft.com/office/2006/metadata/properties" xmlns:ns2="71af3243-3dd4-4a8d-8c0d-dd76da1f02a5" xmlns:ns3="16c05727-aa75-4e4a-9b5f-8a80a1165891" targetNamespace="http://schemas.microsoft.com/office/2006/metadata/properties" ma:root="true" ma:fieldsID="8256c27c40ca5c40ce1cf6c44f0205df" ns2:_="" ns3:_="">
     <xsd:import namespace="71af3243-3dd4-4a8d-8c0d-dd76da1f02a5"/>
@@ -16936,14 +16982,6 @@
 </ct:contentTypeSchema>
 </file>
 
-<file path=customXml/item3.xml><?xml version="1.0" encoding="utf-8"?>
-<p:properties xmlns:p="http://schemas.microsoft.com/office/2006/metadata/properties" xmlns:xsi="http://www.w3.org/2001/XMLSchema-instance" xmlns:pc="http://schemas.microsoft.com/office/infopath/2007/PartnerControls">
-  <documentManagement>
-    <MediaServiceKeyPoints xmlns="71af3243-3dd4-4a8d-8c0d-dd76da1f02a5" xsi:nil="true"/>
-  </documentManagement>
-</p:properties>
-</file>
-
 <file path=customXml/itemProps1.xml><?xml version="1.0" encoding="utf-8"?>
 <ds:datastoreItem xmlns:ds="http://schemas.openxmlformats.org/officeDocument/2006/customXml" ds:itemID="{B579702B-25C7-40D7-9E29-7686B11A9660}">
   <ds:schemaRefs>
@@ -16953,6 +16991,16 @@
 </file>
 
 <file path=customXml/itemProps2.xml><?xml version="1.0" encoding="utf-8"?>
+<ds:datastoreItem xmlns:ds="http://schemas.openxmlformats.org/officeDocument/2006/customXml" ds:itemID="{E7866CFD-F94E-4AE5-ACEA-86FEC0F48A10}">
+  <ds:schemaRefs>
+    <ds:schemaRef ds:uri="http://schemas.microsoft.com/office/2006/metadata/properties"/>
+    <ds:schemaRef ds:uri="http://schemas.microsoft.com/office/infopath/2007/PartnerControls"/>
+    <ds:schemaRef ds:uri="71af3243-3dd4-4a8d-8c0d-dd76da1f02a5"/>
+  </ds:schemaRefs>
+</ds:datastoreItem>
+</file>
+
+<file path=customXml/itemProps3.xml><?xml version="1.0" encoding="utf-8"?>
 <ds:datastoreItem xmlns:ds="http://schemas.openxmlformats.org/officeDocument/2006/customXml" ds:itemID="{A7C0B241-13E5-418D-8920-D23491E2D2C0}">
   <ds:schemaRefs>
     <ds:schemaRef ds:uri="http://schemas.microsoft.com/office/2006/metadata/contentType"/>
@@ -16969,14 +17017,4 @@
     <ds:schemaRef ds:uri="http://schemas.microsoft.com/internal/obd"/>
   </ds:schemaRefs>
 </ds:datastoreItem>
-</file>
-
-<file path=customXml/itemProps3.xml><?xml version="1.0" encoding="utf-8"?>
-<ds:datastoreItem xmlns:ds="http://schemas.openxmlformats.org/officeDocument/2006/customXml" ds:itemID="{E7866CFD-F94E-4AE5-ACEA-86FEC0F48A10}">
-  <ds:schemaRefs>
-    <ds:schemaRef ds:uri="http://schemas.microsoft.com/office/2006/metadata/properties"/>
-    <ds:schemaRef ds:uri="http://schemas.microsoft.com/office/infopath/2007/PartnerControls"/>
-    <ds:schemaRef ds:uri="71af3243-3dd4-4a8d-8c0d-dd76da1f02a5"/>
-  </ds:schemaRefs>
-</ds:datastoreItem>
 </file>
</xml_diff>

<commit_message>
Updating Powerpoint for 12/5 class.
</commit_message>
<xml_diff>
--- a/resources/Introduction to github.pptx
+++ b/resources/Introduction to github.pptx
@@ -235,7 +235,7 @@
           <a:p>
             <a:fld id="{2B85766F-5EC0-4797-B4D1-777FCB005B11}" type="datetimeFigureOut">
               <a:rPr lang="en-US" smtClean="0"/>
-              <a:t>2/22/2020</a:t>
+              <a:t>12/3/2020</a:t>
             </a:fld>
             <a:endParaRPr lang="en-US" dirty="0"/>
           </a:p>
@@ -412,7 +412,7 @@
           <a:p>
             <a:fld id="{B2B4B5EC-152C-4627-80C0-63B10D5574EF}" type="datetimeFigureOut">
               <a:rPr lang="en-US" smtClean="0"/>
-              <a:t>2/22/2020</a:t>
+              <a:t>12/3/2020</a:t>
             </a:fld>
             <a:endParaRPr lang="en-US" dirty="0"/>
           </a:p>
@@ -4961,7 +4961,7 @@
           <a:p>
             <a:fld id="{48A87A34-81AB-432B-8DAE-1953F412C126}" type="datetimeFigureOut">
               <a:rPr lang="en-US" smtClean="0"/>
-              <a:t>2/22/2020</a:t>
+              <a:t>12/3/2020</a:t>
             </a:fld>
             <a:endParaRPr lang="en-US" dirty="0"/>
           </a:p>
@@ -5228,7 +5228,7 @@
           <a:p>
             <a:fld id="{48A87A34-81AB-432B-8DAE-1953F412C126}" type="datetimeFigureOut">
               <a:rPr lang="en-US" smtClean="0"/>
-              <a:t>2/22/2020</a:t>
+              <a:t>12/3/2020</a:t>
             </a:fld>
             <a:endParaRPr lang="en-US" dirty="0"/>
           </a:p>
@@ -5424,7 +5424,7 @@
           <a:p>
             <a:fld id="{48A87A34-81AB-432B-8DAE-1953F412C126}" type="datetimeFigureOut">
               <a:rPr lang="en-US" smtClean="0"/>
-              <a:t>2/22/2020</a:t>
+              <a:t>12/3/2020</a:t>
             </a:fld>
             <a:endParaRPr lang="en-US" dirty="0"/>
           </a:p>
@@ -5687,7 +5687,7 @@
           <a:p>
             <a:fld id="{48A87A34-81AB-432B-8DAE-1953F412C126}" type="datetimeFigureOut">
               <a:rPr lang="en-US" smtClean="0"/>
-              <a:t>2/22/2020</a:t>
+              <a:t>12/3/2020</a:t>
             </a:fld>
             <a:endParaRPr lang="en-US" dirty="0"/>
           </a:p>
@@ -6121,7 +6121,7 @@
           <a:p>
             <a:fld id="{48A87A34-81AB-432B-8DAE-1953F412C126}" type="datetimeFigureOut">
               <a:rPr lang="en-US" smtClean="0"/>
-              <a:t>2/22/2020</a:t>
+              <a:t>12/3/2020</a:t>
             </a:fld>
             <a:endParaRPr lang="en-US" dirty="0"/>
           </a:p>
@@ -6667,7 +6667,7 @@
           <a:p>
             <a:fld id="{48A87A34-81AB-432B-8DAE-1953F412C126}" type="datetimeFigureOut">
               <a:rPr lang="en-US" smtClean="0"/>
-              <a:t>2/22/2020</a:t>
+              <a:t>12/3/2020</a:t>
             </a:fld>
             <a:endParaRPr lang="en-US" dirty="0"/>
           </a:p>
@@ -7387,7 +7387,7 @@
           <a:p>
             <a:fld id="{48A87A34-81AB-432B-8DAE-1953F412C126}" type="datetimeFigureOut">
               <a:rPr lang="en-US" smtClean="0"/>
-              <a:t>2/22/2020</a:t>
+              <a:t>12/3/2020</a:t>
             </a:fld>
             <a:endParaRPr lang="en-US" dirty="0"/>
           </a:p>
@@ -7557,7 +7557,7 @@
           <a:p>
             <a:fld id="{48A87A34-81AB-432B-8DAE-1953F412C126}" type="datetimeFigureOut">
               <a:rPr lang="en-US" smtClean="0"/>
-              <a:t>2/22/2020</a:t>
+              <a:t>12/3/2020</a:t>
             </a:fld>
             <a:endParaRPr lang="en-US" dirty="0"/>
           </a:p>
@@ -7737,7 +7737,7 @@
           <a:p>
             <a:fld id="{48A87A34-81AB-432B-8DAE-1953F412C126}" type="datetimeFigureOut">
               <a:rPr lang="en-US" smtClean="0"/>
-              <a:t>2/22/2020</a:t>
+              <a:t>12/3/2020</a:t>
             </a:fld>
             <a:endParaRPr lang="en-US" dirty="0"/>
           </a:p>
@@ -7907,7 +7907,7 @@
           <a:p>
             <a:fld id="{48A87A34-81AB-432B-8DAE-1953F412C126}" type="datetimeFigureOut">
               <a:rPr lang="en-US" smtClean="0"/>
-              <a:t>2/22/2020</a:t>
+              <a:t>12/3/2020</a:t>
             </a:fld>
             <a:endParaRPr lang="en-US" dirty="0"/>
           </a:p>
@@ -8157,7 +8157,7 @@
           <a:p>
             <a:fld id="{48A87A34-81AB-432B-8DAE-1953F412C126}" type="datetimeFigureOut">
               <a:rPr lang="en-US" smtClean="0"/>
-              <a:t>2/22/2020</a:t>
+              <a:t>12/3/2020</a:t>
             </a:fld>
             <a:endParaRPr lang="en-US" dirty="0"/>
           </a:p>
@@ -8389,7 +8389,7 @@
           <a:p>
             <a:fld id="{48A87A34-81AB-432B-8DAE-1953F412C126}" type="datetimeFigureOut">
               <a:rPr lang="en-US" smtClean="0"/>
-              <a:t>2/22/2020</a:t>
+              <a:t>12/3/2020</a:t>
             </a:fld>
             <a:endParaRPr lang="en-US" dirty="0"/>
           </a:p>
@@ -8770,7 +8770,7 @@
           <a:p>
             <a:fld id="{48A87A34-81AB-432B-8DAE-1953F412C126}" type="datetimeFigureOut">
               <a:rPr lang="en-US" smtClean="0"/>
-              <a:t>2/22/2020</a:t>
+              <a:t>12/3/2020</a:t>
             </a:fld>
             <a:endParaRPr lang="en-US" dirty="0"/>
           </a:p>
@@ -8888,7 +8888,7 @@
           <a:p>
             <a:fld id="{48A87A34-81AB-432B-8DAE-1953F412C126}" type="datetimeFigureOut">
               <a:rPr lang="en-US" smtClean="0"/>
-              <a:t>2/22/2020</a:t>
+              <a:t>12/3/2020</a:t>
             </a:fld>
             <a:endParaRPr lang="en-US" dirty="0"/>
           </a:p>
@@ -8983,7 +8983,7 @@
           <a:p>
             <a:fld id="{48A87A34-81AB-432B-8DAE-1953F412C126}" type="datetimeFigureOut">
               <a:rPr lang="en-US" smtClean="0"/>
-              <a:t>2/22/2020</a:t>
+              <a:t>12/3/2020</a:t>
             </a:fld>
             <a:endParaRPr lang="en-US" dirty="0"/>
           </a:p>
@@ -9232,7 +9232,7 @@
           <a:p>
             <a:fld id="{48A87A34-81AB-432B-8DAE-1953F412C126}" type="datetimeFigureOut">
               <a:rPr lang="en-US" smtClean="0"/>
-              <a:t>2/22/2020</a:t>
+              <a:t>12/3/2020</a:t>
             </a:fld>
             <a:endParaRPr lang="en-US" dirty="0"/>
           </a:p>
@@ -9512,7 +9512,7 @@
           <a:p>
             <a:fld id="{48A87A34-81AB-432B-8DAE-1953F412C126}" type="datetimeFigureOut">
               <a:rPr lang="en-US" smtClean="0"/>
-              <a:t>2/22/2020</a:t>
+              <a:t>12/3/2020</a:t>
             </a:fld>
             <a:endParaRPr lang="en-US" dirty="0"/>
           </a:p>
@@ -12580,7 +12580,7 @@
             <a:fld id="{48A87A34-81AB-432B-8DAE-1953F412C126}" type="datetimeFigureOut">
               <a:rPr lang="en-US" smtClean="0"/>
               <a:pPr/>
-              <a:t>2/22/2020</a:t>
+              <a:t>12/3/2020</a:t>
             </a:fld>
             <a:endParaRPr lang="en-US" dirty="0"/>
           </a:p>
@@ -13068,32 +13068,37 @@
           <a:p>
             <a:pPr algn="ctr"/>
             <a:r>
+              <a:rPr lang="en-US" sz="2400" dirty="0">
+                <a:latin typeface="Tahoma" panose="020B0604030504040204" pitchFamily="34" charset="0"/>
+                <a:ea typeface="Tahoma" panose="020B0604030504040204" pitchFamily="34" charset="0"/>
+                <a:cs typeface="Tahoma" panose="020B0604030504040204" pitchFamily="34" charset="0"/>
+              </a:rPr>
+              <a:t>Instructor – </a:t>
+            </a:r>
+          </a:p>
+          <a:p>
+            <a:pPr algn="ctr"/>
+            <a:r>
+              <a:rPr lang="en-US" sz="2400" dirty="0">
+                <a:latin typeface="Tahoma" panose="020B0604030504040204" pitchFamily="34" charset="0"/>
+                <a:ea typeface="Tahoma" panose="020B0604030504040204" pitchFamily="34" charset="0"/>
+                <a:cs typeface="Tahoma" panose="020B0604030504040204" pitchFamily="34" charset="0"/>
+              </a:rPr>
+              <a:t>Zach </a:t>
+            </a:r>
+            <a:r>
               <a:rPr lang="en-US" sz="2400" dirty="0" err="1">
                 <a:latin typeface="Tahoma" panose="020B0604030504040204" pitchFamily="34" charset="0"/>
                 <a:ea typeface="Tahoma" panose="020B0604030504040204" pitchFamily="34" charset="0"/>
                 <a:cs typeface="Tahoma" panose="020B0604030504040204" pitchFamily="34" charset="0"/>
               </a:rPr>
-              <a:t>InstructorS</a:t>
-            </a:r>
-            <a:r>
-              <a:rPr lang="en-US" sz="2400" dirty="0">
-                <a:latin typeface="Tahoma" panose="020B0604030504040204" pitchFamily="34" charset="0"/>
-                <a:ea typeface="Tahoma" panose="020B0604030504040204" pitchFamily="34" charset="0"/>
-                <a:cs typeface="Tahoma" panose="020B0604030504040204" pitchFamily="34" charset="0"/>
-              </a:rPr>
-              <a:t> – </a:t>
-            </a:r>
-          </a:p>
-          <a:p>
-            <a:pPr algn="ctr"/>
-            <a:r>
-              <a:rPr lang="en-US" sz="2400" dirty="0">
-                <a:latin typeface="Tahoma" panose="020B0604030504040204" pitchFamily="34" charset="0"/>
-                <a:ea typeface="Tahoma" panose="020B0604030504040204" pitchFamily="34" charset="0"/>
-                <a:cs typeface="Tahoma" panose="020B0604030504040204" pitchFamily="34" charset="0"/>
-              </a:rPr>
-              <a:t>Zach martin &amp; Chris Daniels</a:t>
-            </a:r>
+              <a:t>martiN</a:t>
+            </a:r>
+            <a:endParaRPr lang="en-US" sz="2400" dirty="0">
+              <a:latin typeface="Tahoma" panose="020B0604030504040204" pitchFamily="34" charset="0"/>
+              <a:ea typeface="Tahoma" panose="020B0604030504040204" pitchFamily="34" charset="0"/>
+              <a:cs typeface="Tahoma" panose="020B0604030504040204" pitchFamily="34" charset="0"/>
+            </a:endParaRPr>
           </a:p>
         </p:txBody>
       </p:sp>
@@ -14254,22 +14259,55 @@
             <p:ph type="title"/>
           </p:nvPr>
         </p:nvSpPr>
-        <p:spPr/>
+        <p:spPr>
+          <a:xfrm>
+            <a:off x="1146705" y="609601"/>
+            <a:ext cx="3856037" cy="1639884"/>
+          </a:xfrm>
+        </p:spPr>
         <p:txBody>
-          <a:bodyPr>
+          <a:bodyPr anchor="b">
             <a:normAutofit/>
           </a:bodyPr>
           <a:lstStyle/>
           <a:p>
             <a:r>
-              <a:rPr lang="en-US" sz="4400" dirty="0">
-                <a:latin typeface="Rockwell" panose="02060603020205020403" pitchFamily="18" charset="0"/>
-              </a:rPr>
+              <a:rPr lang="en-US"/>
               <a:t>Initial resources and Introductions</a:t>
             </a:r>
           </a:p>
         </p:txBody>
       </p:sp>
+      <p:pic>
+        <p:nvPicPr>
+          <p:cNvPr id="5" name="Picture 4">
+            <a:extLst>
+              <a:ext uri="{FF2B5EF4-FFF2-40B4-BE49-F238E27FC236}">
+                <a16:creationId xmlns:a16="http://schemas.microsoft.com/office/drawing/2014/main" id="{4DE7DAFC-00DA-4C23-BE73-0FBAB7B018A4}"/>
+              </a:ext>
+            </a:extLst>
+          </p:cNvPr>
+          <p:cNvPicPr>
+            <a:picLocks noChangeAspect="1"/>
+          </p:cNvPicPr>
+          <p:nvPr/>
+        </p:nvPicPr>
+        <p:blipFill rotWithShape="1">
+          <a:blip r:embed="rId2"/>
+          <a:srcRect r="-2" b="33817"/>
+          <a:stretch/>
+        </p:blipFill>
+        <p:spPr>
+          <a:xfrm>
+            <a:off x="6535737" y="1341414"/>
+            <a:ext cx="4509558" cy="3979334"/>
+          </a:xfrm>
+          <a:prstGeom prst="rect">
+            <a:avLst/>
+          </a:prstGeom>
+          <a:noFill/>
+        </p:spPr>
+      </p:pic>
       <p:sp>
         <p:nvSpPr>
           <p:cNvPr id="3" name="Content Placeholder 2">
@@ -14283,27 +14321,24 @@
             <a:spLocks noGrp="1"/>
           </p:cNvSpPr>
           <p:nvPr>
-            <p:ph idx="1"/>
+            <p:ph type="body" sz="half" idx="2"/>
           </p:nvPr>
         </p:nvSpPr>
         <p:spPr>
           <a:xfrm>
-            <a:off x="1141412" y="2249487"/>
-            <a:ext cx="9905999" cy="4126146"/>
+            <a:off x="1144591" y="2249485"/>
+            <a:ext cx="5077306" cy="3541714"/>
           </a:xfrm>
         </p:spPr>
         <p:txBody>
           <a:bodyPr>
-            <a:normAutofit fontScale="92500" lnSpcReduction="10000"/>
+            <a:normAutofit/>
           </a:bodyPr>
           <a:lstStyle/>
           <a:p>
             <a:r>
               <a:rPr lang="en-US" dirty="0">
-                <a:latin typeface="Tahoma" panose="020B0604030504040204" pitchFamily="34" charset="0"/>
-                <a:ea typeface="Tahoma" panose="020B0604030504040204" pitchFamily="34" charset="0"/>
-                <a:cs typeface="Tahoma" panose="020B0604030504040204" pitchFamily="34" charset="0"/>
-                <a:hlinkClick r:id="rId2">
+                <a:hlinkClick r:id="rId3">
                   <a:extLst>
                     <a:ext uri="{A12FA001-AC4F-418D-AE19-62706E023703}">
                       <ahyp:hlinkClr xmlns:ahyp="http://schemas.microsoft.com/office/drawing/2018/hyperlinkcolor" val="tx"/>
@@ -14313,22 +14348,14 @@
               </a:rPr>
               <a:t>https://github.zach-martin.com</a:t>
             </a:r>
-            <a:endParaRPr lang="en-US" dirty="0">
-              <a:latin typeface="Tahoma" panose="020B0604030504040204" pitchFamily="34" charset="0"/>
-              <a:ea typeface="Tahoma" panose="020B0604030504040204" pitchFamily="34" charset="0"/>
-              <a:cs typeface="Tahoma" panose="020B0604030504040204" pitchFamily="34" charset="0"/>
-            </a:endParaRPr>
+            <a:endParaRPr lang="en-US" dirty="0"/>
           </a:p>
           <a:p>
             <a:pPr marL="0" indent="0">
               <a:buNone/>
             </a:pPr>
             <a:r>
-              <a:rPr lang="en-US" dirty="0">
-                <a:latin typeface="Tahoma" panose="020B0604030504040204" pitchFamily="34" charset="0"/>
-                <a:ea typeface="Tahoma" panose="020B0604030504040204" pitchFamily="34" charset="0"/>
-                <a:cs typeface="Tahoma" panose="020B0604030504040204" pitchFamily="34" charset="0"/>
-              </a:rPr>
+              <a:rPr lang="en-US" dirty="0"/>
               <a:t>A quick introduction –</a:t>
             </a:r>
           </a:p>
@@ -14337,91 +14364,38 @@
               <a:buNone/>
             </a:pPr>
             <a:r>
-              <a:rPr lang="en-US" dirty="0">
-                <a:latin typeface="Tahoma" panose="020B0604030504040204" pitchFamily="34" charset="0"/>
-                <a:ea typeface="Tahoma" panose="020B0604030504040204" pitchFamily="34" charset="0"/>
-                <a:cs typeface="Tahoma" panose="020B0604030504040204" pitchFamily="34" charset="0"/>
-              </a:rPr>
+              <a:rPr lang="en-US" dirty="0"/>
               <a:t>    Zach Martin</a:t>
             </a:r>
           </a:p>
           <a:p>
-            <a:pPr lvl="1"/>
-            <a:r>
-              <a:rPr lang="en-US" dirty="0">
-                <a:latin typeface="Tahoma" panose="020B0604030504040204" pitchFamily="34" charset="0"/>
-                <a:ea typeface="Tahoma" panose="020B0604030504040204" pitchFamily="34" charset="0"/>
-                <a:cs typeface="Tahoma" panose="020B0604030504040204" pitchFamily="34" charset="0"/>
-              </a:rPr>
-              <a:t>14 years IT experience</a:t>
-            </a:r>
-          </a:p>
-          <a:p>
-            <a:pPr lvl="1"/>
-            <a:r>
-              <a:rPr lang="en-US" dirty="0">
-                <a:latin typeface="Tahoma" panose="020B0604030504040204" pitchFamily="34" charset="0"/>
-                <a:ea typeface="Tahoma" panose="020B0604030504040204" pitchFamily="34" charset="0"/>
-                <a:cs typeface="Tahoma" panose="020B0604030504040204" pitchFamily="34" charset="0"/>
-              </a:rPr>
-              <a:t>4 years professional software development experience</a:t>
-            </a:r>
-          </a:p>
-          <a:p>
-            <a:pPr lvl="1"/>
-            <a:r>
-              <a:rPr lang="en-US" dirty="0">
-                <a:latin typeface="Tahoma" panose="020B0604030504040204" pitchFamily="34" charset="0"/>
-                <a:ea typeface="Tahoma" panose="020B0604030504040204" pitchFamily="34" charset="0"/>
-                <a:cs typeface="Tahoma" panose="020B0604030504040204" pitchFamily="34" charset="0"/>
-              </a:rPr>
-              <a:t>Father to a seven-month-old baby girl</a:t>
-            </a:r>
-          </a:p>
-          <a:p>
-            <a:pPr marL="457200" lvl="1" indent="0">
-              <a:buNone/>
+            <a:pPr marL="742950" lvl="1" indent="-285750">
+              <a:buFont typeface="Arial" panose="020B0604020202020204" pitchFamily="34" charset="0"/>
+              <a:buChar char="•"/>
             </a:pPr>
             <a:r>
-              <a:rPr lang="en-US" dirty="0">
-                <a:latin typeface="Tahoma" panose="020B0604030504040204" pitchFamily="34" charset="0"/>
-                <a:ea typeface="Tahoma" panose="020B0604030504040204" pitchFamily="34" charset="0"/>
-                <a:cs typeface="Tahoma" panose="020B0604030504040204" pitchFamily="34" charset="0"/>
-              </a:rPr>
-              <a:t>Chris Daniels</a:t>
-            </a:r>
-          </a:p>
-          <a:p>
-            <a:pPr lvl="1"/>
-            <a:r>
-              <a:rPr lang="en-US" dirty="0">
-                <a:latin typeface="Tahoma" panose="020B0604030504040204" pitchFamily="34" charset="0"/>
-                <a:ea typeface="Tahoma" panose="020B0604030504040204" pitchFamily="34" charset="0"/>
-                <a:cs typeface="Tahoma" panose="020B0604030504040204" pitchFamily="34" charset="0"/>
-              </a:rPr>
-              <a:t>Heads up the 1819 Initiative at UC</a:t>
-            </a:r>
-          </a:p>
-          <a:p>
-            <a:pPr lvl="1"/>
-            <a:r>
-              <a:rPr lang="en-US" dirty="0">
-                <a:latin typeface="Tahoma" panose="020B0604030504040204" pitchFamily="34" charset="0"/>
-                <a:ea typeface="Tahoma" panose="020B0604030504040204" pitchFamily="34" charset="0"/>
-                <a:cs typeface="Tahoma" panose="020B0604030504040204" pitchFamily="34" charset="0"/>
-              </a:rPr>
-              <a:t>7 years professional software development experience</a:t>
-            </a:r>
-          </a:p>
-          <a:p>
-            <a:pPr lvl="1"/>
-            <a:r>
-              <a:rPr lang="en-US" dirty="0">
-                <a:latin typeface="Tahoma" panose="020B0604030504040204" pitchFamily="34" charset="0"/>
-                <a:ea typeface="Tahoma" panose="020B0604030504040204" pitchFamily="34" charset="0"/>
-                <a:cs typeface="Tahoma" panose="020B0604030504040204" pitchFamily="34" charset="0"/>
-              </a:rPr>
-              <a:t>Father to a five-month-old baby boy</a:t>
+              <a:rPr lang="en-US" sz="1600" dirty="0"/>
+              <a:t>15 years IT experience</a:t>
+            </a:r>
+          </a:p>
+          <a:p>
+            <a:pPr marL="742950" lvl="1" indent="-285750">
+              <a:buFont typeface="Arial" panose="020B0604020202020204" pitchFamily="34" charset="0"/>
+              <a:buChar char="•"/>
+            </a:pPr>
+            <a:r>
+              <a:rPr lang="en-US" sz="1600" dirty="0"/>
+              <a:t>5 years professional software development experience</a:t>
+            </a:r>
+          </a:p>
+          <a:p>
+            <a:pPr marL="742950" lvl="1" indent="-285750">
+              <a:buFont typeface="Arial" panose="020B0604020202020204" pitchFamily="34" charset="0"/>
+              <a:buChar char="•"/>
+            </a:pPr>
+            <a:r>
+              <a:rPr lang="en-US" sz="1600" dirty="0"/>
+              <a:t>Father to a seventeen-month-old baby girl</a:t>
             </a:r>
           </a:p>
         </p:txBody>
@@ -14792,23 +14766,14 @@
           <a:p>
             <a:r>
               <a:rPr lang="en-US" dirty="0"/>
-              <a:t>Agnostic view of git, separate from </a:t>
-            </a:r>
-            <a:r>
-              <a:rPr lang="en-US" dirty="0" err="1"/>
-              <a:t>github</a:t>
-            </a:r>
-            <a:endParaRPr lang="en-US" dirty="0"/>
+              <a:t>Agnostic view of git, separate from GitHub</a:t>
+            </a:r>
           </a:p>
           <a:p>
             <a:pPr lvl="1"/>
             <a:r>
-              <a:rPr lang="en-US"/>
-              <a:t>The </a:t>
-            </a:r>
-            <a:r>
               <a:rPr lang="en-US" dirty="0"/>
-              <a:t>how and why of using git</a:t>
+              <a:t>The how and why of using git</a:t>
             </a:r>
           </a:p>
           <a:p>

</xml_diff>